<commit_message>
add serverless in aws
</commit_message>
<xml_diff>
--- a/docs/Diagrams.pptx
+++ b/docs/Diagrams.pptx
@@ -6,7 +6,7 @@
     <p:sldMasterId id="2147484308" r:id="rId2"/>
   </p:sldMasterIdLst>
   <p:notesMasterIdLst>
-    <p:notesMasterId r:id="rId10"/>
+    <p:notesMasterId r:id="rId11"/>
   </p:notesMasterIdLst>
   <p:sldIdLst>
     <p:sldId id="2670" r:id="rId3"/>
@@ -16,6 +16,7 @@
     <p:sldId id="2674" r:id="rId7"/>
     <p:sldId id="2675" r:id="rId8"/>
     <p:sldId id="2676" r:id="rId9"/>
+    <p:sldId id="2677" r:id="rId10"/>
   </p:sldIdLst>
   <p:sldSz cx="12192000" cy="6858000"/>
   <p:notesSz cx="7086600" cy="9372600"/>
@@ -278,7 +279,7 @@
               <a:pPr>
                 <a:defRPr/>
               </a:pPr>
-              <a:t>12/11/20</a:t>
+              <a:t>12/17/20</a:t>
             </a:fld>
             <a:endParaRPr lang="en-US"/>
           </a:p>
@@ -23406,6 +23407,2393 @@
 </p:sld>
 </file>
 
+<file path=ppt/slides/slide8.xml><?xml version="1.0" encoding="utf-8"?>
+<p:sld xmlns:a="http://schemas.openxmlformats.org/drawingml/2006/main" xmlns:r="http://schemas.openxmlformats.org/officeDocument/2006/relationships" xmlns:p="http://schemas.openxmlformats.org/presentationml/2006/main">
+  <p:cSld>
+    <p:spTree>
+      <p:nvGrpSpPr>
+        <p:cNvPr id="1" name=""/>
+        <p:cNvGrpSpPr/>
+        <p:nvPr/>
+      </p:nvGrpSpPr>
+      <p:grpSpPr>
+        <a:xfrm>
+          <a:off x="0" y="0"/>
+          <a:ext cx="0" cy="0"/>
+          <a:chOff x="0" y="0"/>
+          <a:chExt cx="0" cy="0"/>
+        </a:xfrm>
+      </p:grpSpPr>
+      <p:sp>
+        <p:nvSpPr>
+          <p:cNvPr id="2" name="Title 1">
+            <a:extLst>
+              <a:ext uri="{FF2B5EF4-FFF2-40B4-BE49-F238E27FC236}">
+                <a16:creationId xmlns:a16="http://schemas.microsoft.com/office/drawing/2014/main" id="{747AFB5C-0E89-E14D-9D9D-1B6F7821D359}"/>
+              </a:ext>
+            </a:extLst>
+          </p:cNvPr>
+          <p:cNvSpPr>
+            <a:spLocks noGrp="1"/>
+          </p:cNvSpPr>
+          <p:nvPr>
+            <p:ph type="title"/>
+          </p:nvPr>
+        </p:nvSpPr>
+        <p:spPr/>
+        <p:txBody>
+          <a:bodyPr/>
+          <a:lstStyle/>
+          <a:p>
+            <a:r>
+              <a:rPr lang="en-US" dirty="0"/>
+              <a:t>Serverless Architecture</a:t>
+            </a:r>
+            <a:endParaRPr dirty="0"/>
+          </a:p>
+        </p:txBody>
+      </p:sp>
+      <p:sp>
+        <p:nvSpPr>
+          <p:cNvPr id="3" name="Slide Number Placeholder 2">
+            <a:extLst>
+              <a:ext uri="{FF2B5EF4-FFF2-40B4-BE49-F238E27FC236}">
+                <a16:creationId xmlns:a16="http://schemas.microsoft.com/office/drawing/2014/main" id="{99036B59-5CD6-6643-861B-F7A5D6387ACC}"/>
+              </a:ext>
+            </a:extLst>
+          </p:cNvPr>
+          <p:cNvSpPr>
+            <a:spLocks noGrp="1"/>
+          </p:cNvSpPr>
+          <p:nvPr>
+            <p:ph type="sldNum" sz="quarter" idx="10"/>
+          </p:nvPr>
+        </p:nvSpPr>
+        <p:spPr/>
+        <p:txBody>
+          <a:bodyPr/>
+          <a:lstStyle/>
+          <a:p>
+            <a:pPr defTabSz="911231" eaLnBrk="1" fontAlgn="auto" hangingPunct="1">
+              <a:spcBef>
+                <a:spcPts val="0"/>
+              </a:spcBef>
+              <a:spcAft>
+                <a:spcPts val="0"/>
+              </a:spcAft>
+              <a:defRPr/>
+            </a:pPr>
+            <a:r>
+              <a:rPr lang="en-US" altLang="en-US">
+                <a:solidFill>
+                  <a:srgbClr val="FFFFFF"/>
+                </a:solidFill>
+                <a:latin typeface="Arial"/>
+                <a:ea typeface="ＭＳ Ｐゴシック" charset="0"/>
+                <a:cs typeface="Arial"/>
+                <a:sym typeface="Helvetica" charset="0"/>
+              </a:rPr>
+              <a:t>IBM Confidential – Page </a:t>
+            </a:r>
+            <a:fld id="{E29CC0C0-E046-4664-B80A-AA818B18C835}" type="slidenum">
+              <a:rPr lang="en-US" altLang="en-US" smtClean="0">
+                <a:solidFill>
+                  <a:srgbClr val="FFFFFF"/>
+                </a:solidFill>
+                <a:latin typeface="Arial"/>
+                <a:ea typeface="ＭＳ Ｐゴシック" charset="0"/>
+                <a:cs typeface="Arial"/>
+                <a:sym typeface="Helvetica" charset="0"/>
+              </a:rPr>
+              <a:pPr defTabSz="911231" eaLnBrk="1" fontAlgn="auto" hangingPunct="1">
+                <a:spcBef>
+                  <a:spcPts val="0"/>
+                </a:spcBef>
+                <a:spcAft>
+                  <a:spcPts val="0"/>
+                </a:spcAft>
+                <a:defRPr/>
+              </a:pPr>
+              <a:t>8</a:t>
+            </a:fld>
+            <a:endParaRPr lang="en-US" altLang="en-US">
+              <a:solidFill>
+                <a:srgbClr val="FFFFFF"/>
+              </a:solidFill>
+              <a:latin typeface="Arial"/>
+              <a:ea typeface="ＭＳ Ｐゴシック" charset="0"/>
+              <a:cs typeface="Arial"/>
+              <a:sym typeface="Helvetica" charset="0"/>
+            </a:endParaRPr>
+          </a:p>
+        </p:txBody>
+      </p:sp>
+      <p:grpSp>
+        <p:nvGrpSpPr>
+          <p:cNvPr id="4" name="Group 3">
+            <a:extLst>
+              <a:ext uri="{FF2B5EF4-FFF2-40B4-BE49-F238E27FC236}">
+                <a16:creationId xmlns:a16="http://schemas.microsoft.com/office/drawing/2014/main" id="{19499B35-05CC-C546-81E0-AB392B68DC98}"/>
+              </a:ext>
+            </a:extLst>
+          </p:cNvPr>
+          <p:cNvGrpSpPr/>
+          <p:nvPr/>
+        </p:nvGrpSpPr>
+        <p:grpSpPr>
+          <a:xfrm>
+            <a:off x="335324" y="2641095"/>
+            <a:ext cx="555874" cy="787905"/>
+            <a:chOff x="-774327" y="1676400"/>
+            <a:chExt cx="555874" cy="787905"/>
+          </a:xfrm>
+        </p:grpSpPr>
+        <p:grpSp>
+          <p:nvGrpSpPr>
+            <p:cNvPr id="5" name="Group 4">
+              <a:extLst>
+                <a:ext uri="{FF2B5EF4-FFF2-40B4-BE49-F238E27FC236}">
+                  <a16:creationId xmlns:a16="http://schemas.microsoft.com/office/drawing/2014/main" id="{119648D5-30EB-F54E-B5AD-177593E6C8CD}"/>
+                </a:ext>
+              </a:extLst>
+            </p:cNvPr>
+            <p:cNvGrpSpPr/>
+            <p:nvPr/>
+          </p:nvGrpSpPr>
+          <p:grpSpPr>
+            <a:xfrm>
+              <a:off x="-774327" y="1676400"/>
+              <a:ext cx="548640" cy="548640"/>
+              <a:chOff x="-923414" y="1676400"/>
+              <a:chExt cx="1019446" cy="1019446"/>
+            </a:xfrm>
+          </p:grpSpPr>
+          <p:sp>
+            <p:nvSpPr>
+              <p:cNvPr id="7" name="Shape 189">
+                <a:extLst>
+                  <a:ext uri="{FF2B5EF4-FFF2-40B4-BE49-F238E27FC236}">
+                    <a16:creationId xmlns:a16="http://schemas.microsoft.com/office/drawing/2014/main" id="{7493A15C-F1B6-9343-BE4C-F03F9D495501}"/>
+                  </a:ext>
+                </a:extLst>
+              </p:cNvPr>
+              <p:cNvSpPr>
+                <a:spLocks noChangeAspect="1"/>
+              </p:cNvSpPr>
+              <p:nvPr/>
+            </p:nvSpPr>
+            <p:spPr>
+              <a:xfrm>
+                <a:off x="-923414" y="1676400"/>
+                <a:ext cx="1019446" cy="1019446"/>
+              </a:xfrm>
+              <a:custGeom>
+                <a:avLst/>
+                <a:gdLst/>
+                <a:ahLst/>
+                <a:cxnLst>
+                  <a:cxn ang="0">
+                    <a:pos x="wd2" y="hd2"/>
+                  </a:cxn>
+                  <a:cxn ang="5400000">
+                    <a:pos x="wd2" y="hd2"/>
+                  </a:cxn>
+                  <a:cxn ang="10800000">
+                    <a:pos x="wd2" y="hd2"/>
+                  </a:cxn>
+                  <a:cxn ang="16200000">
+                    <a:pos x="wd2" y="hd2"/>
+                  </a:cxn>
+                </a:cxnLst>
+                <a:rect l="0" t="0" r="r" b="b"/>
+                <a:pathLst>
+                  <a:path w="19679" h="19679" extrusionOk="0">
+                    <a:moveTo>
+                      <a:pt x="16796" y="2882"/>
+                    </a:moveTo>
+                    <a:cubicBezTo>
+                      <a:pt x="20639" y="6724"/>
+                      <a:pt x="20639" y="12954"/>
+                      <a:pt x="16796" y="16796"/>
+                    </a:cubicBezTo>
+                    <a:cubicBezTo>
+                      <a:pt x="12954" y="20639"/>
+                      <a:pt x="6724" y="20639"/>
+                      <a:pt x="2882" y="16796"/>
+                    </a:cubicBezTo>
+                    <a:cubicBezTo>
+                      <a:pt x="-961" y="12954"/>
+                      <a:pt x="-961" y="6724"/>
+                      <a:pt x="2882" y="2882"/>
+                    </a:cubicBezTo>
+                    <a:cubicBezTo>
+                      <a:pt x="6724" y="-961"/>
+                      <a:pt x="12954" y="-961"/>
+                      <a:pt x="16796" y="2882"/>
+                    </a:cubicBezTo>
+                    <a:close/>
+                  </a:path>
+                </a:pathLst>
+              </a:custGeom>
+              <a:solidFill>
+                <a:srgbClr val="C6982C"/>
+              </a:solidFill>
+              <a:ln w="3175" cap="flat">
+                <a:noFill/>
+                <a:miter lim="400000"/>
+              </a:ln>
+              <a:effectLst/>
+            </p:spPr>
+            <p:txBody>
+              <a:bodyPr wrap="square" lIns="0" tIns="0" rIns="0" bIns="0" numCol="1" anchor="ctr">
+                <a:noAutofit/>
+              </a:bodyPr>
+              <a:lstStyle/>
+              <a:p>
+                <a:pPr lvl="0">
+                  <a:defRPr sz="1800">
+                    <a:solidFill>
+                      <a:srgbClr val="FFFFFF"/>
+                    </a:solidFill>
+                  </a:defRPr>
+                </a:pPr>
+                <a:endParaRPr dirty="0"/>
+              </a:p>
+            </p:txBody>
+          </p:sp>
+          <p:pic>
+            <p:nvPicPr>
+              <p:cNvPr id="8" name="_-02.png">
+                <a:extLst>
+                  <a:ext uri="{FF2B5EF4-FFF2-40B4-BE49-F238E27FC236}">
+                    <a16:creationId xmlns:a16="http://schemas.microsoft.com/office/drawing/2014/main" id="{FFE349D2-B1E8-734F-89C7-6E62070F21FF}"/>
+                  </a:ext>
+                </a:extLst>
+              </p:cNvPr>
+              <p:cNvPicPr/>
+              <p:nvPr/>
+            </p:nvPicPr>
+            <p:blipFill>
+              <a:blip r:embed="rId2"/>
+              <a:srcRect l="24323" t="21763" r="24323" b="21763"/>
+              <a:stretch>
+                <a:fillRect/>
+              </a:stretch>
+            </p:blipFill>
+            <p:spPr>
+              <a:xfrm>
+                <a:off x="-701490" y="1858969"/>
+                <a:ext cx="580271" cy="689776"/>
+              </a:xfrm>
+              <a:prstGeom prst="rect">
+                <a:avLst/>
+              </a:prstGeom>
+              <a:ln w="3175" cap="flat">
+                <a:noFill/>
+                <a:miter lim="400000"/>
+              </a:ln>
+              <a:effectLst/>
+            </p:spPr>
+          </p:pic>
+        </p:grpSp>
+        <p:sp>
+          <p:nvSpPr>
+            <p:cNvPr id="6" name="Shape 264">
+              <a:extLst>
+                <a:ext uri="{FF2B5EF4-FFF2-40B4-BE49-F238E27FC236}">
+                  <a16:creationId xmlns:a16="http://schemas.microsoft.com/office/drawing/2014/main" id="{D1FA90B7-C36A-B948-B28C-7B44A26A7A74}"/>
+                </a:ext>
+              </a:extLst>
+            </p:cNvPr>
+            <p:cNvSpPr/>
+            <p:nvPr/>
+          </p:nvSpPr>
+          <p:spPr>
+            <a:xfrm>
+              <a:off x="-744238" y="2218084"/>
+              <a:ext cx="525785" cy="246221"/>
+            </a:xfrm>
+            <a:prstGeom prst="rect">
+              <a:avLst/>
+            </a:prstGeom>
+            <a:noFill/>
+            <a:ln w="3175" cap="flat">
+              <a:noFill/>
+              <a:miter lim="400000"/>
+            </a:ln>
+            <a:effectLst/>
+            <a:extLst>
+              <a:ext uri="{C572A759-6A51-4108-AA02-DFA0A04FC94B}">
+                <ma14:wrappingTextBoxFlag xmlns="" xmlns:ma14="http://schemas.microsoft.com/office/mac/drawingml/2011/main" val="1"/>
+              </a:ext>
+            </a:extLst>
+          </p:spPr>
+          <p:txBody>
+            <a:bodyPr wrap="none" lIns="0" tIns="0" rIns="0" bIns="0" numCol="1" anchor="t">
+              <a:spAutoFit/>
+            </a:bodyPr>
+            <a:lstStyle/>
+            <a:p>
+              <a:pPr lvl="0" algn="ctr">
+                <a:defRPr sz="1800"/>
+              </a:pPr>
+              <a:r>
+                <a:rPr lang="en-US" sz="800" b="1" dirty="0">
+                  <a:solidFill>
+                    <a:srgbClr val="4277BB"/>
+                  </a:solidFill>
+                  <a:latin typeface="Helvetica"/>
+                  <a:ea typeface="Helvetica"/>
+                  <a:cs typeface="Helvetica"/>
+                  <a:sym typeface="Helvetica"/>
+                </a:rPr>
+                <a:t>END </a:t>
+              </a:r>
+            </a:p>
+            <a:p>
+              <a:pPr lvl="0" algn="ctr">
+                <a:defRPr sz="1800"/>
+              </a:pPr>
+              <a:r>
+                <a:rPr lang="en-US" sz="800" b="1" dirty="0">
+                  <a:solidFill>
+                    <a:srgbClr val="4277BB"/>
+                  </a:solidFill>
+                  <a:latin typeface="Helvetica"/>
+                  <a:ea typeface="Helvetica"/>
+                  <a:cs typeface="Helvetica"/>
+                  <a:sym typeface="Helvetica"/>
+                </a:rPr>
+                <a:t>USER APP</a:t>
+              </a:r>
+              <a:endParaRPr sz="800" b="1" dirty="0">
+                <a:solidFill>
+                  <a:srgbClr val="4277BB"/>
+                </a:solidFill>
+                <a:latin typeface="Helvetica"/>
+                <a:ea typeface="Helvetica"/>
+                <a:cs typeface="Helvetica"/>
+                <a:sym typeface="Helvetica"/>
+              </a:endParaRPr>
+            </a:p>
+          </p:txBody>
+        </p:sp>
+      </p:grpSp>
+      <p:grpSp>
+        <p:nvGrpSpPr>
+          <p:cNvPr id="9" name="Group 8">
+            <a:extLst>
+              <a:ext uri="{FF2B5EF4-FFF2-40B4-BE49-F238E27FC236}">
+                <a16:creationId xmlns:a16="http://schemas.microsoft.com/office/drawing/2014/main" id="{C2FF062D-6EC3-B74F-B6A8-CEE5F5E865FC}"/>
+              </a:ext>
+            </a:extLst>
+          </p:cNvPr>
+          <p:cNvGrpSpPr/>
+          <p:nvPr/>
+        </p:nvGrpSpPr>
+        <p:grpSpPr>
+          <a:xfrm>
+            <a:off x="1595590" y="4267975"/>
+            <a:ext cx="548640" cy="662070"/>
+            <a:chOff x="7390429" y="-1789102"/>
+            <a:chExt cx="548640" cy="662070"/>
+          </a:xfrm>
+        </p:grpSpPr>
+        <p:pic>
+          <p:nvPicPr>
+            <p:cNvPr id="10" name="Picture 9">
+              <a:extLst>
+                <a:ext uri="{FF2B5EF4-FFF2-40B4-BE49-F238E27FC236}">
+                  <a16:creationId xmlns:a16="http://schemas.microsoft.com/office/drawing/2014/main" id="{5F17099A-3283-B440-AA57-2AEA34AE5692}"/>
+                </a:ext>
+              </a:extLst>
+            </p:cNvPr>
+            <p:cNvPicPr>
+              <a:picLocks noChangeAspect="1"/>
+            </p:cNvPicPr>
+            <p:nvPr/>
+          </p:nvPicPr>
+          <p:blipFill>
+            <a:blip r:embed="rId3"/>
+            <a:stretch>
+              <a:fillRect/>
+            </a:stretch>
+          </p:blipFill>
+          <p:spPr>
+            <a:xfrm>
+              <a:off x="7390429" y="-1789102"/>
+              <a:ext cx="548640" cy="548640"/>
+            </a:xfrm>
+            <a:prstGeom prst="rect">
+              <a:avLst/>
+            </a:prstGeom>
+          </p:spPr>
+        </p:pic>
+        <p:sp>
+          <p:nvSpPr>
+            <p:cNvPr id="11" name="Shape 264">
+              <a:extLst>
+                <a:ext uri="{FF2B5EF4-FFF2-40B4-BE49-F238E27FC236}">
+                  <a16:creationId xmlns:a16="http://schemas.microsoft.com/office/drawing/2014/main" id="{DC705403-6E16-204D-8FB0-2DF039140013}"/>
+                </a:ext>
+              </a:extLst>
+            </p:cNvPr>
+            <p:cNvSpPr/>
+            <p:nvPr/>
+          </p:nvSpPr>
+          <p:spPr>
+            <a:xfrm>
+              <a:off x="7404261" y="-1250143"/>
+              <a:ext cx="520976" cy="123111"/>
+            </a:xfrm>
+            <a:prstGeom prst="rect">
+              <a:avLst/>
+            </a:prstGeom>
+            <a:noFill/>
+            <a:ln w="3175" cap="flat">
+              <a:noFill/>
+              <a:miter lim="400000"/>
+            </a:ln>
+            <a:effectLst/>
+            <a:extLst>
+              <a:ext uri="{C572A759-6A51-4108-AA02-DFA0A04FC94B}">
+                <ma14:wrappingTextBoxFlag xmlns="" xmlns:ma14="http://schemas.microsoft.com/office/mac/drawingml/2011/main" val="1"/>
+              </a:ext>
+            </a:extLst>
+          </p:spPr>
+          <p:txBody>
+            <a:bodyPr wrap="square" lIns="0" tIns="0" rIns="0" bIns="0" numCol="1" anchor="t">
+              <a:spAutoFit/>
+            </a:bodyPr>
+            <a:lstStyle/>
+            <a:p>
+              <a:pPr lvl="0" algn="ctr">
+                <a:defRPr sz="1800"/>
+              </a:pPr>
+              <a:r>
+                <a:rPr lang="en-US" sz="800" b="1" dirty="0">
+                  <a:solidFill>
+                    <a:srgbClr val="4277BB"/>
+                  </a:solidFill>
+                  <a:latin typeface="Helvetica"/>
+                  <a:ea typeface="Helvetica"/>
+                  <a:cs typeface="Helvetica"/>
+                  <a:sym typeface="Helvetica"/>
+                </a:rPr>
+                <a:t>Cognito</a:t>
+              </a:r>
+              <a:endParaRPr sz="800" b="1" dirty="0">
+                <a:solidFill>
+                  <a:srgbClr val="4277BB"/>
+                </a:solidFill>
+                <a:latin typeface="Helvetica"/>
+                <a:ea typeface="Helvetica"/>
+                <a:cs typeface="Helvetica"/>
+                <a:sym typeface="Helvetica"/>
+              </a:endParaRPr>
+            </a:p>
+          </p:txBody>
+        </p:sp>
+      </p:grpSp>
+      <p:grpSp>
+        <p:nvGrpSpPr>
+          <p:cNvPr id="12" name="Group 11">
+            <a:extLst>
+              <a:ext uri="{FF2B5EF4-FFF2-40B4-BE49-F238E27FC236}">
+                <a16:creationId xmlns:a16="http://schemas.microsoft.com/office/drawing/2014/main" id="{71C869AD-DE31-AC41-9F33-F1CC1CE0DC3C}"/>
+              </a:ext>
+            </a:extLst>
+          </p:cNvPr>
+          <p:cNvGrpSpPr/>
+          <p:nvPr/>
+        </p:nvGrpSpPr>
+        <p:grpSpPr>
+          <a:xfrm>
+            <a:off x="7253686" y="2635865"/>
+            <a:ext cx="548640" cy="793135"/>
+            <a:chOff x="4329965" y="-850115"/>
+            <a:chExt cx="548640" cy="793135"/>
+          </a:xfrm>
+        </p:grpSpPr>
+        <p:pic>
+          <p:nvPicPr>
+            <p:cNvPr id="13" name="Picture 12">
+              <a:extLst>
+                <a:ext uri="{FF2B5EF4-FFF2-40B4-BE49-F238E27FC236}">
+                  <a16:creationId xmlns:a16="http://schemas.microsoft.com/office/drawing/2014/main" id="{E75CD5D0-C14A-1C44-84E1-F03D2AF72DC5}"/>
+                </a:ext>
+              </a:extLst>
+            </p:cNvPr>
+            <p:cNvPicPr>
+              <a:picLocks noChangeAspect="1"/>
+            </p:cNvPicPr>
+            <p:nvPr/>
+          </p:nvPicPr>
+          <p:blipFill>
+            <a:blip r:embed="rId4"/>
+            <a:stretch>
+              <a:fillRect/>
+            </a:stretch>
+          </p:blipFill>
+          <p:spPr>
+            <a:xfrm>
+              <a:off x="4329965" y="-850115"/>
+              <a:ext cx="548640" cy="548640"/>
+            </a:xfrm>
+            <a:prstGeom prst="rect">
+              <a:avLst/>
+            </a:prstGeom>
+          </p:spPr>
+        </p:pic>
+        <p:sp>
+          <p:nvSpPr>
+            <p:cNvPr id="14" name="Shape 264">
+              <a:extLst>
+                <a:ext uri="{FF2B5EF4-FFF2-40B4-BE49-F238E27FC236}">
+                  <a16:creationId xmlns:a16="http://schemas.microsoft.com/office/drawing/2014/main" id="{55866B3B-C1F0-6145-A613-475EF1D2E264}"/>
+                </a:ext>
+              </a:extLst>
+            </p:cNvPr>
+            <p:cNvSpPr/>
+            <p:nvPr/>
+          </p:nvSpPr>
+          <p:spPr>
+            <a:xfrm>
+              <a:off x="4343797" y="-303201"/>
+              <a:ext cx="520976" cy="246221"/>
+            </a:xfrm>
+            <a:prstGeom prst="rect">
+              <a:avLst/>
+            </a:prstGeom>
+            <a:noFill/>
+            <a:ln w="3175" cap="flat">
+              <a:noFill/>
+              <a:miter lim="400000"/>
+            </a:ln>
+            <a:effectLst/>
+            <a:extLst>
+              <a:ext uri="{C572A759-6A51-4108-AA02-DFA0A04FC94B}">
+                <ma14:wrappingTextBoxFlag xmlns="" xmlns:ma14="http://schemas.microsoft.com/office/mac/drawingml/2011/main" val="1"/>
+              </a:ext>
+            </a:extLst>
+          </p:spPr>
+          <p:txBody>
+            <a:bodyPr wrap="square" lIns="0" tIns="0" rIns="0" bIns="0" numCol="1" anchor="t">
+              <a:spAutoFit/>
+            </a:bodyPr>
+            <a:lstStyle/>
+            <a:p>
+              <a:pPr lvl="0" algn="ctr">
+                <a:defRPr sz="1800"/>
+              </a:pPr>
+              <a:r>
+                <a:rPr lang="en-US" sz="800" b="1" dirty="0">
+                  <a:solidFill>
+                    <a:srgbClr val="4277BB"/>
+                  </a:solidFill>
+                  <a:latin typeface="Helvetica"/>
+                  <a:ea typeface="Helvetica"/>
+                  <a:cs typeface="Helvetica"/>
+                  <a:sym typeface="Helvetica"/>
+                </a:rPr>
+                <a:t>DYNAMO</a:t>
+              </a:r>
+            </a:p>
+            <a:p>
+              <a:pPr lvl="0" algn="ctr">
+                <a:defRPr sz="1800"/>
+              </a:pPr>
+              <a:r>
+                <a:rPr lang="en-US" sz="800" b="1" dirty="0">
+                  <a:solidFill>
+                    <a:srgbClr val="4277BB"/>
+                  </a:solidFill>
+                  <a:latin typeface="Helvetica"/>
+                  <a:ea typeface="Helvetica"/>
+                  <a:cs typeface="Helvetica"/>
+                  <a:sym typeface="Helvetica"/>
+                </a:rPr>
+                <a:t>DB</a:t>
+              </a:r>
+              <a:endParaRPr sz="800" b="1" dirty="0">
+                <a:solidFill>
+                  <a:srgbClr val="4277BB"/>
+                </a:solidFill>
+                <a:latin typeface="Helvetica"/>
+                <a:ea typeface="Helvetica"/>
+                <a:cs typeface="Helvetica"/>
+                <a:sym typeface="Helvetica"/>
+              </a:endParaRPr>
+            </a:p>
+          </p:txBody>
+        </p:sp>
+      </p:grpSp>
+      <p:cxnSp>
+        <p:nvCxnSpPr>
+          <p:cNvPr id="16" name="Straight Arrow Connector 15">
+            <a:extLst>
+              <a:ext uri="{FF2B5EF4-FFF2-40B4-BE49-F238E27FC236}">
+                <a16:creationId xmlns:a16="http://schemas.microsoft.com/office/drawing/2014/main" id="{2B513BEB-36B5-D04C-AD5A-751ED8E67BDC}"/>
+              </a:ext>
+            </a:extLst>
+          </p:cNvPr>
+          <p:cNvCxnSpPr>
+            <a:cxnSpLocks/>
+          </p:cNvCxnSpPr>
+          <p:nvPr/>
+        </p:nvCxnSpPr>
+        <p:spPr>
+          <a:xfrm>
+            <a:off x="767045" y="3429000"/>
+            <a:ext cx="912576" cy="867074"/>
+          </a:xfrm>
+          <a:prstGeom prst="straightConnector1">
+            <a:avLst/>
+          </a:prstGeom>
+          <a:ln>
+            <a:headEnd type="triangle"/>
+            <a:tailEnd type="triangle"/>
+          </a:ln>
+        </p:spPr>
+        <p:style>
+          <a:lnRef idx="1">
+            <a:schemeClr val="accent2"/>
+          </a:lnRef>
+          <a:fillRef idx="0">
+            <a:schemeClr val="accent2"/>
+          </a:fillRef>
+          <a:effectRef idx="0">
+            <a:schemeClr val="accent2"/>
+          </a:effectRef>
+          <a:fontRef idx="minor">
+            <a:schemeClr val="tx1"/>
+          </a:fontRef>
+        </p:style>
+      </p:cxnSp>
+      <p:sp>
+        <p:nvSpPr>
+          <p:cNvPr id="17" name="TextBox 16">
+            <a:extLst>
+              <a:ext uri="{FF2B5EF4-FFF2-40B4-BE49-F238E27FC236}">
+                <a16:creationId xmlns:a16="http://schemas.microsoft.com/office/drawing/2014/main" id="{EE45ACB7-52C6-014B-B527-574460A2F633}"/>
+              </a:ext>
+            </a:extLst>
+          </p:cNvPr>
+          <p:cNvSpPr txBox="1"/>
+          <p:nvPr/>
+        </p:nvSpPr>
+        <p:spPr>
+          <a:xfrm>
+            <a:off x="622896" y="3625131"/>
+            <a:ext cx="891591" cy="246221"/>
+          </a:xfrm>
+          <a:prstGeom prst="rect">
+            <a:avLst/>
+          </a:prstGeom>
+          <a:solidFill>
+            <a:schemeClr val="bg1"/>
+          </a:solidFill>
+        </p:spPr>
+        <p:txBody>
+          <a:bodyPr wrap="none" rtlCol="0">
+            <a:spAutoFit/>
+          </a:bodyPr>
+          <a:lstStyle/>
+          <a:p>
+            <a:r>
+              <a:rPr lang="en-US" sz="1000" dirty="0"/>
+              <a:t>Authenticate</a:t>
+            </a:r>
+            <a:endParaRPr sz="1000" dirty="0"/>
+          </a:p>
+        </p:txBody>
+      </p:sp>
+      <p:grpSp>
+        <p:nvGrpSpPr>
+          <p:cNvPr id="18" name="Group 17">
+            <a:extLst>
+              <a:ext uri="{FF2B5EF4-FFF2-40B4-BE49-F238E27FC236}">
+                <a16:creationId xmlns:a16="http://schemas.microsoft.com/office/drawing/2014/main" id="{FF50E5A1-2F3F-3340-9F8B-4F72EB9F4667}"/>
+              </a:ext>
+            </a:extLst>
+          </p:cNvPr>
+          <p:cNvGrpSpPr/>
+          <p:nvPr/>
+        </p:nvGrpSpPr>
+        <p:grpSpPr>
+          <a:xfrm>
+            <a:off x="2357126" y="5562393"/>
+            <a:ext cx="764759" cy="914604"/>
+            <a:chOff x="10202840" y="-858415"/>
+            <a:chExt cx="764759" cy="914604"/>
+          </a:xfrm>
+        </p:grpSpPr>
+        <p:pic>
+          <p:nvPicPr>
+            <p:cNvPr id="19" name="Picture 18">
+              <a:extLst>
+                <a:ext uri="{FF2B5EF4-FFF2-40B4-BE49-F238E27FC236}">
+                  <a16:creationId xmlns:a16="http://schemas.microsoft.com/office/drawing/2014/main" id="{9BC97DC8-CC17-9744-A184-1DA660F90896}"/>
+                </a:ext>
+              </a:extLst>
+            </p:cNvPr>
+            <p:cNvPicPr>
+              <a:picLocks noChangeAspect="1"/>
+            </p:cNvPicPr>
+            <p:nvPr/>
+          </p:nvPicPr>
+          <p:blipFill>
+            <a:blip r:embed="rId5"/>
+            <a:stretch>
+              <a:fillRect/>
+            </a:stretch>
+          </p:blipFill>
+          <p:spPr>
+            <a:xfrm>
+              <a:off x="10313700" y="-858415"/>
+              <a:ext cx="548640" cy="548640"/>
+            </a:xfrm>
+            <a:prstGeom prst="rect">
+              <a:avLst/>
+            </a:prstGeom>
+          </p:spPr>
+        </p:pic>
+        <p:sp>
+          <p:nvSpPr>
+            <p:cNvPr id="20" name="Shape 264">
+              <a:extLst>
+                <a:ext uri="{FF2B5EF4-FFF2-40B4-BE49-F238E27FC236}">
+                  <a16:creationId xmlns:a16="http://schemas.microsoft.com/office/drawing/2014/main" id="{7F482492-CE41-AB4E-AB91-C3E0696A7C3C}"/>
+                </a:ext>
+              </a:extLst>
+            </p:cNvPr>
+            <p:cNvSpPr/>
+            <p:nvPr/>
+          </p:nvSpPr>
+          <p:spPr>
+            <a:xfrm>
+              <a:off x="10202840" y="-313143"/>
+              <a:ext cx="764759" cy="369332"/>
+            </a:xfrm>
+            <a:prstGeom prst="rect">
+              <a:avLst/>
+            </a:prstGeom>
+            <a:noFill/>
+            <a:ln w="3175" cap="flat">
+              <a:noFill/>
+              <a:miter lim="400000"/>
+            </a:ln>
+            <a:effectLst/>
+            <a:extLst>
+              <a:ext uri="{C572A759-6A51-4108-AA02-DFA0A04FC94B}">
+                <ma14:wrappingTextBoxFlag xmlns:ma14="http://schemas.microsoft.com/office/mac/drawingml/2011/main" xmlns="" val="1"/>
+              </a:ext>
+            </a:extLst>
+          </p:spPr>
+          <p:txBody>
+            <a:bodyPr wrap="square" lIns="0" tIns="0" rIns="0" bIns="0" numCol="1" anchor="t">
+              <a:spAutoFit/>
+            </a:bodyPr>
+            <a:lstStyle/>
+            <a:p>
+              <a:pPr lvl="0" algn="ctr">
+                <a:defRPr sz="1800"/>
+              </a:pPr>
+              <a:r>
+                <a:rPr lang="en-US" sz="800" b="1" dirty="0">
+                  <a:solidFill>
+                    <a:srgbClr val="4277BB"/>
+                  </a:solidFill>
+                  <a:latin typeface="Helvetica"/>
+                  <a:ea typeface="Helvetica"/>
+                  <a:cs typeface="Helvetica"/>
+                  <a:sym typeface="Helvetica"/>
+                </a:rPr>
+                <a:t>IDENTITY &amp; ACCESS MANAGEMENT</a:t>
+              </a:r>
+              <a:endParaRPr sz="800" b="1" dirty="0">
+                <a:solidFill>
+                  <a:srgbClr val="4277BB"/>
+                </a:solidFill>
+                <a:latin typeface="Helvetica"/>
+                <a:ea typeface="Helvetica"/>
+                <a:cs typeface="Helvetica"/>
+                <a:sym typeface="Helvetica"/>
+              </a:endParaRPr>
+            </a:p>
+          </p:txBody>
+        </p:sp>
+      </p:grpSp>
+      <p:grpSp>
+        <p:nvGrpSpPr>
+          <p:cNvPr id="21" name="Group 379">
+            <a:extLst>
+              <a:ext uri="{FF2B5EF4-FFF2-40B4-BE49-F238E27FC236}">
+                <a16:creationId xmlns:a16="http://schemas.microsoft.com/office/drawing/2014/main" id="{B84894CA-3751-1942-85B0-4A74B5A6CE81}"/>
+              </a:ext>
+            </a:extLst>
+          </p:cNvPr>
+          <p:cNvGrpSpPr/>
+          <p:nvPr/>
+        </p:nvGrpSpPr>
+        <p:grpSpPr>
+          <a:xfrm>
+            <a:off x="1514487" y="2609089"/>
+            <a:ext cx="891591" cy="864025"/>
+            <a:chOff x="0" y="0"/>
+            <a:chExt cx="1175438" cy="932542"/>
+          </a:xfrm>
+        </p:grpSpPr>
+        <p:sp>
+          <p:nvSpPr>
+            <p:cNvPr id="22" name="Shape 375">
+              <a:extLst>
+                <a:ext uri="{FF2B5EF4-FFF2-40B4-BE49-F238E27FC236}">
+                  <a16:creationId xmlns:a16="http://schemas.microsoft.com/office/drawing/2014/main" id="{ADF5DC0E-8664-9E45-9F6C-9C8CF3206AF5}"/>
+                </a:ext>
+              </a:extLst>
+            </p:cNvPr>
+            <p:cNvSpPr/>
+            <p:nvPr/>
+          </p:nvSpPr>
+          <p:spPr>
+            <a:xfrm>
+              <a:off x="217706" y="0"/>
+              <a:ext cx="707232" cy="707232"/>
+            </a:xfrm>
+            <a:custGeom>
+              <a:avLst/>
+              <a:gdLst/>
+              <a:ahLst/>
+              <a:cxnLst>
+                <a:cxn ang="0">
+                  <a:pos x="wd2" y="hd2"/>
+                </a:cxn>
+                <a:cxn ang="5400000">
+                  <a:pos x="wd2" y="hd2"/>
+                </a:cxn>
+                <a:cxn ang="10800000">
+                  <a:pos x="wd2" y="hd2"/>
+                </a:cxn>
+                <a:cxn ang="16200000">
+                  <a:pos x="wd2" y="hd2"/>
+                </a:cxn>
+              </a:cxnLst>
+              <a:rect l="0" t="0" r="r" b="b"/>
+              <a:pathLst>
+                <a:path w="19679" h="19679" extrusionOk="0">
+                  <a:moveTo>
+                    <a:pt x="16796" y="2882"/>
+                  </a:moveTo>
+                  <a:cubicBezTo>
+                    <a:pt x="20639" y="6724"/>
+                    <a:pt x="20639" y="12954"/>
+                    <a:pt x="16796" y="16796"/>
+                  </a:cubicBezTo>
+                  <a:cubicBezTo>
+                    <a:pt x="12954" y="20639"/>
+                    <a:pt x="6724" y="20639"/>
+                    <a:pt x="2882" y="16796"/>
+                  </a:cubicBezTo>
+                  <a:cubicBezTo>
+                    <a:pt x="-961" y="12954"/>
+                    <a:pt x="-961" y="6724"/>
+                    <a:pt x="2882" y="2882"/>
+                  </a:cubicBezTo>
+                  <a:cubicBezTo>
+                    <a:pt x="6724" y="-961"/>
+                    <a:pt x="12954" y="-961"/>
+                    <a:pt x="16796" y="2882"/>
+                  </a:cubicBezTo>
+                  <a:close/>
+                </a:path>
+              </a:pathLst>
+            </a:custGeom>
+            <a:solidFill>
+              <a:srgbClr val="00B19E"/>
+            </a:solidFill>
+            <a:ln w="3175" cap="flat">
+              <a:noFill/>
+              <a:miter lim="400000"/>
+            </a:ln>
+            <a:effectLst/>
+          </p:spPr>
+          <p:txBody>
+            <a:bodyPr wrap="square" lIns="0" tIns="0" rIns="0" bIns="0" numCol="1" anchor="ctr">
+              <a:noAutofit/>
+            </a:bodyPr>
+            <a:lstStyle/>
+            <a:p>
+              <a:pPr lvl="0">
+                <a:defRPr sz="1800">
+                  <a:solidFill>
+                    <a:srgbClr val="FFFFFF"/>
+                  </a:solidFill>
+                </a:defRPr>
+              </a:pPr>
+              <a:endParaRPr/>
+            </a:p>
+          </p:txBody>
+        </p:sp>
+        <p:grpSp>
+          <p:nvGrpSpPr>
+            <p:cNvPr id="23" name="Group 378">
+              <a:extLst>
+                <a:ext uri="{FF2B5EF4-FFF2-40B4-BE49-F238E27FC236}">
+                  <a16:creationId xmlns:a16="http://schemas.microsoft.com/office/drawing/2014/main" id="{8E164CB2-DBB7-2243-BC6D-697C6A5884D1}"/>
+                </a:ext>
+              </a:extLst>
+            </p:cNvPr>
+            <p:cNvGrpSpPr/>
+            <p:nvPr/>
+          </p:nvGrpSpPr>
+          <p:grpSpPr>
+            <a:xfrm>
+              <a:off x="-1" y="139612"/>
+              <a:ext cx="1175440" cy="792931"/>
+              <a:chOff x="0" y="130399"/>
+              <a:chExt cx="1175438" cy="792929"/>
+            </a:xfrm>
+          </p:grpSpPr>
+          <p:pic>
+            <p:nvPicPr>
+              <p:cNvPr id="24" name="_-19.png">
+                <a:extLst>
+                  <a:ext uri="{FF2B5EF4-FFF2-40B4-BE49-F238E27FC236}">
+                    <a16:creationId xmlns:a16="http://schemas.microsoft.com/office/drawing/2014/main" id="{827D0EA9-2AD3-2D4B-8787-182FE73D6F13}"/>
+                  </a:ext>
+                </a:extLst>
+              </p:cNvPr>
+              <p:cNvPicPr/>
+              <p:nvPr/>
+            </p:nvPicPr>
+            <p:blipFill>
+              <a:blip r:embed="rId6"/>
+              <a:srcRect l="11328" t="18438" r="11328" b="18438"/>
+              <a:stretch>
+                <a:fillRect/>
+              </a:stretch>
+            </p:blipFill>
+            <p:spPr>
+              <a:xfrm>
+                <a:off x="306810" y="130399"/>
+                <a:ext cx="547001" cy="446433"/>
+              </a:xfrm>
+              <a:prstGeom prst="rect">
+                <a:avLst/>
+              </a:prstGeom>
+              <a:ln w="3175" cap="flat">
+                <a:noFill/>
+                <a:miter lim="400000"/>
+              </a:ln>
+              <a:effectLst/>
+            </p:spPr>
+          </p:pic>
+          <p:sp>
+            <p:nvSpPr>
+              <p:cNvPr id="25" name="Shape 377">
+                <a:extLst>
+                  <a:ext uri="{FF2B5EF4-FFF2-40B4-BE49-F238E27FC236}">
+                    <a16:creationId xmlns:a16="http://schemas.microsoft.com/office/drawing/2014/main" id="{527328AB-FED0-8E48-974C-3F9731394A80}"/>
+                  </a:ext>
+                </a:extLst>
+              </p:cNvPr>
+              <p:cNvSpPr/>
+              <p:nvPr/>
+            </p:nvSpPr>
+            <p:spPr>
+              <a:xfrm>
+                <a:off x="0" y="707231"/>
+                <a:ext cx="1175439" cy="216099"/>
+              </a:xfrm>
+              <a:prstGeom prst="rect">
+                <a:avLst/>
+              </a:prstGeom>
+              <a:noFill/>
+              <a:ln w="3175" cap="flat">
+                <a:noFill/>
+                <a:miter lim="400000"/>
+              </a:ln>
+              <a:effectLst/>
+              <a:extLst>
+                <a:ext uri="{C572A759-6A51-4108-AA02-DFA0A04FC94B}">
+                  <ma14:wrappingTextBoxFlag xmlns:ma14="http://schemas.microsoft.com/office/mac/drawingml/2011/main" xmlns="" val="1"/>
+                </a:ext>
+              </a:extLst>
+            </p:spPr>
+            <p:txBody>
+              <a:bodyPr wrap="square" lIns="0" tIns="0" rIns="0" bIns="0" numCol="1" anchor="t">
+                <a:noAutofit/>
+              </a:bodyPr>
+              <a:lstStyle>
+                <a:lvl1pPr>
+                  <a:defRPr sz="800" b="1">
+                    <a:solidFill>
+                      <a:srgbClr val="4277BB"/>
+                    </a:solidFill>
+                    <a:latin typeface="Helvetica"/>
+                    <a:ea typeface="Helvetica"/>
+                    <a:cs typeface="Helvetica"/>
+                    <a:sym typeface="Helvetica"/>
+                  </a:defRPr>
+                </a:lvl1pPr>
+              </a:lstStyle>
+              <a:p>
+                <a:pPr lvl="0">
+                  <a:defRPr sz="1800" b="0">
+                    <a:solidFill>
+                      <a:srgbClr val="000000"/>
+                    </a:solidFill>
+                  </a:defRPr>
+                </a:pPr>
+                <a:r>
+                  <a:rPr sz="800" b="1" dirty="0">
+                    <a:solidFill>
+                      <a:srgbClr val="4277BB"/>
+                    </a:solidFill>
+                  </a:rPr>
+                  <a:t>API </a:t>
+                </a:r>
+                <a:r>
+                  <a:rPr lang="en-US" sz="800" b="1" dirty="0">
+                    <a:solidFill>
+                      <a:srgbClr val="4277BB"/>
+                    </a:solidFill>
+                  </a:rPr>
+                  <a:t>GATEWAY</a:t>
+                </a:r>
+                <a:endParaRPr sz="800" b="1" dirty="0">
+                  <a:solidFill>
+                    <a:srgbClr val="4277BB"/>
+                  </a:solidFill>
+                </a:endParaRPr>
+              </a:p>
+            </p:txBody>
+          </p:sp>
+        </p:grpSp>
+      </p:grpSp>
+      <p:cxnSp>
+        <p:nvCxnSpPr>
+          <p:cNvPr id="26" name="Straight Arrow Connector 25">
+            <a:extLst>
+              <a:ext uri="{FF2B5EF4-FFF2-40B4-BE49-F238E27FC236}">
+                <a16:creationId xmlns:a16="http://schemas.microsoft.com/office/drawing/2014/main" id="{EFA8A8E8-B409-C645-82C1-542747104C89}"/>
+              </a:ext>
+            </a:extLst>
+          </p:cNvPr>
+          <p:cNvCxnSpPr>
+            <a:cxnSpLocks/>
+          </p:cNvCxnSpPr>
+          <p:nvPr/>
+        </p:nvCxnSpPr>
+        <p:spPr>
+          <a:xfrm>
+            <a:off x="891198" y="2903551"/>
+            <a:ext cx="740207" cy="0"/>
+          </a:xfrm>
+          <a:prstGeom prst="straightConnector1">
+            <a:avLst/>
+          </a:prstGeom>
+          <a:ln>
+            <a:headEnd type="triangle"/>
+            <a:tailEnd type="triangle"/>
+          </a:ln>
+        </p:spPr>
+        <p:style>
+          <a:lnRef idx="1">
+            <a:schemeClr val="accent2"/>
+          </a:lnRef>
+          <a:fillRef idx="0">
+            <a:schemeClr val="accent2"/>
+          </a:fillRef>
+          <a:effectRef idx="0">
+            <a:schemeClr val="accent2"/>
+          </a:effectRef>
+          <a:fontRef idx="minor">
+            <a:schemeClr val="tx1"/>
+          </a:fontRef>
+        </p:style>
+      </p:cxnSp>
+      <p:sp>
+        <p:nvSpPr>
+          <p:cNvPr id="29" name="TextBox 28">
+            <a:extLst>
+              <a:ext uri="{FF2B5EF4-FFF2-40B4-BE49-F238E27FC236}">
+                <a16:creationId xmlns:a16="http://schemas.microsoft.com/office/drawing/2014/main" id="{24836AB1-B33E-3346-9DCC-ED3661071677}"/>
+              </a:ext>
+            </a:extLst>
+          </p:cNvPr>
+          <p:cNvSpPr txBox="1"/>
+          <p:nvPr/>
+        </p:nvSpPr>
+        <p:spPr>
+          <a:xfrm>
+            <a:off x="986719" y="2615332"/>
+            <a:ext cx="526106" cy="246221"/>
+          </a:xfrm>
+          <a:prstGeom prst="rect">
+            <a:avLst/>
+          </a:prstGeom>
+          <a:solidFill>
+            <a:schemeClr val="bg1"/>
+          </a:solidFill>
+        </p:spPr>
+        <p:txBody>
+          <a:bodyPr wrap="none" rtlCol="0">
+            <a:spAutoFit/>
+          </a:bodyPr>
+          <a:lstStyle/>
+          <a:p>
+            <a:r>
+              <a:rPr lang="en-US" sz="1000" dirty="0"/>
+              <a:t>REST</a:t>
+            </a:r>
+            <a:endParaRPr sz="1000" dirty="0"/>
+          </a:p>
+        </p:txBody>
+      </p:sp>
+      <p:cxnSp>
+        <p:nvCxnSpPr>
+          <p:cNvPr id="30" name="Straight Arrow Connector 29">
+            <a:extLst>
+              <a:ext uri="{FF2B5EF4-FFF2-40B4-BE49-F238E27FC236}">
+                <a16:creationId xmlns:a16="http://schemas.microsoft.com/office/drawing/2014/main" id="{C6AD1BE3-B031-6B47-89B4-3EAA0911B5DA}"/>
+              </a:ext>
+            </a:extLst>
+          </p:cNvPr>
+          <p:cNvCxnSpPr>
+            <a:cxnSpLocks/>
+            <a:stCxn id="25" idx="2"/>
+            <a:endCxn id="10" idx="0"/>
+          </p:cNvCxnSpPr>
+          <p:nvPr/>
+        </p:nvCxnSpPr>
+        <p:spPr>
+          <a:xfrm flipH="1">
+            <a:off x="1869910" y="3473117"/>
+            <a:ext cx="90373" cy="794858"/>
+          </a:xfrm>
+          <a:prstGeom prst="straightConnector1">
+            <a:avLst/>
+          </a:prstGeom>
+          <a:ln>
+            <a:headEnd type="triangle"/>
+            <a:tailEnd type="triangle"/>
+          </a:ln>
+        </p:spPr>
+        <p:style>
+          <a:lnRef idx="1">
+            <a:schemeClr val="accent2"/>
+          </a:lnRef>
+          <a:fillRef idx="0">
+            <a:schemeClr val="accent2"/>
+          </a:fillRef>
+          <a:effectRef idx="0">
+            <a:schemeClr val="accent2"/>
+          </a:effectRef>
+          <a:fontRef idx="minor">
+            <a:schemeClr val="tx1"/>
+          </a:fontRef>
+        </p:style>
+      </p:cxnSp>
+      <p:sp>
+        <p:nvSpPr>
+          <p:cNvPr id="33" name="TextBox 32">
+            <a:extLst>
+              <a:ext uri="{FF2B5EF4-FFF2-40B4-BE49-F238E27FC236}">
+                <a16:creationId xmlns:a16="http://schemas.microsoft.com/office/drawing/2014/main" id="{A6A005F4-4AA3-E945-B377-D273B2B2F716}"/>
+              </a:ext>
+            </a:extLst>
+          </p:cNvPr>
+          <p:cNvSpPr txBox="1"/>
+          <p:nvPr/>
+        </p:nvSpPr>
+        <p:spPr>
+          <a:xfrm>
+            <a:off x="1747207" y="3602266"/>
+            <a:ext cx="990977" cy="400110"/>
+          </a:xfrm>
+          <a:prstGeom prst="rect">
+            <a:avLst/>
+          </a:prstGeom>
+          <a:solidFill>
+            <a:schemeClr val="bg1"/>
+          </a:solidFill>
+        </p:spPr>
+        <p:txBody>
+          <a:bodyPr wrap="none" rtlCol="0">
+            <a:spAutoFit/>
+          </a:bodyPr>
+          <a:lstStyle/>
+          <a:p>
+            <a:r>
+              <a:rPr lang="en-US" sz="1000" dirty="0"/>
+              <a:t>Verify </a:t>
+            </a:r>
+          </a:p>
+          <a:p>
+            <a:r>
+              <a:rPr lang="en-US" sz="1000" dirty="0"/>
+              <a:t>Authentication</a:t>
+            </a:r>
+            <a:endParaRPr sz="1000" dirty="0"/>
+          </a:p>
+        </p:txBody>
+      </p:sp>
+      <p:cxnSp>
+        <p:nvCxnSpPr>
+          <p:cNvPr id="39" name="Straight Arrow Connector 38">
+            <a:extLst>
+              <a:ext uri="{FF2B5EF4-FFF2-40B4-BE49-F238E27FC236}">
+                <a16:creationId xmlns:a16="http://schemas.microsoft.com/office/drawing/2014/main" id="{76258717-FB62-7F4A-8EA5-1B0F3CAD3876}"/>
+              </a:ext>
+            </a:extLst>
+          </p:cNvPr>
+          <p:cNvCxnSpPr>
+            <a:cxnSpLocks/>
+          </p:cNvCxnSpPr>
+          <p:nvPr/>
+        </p:nvCxnSpPr>
+        <p:spPr>
+          <a:xfrm>
+            <a:off x="2242695" y="2910185"/>
+            <a:ext cx="1293296" cy="6995"/>
+          </a:xfrm>
+          <a:prstGeom prst="straightConnector1">
+            <a:avLst/>
+          </a:prstGeom>
+          <a:ln>
+            <a:headEnd type="triangle"/>
+            <a:tailEnd type="triangle"/>
+          </a:ln>
+        </p:spPr>
+        <p:style>
+          <a:lnRef idx="1">
+            <a:schemeClr val="accent2"/>
+          </a:lnRef>
+          <a:fillRef idx="0">
+            <a:schemeClr val="accent2"/>
+          </a:fillRef>
+          <a:effectRef idx="0">
+            <a:schemeClr val="accent2"/>
+          </a:effectRef>
+          <a:fontRef idx="minor">
+            <a:schemeClr val="tx1"/>
+          </a:fontRef>
+        </p:style>
+      </p:cxnSp>
+      <p:cxnSp>
+        <p:nvCxnSpPr>
+          <p:cNvPr id="42" name="Straight Arrow Connector 41">
+            <a:extLst>
+              <a:ext uri="{FF2B5EF4-FFF2-40B4-BE49-F238E27FC236}">
+                <a16:creationId xmlns:a16="http://schemas.microsoft.com/office/drawing/2014/main" id="{2334D32E-479F-B64C-A001-08F317DC7B0B}"/>
+              </a:ext>
+            </a:extLst>
+          </p:cNvPr>
+          <p:cNvCxnSpPr>
+            <a:cxnSpLocks/>
+          </p:cNvCxnSpPr>
+          <p:nvPr/>
+        </p:nvCxnSpPr>
+        <p:spPr>
+          <a:xfrm flipV="1">
+            <a:off x="4296343" y="2940220"/>
+            <a:ext cx="1090192" cy="5039"/>
+          </a:xfrm>
+          <a:prstGeom prst="straightConnector1">
+            <a:avLst/>
+          </a:prstGeom>
+          <a:ln>
+            <a:headEnd type="triangle"/>
+            <a:tailEnd type="triangle"/>
+          </a:ln>
+        </p:spPr>
+        <p:style>
+          <a:lnRef idx="1">
+            <a:schemeClr val="accent2"/>
+          </a:lnRef>
+          <a:fillRef idx="0">
+            <a:schemeClr val="accent2"/>
+          </a:fillRef>
+          <a:effectRef idx="0">
+            <a:schemeClr val="accent2"/>
+          </a:effectRef>
+          <a:fontRef idx="minor">
+            <a:schemeClr val="tx1"/>
+          </a:fontRef>
+        </p:style>
+      </p:cxnSp>
+      <p:grpSp>
+        <p:nvGrpSpPr>
+          <p:cNvPr id="43" name="Group 42">
+            <a:extLst>
+              <a:ext uri="{FF2B5EF4-FFF2-40B4-BE49-F238E27FC236}">
+                <a16:creationId xmlns:a16="http://schemas.microsoft.com/office/drawing/2014/main" id="{0985F01F-31D0-5145-BAE7-F2745450CD84}"/>
+              </a:ext>
+            </a:extLst>
+          </p:cNvPr>
+          <p:cNvGrpSpPr/>
+          <p:nvPr/>
+        </p:nvGrpSpPr>
+        <p:grpSpPr>
+          <a:xfrm>
+            <a:off x="3535991" y="2529168"/>
+            <a:ext cx="715987" cy="820840"/>
+            <a:chOff x="-3132954" y="533400"/>
+            <a:chExt cx="715987" cy="820840"/>
+          </a:xfrm>
+        </p:grpSpPr>
+        <p:grpSp>
+          <p:nvGrpSpPr>
+            <p:cNvPr id="44" name="Group 239">
+              <a:extLst>
+                <a:ext uri="{FF2B5EF4-FFF2-40B4-BE49-F238E27FC236}">
+                  <a16:creationId xmlns:a16="http://schemas.microsoft.com/office/drawing/2014/main" id="{BD5B82F0-0B78-0949-80FF-329E23D0F2CE}"/>
+                </a:ext>
+              </a:extLst>
+            </p:cNvPr>
+            <p:cNvGrpSpPr/>
+            <p:nvPr/>
+          </p:nvGrpSpPr>
+          <p:grpSpPr>
+            <a:xfrm>
+              <a:off x="-3132954" y="533400"/>
+              <a:ext cx="715987" cy="820840"/>
+              <a:chOff x="-7060" y="9504"/>
+              <a:chExt cx="715986" cy="820838"/>
+            </a:xfrm>
+          </p:grpSpPr>
+          <p:sp>
+            <p:nvSpPr>
+              <p:cNvPr id="46" name="Shape 237">
+                <a:extLst>
+                  <a:ext uri="{FF2B5EF4-FFF2-40B4-BE49-F238E27FC236}">
+                    <a16:creationId xmlns:a16="http://schemas.microsoft.com/office/drawing/2014/main" id="{E74E9391-3331-EA4A-974E-49B491BC867B}"/>
+                  </a:ext>
+                </a:extLst>
+              </p:cNvPr>
+              <p:cNvSpPr/>
+              <p:nvPr/>
+            </p:nvSpPr>
+            <p:spPr>
+              <a:xfrm>
+                <a:off x="1694" y="9504"/>
+                <a:ext cx="707232" cy="707232"/>
+              </a:xfrm>
+              <a:custGeom>
+                <a:avLst/>
+                <a:gdLst/>
+                <a:ahLst/>
+                <a:cxnLst>
+                  <a:cxn ang="0">
+                    <a:pos x="wd2" y="hd2"/>
+                  </a:cxn>
+                  <a:cxn ang="5400000">
+                    <a:pos x="wd2" y="hd2"/>
+                  </a:cxn>
+                  <a:cxn ang="10800000">
+                    <a:pos x="wd2" y="hd2"/>
+                  </a:cxn>
+                  <a:cxn ang="16200000">
+                    <a:pos x="wd2" y="hd2"/>
+                  </a:cxn>
+                </a:cxnLst>
+                <a:rect l="0" t="0" r="r" b="b"/>
+                <a:pathLst>
+                  <a:path w="19679" h="19679" extrusionOk="0">
+                    <a:moveTo>
+                      <a:pt x="16796" y="2882"/>
+                    </a:moveTo>
+                    <a:cubicBezTo>
+                      <a:pt x="20639" y="6724"/>
+                      <a:pt x="20639" y="12954"/>
+                      <a:pt x="16796" y="16796"/>
+                    </a:cubicBezTo>
+                    <a:cubicBezTo>
+                      <a:pt x="12954" y="20639"/>
+                      <a:pt x="6724" y="20639"/>
+                      <a:pt x="2882" y="16796"/>
+                    </a:cubicBezTo>
+                    <a:cubicBezTo>
+                      <a:pt x="-961" y="12954"/>
+                      <a:pt x="-961" y="6724"/>
+                      <a:pt x="2882" y="2882"/>
+                    </a:cubicBezTo>
+                    <a:cubicBezTo>
+                      <a:pt x="6724" y="-961"/>
+                      <a:pt x="12954" y="-961"/>
+                      <a:pt x="16796" y="2882"/>
+                    </a:cubicBezTo>
+                    <a:close/>
+                  </a:path>
+                </a:pathLst>
+              </a:custGeom>
+              <a:solidFill>
+                <a:srgbClr val="ECC01B"/>
+              </a:solidFill>
+              <a:ln w="3175" cap="flat">
+                <a:noFill/>
+                <a:miter lim="400000"/>
+              </a:ln>
+              <a:effectLst/>
+            </p:spPr>
+            <p:txBody>
+              <a:bodyPr wrap="square" lIns="0" tIns="0" rIns="0" bIns="0" numCol="1" anchor="ctr">
+                <a:noAutofit/>
+              </a:bodyPr>
+              <a:lstStyle/>
+              <a:p>
+                <a:pPr lvl="0">
+                  <a:defRPr sz="1800">
+                    <a:solidFill>
+                      <a:srgbClr val="FFFFFF"/>
+                    </a:solidFill>
+                  </a:defRPr>
+                </a:pPr>
+                <a:endParaRPr/>
+              </a:p>
+            </p:txBody>
+          </p:sp>
+          <p:sp>
+            <p:nvSpPr>
+              <p:cNvPr id="47" name="Shape 238">
+                <a:extLst>
+                  <a:ext uri="{FF2B5EF4-FFF2-40B4-BE49-F238E27FC236}">
+                    <a16:creationId xmlns:a16="http://schemas.microsoft.com/office/drawing/2014/main" id="{73038515-EAF9-CC4B-8BBF-0B3F5A931846}"/>
+                  </a:ext>
+                </a:extLst>
+              </p:cNvPr>
+              <p:cNvSpPr/>
+              <p:nvPr/>
+            </p:nvSpPr>
+            <p:spPr>
+              <a:xfrm>
+                <a:off x="-7060" y="707231"/>
+                <a:ext cx="442428" cy="123111"/>
+              </a:xfrm>
+              <a:prstGeom prst="rect">
+                <a:avLst/>
+              </a:prstGeom>
+              <a:noFill/>
+              <a:ln w="3175" cap="flat">
+                <a:noFill/>
+                <a:miter lim="400000"/>
+              </a:ln>
+              <a:effectLst/>
+              <a:extLst>
+                <a:ext uri="{C572A759-6A51-4108-AA02-DFA0A04FC94B}">
+                  <ma14:wrappingTextBoxFlag xmlns:ma14="http://schemas.microsoft.com/office/mac/drawingml/2011/main" xmlns="" val="1"/>
+                </a:ext>
+              </a:extLst>
+            </p:spPr>
+            <p:txBody>
+              <a:bodyPr wrap="none" lIns="0" tIns="0" rIns="0" bIns="0" numCol="1" anchor="t">
+                <a:spAutoFit/>
+              </a:bodyPr>
+              <a:lstStyle>
+                <a:lvl1pPr>
+                  <a:defRPr sz="800" b="1">
+                    <a:solidFill>
+                      <a:srgbClr val="4277BB"/>
+                    </a:solidFill>
+                    <a:latin typeface="Helvetica"/>
+                    <a:ea typeface="Helvetica"/>
+                    <a:cs typeface="Helvetica"/>
+                    <a:sym typeface="Helvetica"/>
+                  </a:defRPr>
+                </a:lvl1pPr>
+              </a:lstStyle>
+              <a:p>
+                <a:pPr lvl="0">
+                  <a:defRPr sz="1800" b="0">
+                    <a:solidFill>
+                      <a:srgbClr val="000000"/>
+                    </a:solidFill>
+                  </a:defRPr>
+                </a:pPr>
+                <a:r>
+                  <a:rPr lang="en-US" sz="800" b="1" dirty="0">
+                    <a:solidFill>
+                      <a:srgbClr val="4277BB"/>
+                    </a:solidFill>
+                  </a:rPr>
+                  <a:t>LAMBDA</a:t>
+                </a:r>
+              </a:p>
+            </p:txBody>
+          </p:sp>
+        </p:grpSp>
+        <p:pic>
+          <p:nvPicPr>
+            <p:cNvPr id="45" name="Picture 44">
+              <a:extLst>
+                <a:ext uri="{FF2B5EF4-FFF2-40B4-BE49-F238E27FC236}">
+                  <a16:creationId xmlns:a16="http://schemas.microsoft.com/office/drawing/2014/main" id="{39FD08D1-6A6E-1749-B288-A66E37EB3F83}"/>
+                </a:ext>
+              </a:extLst>
+            </p:cNvPr>
+            <p:cNvPicPr>
+              <a:picLocks noChangeAspect="1"/>
+            </p:cNvPicPr>
+            <p:nvPr/>
+          </p:nvPicPr>
+          <p:blipFill>
+            <a:blip r:embed="rId7"/>
+            <a:stretch>
+              <a:fillRect/>
+            </a:stretch>
+          </p:blipFill>
+          <p:spPr>
+            <a:xfrm>
+              <a:off x="-3079835" y="642450"/>
+              <a:ext cx="584700" cy="441283"/>
+            </a:xfrm>
+            <a:prstGeom prst="rect">
+              <a:avLst/>
+            </a:prstGeom>
+          </p:spPr>
+        </p:pic>
+      </p:grpSp>
+      <p:grpSp>
+        <p:nvGrpSpPr>
+          <p:cNvPr id="54" name="Group 53">
+            <a:extLst>
+              <a:ext uri="{FF2B5EF4-FFF2-40B4-BE49-F238E27FC236}">
+                <a16:creationId xmlns:a16="http://schemas.microsoft.com/office/drawing/2014/main" id="{AECBAC9D-7723-CD42-9FBC-E500F26B1D41}"/>
+              </a:ext>
+            </a:extLst>
+          </p:cNvPr>
+          <p:cNvGrpSpPr/>
+          <p:nvPr/>
+        </p:nvGrpSpPr>
+        <p:grpSpPr>
+          <a:xfrm>
+            <a:off x="1659222" y="1267798"/>
+            <a:ext cx="693528" cy="832902"/>
+            <a:chOff x="5254443" y="5121838"/>
+            <a:chExt cx="454343" cy="521461"/>
+          </a:xfrm>
+        </p:grpSpPr>
+        <p:sp>
+          <p:nvSpPr>
+            <p:cNvPr id="50" name="Freeform 49">
+              <a:extLst>
+                <a:ext uri="{FF2B5EF4-FFF2-40B4-BE49-F238E27FC236}">
+                  <a16:creationId xmlns:a16="http://schemas.microsoft.com/office/drawing/2014/main" id="{3F87F872-8B10-D342-A007-5FABCB115A08}"/>
+                </a:ext>
+              </a:extLst>
+            </p:cNvPr>
+            <p:cNvSpPr/>
+            <p:nvPr/>
+          </p:nvSpPr>
+          <p:spPr>
+            <a:xfrm>
+              <a:off x="5304926" y="5121838"/>
+              <a:ext cx="403860" cy="403504"/>
+            </a:xfrm>
+            <a:custGeom>
+              <a:avLst/>
+              <a:gdLst>
+                <a:gd name="connsiteX0" fmla="*/ 403860 w 403860"/>
+                <a:gd name="connsiteY0" fmla="*/ 201752 h 403504"/>
+                <a:gd name="connsiteX1" fmla="*/ 201930 w 403860"/>
+                <a:gd name="connsiteY1" fmla="*/ 403505 h 403504"/>
+                <a:gd name="connsiteX2" fmla="*/ 0 w 403860"/>
+                <a:gd name="connsiteY2" fmla="*/ 201752 h 403504"/>
+                <a:gd name="connsiteX3" fmla="*/ 201930 w 403860"/>
+                <a:gd name="connsiteY3" fmla="*/ 0 h 403504"/>
+                <a:gd name="connsiteX4" fmla="*/ 403860 w 403860"/>
+                <a:gd name="connsiteY4" fmla="*/ 201752 h 403504"/>
+              </a:gdLst>
+              <a:ahLst/>
+              <a:cxnLst>
+                <a:cxn ang="0">
+                  <a:pos x="connsiteX0" y="connsiteY0"/>
+                </a:cxn>
+                <a:cxn ang="0">
+                  <a:pos x="connsiteX1" y="connsiteY1"/>
+                </a:cxn>
+                <a:cxn ang="0">
+                  <a:pos x="connsiteX2" y="connsiteY2"/>
+                </a:cxn>
+                <a:cxn ang="0">
+                  <a:pos x="connsiteX3" y="connsiteY3"/>
+                </a:cxn>
+                <a:cxn ang="0">
+                  <a:pos x="connsiteX4" y="connsiteY4"/>
+                </a:cxn>
+              </a:cxnLst>
+              <a:rect l="l" t="t" r="r" b="b"/>
+              <a:pathLst>
+                <a:path w="403860" h="403504">
+                  <a:moveTo>
+                    <a:pt x="403860" y="201752"/>
+                  </a:moveTo>
+                  <a:cubicBezTo>
+                    <a:pt x="403860" y="313177"/>
+                    <a:pt x="313453" y="403505"/>
+                    <a:pt x="201930" y="403505"/>
+                  </a:cubicBezTo>
+                  <a:cubicBezTo>
+                    <a:pt x="90407" y="403505"/>
+                    <a:pt x="0" y="313177"/>
+                    <a:pt x="0" y="201752"/>
+                  </a:cubicBezTo>
+                  <a:cubicBezTo>
+                    <a:pt x="0" y="90327"/>
+                    <a:pt x="90407" y="0"/>
+                    <a:pt x="201930" y="0"/>
+                  </a:cubicBezTo>
+                  <a:cubicBezTo>
+                    <a:pt x="313453" y="0"/>
+                    <a:pt x="403860" y="90327"/>
+                    <a:pt x="403860" y="201752"/>
+                  </a:cubicBezTo>
+                  <a:close/>
+                </a:path>
+              </a:pathLst>
+            </a:custGeom>
+            <a:solidFill>
+              <a:srgbClr val="417193"/>
+            </a:solidFill>
+            <a:ln w="7620" cap="flat">
+              <a:noFill/>
+              <a:prstDash val="solid"/>
+              <a:miter/>
+            </a:ln>
+          </p:spPr>
+          <p:txBody>
+            <a:bodyPr rtlCol="0" anchor="ctr"/>
+            <a:lstStyle/>
+            <a:p>
+              <a:endParaRPr lang="en-US"/>
+            </a:p>
+          </p:txBody>
+        </p:sp>
+        <p:sp>
+          <p:nvSpPr>
+            <p:cNvPr id="51" name="Freeform 50">
+              <a:extLst>
+                <a:ext uri="{FF2B5EF4-FFF2-40B4-BE49-F238E27FC236}">
+                  <a16:creationId xmlns:a16="http://schemas.microsoft.com/office/drawing/2014/main" id="{0BA8F5A0-F5D4-2944-A2C8-095FE9D29022}"/>
+                </a:ext>
+              </a:extLst>
+            </p:cNvPr>
+            <p:cNvSpPr/>
+            <p:nvPr/>
+          </p:nvSpPr>
+          <p:spPr>
+            <a:xfrm>
+              <a:off x="5412368" y="5196448"/>
+              <a:ext cx="188975" cy="80700"/>
+            </a:xfrm>
+            <a:custGeom>
+              <a:avLst/>
+              <a:gdLst>
+                <a:gd name="connsiteX0" fmla="*/ 188976 w 188975"/>
+                <a:gd name="connsiteY0" fmla="*/ 40351 h 80700"/>
+                <a:gd name="connsiteX1" fmla="*/ 94488 w 188975"/>
+                <a:gd name="connsiteY1" fmla="*/ 80701 h 80700"/>
+                <a:gd name="connsiteX2" fmla="*/ 0 w 188975"/>
+                <a:gd name="connsiteY2" fmla="*/ 40351 h 80700"/>
+                <a:gd name="connsiteX3" fmla="*/ 94488 w 188975"/>
+                <a:gd name="connsiteY3" fmla="*/ 0 h 80700"/>
+                <a:gd name="connsiteX4" fmla="*/ 188976 w 188975"/>
+                <a:gd name="connsiteY4" fmla="*/ 40351 h 80700"/>
+              </a:gdLst>
+              <a:ahLst/>
+              <a:cxnLst>
+                <a:cxn ang="0">
+                  <a:pos x="connsiteX0" y="connsiteY0"/>
+                </a:cxn>
+                <a:cxn ang="0">
+                  <a:pos x="connsiteX1" y="connsiteY1"/>
+                </a:cxn>
+                <a:cxn ang="0">
+                  <a:pos x="connsiteX2" y="connsiteY2"/>
+                </a:cxn>
+                <a:cxn ang="0">
+                  <a:pos x="connsiteX3" y="connsiteY3"/>
+                </a:cxn>
+                <a:cxn ang="0">
+                  <a:pos x="connsiteX4" y="connsiteY4"/>
+                </a:cxn>
+              </a:cxnLst>
+              <a:rect l="l" t="t" r="r" b="b"/>
+              <a:pathLst>
+                <a:path w="188975" h="80700">
+                  <a:moveTo>
+                    <a:pt x="188976" y="40351"/>
+                  </a:moveTo>
+                  <a:cubicBezTo>
+                    <a:pt x="188976" y="62636"/>
+                    <a:pt x="146672" y="80701"/>
+                    <a:pt x="94488" y="80701"/>
+                  </a:cubicBezTo>
+                  <a:cubicBezTo>
+                    <a:pt x="42304" y="80701"/>
+                    <a:pt x="0" y="62636"/>
+                    <a:pt x="0" y="40351"/>
+                  </a:cubicBezTo>
+                  <a:cubicBezTo>
+                    <a:pt x="0" y="18066"/>
+                    <a:pt x="42304" y="0"/>
+                    <a:pt x="94488" y="0"/>
+                  </a:cubicBezTo>
+                  <a:cubicBezTo>
+                    <a:pt x="146672" y="0"/>
+                    <a:pt x="188976" y="18066"/>
+                    <a:pt x="188976" y="40351"/>
+                  </a:cubicBezTo>
+                  <a:close/>
+                </a:path>
+              </a:pathLst>
+            </a:custGeom>
+            <a:solidFill>
+              <a:srgbClr val="FFFFFF"/>
+            </a:solidFill>
+            <a:ln w="7620" cap="flat">
+              <a:noFill/>
+              <a:prstDash val="solid"/>
+              <a:miter/>
+            </a:ln>
+          </p:spPr>
+          <p:txBody>
+            <a:bodyPr rtlCol="0" anchor="ctr"/>
+            <a:lstStyle/>
+            <a:p>
+              <a:endParaRPr lang="en-US"/>
+            </a:p>
+          </p:txBody>
+        </p:sp>
+        <p:sp>
+          <p:nvSpPr>
+            <p:cNvPr id="52" name="Freeform 51">
+              <a:extLst>
+                <a:ext uri="{FF2B5EF4-FFF2-40B4-BE49-F238E27FC236}">
+                  <a16:creationId xmlns:a16="http://schemas.microsoft.com/office/drawing/2014/main" id="{15DD7610-5D5A-924D-8AB5-C7519893BDFB}"/>
+                </a:ext>
+              </a:extLst>
+            </p:cNvPr>
+            <p:cNvSpPr/>
+            <p:nvPr/>
+          </p:nvSpPr>
+          <p:spPr>
+            <a:xfrm>
+              <a:off x="5407034" y="5250503"/>
+              <a:ext cx="197357" cy="198706"/>
+            </a:xfrm>
+            <a:custGeom>
+              <a:avLst/>
+              <a:gdLst>
+                <a:gd name="connsiteX0" fmla="*/ 197358 w 197357"/>
+                <a:gd name="connsiteY0" fmla="*/ 0 h 198706"/>
+                <a:gd name="connsiteX1" fmla="*/ 99060 w 197357"/>
+                <a:gd name="connsiteY1" fmla="*/ 37305 h 198706"/>
+                <a:gd name="connsiteX2" fmla="*/ 762 w 197357"/>
+                <a:gd name="connsiteY2" fmla="*/ 0 h 198706"/>
+                <a:gd name="connsiteX3" fmla="*/ 0 w 197357"/>
+                <a:gd name="connsiteY3" fmla="*/ 0 h 198706"/>
+                <a:gd name="connsiteX4" fmla="*/ 0 w 197357"/>
+                <a:gd name="connsiteY4" fmla="*/ 156834 h 198706"/>
+                <a:gd name="connsiteX5" fmla="*/ 0 w 197357"/>
+                <a:gd name="connsiteY5" fmla="*/ 156834 h 198706"/>
+                <a:gd name="connsiteX6" fmla="*/ 98298 w 197357"/>
+                <a:gd name="connsiteY6" fmla="*/ 198707 h 198706"/>
+                <a:gd name="connsiteX7" fmla="*/ 196596 w 197357"/>
+                <a:gd name="connsiteY7" fmla="*/ 156834 h 198706"/>
+                <a:gd name="connsiteX8" fmla="*/ 197358 w 197357"/>
+                <a:gd name="connsiteY8" fmla="*/ 0 h 198706"/>
+                <a:gd name="connsiteX9" fmla="*/ 197358 w 197357"/>
+                <a:gd name="connsiteY9" fmla="*/ 0 h 198706"/>
+              </a:gdLst>
+              <a:ahLst/>
+              <a:cxnLst>
+                <a:cxn ang="0">
+                  <a:pos x="connsiteX0" y="connsiteY0"/>
+                </a:cxn>
+                <a:cxn ang="0">
+                  <a:pos x="connsiteX1" y="connsiteY1"/>
+                </a:cxn>
+                <a:cxn ang="0">
+                  <a:pos x="connsiteX2" y="connsiteY2"/>
+                </a:cxn>
+                <a:cxn ang="0">
+                  <a:pos x="connsiteX3" y="connsiteY3"/>
+                </a:cxn>
+                <a:cxn ang="0">
+                  <a:pos x="connsiteX4" y="connsiteY4"/>
+                </a:cxn>
+                <a:cxn ang="0">
+                  <a:pos x="connsiteX5" y="connsiteY5"/>
+                </a:cxn>
+                <a:cxn ang="0">
+                  <a:pos x="connsiteX6" y="connsiteY6"/>
+                </a:cxn>
+                <a:cxn ang="0">
+                  <a:pos x="connsiteX7" y="connsiteY7"/>
+                </a:cxn>
+                <a:cxn ang="0">
+                  <a:pos x="connsiteX8" y="connsiteY8"/>
+                </a:cxn>
+                <a:cxn ang="0">
+                  <a:pos x="connsiteX9" y="connsiteY9"/>
+                </a:cxn>
+              </a:cxnLst>
+              <a:rect l="l" t="t" r="r" b="b"/>
+              <a:pathLst>
+                <a:path w="197357" h="198706">
+                  <a:moveTo>
+                    <a:pt x="197358" y="0"/>
+                  </a:moveTo>
+                  <a:cubicBezTo>
+                    <a:pt x="192786" y="21317"/>
+                    <a:pt x="150114" y="37305"/>
+                    <a:pt x="99060" y="37305"/>
+                  </a:cubicBezTo>
+                  <a:cubicBezTo>
+                    <a:pt x="48006" y="37305"/>
+                    <a:pt x="6096" y="20556"/>
+                    <a:pt x="762" y="0"/>
+                  </a:cubicBezTo>
+                  <a:lnTo>
+                    <a:pt x="0" y="0"/>
+                  </a:lnTo>
+                  <a:lnTo>
+                    <a:pt x="0" y="156834"/>
+                  </a:lnTo>
+                  <a:lnTo>
+                    <a:pt x="0" y="156834"/>
+                  </a:lnTo>
+                  <a:cubicBezTo>
+                    <a:pt x="0" y="179674"/>
+                    <a:pt x="44196" y="198707"/>
+                    <a:pt x="98298" y="198707"/>
+                  </a:cubicBezTo>
+                  <a:cubicBezTo>
+                    <a:pt x="152400" y="198707"/>
+                    <a:pt x="196596" y="179674"/>
+                    <a:pt x="196596" y="156834"/>
+                  </a:cubicBezTo>
+                  <a:lnTo>
+                    <a:pt x="197358" y="0"/>
+                  </a:lnTo>
+                  <a:lnTo>
+                    <a:pt x="197358" y="0"/>
+                  </a:lnTo>
+                  <a:close/>
+                </a:path>
+              </a:pathLst>
+            </a:custGeom>
+            <a:solidFill>
+              <a:srgbClr val="FFFFFF"/>
+            </a:solidFill>
+            <a:ln w="7620" cap="flat">
+              <a:noFill/>
+              <a:prstDash val="solid"/>
+              <a:miter/>
+            </a:ln>
+          </p:spPr>
+          <p:txBody>
+            <a:bodyPr rtlCol="0" anchor="ctr"/>
+            <a:lstStyle/>
+            <a:p>
+              <a:endParaRPr lang="en-US"/>
+            </a:p>
+          </p:txBody>
+        </p:sp>
+        <p:sp>
+          <p:nvSpPr>
+            <p:cNvPr id="53" name="TextBox 52">
+              <a:extLst>
+                <a:ext uri="{FF2B5EF4-FFF2-40B4-BE49-F238E27FC236}">
+                  <a16:creationId xmlns:a16="http://schemas.microsoft.com/office/drawing/2014/main" id="{AF27793C-74FD-214E-8B99-A676AC56E60F}"/>
+                </a:ext>
+              </a:extLst>
+            </p:cNvPr>
+            <p:cNvSpPr txBox="1"/>
+            <p:nvPr/>
+          </p:nvSpPr>
+          <p:spPr>
+            <a:xfrm>
+              <a:off x="5254443" y="5492458"/>
+              <a:ext cx="160148" cy="150841"/>
+            </a:xfrm>
+            <a:prstGeom prst="rect">
+              <a:avLst/>
+            </a:prstGeom>
+            <a:noFill/>
+            <a:ln w="3175" cap="flat">
+              <a:noFill/>
+              <a:miter lim="400000"/>
+            </a:ln>
+            <a:effectLst/>
+          </p:spPr>
+          <p:txBody>
+            <a:bodyPr rot="0" spcFirstLastPara="1" vertOverflow="overflow" horzOverflow="overflow" vert="horz" wrap="none" lIns="39290" tIns="39290" rIns="39290" bIns="39290" numCol="1" spcCol="38100" rtlCol="0" anchor="ctr">
+              <a:spAutoFit/>
+            </a:bodyPr>
+            <a:lstStyle/>
+            <a:p>
+              <a:pPr marL="0" marR="0" indent="0" algn="l" defTabSz="584200" rtl="0" fontAlgn="auto" latinLnBrk="1" hangingPunct="0">
+                <a:lnSpc>
+                  <a:spcPct val="100000"/>
+                </a:lnSpc>
+                <a:spcBef>
+                  <a:spcPts val="0"/>
+                </a:spcBef>
+                <a:spcAft>
+                  <a:spcPts val="0"/>
+                </a:spcAft>
+                <a:buClrTx/>
+                <a:buSzTx/>
+                <a:buFontTx/>
+                <a:buNone/>
+                <a:tabLst/>
+              </a:pPr>
+              <a:r>
+                <a:rPr kumimoji="0" lang="en-US" sz="1050" b="0" i="0" u="none" strike="noStrike" cap="none" spc="0" normalizeH="0" baseline="0" dirty="0">
+                  <a:ln>
+                    <a:noFill/>
+                  </a:ln>
+                  <a:solidFill>
+                    <a:schemeClr val="accent2">
+                      <a:lumMod val="75000"/>
+                    </a:schemeClr>
+                  </a:solidFill>
+                  <a:effectLst/>
+                  <a:uFillTx/>
+                  <a:latin typeface="Arial"/>
+                  <a:ea typeface="+mn-ea"/>
+                  <a:cs typeface="Arial"/>
+                  <a:sym typeface="Arial"/>
+                  <a:rtl val="0"/>
+                </a:rPr>
+                <a:t>S3</a:t>
+              </a:r>
+            </a:p>
+          </p:txBody>
+        </p:sp>
+      </p:grpSp>
+      <p:cxnSp>
+        <p:nvCxnSpPr>
+          <p:cNvPr id="55" name="Straight Arrow Connector 54">
+            <a:extLst>
+              <a:ext uri="{FF2B5EF4-FFF2-40B4-BE49-F238E27FC236}">
+                <a16:creationId xmlns:a16="http://schemas.microsoft.com/office/drawing/2014/main" id="{43ABE90F-AB0E-CE44-86D4-0ADEB264A10B}"/>
+              </a:ext>
+            </a:extLst>
+          </p:cNvPr>
+          <p:cNvCxnSpPr>
+            <a:cxnSpLocks/>
+          </p:cNvCxnSpPr>
+          <p:nvPr/>
+        </p:nvCxnSpPr>
+        <p:spPr>
+          <a:xfrm flipV="1">
+            <a:off x="793673" y="1761250"/>
+            <a:ext cx="885948" cy="960766"/>
+          </a:xfrm>
+          <a:prstGeom prst="straightConnector1">
+            <a:avLst/>
+          </a:prstGeom>
+          <a:ln>
+            <a:headEnd type="triangle"/>
+            <a:tailEnd type="triangle"/>
+          </a:ln>
+        </p:spPr>
+        <p:style>
+          <a:lnRef idx="1">
+            <a:schemeClr val="accent2"/>
+          </a:lnRef>
+          <a:fillRef idx="0">
+            <a:schemeClr val="accent2"/>
+          </a:fillRef>
+          <a:effectRef idx="0">
+            <a:schemeClr val="accent2"/>
+          </a:effectRef>
+          <a:fontRef idx="minor">
+            <a:schemeClr val="tx1"/>
+          </a:fontRef>
+        </p:style>
+      </p:cxnSp>
+      <p:cxnSp>
+        <p:nvCxnSpPr>
+          <p:cNvPr id="58" name="Straight Arrow Connector 57">
+            <a:extLst>
+              <a:ext uri="{FF2B5EF4-FFF2-40B4-BE49-F238E27FC236}">
+                <a16:creationId xmlns:a16="http://schemas.microsoft.com/office/drawing/2014/main" id="{197C7B99-AFF8-C642-8E73-72510B51F859}"/>
+              </a:ext>
+            </a:extLst>
+          </p:cNvPr>
+          <p:cNvCxnSpPr>
+            <a:cxnSpLocks/>
+          </p:cNvCxnSpPr>
+          <p:nvPr/>
+        </p:nvCxnSpPr>
+        <p:spPr>
+          <a:xfrm flipV="1">
+            <a:off x="6117102" y="2945259"/>
+            <a:ext cx="1090192" cy="5039"/>
+          </a:xfrm>
+          <a:prstGeom prst="straightConnector1">
+            <a:avLst/>
+          </a:prstGeom>
+          <a:ln>
+            <a:headEnd type="triangle"/>
+            <a:tailEnd type="triangle"/>
+          </a:ln>
+        </p:spPr>
+        <p:style>
+          <a:lnRef idx="1">
+            <a:schemeClr val="accent2"/>
+          </a:lnRef>
+          <a:fillRef idx="0">
+            <a:schemeClr val="accent2"/>
+          </a:fillRef>
+          <a:effectRef idx="0">
+            <a:schemeClr val="accent2"/>
+          </a:effectRef>
+          <a:fontRef idx="minor">
+            <a:schemeClr val="tx1"/>
+          </a:fontRef>
+        </p:style>
+      </p:cxnSp>
+      <p:grpSp>
+        <p:nvGrpSpPr>
+          <p:cNvPr id="60" name="Group 59">
+            <a:extLst>
+              <a:ext uri="{FF2B5EF4-FFF2-40B4-BE49-F238E27FC236}">
+                <a16:creationId xmlns:a16="http://schemas.microsoft.com/office/drawing/2014/main" id="{94896B02-6217-2345-9119-9BB6F509BB9C}"/>
+              </a:ext>
+            </a:extLst>
+          </p:cNvPr>
+          <p:cNvGrpSpPr/>
+          <p:nvPr/>
+        </p:nvGrpSpPr>
+        <p:grpSpPr>
+          <a:xfrm>
+            <a:off x="5323662" y="2676366"/>
+            <a:ext cx="883255" cy="776855"/>
+            <a:chOff x="6344886" y="3947160"/>
+            <a:chExt cx="883255" cy="776855"/>
+          </a:xfrm>
+        </p:grpSpPr>
+        <p:grpSp>
+          <p:nvGrpSpPr>
+            <p:cNvPr id="61" name="Group 60">
+              <a:extLst>
+                <a:ext uri="{FF2B5EF4-FFF2-40B4-BE49-F238E27FC236}">
+                  <a16:creationId xmlns:a16="http://schemas.microsoft.com/office/drawing/2014/main" id="{ED79F8F2-7CCD-F24B-BCA1-5A4FC3D5C977}"/>
+                </a:ext>
+              </a:extLst>
+            </p:cNvPr>
+            <p:cNvGrpSpPr/>
+            <p:nvPr/>
+          </p:nvGrpSpPr>
+          <p:grpSpPr>
+            <a:xfrm>
+              <a:off x="6344886" y="3947160"/>
+              <a:ext cx="883255" cy="776855"/>
+              <a:chOff x="7171374" y="3263404"/>
+              <a:chExt cx="968383" cy="851727"/>
+            </a:xfrm>
+          </p:grpSpPr>
+          <p:sp>
+            <p:nvSpPr>
+              <p:cNvPr id="63" name="Shape 149">
+                <a:extLst>
+                  <a:ext uri="{FF2B5EF4-FFF2-40B4-BE49-F238E27FC236}">
+                    <a16:creationId xmlns:a16="http://schemas.microsoft.com/office/drawing/2014/main" id="{1C373587-9A77-DE4C-9876-C45CDC32A8D6}"/>
+                  </a:ext>
+                </a:extLst>
+              </p:cNvPr>
+              <p:cNvSpPr/>
+              <p:nvPr/>
+            </p:nvSpPr>
+            <p:spPr>
+              <a:xfrm>
+                <a:off x="7367227" y="3263404"/>
+                <a:ext cx="585216" cy="585216"/>
+              </a:xfrm>
+              <a:custGeom>
+                <a:avLst/>
+                <a:gdLst/>
+                <a:ahLst/>
+                <a:cxnLst>
+                  <a:cxn ang="0">
+                    <a:pos x="wd2" y="hd2"/>
+                  </a:cxn>
+                  <a:cxn ang="5400000">
+                    <a:pos x="wd2" y="hd2"/>
+                  </a:cxn>
+                  <a:cxn ang="10800000">
+                    <a:pos x="wd2" y="hd2"/>
+                  </a:cxn>
+                  <a:cxn ang="16200000">
+                    <a:pos x="wd2" y="hd2"/>
+                  </a:cxn>
+                </a:cxnLst>
+                <a:rect l="0" t="0" r="r" b="b"/>
+                <a:pathLst>
+                  <a:path w="19679" h="19679" extrusionOk="0">
+                    <a:moveTo>
+                      <a:pt x="16796" y="2882"/>
+                    </a:moveTo>
+                    <a:cubicBezTo>
+                      <a:pt x="20639" y="6724"/>
+                      <a:pt x="20639" y="12954"/>
+                      <a:pt x="16796" y="16796"/>
+                    </a:cubicBezTo>
+                    <a:cubicBezTo>
+                      <a:pt x="12954" y="20639"/>
+                      <a:pt x="6724" y="20639"/>
+                      <a:pt x="2882" y="16796"/>
+                    </a:cubicBezTo>
+                    <a:cubicBezTo>
+                      <a:pt x="-961" y="12954"/>
+                      <a:pt x="-961" y="6724"/>
+                      <a:pt x="2882" y="2882"/>
+                    </a:cubicBezTo>
+                    <a:cubicBezTo>
+                      <a:pt x="6724" y="-961"/>
+                      <a:pt x="12954" y="-961"/>
+                      <a:pt x="16796" y="2882"/>
+                    </a:cubicBezTo>
+                    <a:close/>
+                  </a:path>
+                </a:pathLst>
+              </a:custGeom>
+              <a:solidFill>
+                <a:srgbClr val="8DC53F"/>
+              </a:solidFill>
+              <a:ln w="3175" cap="flat">
+                <a:noFill/>
+                <a:miter lim="400000"/>
+              </a:ln>
+              <a:effectLst/>
+            </p:spPr>
+            <p:txBody>
+              <a:bodyPr wrap="square" lIns="0" tIns="0" rIns="0" bIns="0" numCol="1" anchor="ctr">
+                <a:noAutofit/>
+              </a:bodyPr>
+              <a:lstStyle/>
+              <a:p>
+                <a:pPr lvl="0">
+                  <a:defRPr sz="1800">
+                    <a:solidFill>
+                      <a:srgbClr val="FFFFFF"/>
+                    </a:solidFill>
+                  </a:defRPr>
+                </a:pPr>
+                <a:endParaRPr/>
+              </a:p>
+            </p:txBody>
+          </p:sp>
+          <p:sp>
+            <p:nvSpPr>
+              <p:cNvPr id="64" name="Shape 151">
+                <a:extLst>
+                  <a:ext uri="{FF2B5EF4-FFF2-40B4-BE49-F238E27FC236}">
+                    <a16:creationId xmlns:a16="http://schemas.microsoft.com/office/drawing/2014/main" id="{492460FF-1C92-F24C-BE22-905793F62A41}"/>
+                  </a:ext>
+                </a:extLst>
+              </p:cNvPr>
+              <p:cNvSpPr/>
+              <p:nvPr/>
+            </p:nvSpPr>
+            <p:spPr>
+              <a:xfrm>
+                <a:off x="7171374" y="3845180"/>
+                <a:ext cx="968383" cy="269951"/>
+              </a:xfrm>
+              <a:prstGeom prst="rect">
+                <a:avLst/>
+              </a:prstGeom>
+              <a:noFill/>
+              <a:ln w="3175" cap="flat">
+                <a:noFill/>
+                <a:miter lim="400000"/>
+              </a:ln>
+              <a:effectLst/>
+              <a:extLst>
+                <a:ext uri="{C572A759-6A51-4108-AA02-DFA0A04FC94B}">
+                  <ma14:wrappingTextBoxFlag xmlns:ma14="http://schemas.microsoft.com/office/mac/drawingml/2011/main" xmlns="" val="1"/>
+                </a:ext>
+              </a:extLst>
+            </p:spPr>
+            <p:txBody>
+              <a:bodyPr wrap="none" lIns="0" tIns="0" rIns="0" bIns="0" numCol="1" anchor="t">
+                <a:spAutoFit/>
+              </a:bodyPr>
+              <a:lstStyle/>
+              <a:p>
+                <a:pPr lvl="0" algn="ctr">
+                  <a:defRPr sz="1800"/>
+                </a:pPr>
+                <a:r>
+                  <a:rPr lang="en-US" sz="800" b="1" dirty="0">
+                    <a:solidFill>
+                      <a:srgbClr val="4277BB"/>
+                    </a:solidFill>
+                    <a:latin typeface="Helvetica"/>
+                    <a:ea typeface="Helvetica"/>
+                    <a:cs typeface="Helvetica"/>
+                    <a:sym typeface="Helvetica"/>
+                  </a:rPr>
+                  <a:t>DAX</a:t>
+                </a:r>
+              </a:p>
+              <a:p>
+                <a:pPr lvl="0" algn="ctr">
+                  <a:defRPr sz="1800"/>
+                </a:pPr>
+                <a:r>
+                  <a:rPr lang="en-US" sz="800" b="1" dirty="0">
+                    <a:solidFill>
+                      <a:srgbClr val="4277BB"/>
+                    </a:solidFill>
+                    <a:latin typeface="Helvetica"/>
+                    <a:ea typeface="Helvetica"/>
+                    <a:cs typeface="Helvetica"/>
+                    <a:sym typeface="Helvetica"/>
+                  </a:rPr>
+                  <a:t> CACHING LAYER</a:t>
+                </a:r>
+                <a:endParaRPr sz="800" b="1" dirty="0">
+                  <a:solidFill>
+                    <a:srgbClr val="4277BB"/>
+                  </a:solidFill>
+                  <a:latin typeface="Helvetica"/>
+                  <a:ea typeface="Helvetica"/>
+                  <a:cs typeface="Helvetica"/>
+                  <a:sym typeface="Helvetica"/>
+                </a:endParaRPr>
+              </a:p>
+            </p:txBody>
+          </p:sp>
+        </p:grpSp>
+        <p:pic>
+          <p:nvPicPr>
+            <p:cNvPr id="62" name="Picture 61">
+              <a:extLst>
+                <a:ext uri="{FF2B5EF4-FFF2-40B4-BE49-F238E27FC236}">
+                  <a16:creationId xmlns:a16="http://schemas.microsoft.com/office/drawing/2014/main" id="{2CB1D7BD-BDE5-A248-9D5E-01AE33243C3D}"/>
+                </a:ext>
+              </a:extLst>
+            </p:cNvPr>
+            <p:cNvPicPr>
+              <a:picLocks noChangeAspect="1"/>
+            </p:cNvPicPr>
+            <p:nvPr/>
+          </p:nvPicPr>
+          <p:blipFill>
+            <a:blip r:embed="rId8"/>
+            <a:stretch>
+              <a:fillRect/>
+            </a:stretch>
+          </p:blipFill>
+          <p:spPr>
+            <a:xfrm>
+              <a:off x="6615235" y="4035669"/>
+              <a:ext cx="365858" cy="365858"/>
+            </a:xfrm>
+            <a:prstGeom prst="rect">
+              <a:avLst/>
+            </a:prstGeom>
+          </p:spPr>
+        </p:pic>
+      </p:grpSp>
+      <p:sp>
+        <p:nvSpPr>
+          <p:cNvPr id="66" name="TextBox 65">
+            <a:extLst>
+              <a:ext uri="{FF2B5EF4-FFF2-40B4-BE49-F238E27FC236}">
+                <a16:creationId xmlns:a16="http://schemas.microsoft.com/office/drawing/2014/main" id="{2C200626-7D14-E340-AE51-B8A360A8A904}"/>
+              </a:ext>
+            </a:extLst>
+          </p:cNvPr>
+          <p:cNvSpPr txBox="1"/>
+          <p:nvPr/>
+        </p:nvSpPr>
+        <p:spPr>
+          <a:xfrm>
+            <a:off x="2406080" y="2641463"/>
+            <a:ext cx="559769" cy="246221"/>
+          </a:xfrm>
+          <a:prstGeom prst="rect">
+            <a:avLst/>
+          </a:prstGeom>
+          <a:solidFill>
+            <a:schemeClr val="bg1"/>
+          </a:solidFill>
+        </p:spPr>
+        <p:txBody>
+          <a:bodyPr wrap="none" rtlCol="0">
+            <a:spAutoFit/>
+          </a:bodyPr>
+          <a:lstStyle/>
+          <a:p>
+            <a:r>
+              <a:rPr lang="en-US" sz="1000" dirty="0"/>
+              <a:t>Invoke</a:t>
+            </a:r>
+            <a:endParaRPr sz="1000" dirty="0"/>
+          </a:p>
+        </p:txBody>
+      </p:sp>
+      <p:sp>
+        <p:nvSpPr>
+          <p:cNvPr id="67" name="TextBox 66">
+            <a:extLst>
+              <a:ext uri="{FF2B5EF4-FFF2-40B4-BE49-F238E27FC236}">
+                <a16:creationId xmlns:a16="http://schemas.microsoft.com/office/drawing/2014/main" id="{5E71C72C-9FC3-5A41-957D-A403FEF703D4}"/>
+              </a:ext>
+            </a:extLst>
+          </p:cNvPr>
+          <p:cNvSpPr txBox="1"/>
+          <p:nvPr/>
+        </p:nvSpPr>
+        <p:spPr>
+          <a:xfrm>
+            <a:off x="4395643" y="2641462"/>
+            <a:ext cx="878767" cy="246221"/>
+          </a:xfrm>
+          <a:prstGeom prst="rect">
+            <a:avLst/>
+          </a:prstGeom>
+          <a:solidFill>
+            <a:schemeClr val="bg1"/>
+          </a:solidFill>
+        </p:spPr>
+        <p:txBody>
+          <a:bodyPr wrap="none" rtlCol="0">
+            <a:spAutoFit/>
+          </a:bodyPr>
+          <a:lstStyle/>
+          <a:p>
+            <a:r>
+              <a:rPr lang="en-US" sz="1000" dirty="0"/>
+              <a:t>Read/ query</a:t>
+            </a:r>
+            <a:endParaRPr sz="1000" dirty="0"/>
+          </a:p>
+        </p:txBody>
+      </p:sp>
+    </p:spTree>
+    <p:extLst>
+      <p:ext uri="{BB962C8B-B14F-4D97-AF65-F5344CB8AC3E}">
+        <p14:creationId xmlns:p14="http://schemas.microsoft.com/office/powerpoint/2010/main" val="3250871607"/>
+      </p:ext>
+    </p:extLst>
+  </p:cSld>
+  <p:clrMapOvr>
+    <a:masterClrMapping/>
+  </p:clrMapOvr>
+</p:sld>
+</file>
+
 <file path=ppt/theme/theme1.xml><?xml version="1.0" encoding="utf-8"?>
 <a:theme xmlns:a="http://schemas.openxmlformats.org/drawingml/2006/main" name="BLANK">
   <a:themeElements>

</xml_diff>

<commit_message>
Add DR and update apicurio
</commit_message>
<xml_diff>
--- a/docs/Diagrams.pptx
+++ b/docs/Diagrams.pptx
@@ -6,7 +6,7 @@
     <p:sldMasterId id="2147484308" r:id="rId2"/>
   </p:sldMasterIdLst>
   <p:notesMasterIdLst>
-    <p:notesMasterId r:id="rId17"/>
+    <p:notesMasterId r:id="rId18"/>
   </p:notesMasterIdLst>
   <p:sldIdLst>
     <p:sldId id="2670" r:id="rId3"/>
@@ -23,6 +23,7 @@
     <p:sldId id="2681" r:id="rId14"/>
     <p:sldId id="2682" r:id="rId15"/>
     <p:sldId id="2683" r:id="rId16"/>
+    <p:sldId id="2684" r:id="rId17"/>
   </p:sldIdLst>
   <p:sldSz cx="12192000" cy="6858000"/>
   <p:notesSz cx="7086600" cy="9372600"/>
@@ -285,7 +286,7 @@
               <a:pPr>
                 <a:defRPr/>
               </a:pPr>
-              <a:t>4/7/21</a:t>
+              <a:t>5/3/21</a:t>
             </a:fld>
             <a:endParaRPr lang="en-US"/>
           </a:p>
@@ -9163,7 +9164,7 @@
             <a:effectLst/>
             <a:extLst>
               <a:ext uri="{C572A759-6A51-4108-AA02-DFA0A04FC94B}">
-                <ma14:wrappingTextBoxFlag xmlns:ma14="http://schemas.microsoft.com/office/mac/drawingml/2011/main" xmlns="" val="1"/>
+                <ma14:wrappingTextBoxFlag xmlns="" xmlns:ma14="http://schemas.microsoft.com/office/mac/drawingml/2011/main" val="1"/>
               </a:ext>
             </a:extLst>
           </p:spPr>
@@ -9979,7 +9980,7 @@
             <a:effectLst/>
             <a:extLst>
               <a:ext uri="{C572A759-6A51-4108-AA02-DFA0A04FC94B}">
-                <ma14:wrappingTextBoxFlag xmlns:ma14="http://schemas.microsoft.com/office/mac/drawingml/2011/main" xmlns="" val="1"/>
+                <ma14:wrappingTextBoxFlag xmlns="" xmlns:ma14="http://schemas.microsoft.com/office/mac/drawingml/2011/main" val="1"/>
               </a:ext>
             </a:extLst>
           </p:spPr>
@@ -10095,7 +10096,7 @@
             <a:effectLst/>
             <a:extLst>
               <a:ext uri="{C572A759-6A51-4108-AA02-DFA0A04FC94B}">
-                <ma14:wrappingTextBoxFlag xmlns:ma14="http://schemas.microsoft.com/office/mac/drawingml/2011/main" xmlns="" val="1"/>
+                <ma14:wrappingTextBoxFlag xmlns="" xmlns:ma14="http://schemas.microsoft.com/office/mac/drawingml/2011/main" val="1"/>
               </a:ext>
             </a:extLst>
           </p:spPr>
@@ -10275,7 +10276,7 @@
             <a:effectLst/>
             <a:extLst>
               <a:ext uri="{C572A759-6A51-4108-AA02-DFA0A04FC94B}">
-                <ma14:wrappingTextBoxFlag xmlns="" xmlns:ma14="http://schemas.microsoft.com/office/mac/drawingml/2011/main" val="1"/>
+                <ma14:wrappingTextBoxFlag xmlns:ma14="http://schemas.microsoft.com/office/mac/drawingml/2011/main" xmlns="" val="1"/>
               </a:ext>
             </a:extLst>
           </p:spPr>
@@ -10590,7 +10591,7 @@
               <a:effectLst/>
               <a:extLst>
                 <a:ext uri="{C572A759-6A51-4108-AA02-DFA0A04FC94B}">
-                  <ma14:wrappingTextBoxFlag xmlns:ma14="http://schemas.microsoft.com/office/mac/drawingml/2011/main" xmlns="" val="1"/>
+                  <ma14:wrappingTextBoxFlag xmlns="" xmlns:ma14="http://schemas.microsoft.com/office/mac/drawingml/2011/main" val="1"/>
                 </a:ext>
               </a:extLst>
             </p:spPr>
@@ -10804,7 +10805,7 @@
               <a:effectLst/>
               <a:extLst>
                 <a:ext uri="{C572A759-6A51-4108-AA02-DFA0A04FC94B}">
-                  <ma14:wrappingTextBoxFlag xmlns:ma14="http://schemas.microsoft.com/office/mac/drawingml/2011/main" xmlns="" val="1"/>
+                  <ma14:wrappingTextBoxFlag xmlns="" xmlns:ma14="http://schemas.microsoft.com/office/mac/drawingml/2011/main" val="1"/>
                 </a:ext>
               </a:extLst>
             </p:spPr>
@@ -11086,7 +11087,7 @@
             <a:effectLst/>
             <a:extLst>
               <a:ext uri="{C572A759-6A51-4108-AA02-DFA0A04FC94B}">
-                <ma14:wrappingTextBoxFlag xmlns:ma14="http://schemas.microsoft.com/office/mac/drawingml/2011/main" xmlns="" val="1"/>
+                <ma14:wrappingTextBoxFlag xmlns="" xmlns:ma14="http://schemas.microsoft.com/office/mac/drawingml/2011/main" val="1"/>
               </a:ext>
             </a:extLst>
           </p:spPr>
@@ -11202,7 +11203,7 @@
             <a:effectLst/>
             <a:extLst>
               <a:ext uri="{C572A759-6A51-4108-AA02-DFA0A04FC94B}">
-                <ma14:wrappingTextBoxFlag xmlns:ma14="http://schemas.microsoft.com/office/mac/drawingml/2011/main" xmlns="" val="1"/>
+                <ma14:wrappingTextBoxFlag xmlns="" xmlns:ma14="http://schemas.microsoft.com/office/mac/drawingml/2011/main" val="1"/>
               </a:ext>
             </a:extLst>
           </p:spPr>
@@ -12340,7 +12341,7 @@
             <a:effectLst/>
             <a:extLst>
               <a:ext uri="{C572A759-6A51-4108-AA02-DFA0A04FC94B}">
-                <ma14:wrappingTextBoxFlag xmlns="" xmlns:ma14="http://schemas.microsoft.com/office/mac/drawingml/2011/main" val="1"/>
+                <ma14:wrappingTextBoxFlag xmlns:ma14="http://schemas.microsoft.com/office/mac/drawingml/2011/main" xmlns="" val="1"/>
               </a:ext>
             </a:extLst>
           </p:spPr>
@@ -12473,7 +12474,7 @@
             <a:effectLst/>
             <a:extLst>
               <a:ext uri="{C572A759-6A51-4108-AA02-DFA0A04FC94B}">
-                <ma14:wrappingTextBoxFlag xmlns="" xmlns:ma14="http://schemas.microsoft.com/office/mac/drawingml/2011/main" val="1"/>
+                <ma14:wrappingTextBoxFlag xmlns:ma14="http://schemas.microsoft.com/office/mac/drawingml/2011/main" xmlns="" val="1"/>
               </a:ext>
             </a:extLst>
           </p:spPr>
@@ -12785,7 +12786,7 @@
               <a:effectLst/>
               <a:extLst>
                 <a:ext uri="{C572A759-6A51-4108-AA02-DFA0A04FC94B}">
-                  <ma14:wrappingTextBoxFlag xmlns:ma14="http://schemas.microsoft.com/office/mac/drawingml/2011/main" xmlns="" val="1"/>
+                  <ma14:wrappingTextBoxFlag xmlns="" xmlns:ma14="http://schemas.microsoft.com/office/mac/drawingml/2011/main" val="1"/>
                 </a:ext>
               </a:extLst>
             </p:spPr>
@@ -13209,7 +13210,7 @@
               <a:effectLst/>
               <a:extLst>
                 <a:ext uri="{C572A759-6A51-4108-AA02-DFA0A04FC94B}">
-                  <ma14:wrappingTextBoxFlag xmlns:ma14="http://schemas.microsoft.com/office/mac/drawingml/2011/main" xmlns="" val="1"/>
+                  <ma14:wrappingTextBoxFlag xmlns="" xmlns:ma14="http://schemas.microsoft.com/office/mac/drawingml/2011/main" val="1"/>
                 </a:ext>
               </a:extLst>
             </p:spPr>
@@ -13860,7 +13861,7 @@
             <a:effectLst/>
             <a:extLst>
               <a:ext uri="{C572A759-6A51-4108-AA02-DFA0A04FC94B}">
-                <ma14:wrappingTextBoxFlag xmlns:ma14="http://schemas.microsoft.com/office/mac/drawingml/2011/main" xmlns="" val="1"/>
+                <ma14:wrappingTextBoxFlag xmlns="" xmlns:ma14="http://schemas.microsoft.com/office/mac/drawingml/2011/main" val="1"/>
               </a:ext>
             </a:extLst>
           </p:spPr>
@@ -14115,7 +14116,7 @@
             <a:effectLst/>
             <a:extLst>
               <a:ext uri="{C572A759-6A51-4108-AA02-DFA0A04FC94B}">
-                <ma14:wrappingTextBoxFlag xmlns="" xmlns:ma14="http://schemas.microsoft.com/office/mac/drawingml/2011/main" val="1"/>
+                <ma14:wrappingTextBoxFlag xmlns:ma14="http://schemas.microsoft.com/office/mac/drawingml/2011/main" xmlns="" val="1"/>
               </a:ext>
             </a:extLst>
           </p:spPr>
@@ -14363,7 +14364,7 @@
               <a:effectLst/>
               <a:extLst>
                 <a:ext uri="{C572A759-6A51-4108-AA02-DFA0A04FC94B}">
-                  <ma14:wrappingTextBoxFlag xmlns:ma14="http://schemas.microsoft.com/office/mac/drawingml/2011/main" xmlns="" val="1"/>
+                  <ma14:wrappingTextBoxFlag xmlns="" xmlns:ma14="http://schemas.microsoft.com/office/mac/drawingml/2011/main" val="1"/>
                 </a:ext>
               </a:extLst>
             </p:spPr>
@@ -14661,7 +14662,7 @@
               <a:effectLst/>
               <a:extLst>
                 <a:ext uri="{C572A759-6A51-4108-AA02-DFA0A04FC94B}">
-                  <ma14:wrappingTextBoxFlag xmlns:ma14="http://schemas.microsoft.com/office/mac/drawingml/2011/main" xmlns="" val="1"/>
+                  <ma14:wrappingTextBoxFlag xmlns="" xmlns:ma14="http://schemas.microsoft.com/office/mac/drawingml/2011/main" val="1"/>
                 </a:ext>
               </a:extLst>
             </p:spPr>
@@ -15971,7 +15972,7 @@
             <a:effectLst/>
             <a:extLst>
               <a:ext uri="{C572A759-6A51-4108-AA02-DFA0A04FC94B}">
-                <ma14:wrappingTextBoxFlag xmlns="" xmlns:ma14="http://schemas.microsoft.com/office/mac/drawingml/2011/main" val="1"/>
+                <ma14:wrappingTextBoxFlag xmlns:ma14="http://schemas.microsoft.com/office/mac/drawingml/2011/main" xmlns="" val="1"/>
               </a:ext>
             </a:extLst>
           </p:spPr>
@@ -16087,7 +16088,7 @@
             <a:effectLst/>
             <a:extLst>
               <a:ext uri="{C572A759-6A51-4108-AA02-DFA0A04FC94B}">
-                <ma14:wrappingTextBoxFlag xmlns="" xmlns:ma14="http://schemas.microsoft.com/office/mac/drawingml/2011/main" val="1"/>
+                <ma14:wrappingTextBoxFlag xmlns:ma14="http://schemas.microsoft.com/office/mac/drawingml/2011/main" xmlns="" val="1"/>
               </a:ext>
             </a:extLst>
           </p:spPr>
@@ -16508,7 +16509,7 @@
             <a:effectLst/>
             <a:extLst>
               <a:ext uri="{C572A759-6A51-4108-AA02-DFA0A04FC94B}">
-                <ma14:wrappingTextBoxFlag xmlns="" xmlns:ma14="http://schemas.microsoft.com/office/mac/drawingml/2011/main" val="1"/>
+                <ma14:wrappingTextBoxFlag xmlns:ma14="http://schemas.microsoft.com/office/mac/drawingml/2011/main" xmlns="" val="1"/>
               </a:ext>
             </a:extLst>
           </p:spPr>
@@ -16667,7 +16668,7 @@
             <a:effectLst/>
             <a:extLst>
               <a:ext uri="{C572A759-6A51-4108-AA02-DFA0A04FC94B}">
-                <ma14:wrappingTextBoxFlag xmlns:ma14="http://schemas.microsoft.com/office/mac/drawingml/2011/main" xmlns="" val="1"/>
+                <ma14:wrappingTextBoxFlag xmlns="" xmlns:ma14="http://schemas.microsoft.com/office/mac/drawingml/2011/main" val="1"/>
               </a:ext>
             </a:extLst>
           </p:spPr>
@@ -17186,7 +17187,7 @@
               <a:effectLst/>
               <a:extLst>
                 <a:ext uri="{C572A759-6A51-4108-AA02-DFA0A04FC94B}">
-                  <ma14:wrappingTextBoxFlag xmlns:ma14="http://schemas.microsoft.com/office/mac/drawingml/2011/main" xmlns="" val="1"/>
+                  <ma14:wrappingTextBoxFlag xmlns="" xmlns:ma14="http://schemas.microsoft.com/office/mac/drawingml/2011/main" val="1"/>
                 </a:ext>
               </a:extLst>
             </p:spPr>
@@ -17336,7 +17337,7 @@
             <a:effectLst/>
             <a:extLst>
               <a:ext uri="{C572A759-6A51-4108-AA02-DFA0A04FC94B}">
-                <ma14:wrappingTextBoxFlag xmlns="" xmlns:ma14="http://schemas.microsoft.com/office/mac/drawingml/2011/main" val="1"/>
+                <ma14:wrappingTextBoxFlag xmlns:ma14="http://schemas.microsoft.com/office/mac/drawingml/2011/main" xmlns="" val="1"/>
               </a:ext>
             </a:extLst>
           </p:spPr>
@@ -17496,7 +17497,7 @@
             <a:effectLst/>
             <a:extLst>
               <a:ext uri="{C572A759-6A51-4108-AA02-DFA0A04FC94B}">
-                <ma14:wrappingTextBoxFlag xmlns:ma14="http://schemas.microsoft.com/office/mac/drawingml/2011/main" xmlns="" val="1"/>
+                <ma14:wrappingTextBoxFlag xmlns="" xmlns:ma14="http://schemas.microsoft.com/office/mac/drawingml/2011/main" val="1"/>
               </a:ext>
             </a:extLst>
           </p:spPr>
@@ -17797,7 +17798,7 @@
               <a:effectLst/>
               <a:extLst>
                 <a:ext uri="{C572A759-6A51-4108-AA02-DFA0A04FC94B}">
-                  <ma14:wrappingTextBoxFlag xmlns:ma14="http://schemas.microsoft.com/office/mac/drawingml/2011/main" xmlns="" val="1"/>
+                  <ma14:wrappingTextBoxFlag xmlns="" xmlns:ma14="http://schemas.microsoft.com/office/mac/drawingml/2011/main" val="1"/>
                 </a:ext>
               </a:extLst>
             </p:spPr>
@@ -21213,6 +21214,676 @@
 </p:sld>
 </file>
 
+<file path=ppt/slides/slide15.xml><?xml version="1.0" encoding="utf-8"?>
+<p:sld xmlns:a="http://schemas.openxmlformats.org/drawingml/2006/main" xmlns:r="http://schemas.openxmlformats.org/officeDocument/2006/relationships" xmlns:p="http://schemas.openxmlformats.org/presentationml/2006/main">
+  <p:cSld>
+    <p:spTree>
+      <p:nvGrpSpPr>
+        <p:cNvPr id="1" name=""/>
+        <p:cNvGrpSpPr/>
+        <p:nvPr/>
+      </p:nvGrpSpPr>
+      <p:grpSpPr>
+        <a:xfrm>
+          <a:off x="0" y="0"/>
+          <a:ext cx="0" cy="0"/>
+          <a:chOff x="0" y="0"/>
+          <a:chExt cx="0" cy="0"/>
+        </a:xfrm>
+      </p:grpSpPr>
+      <p:sp>
+        <p:nvSpPr>
+          <p:cNvPr id="2" name="Title 1">
+            <a:extLst>
+              <a:ext uri="{FF2B5EF4-FFF2-40B4-BE49-F238E27FC236}">
+                <a16:creationId xmlns:a16="http://schemas.microsoft.com/office/drawing/2014/main" id="{70F591F0-5F5A-024B-9AB3-82538EA75689}"/>
+              </a:ext>
+            </a:extLst>
+          </p:cNvPr>
+          <p:cNvSpPr>
+            <a:spLocks noGrp="1"/>
+          </p:cNvSpPr>
+          <p:nvPr>
+            <p:ph type="title"/>
+          </p:nvPr>
+        </p:nvSpPr>
+        <p:spPr>
+          <a:xfrm>
+            <a:off x="599016" y="125846"/>
+            <a:ext cx="10993967" cy="342900"/>
+          </a:xfrm>
+        </p:spPr>
+        <p:txBody>
+          <a:bodyPr/>
+          <a:lstStyle/>
+          <a:p>
+            <a:r>
+              <a:rPr lang="en-US" dirty="0"/>
+              <a:t>ADS</a:t>
+            </a:r>
+          </a:p>
+        </p:txBody>
+      </p:sp>
+      <p:sp>
+        <p:nvSpPr>
+          <p:cNvPr id="3" name="Slide Number Placeholder 2">
+            <a:extLst>
+              <a:ext uri="{FF2B5EF4-FFF2-40B4-BE49-F238E27FC236}">
+                <a16:creationId xmlns:a16="http://schemas.microsoft.com/office/drawing/2014/main" id="{E5C81BE9-47C6-2E4B-A85F-02B6E9FAE09E}"/>
+              </a:ext>
+            </a:extLst>
+          </p:cNvPr>
+          <p:cNvSpPr>
+            <a:spLocks noGrp="1"/>
+          </p:cNvSpPr>
+          <p:nvPr>
+            <p:ph type="sldNum" sz="quarter" idx="10"/>
+          </p:nvPr>
+        </p:nvSpPr>
+        <p:spPr/>
+        <p:txBody>
+          <a:bodyPr/>
+          <a:lstStyle/>
+          <a:p>
+            <a:pPr defTabSz="911231" eaLnBrk="1" fontAlgn="auto" hangingPunct="1">
+              <a:spcBef>
+                <a:spcPts val="0"/>
+              </a:spcBef>
+              <a:spcAft>
+                <a:spcPts val="0"/>
+              </a:spcAft>
+              <a:defRPr/>
+            </a:pPr>
+            <a:r>
+              <a:rPr lang="en-US" altLang="en-US">
+                <a:solidFill>
+                  <a:srgbClr val="FFFFFF"/>
+                </a:solidFill>
+                <a:latin typeface="Arial"/>
+                <a:ea typeface="ＭＳ Ｐゴシック" charset="0"/>
+                <a:cs typeface="Arial"/>
+                <a:sym typeface="Helvetica" charset="0"/>
+              </a:rPr>
+              <a:t>IBM Confidential – Page </a:t>
+            </a:r>
+            <a:fld id="{E29CC0C0-E046-4664-B80A-AA818B18C835}" type="slidenum">
+              <a:rPr lang="en-US" altLang="en-US" smtClean="0">
+                <a:solidFill>
+                  <a:srgbClr val="FFFFFF"/>
+                </a:solidFill>
+                <a:latin typeface="Arial"/>
+                <a:ea typeface="ＭＳ Ｐゴシック" charset="0"/>
+                <a:cs typeface="Arial"/>
+                <a:sym typeface="Helvetica" charset="0"/>
+              </a:rPr>
+              <a:pPr defTabSz="911231" eaLnBrk="1" fontAlgn="auto" hangingPunct="1">
+                <a:spcBef>
+                  <a:spcPts val="0"/>
+                </a:spcBef>
+                <a:spcAft>
+                  <a:spcPts val="0"/>
+                </a:spcAft>
+                <a:defRPr/>
+              </a:pPr>
+              <a:t>15</a:t>
+            </a:fld>
+            <a:endParaRPr lang="en-US" altLang="en-US">
+              <a:solidFill>
+                <a:srgbClr val="FFFFFF"/>
+              </a:solidFill>
+              <a:latin typeface="Arial"/>
+              <a:ea typeface="ＭＳ Ｐゴシック" charset="0"/>
+              <a:cs typeface="Arial"/>
+              <a:sym typeface="Helvetica" charset="0"/>
+            </a:endParaRPr>
+          </a:p>
+        </p:txBody>
+      </p:sp>
+      <p:sp>
+        <p:nvSpPr>
+          <p:cNvPr id="4" name="Rectangle 3">
+            <a:extLst>
+              <a:ext uri="{FF2B5EF4-FFF2-40B4-BE49-F238E27FC236}">
+                <a16:creationId xmlns:a16="http://schemas.microsoft.com/office/drawing/2014/main" id="{E69F3A93-983B-C442-ACB2-1D3C2DF02FAE}"/>
+              </a:ext>
+            </a:extLst>
+          </p:cNvPr>
+          <p:cNvSpPr/>
+          <p:nvPr/>
+        </p:nvSpPr>
+        <p:spPr>
+          <a:xfrm>
+            <a:off x="4641447" y="984370"/>
+            <a:ext cx="1454551" cy="438587"/>
+          </a:xfrm>
+          <a:prstGeom prst="rect">
+            <a:avLst/>
+          </a:prstGeom>
+          <a:solidFill>
+            <a:srgbClr val="4040EA"/>
+          </a:solidFill>
+          <a:ln>
+            <a:noFill/>
+          </a:ln>
+          <a:effectLst>
+            <a:outerShdw blurRad="50800" dist="38100" dir="5400000" algn="t" rotWithShape="0">
+              <a:prstClr val="black">
+                <a:alpha val="40000"/>
+              </a:prstClr>
+            </a:outerShdw>
+          </a:effectLst>
+        </p:spPr>
+        <p:style>
+          <a:lnRef idx="2">
+            <a:schemeClr val="accent1">
+              <a:shade val="50000"/>
+            </a:schemeClr>
+          </a:lnRef>
+          <a:fillRef idx="1">
+            <a:schemeClr val="accent1"/>
+          </a:fillRef>
+          <a:effectRef idx="0">
+            <a:schemeClr val="accent1"/>
+          </a:effectRef>
+          <a:fontRef idx="minor">
+            <a:schemeClr val="lt1"/>
+          </a:fontRef>
+        </p:style>
+        <p:txBody>
+          <a:bodyPr rtlCol="0" anchor="ctr"/>
+          <a:lstStyle/>
+          <a:p>
+            <a:pPr algn="ctr"/>
+            <a:r>
+              <a:rPr lang="en-US" sz="1200" dirty="0">
+                <a:solidFill>
+                  <a:schemeClr val="bg1"/>
+                </a:solidFill>
+              </a:rPr>
+              <a:t>Decision Designer</a:t>
+            </a:r>
+          </a:p>
+        </p:txBody>
+      </p:sp>
+      <p:sp>
+        <p:nvSpPr>
+          <p:cNvPr id="5" name="Rounded Rectangle 4">
+            <a:extLst>
+              <a:ext uri="{FF2B5EF4-FFF2-40B4-BE49-F238E27FC236}">
+                <a16:creationId xmlns:a16="http://schemas.microsoft.com/office/drawing/2014/main" id="{D20B5100-9FC1-5246-A30E-DD2E227B6910}"/>
+              </a:ext>
+            </a:extLst>
+          </p:cNvPr>
+          <p:cNvSpPr/>
+          <p:nvPr/>
+        </p:nvSpPr>
+        <p:spPr>
+          <a:xfrm>
+            <a:off x="277353" y="841625"/>
+            <a:ext cx="5997735" cy="3827763"/>
+          </a:xfrm>
+          <a:prstGeom prst="roundRect">
+            <a:avLst>
+              <a:gd name="adj" fmla="val 2992"/>
+            </a:avLst>
+          </a:prstGeom>
+          <a:noFill/>
+          <a:ln>
+            <a:solidFill>
+              <a:srgbClr val="FF0000"/>
+            </a:solidFill>
+            <a:prstDash val="dash"/>
+          </a:ln>
+        </p:spPr>
+        <p:style>
+          <a:lnRef idx="2">
+            <a:schemeClr val="accent1">
+              <a:shade val="50000"/>
+            </a:schemeClr>
+          </a:lnRef>
+          <a:fillRef idx="1">
+            <a:schemeClr val="accent1"/>
+          </a:fillRef>
+          <a:effectRef idx="0">
+            <a:schemeClr val="accent1"/>
+          </a:effectRef>
+          <a:fontRef idx="minor">
+            <a:schemeClr val="lt1"/>
+          </a:fontRef>
+        </p:style>
+        <p:txBody>
+          <a:bodyPr rtlCol="0" anchor="b"/>
+          <a:lstStyle/>
+          <a:p>
+            <a:pPr algn="ctr"/>
+            <a:r>
+              <a:rPr lang="en-US" sz="1200" dirty="0">
+                <a:solidFill>
+                  <a:schemeClr val="accent1">
+                    <a:lumMod val="25000"/>
+                  </a:schemeClr>
+                </a:solidFill>
+              </a:rPr>
+              <a:t>Container Orchestration</a:t>
+            </a:r>
+            <a:endParaRPr sz="1200" dirty="0">
+              <a:solidFill>
+                <a:schemeClr val="accent1">
+                  <a:lumMod val="25000"/>
+                </a:schemeClr>
+              </a:solidFill>
+            </a:endParaRPr>
+          </a:p>
+        </p:txBody>
+      </p:sp>
+      <p:sp>
+        <p:nvSpPr>
+          <p:cNvPr id="6" name="Rounded Rectangle 5">
+            <a:extLst>
+              <a:ext uri="{FF2B5EF4-FFF2-40B4-BE49-F238E27FC236}">
+                <a16:creationId xmlns:a16="http://schemas.microsoft.com/office/drawing/2014/main" id="{56109B89-C21A-0C45-BA8E-38DA913A240F}"/>
+              </a:ext>
+            </a:extLst>
+          </p:cNvPr>
+          <p:cNvSpPr/>
+          <p:nvPr/>
+        </p:nvSpPr>
+        <p:spPr>
+          <a:xfrm>
+            <a:off x="153743" y="729975"/>
+            <a:ext cx="6213474" cy="5286400"/>
+          </a:xfrm>
+          <a:prstGeom prst="roundRect">
+            <a:avLst>
+              <a:gd name="adj" fmla="val 2992"/>
+            </a:avLst>
+          </a:prstGeom>
+          <a:noFill/>
+          <a:ln>
+            <a:solidFill>
+              <a:schemeClr val="tx1"/>
+            </a:solidFill>
+            <a:prstDash val="dash"/>
+          </a:ln>
+        </p:spPr>
+        <p:style>
+          <a:lnRef idx="2">
+            <a:schemeClr val="accent1">
+              <a:shade val="50000"/>
+            </a:schemeClr>
+          </a:lnRef>
+          <a:fillRef idx="1">
+            <a:schemeClr val="accent1"/>
+          </a:fillRef>
+          <a:effectRef idx="0">
+            <a:schemeClr val="accent1"/>
+          </a:effectRef>
+          <a:fontRef idx="minor">
+            <a:schemeClr val="lt1"/>
+          </a:fontRef>
+        </p:style>
+        <p:txBody>
+          <a:bodyPr rtlCol="0" anchor="b"/>
+          <a:lstStyle/>
+          <a:p>
+            <a:pPr algn="ctr"/>
+            <a:r>
+              <a:rPr lang="en-US" sz="1200" dirty="0">
+                <a:solidFill>
+                  <a:schemeClr val="accent1">
+                    <a:lumMod val="25000"/>
+                  </a:schemeClr>
+                </a:solidFill>
+              </a:rPr>
+              <a:t>Cloud or On-Premise Data Center</a:t>
+            </a:r>
+            <a:endParaRPr sz="1200" dirty="0">
+              <a:solidFill>
+                <a:schemeClr val="accent1">
+                  <a:lumMod val="25000"/>
+                </a:schemeClr>
+              </a:solidFill>
+            </a:endParaRPr>
+          </a:p>
+        </p:txBody>
+      </p:sp>
+      <p:pic>
+        <p:nvPicPr>
+          <p:cNvPr id="7" name="Picture 6">
+            <a:extLst>
+              <a:ext uri="{FF2B5EF4-FFF2-40B4-BE49-F238E27FC236}">
+                <a16:creationId xmlns:a16="http://schemas.microsoft.com/office/drawing/2014/main" id="{47414214-4EE5-AF46-953D-5609BB9ED94F}"/>
+              </a:ext>
+            </a:extLst>
+          </p:cNvPr>
+          <p:cNvPicPr>
+            <a:picLocks noChangeAspect="1"/>
+          </p:cNvPicPr>
+          <p:nvPr/>
+        </p:nvPicPr>
+        <p:blipFill>
+          <a:blip r:embed="rId2"/>
+          <a:stretch>
+            <a:fillRect/>
+          </a:stretch>
+        </p:blipFill>
+        <p:spPr>
+          <a:xfrm>
+            <a:off x="5521122" y="4781038"/>
+            <a:ext cx="622300" cy="558800"/>
+          </a:xfrm>
+          <a:prstGeom prst="rect">
+            <a:avLst/>
+          </a:prstGeom>
+        </p:spPr>
+      </p:pic>
+      <p:pic>
+        <p:nvPicPr>
+          <p:cNvPr id="8" name="Picture 7">
+            <a:extLst>
+              <a:ext uri="{FF2B5EF4-FFF2-40B4-BE49-F238E27FC236}">
+                <a16:creationId xmlns:a16="http://schemas.microsoft.com/office/drawing/2014/main" id="{E82F6022-4B01-5343-B423-8C91DCE8EAA8}"/>
+              </a:ext>
+            </a:extLst>
+          </p:cNvPr>
+          <p:cNvPicPr>
+            <a:picLocks noChangeAspect="1"/>
+          </p:cNvPicPr>
+          <p:nvPr/>
+        </p:nvPicPr>
+        <p:blipFill>
+          <a:blip r:embed="rId3"/>
+          <a:stretch>
+            <a:fillRect/>
+          </a:stretch>
+        </p:blipFill>
+        <p:spPr>
+          <a:xfrm>
+            <a:off x="424378" y="3518704"/>
+            <a:ext cx="349276" cy="451650"/>
+          </a:xfrm>
+          <a:prstGeom prst="rect">
+            <a:avLst/>
+          </a:prstGeom>
+        </p:spPr>
+      </p:pic>
+      <p:sp>
+        <p:nvSpPr>
+          <p:cNvPr id="9" name="Rectangle 8">
+            <a:extLst>
+              <a:ext uri="{FF2B5EF4-FFF2-40B4-BE49-F238E27FC236}">
+                <a16:creationId xmlns:a16="http://schemas.microsoft.com/office/drawing/2014/main" id="{C4B9F69B-26D4-044C-82BA-5B135C64AD76}"/>
+              </a:ext>
+            </a:extLst>
+          </p:cNvPr>
+          <p:cNvSpPr/>
+          <p:nvPr/>
+        </p:nvSpPr>
+        <p:spPr>
+          <a:xfrm>
+            <a:off x="1425614" y="1958573"/>
+            <a:ext cx="1454551" cy="438587"/>
+          </a:xfrm>
+          <a:prstGeom prst="rect">
+            <a:avLst/>
+          </a:prstGeom>
+          <a:solidFill>
+            <a:srgbClr val="4040EA"/>
+          </a:solidFill>
+          <a:ln>
+            <a:noFill/>
+          </a:ln>
+          <a:effectLst>
+            <a:outerShdw blurRad="50800" dist="38100" dir="5400000" algn="t" rotWithShape="0">
+              <a:prstClr val="black">
+                <a:alpha val="40000"/>
+              </a:prstClr>
+            </a:outerShdw>
+          </a:effectLst>
+        </p:spPr>
+        <p:style>
+          <a:lnRef idx="2">
+            <a:schemeClr val="accent1">
+              <a:shade val="50000"/>
+            </a:schemeClr>
+          </a:lnRef>
+          <a:fillRef idx="1">
+            <a:schemeClr val="accent1"/>
+          </a:fillRef>
+          <a:effectRef idx="0">
+            <a:schemeClr val="accent1"/>
+          </a:effectRef>
+          <a:fontRef idx="minor">
+            <a:schemeClr val="lt1"/>
+          </a:fontRef>
+        </p:style>
+        <p:txBody>
+          <a:bodyPr rtlCol="0" anchor="ctr"/>
+          <a:lstStyle/>
+          <a:p>
+            <a:pPr algn="ctr"/>
+            <a:r>
+              <a:rPr lang="en-US" sz="1200" dirty="0">
+                <a:solidFill>
+                  <a:schemeClr val="bg1"/>
+                </a:solidFill>
+              </a:rPr>
+              <a:t>Embedded build service</a:t>
+            </a:r>
+          </a:p>
+        </p:txBody>
+      </p:sp>
+      <p:sp>
+        <p:nvSpPr>
+          <p:cNvPr id="10" name="Rectangle 9">
+            <a:extLst>
+              <a:ext uri="{FF2B5EF4-FFF2-40B4-BE49-F238E27FC236}">
+                <a16:creationId xmlns:a16="http://schemas.microsoft.com/office/drawing/2014/main" id="{6FB2014A-DC82-4A4A-B599-036F158E3F6E}"/>
+              </a:ext>
+            </a:extLst>
+          </p:cNvPr>
+          <p:cNvSpPr/>
+          <p:nvPr/>
+        </p:nvSpPr>
+        <p:spPr>
+          <a:xfrm>
+            <a:off x="424378" y="5090522"/>
+            <a:ext cx="1454551" cy="438587"/>
+          </a:xfrm>
+          <a:prstGeom prst="rect">
+            <a:avLst/>
+          </a:prstGeom>
+          <a:solidFill>
+            <a:srgbClr val="4040EA"/>
+          </a:solidFill>
+          <a:ln>
+            <a:noFill/>
+          </a:ln>
+          <a:effectLst>
+            <a:outerShdw blurRad="50800" dist="38100" dir="5400000" algn="t" rotWithShape="0">
+              <a:prstClr val="black">
+                <a:alpha val="40000"/>
+              </a:prstClr>
+            </a:outerShdw>
+          </a:effectLst>
+        </p:spPr>
+        <p:style>
+          <a:lnRef idx="2">
+            <a:schemeClr val="accent1">
+              <a:shade val="50000"/>
+            </a:schemeClr>
+          </a:lnRef>
+          <a:fillRef idx="1">
+            <a:schemeClr val="accent1"/>
+          </a:fillRef>
+          <a:effectRef idx="0">
+            <a:schemeClr val="accent1"/>
+          </a:effectRef>
+          <a:fontRef idx="minor">
+            <a:schemeClr val="lt1"/>
+          </a:fontRef>
+        </p:style>
+        <p:txBody>
+          <a:bodyPr rtlCol="0" anchor="ctr"/>
+          <a:lstStyle/>
+          <a:p>
+            <a:pPr algn="ctr"/>
+            <a:r>
+              <a:rPr lang="en-US" sz="1200" dirty="0">
+                <a:solidFill>
+                  <a:schemeClr val="bg1"/>
+                </a:solidFill>
+              </a:rPr>
+              <a:t>Business Automation Studio</a:t>
+            </a:r>
+          </a:p>
+        </p:txBody>
+      </p:sp>
+      <p:sp>
+        <p:nvSpPr>
+          <p:cNvPr id="11" name="Rectangle 10">
+            <a:extLst>
+              <a:ext uri="{FF2B5EF4-FFF2-40B4-BE49-F238E27FC236}">
+                <a16:creationId xmlns:a16="http://schemas.microsoft.com/office/drawing/2014/main" id="{3274F9DA-C03A-CE48-8F4A-CDE52FDB86E6}"/>
+              </a:ext>
+            </a:extLst>
+          </p:cNvPr>
+          <p:cNvSpPr/>
+          <p:nvPr/>
+        </p:nvSpPr>
+        <p:spPr>
+          <a:xfrm>
+            <a:off x="4528928" y="2755506"/>
+            <a:ext cx="1454551" cy="438587"/>
+          </a:xfrm>
+          <a:prstGeom prst="rect">
+            <a:avLst/>
+          </a:prstGeom>
+          <a:solidFill>
+            <a:srgbClr val="4040EA"/>
+          </a:solidFill>
+          <a:ln>
+            <a:noFill/>
+          </a:ln>
+          <a:effectLst>
+            <a:outerShdw blurRad="50800" dist="38100" dir="5400000" algn="t" rotWithShape="0">
+              <a:prstClr val="black">
+                <a:alpha val="40000"/>
+              </a:prstClr>
+            </a:outerShdw>
+          </a:effectLst>
+        </p:spPr>
+        <p:style>
+          <a:lnRef idx="2">
+            <a:schemeClr val="accent1">
+              <a:shade val="50000"/>
+            </a:schemeClr>
+          </a:lnRef>
+          <a:fillRef idx="1">
+            <a:schemeClr val="accent1"/>
+          </a:fillRef>
+          <a:effectRef idx="0">
+            <a:schemeClr val="accent1"/>
+          </a:effectRef>
+          <a:fontRef idx="minor">
+            <a:schemeClr val="lt1"/>
+          </a:fontRef>
+        </p:style>
+        <p:txBody>
+          <a:bodyPr rtlCol="0" anchor="ctr"/>
+          <a:lstStyle/>
+          <a:p>
+            <a:pPr algn="ctr"/>
+            <a:r>
+              <a:rPr lang="en-US" sz="1200" dirty="0">
+                <a:solidFill>
+                  <a:schemeClr val="bg1"/>
+                </a:solidFill>
+              </a:rPr>
+              <a:t>Decision runtime</a:t>
+            </a:r>
+          </a:p>
+        </p:txBody>
+      </p:sp>
+      <p:sp>
+        <p:nvSpPr>
+          <p:cNvPr id="12" name="Rectangle 11">
+            <a:extLst>
+              <a:ext uri="{FF2B5EF4-FFF2-40B4-BE49-F238E27FC236}">
+                <a16:creationId xmlns:a16="http://schemas.microsoft.com/office/drawing/2014/main" id="{02564780-DF20-2942-B672-E66FF79C2B3B}"/>
+              </a:ext>
+            </a:extLst>
+          </p:cNvPr>
+          <p:cNvSpPr/>
+          <p:nvPr/>
+        </p:nvSpPr>
+        <p:spPr>
+          <a:xfrm>
+            <a:off x="495123" y="1040245"/>
+            <a:ext cx="1454551" cy="438587"/>
+          </a:xfrm>
+          <a:prstGeom prst="rect">
+            <a:avLst/>
+          </a:prstGeom>
+          <a:solidFill>
+            <a:srgbClr val="4040EA"/>
+          </a:solidFill>
+          <a:ln>
+            <a:noFill/>
+          </a:ln>
+          <a:effectLst>
+            <a:outerShdw blurRad="50800" dist="38100" dir="5400000" algn="t" rotWithShape="0">
+              <a:prstClr val="black">
+                <a:alpha val="40000"/>
+              </a:prstClr>
+            </a:outerShdw>
+          </a:effectLst>
+        </p:spPr>
+        <p:style>
+          <a:lnRef idx="2">
+            <a:schemeClr val="accent1">
+              <a:shade val="50000"/>
+            </a:schemeClr>
+          </a:lnRef>
+          <a:fillRef idx="1">
+            <a:schemeClr val="accent1"/>
+          </a:fillRef>
+          <a:effectRef idx="0">
+            <a:schemeClr val="accent1"/>
+          </a:effectRef>
+          <a:fontRef idx="minor">
+            <a:schemeClr val="lt1"/>
+          </a:fontRef>
+        </p:style>
+        <p:txBody>
+          <a:bodyPr rtlCol="0" anchor="ctr"/>
+          <a:lstStyle/>
+          <a:p>
+            <a:pPr algn="ctr"/>
+            <a:r>
+              <a:rPr lang="en-US" sz="1200" dirty="0">
+                <a:solidFill>
+                  <a:schemeClr val="bg1"/>
+                </a:solidFill>
+              </a:rPr>
+              <a:t>Machine Learning Predict</a:t>
+            </a:r>
+          </a:p>
+        </p:txBody>
+      </p:sp>
+    </p:spTree>
+    <p:extLst>
+      <p:ext uri="{BB962C8B-B14F-4D97-AF65-F5344CB8AC3E}">
+        <p14:creationId xmlns:p14="http://schemas.microsoft.com/office/powerpoint/2010/main" val="3806424803"/>
+      </p:ext>
+    </p:extLst>
+  </p:cSld>
+  <p:clrMapOvr>
+    <a:masterClrMapping/>
+  </p:clrMapOvr>
+</p:sld>
+</file>
+
 <file path=ppt/slides/slide2.xml><?xml version="1.0" encoding="utf-8"?>
 <p:sld xmlns:a="http://schemas.openxmlformats.org/drawingml/2006/main" xmlns:r="http://schemas.openxmlformats.org/officeDocument/2006/relationships" xmlns:p="http://schemas.openxmlformats.org/presentationml/2006/main">
   <p:cSld>
@@ -21308,7 +21979,7 @@
             <a:effectLst/>
             <a:extLst>
               <a:ext uri="{C572A759-6A51-4108-AA02-DFA0A04FC94B}">
-                <ma14:wrappingTextBoxFlag xmlns:ma14="http://schemas.microsoft.com/office/mac/drawingml/2011/main" xmlns="" val="1"/>
+                <ma14:wrappingTextBoxFlag xmlns="" xmlns:ma14="http://schemas.microsoft.com/office/mac/drawingml/2011/main" val="1"/>
               </a:ext>
             </a:extLst>
           </p:spPr>
@@ -21424,7 +22095,7 @@
             <a:effectLst/>
             <a:extLst>
               <a:ext uri="{C572A759-6A51-4108-AA02-DFA0A04FC94B}">
-                <ma14:wrappingTextBoxFlag xmlns:ma14="http://schemas.microsoft.com/office/mac/drawingml/2011/main" xmlns="" val="1"/>
+                <ma14:wrappingTextBoxFlag xmlns="" xmlns:ma14="http://schemas.microsoft.com/office/mac/drawingml/2011/main" val="1"/>
               </a:ext>
             </a:extLst>
           </p:spPr>
@@ -21894,7 +22565,7 @@
             <a:effectLst/>
             <a:extLst>
               <a:ext uri="{C572A759-6A51-4108-AA02-DFA0A04FC94B}">
-                <ma14:wrappingTextBoxFlag xmlns:ma14="http://schemas.microsoft.com/office/mac/drawingml/2011/main" xmlns="" val="1"/>
+                <ma14:wrappingTextBoxFlag xmlns="" xmlns:ma14="http://schemas.microsoft.com/office/mac/drawingml/2011/main" val="1"/>
               </a:ext>
             </a:extLst>
           </p:spPr>
@@ -22204,7 +22875,7 @@
             <a:effectLst/>
             <a:extLst>
               <a:ext uri="{C572A759-6A51-4108-AA02-DFA0A04FC94B}">
-                <ma14:wrappingTextBoxFlag xmlns:ma14="http://schemas.microsoft.com/office/mac/drawingml/2011/main" xmlns="" val="1"/>
+                <ma14:wrappingTextBoxFlag xmlns="" xmlns:ma14="http://schemas.microsoft.com/office/mac/drawingml/2011/main" val="1"/>
               </a:ext>
             </a:extLst>
           </p:spPr>
@@ -22438,7 +23109,7 @@
             <a:effectLst/>
             <a:extLst>
               <a:ext uri="{C572A759-6A51-4108-AA02-DFA0A04FC94B}">
-                <ma14:wrappingTextBoxFlag xmlns:ma14="http://schemas.microsoft.com/office/mac/drawingml/2011/main" xmlns="" val="1"/>
+                <ma14:wrappingTextBoxFlag xmlns="" xmlns:ma14="http://schemas.microsoft.com/office/mac/drawingml/2011/main" val="1"/>
               </a:ext>
             </a:extLst>
           </p:spPr>
@@ -22571,7 +23242,7 @@
             <a:effectLst/>
             <a:extLst>
               <a:ext uri="{C572A759-6A51-4108-AA02-DFA0A04FC94B}">
-                <ma14:wrappingTextBoxFlag xmlns:ma14="http://schemas.microsoft.com/office/mac/drawingml/2011/main" xmlns="" val="1"/>
+                <ma14:wrappingTextBoxFlag xmlns="" xmlns:ma14="http://schemas.microsoft.com/office/mac/drawingml/2011/main" val="1"/>
               </a:ext>
             </a:extLst>
           </p:spPr>
@@ -23644,7 +24315,7 @@
             <a:effectLst/>
             <a:extLst>
               <a:ext uri="{C572A759-6A51-4108-AA02-DFA0A04FC94B}">
-                <ma14:wrappingTextBoxFlag xmlns:ma14="http://schemas.microsoft.com/office/mac/drawingml/2011/main" xmlns="" val="1"/>
+                <ma14:wrappingTextBoxFlag xmlns="" xmlns:ma14="http://schemas.microsoft.com/office/mac/drawingml/2011/main" val="1"/>
               </a:ext>
             </a:extLst>
           </p:spPr>
@@ -23993,7 +24664,7 @@
             <a:effectLst/>
             <a:extLst>
               <a:ext uri="{C572A759-6A51-4108-AA02-DFA0A04FC94B}">
-                <ma14:wrappingTextBoxFlag xmlns:ma14="http://schemas.microsoft.com/office/mac/drawingml/2011/main" xmlns="" val="1"/>
+                <ma14:wrappingTextBoxFlag xmlns="" xmlns:ma14="http://schemas.microsoft.com/office/mac/drawingml/2011/main" val="1"/>
               </a:ext>
             </a:extLst>
           </p:spPr>
@@ -24413,7 +25084,7 @@
             <a:effectLst/>
             <a:extLst>
               <a:ext uri="{C572A759-6A51-4108-AA02-DFA0A04FC94B}">
-                <ma14:wrappingTextBoxFlag xmlns:ma14="http://schemas.microsoft.com/office/mac/drawingml/2011/main" xmlns="" val="1"/>
+                <ma14:wrappingTextBoxFlag xmlns="" xmlns:ma14="http://schemas.microsoft.com/office/mac/drawingml/2011/main" val="1"/>
               </a:ext>
             </a:extLst>
           </p:spPr>
@@ -25911,7 +26582,7 @@
             <a:effectLst/>
             <a:extLst>
               <a:ext uri="{C572A759-6A51-4108-AA02-DFA0A04FC94B}">
-                <ma14:wrappingTextBoxFlag xmlns:ma14="http://schemas.microsoft.com/office/mac/drawingml/2011/main" xmlns="" val="1"/>
+                <ma14:wrappingTextBoxFlag xmlns="" xmlns:ma14="http://schemas.microsoft.com/office/mac/drawingml/2011/main" val="1"/>
               </a:ext>
             </a:extLst>
           </p:spPr>
@@ -26676,7 +27347,7 @@
             <a:effectLst/>
             <a:extLst>
               <a:ext uri="{C572A759-6A51-4108-AA02-DFA0A04FC94B}">
-                <ma14:wrappingTextBoxFlag xmlns="" xmlns:ma14="http://schemas.microsoft.com/office/mac/drawingml/2011/main" val="1"/>
+                <ma14:wrappingTextBoxFlag xmlns:ma14="http://schemas.microsoft.com/office/mac/drawingml/2011/main" xmlns="" val="1"/>
               </a:ext>
             </a:extLst>
           </p:spPr>
@@ -26792,7 +27463,7 @@
             <a:effectLst/>
             <a:extLst>
               <a:ext uri="{C572A759-6A51-4108-AA02-DFA0A04FC94B}">
-                <ma14:wrappingTextBoxFlag xmlns="" xmlns:ma14="http://schemas.microsoft.com/office/mac/drawingml/2011/main" val="1"/>
+                <ma14:wrappingTextBoxFlag xmlns:ma14="http://schemas.microsoft.com/office/mac/drawingml/2011/main" xmlns="" val="1"/>
               </a:ext>
             </a:extLst>
           </p:spPr>
@@ -26908,7 +27579,7 @@
             <a:effectLst/>
             <a:extLst>
               <a:ext uri="{C572A759-6A51-4108-AA02-DFA0A04FC94B}">
-                <ma14:wrappingTextBoxFlag xmlns="" xmlns:ma14="http://schemas.microsoft.com/office/mac/drawingml/2011/main" val="1"/>
+                <ma14:wrappingTextBoxFlag xmlns:ma14="http://schemas.microsoft.com/office/mac/drawingml/2011/main" xmlns="" val="1"/>
               </a:ext>
             </a:extLst>
           </p:spPr>
@@ -27024,7 +27695,7 @@
             <a:effectLst/>
             <a:extLst>
               <a:ext uri="{C572A759-6A51-4108-AA02-DFA0A04FC94B}">
-                <ma14:wrappingTextBoxFlag xmlns="" xmlns:ma14="http://schemas.microsoft.com/office/mac/drawingml/2011/main" val="1"/>
+                <ma14:wrappingTextBoxFlag xmlns:ma14="http://schemas.microsoft.com/office/mac/drawingml/2011/main" xmlns="" val="1"/>
               </a:ext>
             </a:extLst>
           </p:spPr>
@@ -27140,7 +27811,7 @@
             <a:effectLst/>
             <a:extLst>
               <a:ext uri="{C572A759-6A51-4108-AA02-DFA0A04FC94B}">
-                <ma14:wrappingTextBoxFlag xmlns="" xmlns:ma14="http://schemas.microsoft.com/office/mac/drawingml/2011/main" val="1"/>
+                <ma14:wrappingTextBoxFlag xmlns:ma14="http://schemas.microsoft.com/office/mac/drawingml/2011/main" xmlns="" val="1"/>
               </a:ext>
             </a:extLst>
           </p:spPr>
@@ -27256,7 +27927,7 @@
             <a:effectLst/>
             <a:extLst>
               <a:ext uri="{C572A759-6A51-4108-AA02-DFA0A04FC94B}">
-                <ma14:wrappingTextBoxFlag xmlns="" xmlns:ma14="http://schemas.microsoft.com/office/mac/drawingml/2011/main" val="1"/>
+                <ma14:wrappingTextBoxFlag xmlns:ma14="http://schemas.microsoft.com/office/mac/drawingml/2011/main" xmlns="" val="1"/>
               </a:ext>
             </a:extLst>
           </p:spPr>
@@ -28936,7 +29607,7 @@
             <a:effectLst/>
             <a:extLst>
               <a:ext uri="{C572A759-6A51-4108-AA02-DFA0A04FC94B}">
-                <ma14:wrappingTextBoxFlag xmlns:ma14="http://schemas.microsoft.com/office/mac/drawingml/2011/main" xmlns="" val="1"/>
+                <ma14:wrappingTextBoxFlag xmlns="" xmlns:ma14="http://schemas.microsoft.com/office/mac/drawingml/2011/main" val="1"/>
               </a:ext>
             </a:extLst>
           </p:spPr>
@@ -29589,7 +30260,7 @@
             <a:effectLst/>
             <a:extLst>
               <a:ext uri="{C572A759-6A51-4108-AA02-DFA0A04FC94B}">
-                <ma14:wrappingTextBoxFlag xmlns="" xmlns:ma14="http://schemas.microsoft.com/office/mac/drawingml/2011/main" val="1"/>
+                <ma14:wrappingTextBoxFlag xmlns:ma14="http://schemas.microsoft.com/office/mac/drawingml/2011/main" xmlns="" val="1"/>
               </a:ext>
             </a:extLst>
           </p:spPr>
@@ -30078,7 +30749,7 @@
             <a:effectLst/>
             <a:extLst>
               <a:ext uri="{C572A759-6A51-4108-AA02-DFA0A04FC94B}">
-                <ma14:wrappingTextBoxFlag xmlns:ma14="http://schemas.microsoft.com/office/mac/drawingml/2011/main" xmlns="" val="1"/>
+                <ma14:wrappingTextBoxFlag xmlns="" xmlns:ma14="http://schemas.microsoft.com/office/mac/drawingml/2011/main" val="1"/>
               </a:ext>
             </a:extLst>
           </p:spPr>
@@ -30194,7 +30865,7 @@
             <a:effectLst/>
             <a:extLst>
               <a:ext uri="{C572A759-6A51-4108-AA02-DFA0A04FC94B}">
-                <ma14:wrappingTextBoxFlag xmlns:ma14="http://schemas.microsoft.com/office/mac/drawingml/2011/main" xmlns="" val="1"/>
+                <ma14:wrappingTextBoxFlag xmlns="" xmlns:ma14="http://schemas.microsoft.com/office/mac/drawingml/2011/main" val="1"/>
               </a:ext>
             </a:extLst>
           </p:spPr>
@@ -30524,7 +31195,7 @@
             <a:effectLst/>
             <a:extLst>
               <a:ext uri="{C572A759-6A51-4108-AA02-DFA0A04FC94B}">
-                <ma14:wrappingTextBoxFlag xmlns:ma14="http://schemas.microsoft.com/office/mac/drawingml/2011/main" xmlns="" val="1"/>
+                <ma14:wrappingTextBoxFlag xmlns="" xmlns:ma14="http://schemas.microsoft.com/office/mac/drawingml/2011/main" val="1"/>
               </a:ext>
             </a:extLst>
           </p:spPr>
@@ -30952,7 +31623,7 @@
             <a:effectLst/>
             <a:extLst>
               <a:ext uri="{C572A759-6A51-4108-AA02-DFA0A04FC94B}">
-                <ma14:wrappingTextBoxFlag xmlns:ma14="http://schemas.microsoft.com/office/mac/drawingml/2011/main" xmlns="" val="1"/>
+                <ma14:wrappingTextBoxFlag xmlns="" xmlns:ma14="http://schemas.microsoft.com/office/mac/drawingml/2011/main" val="1"/>
               </a:ext>
             </a:extLst>
           </p:spPr>
@@ -31935,7 +32606,7 @@
             <a:effectLst/>
             <a:extLst>
               <a:ext uri="{C572A759-6A51-4108-AA02-DFA0A04FC94B}">
-                <ma14:wrappingTextBoxFlag xmlns:ma14="http://schemas.microsoft.com/office/mac/drawingml/2011/main" xmlns="" val="1"/>
+                <ma14:wrappingTextBoxFlag xmlns="" xmlns:ma14="http://schemas.microsoft.com/office/mac/drawingml/2011/main" val="1"/>
               </a:ext>
             </a:extLst>
           </p:spPr>
@@ -32190,7 +32861,7 @@
             <a:effectLst/>
             <a:extLst>
               <a:ext uri="{C572A759-6A51-4108-AA02-DFA0A04FC94B}">
-                <ma14:wrappingTextBoxFlag xmlns:ma14="http://schemas.microsoft.com/office/mac/drawingml/2011/main" xmlns="" val="1"/>
+                <ma14:wrappingTextBoxFlag xmlns="" xmlns:ma14="http://schemas.microsoft.com/office/mac/drawingml/2011/main" val="1"/>
               </a:ext>
             </a:extLst>
           </p:spPr>
@@ -32520,7 +33191,7 @@
             <a:effectLst/>
             <a:extLst>
               <a:ext uri="{C572A759-6A51-4108-AA02-DFA0A04FC94B}">
-                <ma14:wrappingTextBoxFlag xmlns:ma14="http://schemas.microsoft.com/office/mac/drawingml/2011/main" xmlns="" val="1"/>
+                <ma14:wrappingTextBoxFlag xmlns="" xmlns:ma14="http://schemas.microsoft.com/office/mac/drawingml/2011/main" val="1"/>
               </a:ext>
             </a:extLst>
           </p:spPr>
@@ -32747,7 +33418,7 @@
             <a:effectLst/>
             <a:extLst>
               <a:ext uri="{C572A759-6A51-4108-AA02-DFA0A04FC94B}">
-                <ma14:wrappingTextBoxFlag xmlns:ma14="http://schemas.microsoft.com/office/mac/drawingml/2011/main" xmlns="" val="1"/>
+                <ma14:wrappingTextBoxFlag xmlns="" xmlns:ma14="http://schemas.microsoft.com/office/mac/drawingml/2011/main" val="1"/>
               </a:ext>
             </a:extLst>
           </p:spPr>
@@ -33088,7 +33759,7 @@
             <a:effectLst/>
             <a:extLst>
               <a:ext uri="{C572A759-6A51-4108-AA02-DFA0A04FC94B}">
-                <ma14:wrappingTextBoxFlag xmlns:ma14="http://schemas.microsoft.com/office/mac/drawingml/2011/main" xmlns="" val="1"/>
+                <ma14:wrappingTextBoxFlag xmlns="" xmlns:ma14="http://schemas.microsoft.com/office/mac/drawingml/2011/main" val="1"/>
               </a:ext>
             </a:extLst>
           </p:spPr>
@@ -33726,7 +34397,7 @@
             <a:effectLst/>
             <a:extLst>
               <a:ext uri="{C572A759-6A51-4108-AA02-DFA0A04FC94B}">
-                <ma14:wrappingTextBoxFlag xmlns:ma14="http://schemas.microsoft.com/office/mac/drawingml/2011/main" xmlns="" val="1"/>
+                <ma14:wrappingTextBoxFlag xmlns="" xmlns:ma14="http://schemas.microsoft.com/office/mac/drawingml/2011/main" val="1"/>
               </a:ext>
             </a:extLst>
           </p:spPr>
@@ -33842,7 +34513,7 @@
             <a:effectLst/>
             <a:extLst>
               <a:ext uri="{C572A759-6A51-4108-AA02-DFA0A04FC94B}">
-                <ma14:wrappingTextBoxFlag xmlns:ma14="http://schemas.microsoft.com/office/mac/drawingml/2011/main" xmlns="" val="1"/>
+                <ma14:wrappingTextBoxFlag xmlns="" xmlns:ma14="http://schemas.microsoft.com/office/mac/drawingml/2011/main" val="1"/>
               </a:ext>
             </a:extLst>
           </p:spPr>
@@ -35034,7 +35705,7 @@
             <a:effectLst/>
             <a:extLst>
               <a:ext uri="{C572A759-6A51-4108-AA02-DFA0A04FC94B}">
-                <ma14:wrappingTextBoxFlag xmlns:ma14="http://schemas.microsoft.com/office/mac/drawingml/2011/main" xmlns="" val="1"/>
+                <ma14:wrappingTextBoxFlag xmlns="" xmlns:ma14="http://schemas.microsoft.com/office/mac/drawingml/2011/main" val="1"/>
               </a:ext>
             </a:extLst>
           </p:spPr>
@@ -35150,7 +35821,7 @@
             <a:effectLst/>
             <a:extLst>
               <a:ext uri="{C572A759-6A51-4108-AA02-DFA0A04FC94B}">
-                <ma14:wrappingTextBoxFlag xmlns:ma14="http://schemas.microsoft.com/office/mac/drawingml/2011/main" xmlns="" val="1"/>
+                <ma14:wrappingTextBoxFlag xmlns="" xmlns:ma14="http://schemas.microsoft.com/office/mac/drawingml/2011/main" val="1"/>
               </a:ext>
             </a:extLst>
           </p:spPr>
@@ -35266,7 +35937,7 @@
             <a:effectLst/>
             <a:extLst>
               <a:ext uri="{C572A759-6A51-4108-AA02-DFA0A04FC94B}">
-                <ma14:wrappingTextBoxFlag xmlns:ma14="http://schemas.microsoft.com/office/mac/drawingml/2011/main" xmlns="" val="1"/>
+                <ma14:wrappingTextBoxFlag xmlns="" xmlns:ma14="http://schemas.microsoft.com/office/mac/drawingml/2011/main" val="1"/>
               </a:ext>
             </a:extLst>
           </p:spPr>
@@ -35677,7 +36348,7 @@
             <a:effectLst/>
             <a:extLst>
               <a:ext uri="{C572A759-6A51-4108-AA02-DFA0A04FC94B}">
-                <ma14:wrappingTextBoxFlag xmlns:ma14="http://schemas.microsoft.com/office/mac/drawingml/2011/main" xmlns="" val="1"/>
+                <ma14:wrappingTextBoxFlag xmlns="" xmlns:ma14="http://schemas.microsoft.com/office/mac/drawingml/2011/main" val="1"/>
               </a:ext>
             </a:extLst>
           </p:spPr>
@@ -35793,7 +36464,7 @@
             <a:effectLst/>
             <a:extLst>
               <a:ext uri="{C572A759-6A51-4108-AA02-DFA0A04FC94B}">
-                <ma14:wrappingTextBoxFlag xmlns:ma14="http://schemas.microsoft.com/office/mac/drawingml/2011/main" xmlns="" val="1"/>
+                <ma14:wrappingTextBoxFlag xmlns="" xmlns:ma14="http://schemas.microsoft.com/office/mac/drawingml/2011/main" val="1"/>
               </a:ext>
             </a:extLst>
           </p:spPr>
@@ -35909,7 +36580,7 @@
             <a:effectLst/>
             <a:extLst>
               <a:ext uri="{C572A759-6A51-4108-AA02-DFA0A04FC94B}">
-                <ma14:wrappingTextBoxFlag xmlns:ma14="http://schemas.microsoft.com/office/mac/drawingml/2011/main" xmlns="" val="1"/>
+                <ma14:wrappingTextBoxFlag xmlns="" xmlns:ma14="http://schemas.microsoft.com/office/mac/drawingml/2011/main" val="1"/>
               </a:ext>
             </a:extLst>
           </p:spPr>
@@ -36285,7 +36956,7 @@
             <a:effectLst/>
             <a:extLst>
               <a:ext uri="{C572A759-6A51-4108-AA02-DFA0A04FC94B}">
-                <ma14:wrappingTextBoxFlag xmlns:ma14="http://schemas.microsoft.com/office/mac/drawingml/2011/main" xmlns="" val="1"/>
+                <ma14:wrappingTextBoxFlag xmlns="" xmlns:ma14="http://schemas.microsoft.com/office/mac/drawingml/2011/main" val="1"/>
               </a:ext>
             </a:extLst>
           </p:spPr>
@@ -36418,7 +37089,7 @@
             <a:effectLst/>
             <a:extLst>
               <a:ext uri="{C572A759-6A51-4108-AA02-DFA0A04FC94B}">
-                <ma14:wrappingTextBoxFlag xmlns:ma14="http://schemas.microsoft.com/office/mac/drawingml/2011/main" xmlns="" val="1"/>
+                <ma14:wrappingTextBoxFlag xmlns="" xmlns:ma14="http://schemas.microsoft.com/office/mac/drawingml/2011/main" val="1"/>
               </a:ext>
             </a:extLst>
           </p:spPr>
@@ -36534,7 +37205,7 @@
             <a:effectLst/>
             <a:extLst>
               <a:ext uri="{C572A759-6A51-4108-AA02-DFA0A04FC94B}">
-                <ma14:wrappingTextBoxFlag xmlns:ma14="http://schemas.microsoft.com/office/mac/drawingml/2011/main" xmlns="" val="1"/>
+                <ma14:wrappingTextBoxFlag xmlns="" xmlns:ma14="http://schemas.microsoft.com/office/mac/drawingml/2011/main" val="1"/>
               </a:ext>
             </a:extLst>
           </p:spPr>
@@ -36747,7 +37418,7 @@
             <a:effectLst/>
             <a:extLst>
               <a:ext uri="{C572A759-6A51-4108-AA02-DFA0A04FC94B}">
-                <ma14:wrappingTextBoxFlag xmlns="" xmlns:ma14="http://schemas.microsoft.com/office/mac/drawingml/2011/main" val="1"/>
+                <ma14:wrappingTextBoxFlag xmlns:ma14="http://schemas.microsoft.com/office/mac/drawingml/2011/main" xmlns="" val="1"/>
               </a:ext>
             </a:extLst>
           </p:spPr>
@@ -36978,7 +37649,7 @@
               <a:effectLst/>
               <a:extLst>
                 <a:ext uri="{C572A759-6A51-4108-AA02-DFA0A04FC94B}">
-                  <ma14:wrappingTextBoxFlag xmlns="" xmlns:ma14="http://schemas.microsoft.com/office/mac/drawingml/2011/main" val="1"/>
+                  <ma14:wrappingTextBoxFlag xmlns:ma14="http://schemas.microsoft.com/office/mac/drawingml/2011/main" xmlns="" val="1"/>
                 </a:ext>
               </a:extLst>
             </p:spPr>
@@ -37444,7 +38115,7 @@
               <a:effectLst/>
               <a:extLst>
                 <a:ext uri="{C572A759-6A51-4108-AA02-DFA0A04FC94B}">
-                  <ma14:wrappingTextBoxFlag xmlns="" xmlns:ma14="http://schemas.microsoft.com/office/mac/drawingml/2011/main" val="1"/>
+                  <ma14:wrappingTextBoxFlag xmlns:ma14="http://schemas.microsoft.com/office/mac/drawingml/2011/main" xmlns="" val="1"/>
                 </a:ext>
               </a:extLst>
             </p:spPr>
@@ -38180,7 +38851,7 @@
               <a:effectLst/>
               <a:extLst>
                 <a:ext uri="{C572A759-6A51-4108-AA02-DFA0A04FC94B}">
-                  <ma14:wrappingTextBoxFlag xmlns="" xmlns:ma14="http://schemas.microsoft.com/office/mac/drawingml/2011/main" val="1"/>
+                  <ma14:wrappingTextBoxFlag xmlns:ma14="http://schemas.microsoft.com/office/mac/drawingml/2011/main" xmlns="" val="1"/>
                 </a:ext>
               </a:extLst>
             </p:spPr>
@@ -38672,7 +39343,7 @@
             <a:effectLst/>
             <a:extLst>
               <a:ext uri="{C572A759-6A51-4108-AA02-DFA0A04FC94B}">
-                <ma14:wrappingTextBoxFlag xmlns="" xmlns:ma14="http://schemas.microsoft.com/office/mac/drawingml/2011/main" val="1"/>
+                <ma14:wrappingTextBoxFlag xmlns:ma14="http://schemas.microsoft.com/office/mac/drawingml/2011/main" xmlns="" val="1"/>
               </a:ext>
             </a:extLst>
           </p:spPr>
@@ -38805,7 +39476,7 @@
             <a:effectLst/>
             <a:extLst>
               <a:ext uri="{C572A759-6A51-4108-AA02-DFA0A04FC94B}">
-                <ma14:wrappingTextBoxFlag xmlns="" xmlns:ma14="http://schemas.microsoft.com/office/mac/drawingml/2011/main" val="1"/>
+                <ma14:wrappingTextBoxFlag xmlns:ma14="http://schemas.microsoft.com/office/mac/drawingml/2011/main" xmlns="" val="1"/>
               </a:ext>
             </a:extLst>
           </p:spPr>
@@ -38938,7 +39609,7 @@
             <a:effectLst/>
             <a:extLst>
               <a:ext uri="{C572A759-6A51-4108-AA02-DFA0A04FC94B}">
-                <ma14:wrappingTextBoxFlag xmlns:ma14="http://schemas.microsoft.com/office/mac/drawingml/2011/main" xmlns="" val="1"/>
+                <ma14:wrappingTextBoxFlag xmlns="" xmlns:ma14="http://schemas.microsoft.com/office/mac/drawingml/2011/main" val="1"/>
               </a:ext>
             </a:extLst>
           </p:spPr>
@@ -39169,7 +39840,7 @@
               <a:effectLst/>
               <a:extLst>
                 <a:ext uri="{C572A759-6A51-4108-AA02-DFA0A04FC94B}">
-                  <ma14:wrappingTextBoxFlag xmlns:ma14="http://schemas.microsoft.com/office/mac/drawingml/2011/main" xmlns="" val="1"/>
+                  <ma14:wrappingTextBoxFlag xmlns="" xmlns:ma14="http://schemas.microsoft.com/office/mac/drawingml/2011/main" val="1"/>
                 </a:ext>
               </a:extLst>
             </p:spPr>
@@ -39547,7 +40218,7 @@
               <a:effectLst/>
               <a:extLst>
                 <a:ext uri="{C572A759-6A51-4108-AA02-DFA0A04FC94B}">
-                  <ma14:wrappingTextBoxFlag xmlns:ma14="http://schemas.microsoft.com/office/mac/drawingml/2011/main" xmlns="" val="1"/>
+                  <ma14:wrappingTextBoxFlag xmlns="" xmlns:ma14="http://schemas.microsoft.com/office/mac/drawingml/2011/main" val="1"/>
                 </a:ext>
               </a:extLst>
             </p:spPr>
@@ -40283,7 +40954,7 @@
               <a:effectLst/>
               <a:extLst>
                 <a:ext uri="{C572A759-6A51-4108-AA02-DFA0A04FC94B}">
-                  <ma14:wrappingTextBoxFlag xmlns:ma14="http://schemas.microsoft.com/office/mac/drawingml/2011/main" xmlns="" val="1"/>
+                  <ma14:wrappingTextBoxFlag xmlns="" xmlns:ma14="http://schemas.microsoft.com/office/mac/drawingml/2011/main" val="1"/>
                 </a:ext>
               </a:extLst>
             </p:spPr>
@@ -40523,7 +41194,7 @@
             <a:effectLst/>
             <a:extLst>
               <a:ext uri="{C572A759-6A51-4108-AA02-DFA0A04FC94B}">
-                <ma14:wrappingTextBoxFlag xmlns:ma14="http://schemas.microsoft.com/office/mac/drawingml/2011/main" xmlns="" val="1"/>
+                <ma14:wrappingTextBoxFlag xmlns="" xmlns:ma14="http://schemas.microsoft.com/office/mac/drawingml/2011/main" val="1"/>
               </a:ext>
             </a:extLst>
           </p:spPr>
@@ -40776,7 +41447,7 @@
             <a:effectLst/>
             <a:extLst>
               <a:ext uri="{C572A759-6A51-4108-AA02-DFA0A04FC94B}">
-                <ma14:wrappingTextBoxFlag xmlns:ma14="http://schemas.microsoft.com/office/mac/drawingml/2011/main" xmlns="" val="1"/>
+                <ma14:wrappingTextBoxFlag xmlns="" xmlns:ma14="http://schemas.microsoft.com/office/mac/drawingml/2011/main" val="1"/>
               </a:ext>
             </a:extLst>
           </p:spPr>
@@ -41108,7 +41779,7 @@
               <a:effectLst/>
               <a:extLst>
                 <a:ext uri="{C572A759-6A51-4108-AA02-DFA0A04FC94B}">
-                  <ma14:wrappingTextBoxFlag xmlns:ma14="http://schemas.microsoft.com/office/mac/drawingml/2011/main" xmlns="" val="1"/>
+                  <ma14:wrappingTextBoxFlag xmlns="" xmlns:ma14="http://schemas.microsoft.com/office/mac/drawingml/2011/main" val="1"/>
                 </a:ext>
               </a:extLst>
             </p:spPr>
@@ -41301,7 +41972,7 @@
             <a:effectLst/>
             <a:extLst>
               <a:ext uri="{C572A759-6A51-4108-AA02-DFA0A04FC94B}">
-                <ma14:wrappingTextBoxFlag xmlns:ma14="http://schemas.microsoft.com/office/mac/drawingml/2011/main" xmlns="" val="1"/>
+                <ma14:wrappingTextBoxFlag xmlns="" xmlns:ma14="http://schemas.microsoft.com/office/mac/drawingml/2011/main" val="1"/>
               </a:ext>
             </a:extLst>
           </p:spPr>

</xml_diff>

<commit_message>
update mq and gitops
</commit_message>
<xml_diff>
--- a/docs/Diagrams.pptx
+++ b/docs/Diagrams.pptx
@@ -6,7 +6,7 @@
     <p:sldMasterId id="2147484308" r:id="rId2"/>
   </p:sldMasterIdLst>
   <p:notesMasterIdLst>
-    <p:notesMasterId r:id="rId20"/>
+    <p:notesMasterId r:id="rId22"/>
   </p:notesMasterIdLst>
   <p:sldIdLst>
     <p:sldId id="2670" r:id="rId3"/>
@@ -26,6 +26,8 @@
     <p:sldId id="2684" r:id="rId17"/>
     <p:sldId id="2685" r:id="rId18"/>
     <p:sldId id="2686" r:id="rId19"/>
+    <p:sldId id="2687" r:id="rId20"/>
+    <p:sldId id="2688" r:id="rId21"/>
   </p:sldIdLst>
   <p:sldSz cx="12192000" cy="6858000"/>
   <p:notesSz cx="7086600" cy="9372600"/>
@@ -288,7 +290,7 @@
               <a:pPr>
                 <a:defRPr/>
               </a:pPr>
-              <a:t>6/15/21</a:t>
+              <a:t>9/1/21</a:t>
             </a:fld>
             <a:endParaRPr lang="en-US"/>
           </a:p>
@@ -9166,7 +9168,7 @@
             <a:effectLst/>
             <a:extLst>
               <a:ext uri="{C572A759-6A51-4108-AA02-DFA0A04FC94B}">
-                <ma14:wrappingTextBoxFlag xmlns="" xmlns:ma14="http://schemas.microsoft.com/office/mac/drawingml/2011/main" val="1"/>
+                <ma14:wrappingTextBoxFlag xmlns:ma14="http://schemas.microsoft.com/office/mac/drawingml/2011/main" xmlns="" val="1"/>
               </a:ext>
             </a:extLst>
           </p:spPr>
@@ -9982,7 +9984,7 @@
             <a:effectLst/>
             <a:extLst>
               <a:ext uri="{C572A759-6A51-4108-AA02-DFA0A04FC94B}">
-                <ma14:wrappingTextBoxFlag xmlns="" xmlns:ma14="http://schemas.microsoft.com/office/mac/drawingml/2011/main" val="1"/>
+                <ma14:wrappingTextBoxFlag xmlns:ma14="http://schemas.microsoft.com/office/mac/drawingml/2011/main" xmlns="" val="1"/>
               </a:ext>
             </a:extLst>
           </p:spPr>
@@ -10098,7 +10100,7 @@
             <a:effectLst/>
             <a:extLst>
               <a:ext uri="{C572A759-6A51-4108-AA02-DFA0A04FC94B}">
-                <ma14:wrappingTextBoxFlag xmlns="" xmlns:ma14="http://schemas.microsoft.com/office/mac/drawingml/2011/main" val="1"/>
+                <ma14:wrappingTextBoxFlag xmlns:ma14="http://schemas.microsoft.com/office/mac/drawingml/2011/main" xmlns="" val="1"/>
               </a:ext>
             </a:extLst>
           </p:spPr>
@@ -10278,7 +10280,7 @@
             <a:effectLst/>
             <a:extLst>
               <a:ext uri="{C572A759-6A51-4108-AA02-DFA0A04FC94B}">
-                <ma14:wrappingTextBoxFlag xmlns:ma14="http://schemas.microsoft.com/office/mac/drawingml/2011/main" xmlns="" val="1"/>
+                <ma14:wrappingTextBoxFlag xmlns="" xmlns:ma14="http://schemas.microsoft.com/office/mac/drawingml/2011/main" val="1"/>
               </a:ext>
             </a:extLst>
           </p:spPr>
@@ -10593,7 +10595,7 @@
               <a:effectLst/>
               <a:extLst>
                 <a:ext uri="{C572A759-6A51-4108-AA02-DFA0A04FC94B}">
-                  <ma14:wrappingTextBoxFlag xmlns="" xmlns:ma14="http://schemas.microsoft.com/office/mac/drawingml/2011/main" val="1"/>
+                  <ma14:wrappingTextBoxFlag xmlns:ma14="http://schemas.microsoft.com/office/mac/drawingml/2011/main" xmlns="" val="1"/>
                 </a:ext>
               </a:extLst>
             </p:spPr>
@@ -10807,7 +10809,7 @@
               <a:effectLst/>
               <a:extLst>
                 <a:ext uri="{C572A759-6A51-4108-AA02-DFA0A04FC94B}">
-                  <ma14:wrappingTextBoxFlag xmlns="" xmlns:ma14="http://schemas.microsoft.com/office/mac/drawingml/2011/main" val="1"/>
+                  <ma14:wrappingTextBoxFlag xmlns:ma14="http://schemas.microsoft.com/office/mac/drawingml/2011/main" xmlns="" val="1"/>
                 </a:ext>
               </a:extLst>
             </p:spPr>
@@ -11089,7 +11091,7 @@
             <a:effectLst/>
             <a:extLst>
               <a:ext uri="{C572A759-6A51-4108-AA02-DFA0A04FC94B}">
-                <ma14:wrappingTextBoxFlag xmlns="" xmlns:ma14="http://schemas.microsoft.com/office/mac/drawingml/2011/main" val="1"/>
+                <ma14:wrappingTextBoxFlag xmlns:ma14="http://schemas.microsoft.com/office/mac/drawingml/2011/main" xmlns="" val="1"/>
               </a:ext>
             </a:extLst>
           </p:spPr>
@@ -11205,7 +11207,7 @@
             <a:effectLst/>
             <a:extLst>
               <a:ext uri="{C572A759-6A51-4108-AA02-DFA0A04FC94B}">
-                <ma14:wrappingTextBoxFlag xmlns="" xmlns:ma14="http://schemas.microsoft.com/office/mac/drawingml/2011/main" val="1"/>
+                <ma14:wrappingTextBoxFlag xmlns:ma14="http://schemas.microsoft.com/office/mac/drawingml/2011/main" xmlns="" val="1"/>
               </a:ext>
             </a:extLst>
           </p:spPr>
@@ -12343,7 +12345,7 @@
             <a:effectLst/>
             <a:extLst>
               <a:ext uri="{C572A759-6A51-4108-AA02-DFA0A04FC94B}">
-                <ma14:wrappingTextBoxFlag xmlns:ma14="http://schemas.microsoft.com/office/mac/drawingml/2011/main" xmlns="" val="1"/>
+                <ma14:wrappingTextBoxFlag xmlns="" xmlns:ma14="http://schemas.microsoft.com/office/mac/drawingml/2011/main" val="1"/>
               </a:ext>
             </a:extLst>
           </p:spPr>
@@ -12476,7 +12478,7 @@
             <a:effectLst/>
             <a:extLst>
               <a:ext uri="{C572A759-6A51-4108-AA02-DFA0A04FC94B}">
-                <ma14:wrappingTextBoxFlag xmlns:ma14="http://schemas.microsoft.com/office/mac/drawingml/2011/main" xmlns="" val="1"/>
+                <ma14:wrappingTextBoxFlag xmlns="" xmlns:ma14="http://schemas.microsoft.com/office/mac/drawingml/2011/main" val="1"/>
               </a:ext>
             </a:extLst>
           </p:spPr>
@@ -12788,7 +12790,7 @@
               <a:effectLst/>
               <a:extLst>
                 <a:ext uri="{C572A759-6A51-4108-AA02-DFA0A04FC94B}">
-                  <ma14:wrappingTextBoxFlag xmlns="" xmlns:ma14="http://schemas.microsoft.com/office/mac/drawingml/2011/main" val="1"/>
+                  <ma14:wrappingTextBoxFlag xmlns:ma14="http://schemas.microsoft.com/office/mac/drawingml/2011/main" xmlns="" val="1"/>
                 </a:ext>
               </a:extLst>
             </p:spPr>
@@ -13212,7 +13214,7 @@
               <a:effectLst/>
               <a:extLst>
                 <a:ext uri="{C572A759-6A51-4108-AA02-DFA0A04FC94B}">
-                  <ma14:wrappingTextBoxFlag xmlns="" xmlns:ma14="http://schemas.microsoft.com/office/mac/drawingml/2011/main" val="1"/>
+                  <ma14:wrappingTextBoxFlag xmlns:ma14="http://schemas.microsoft.com/office/mac/drawingml/2011/main" xmlns="" val="1"/>
                 </a:ext>
               </a:extLst>
             </p:spPr>
@@ -13863,7 +13865,7 @@
             <a:effectLst/>
             <a:extLst>
               <a:ext uri="{C572A759-6A51-4108-AA02-DFA0A04FC94B}">
-                <ma14:wrappingTextBoxFlag xmlns="" xmlns:ma14="http://schemas.microsoft.com/office/mac/drawingml/2011/main" val="1"/>
+                <ma14:wrappingTextBoxFlag xmlns:ma14="http://schemas.microsoft.com/office/mac/drawingml/2011/main" xmlns="" val="1"/>
               </a:ext>
             </a:extLst>
           </p:spPr>
@@ -14118,7 +14120,7 @@
             <a:effectLst/>
             <a:extLst>
               <a:ext uri="{C572A759-6A51-4108-AA02-DFA0A04FC94B}">
-                <ma14:wrappingTextBoxFlag xmlns:ma14="http://schemas.microsoft.com/office/mac/drawingml/2011/main" xmlns="" val="1"/>
+                <ma14:wrappingTextBoxFlag xmlns="" xmlns:ma14="http://schemas.microsoft.com/office/mac/drawingml/2011/main" val="1"/>
               </a:ext>
             </a:extLst>
           </p:spPr>
@@ -14366,7 +14368,7 @@
               <a:effectLst/>
               <a:extLst>
                 <a:ext uri="{C572A759-6A51-4108-AA02-DFA0A04FC94B}">
-                  <ma14:wrappingTextBoxFlag xmlns="" xmlns:ma14="http://schemas.microsoft.com/office/mac/drawingml/2011/main" val="1"/>
+                  <ma14:wrappingTextBoxFlag xmlns:ma14="http://schemas.microsoft.com/office/mac/drawingml/2011/main" xmlns="" val="1"/>
                 </a:ext>
               </a:extLst>
             </p:spPr>
@@ -14664,7 +14666,7 @@
               <a:effectLst/>
               <a:extLst>
                 <a:ext uri="{C572A759-6A51-4108-AA02-DFA0A04FC94B}">
-                  <ma14:wrappingTextBoxFlag xmlns="" xmlns:ma14="http://schemas.microsoft.com/office/mac/drawingml/2011/main" val="1"/>
+                  <ma14:wrappingTextBoxFlag xmlns:ma14="http://schemas.microsoft.com/office/mac/drawingml/2011/main" xmlns="" val="1"/>
                 </a:ext>
               </a:extLst>
             </p:spPr>
@@ -15974,7 +15976,7 @@
             <a:effectLst/>
             <a:extLst>
               <a:ext uri="{C572A759-6A51-4108-AA02-DFA0A04FC94B}">
-                <ma14:wrappingTextBoxFlag xmlns:ma14="http://schemas.microsoft.com/office/mac/drawingml/2011/main" xmlns="" val="1"/>
+                <ma14:wrappingTextBoxFlag xmlns="" xmlns:ma14="http://schemas.microsoft.com/office/mac/drawingml/2011/main" val="1"/>
               </a:ext>
             </a:extLst>
           </p:spPr>
@@ -16090,7 +16092,7 @@
             <a:effectLst/>
             <a:extLst>
               <a:ext uri="{C572A759-6A51-4108-AA02-DFA0A04FC94B}">
-                <ma14:wrappingTextBoxFlag xmlns:ma14="http://schemas.microsoft.com/office/mac/drawingml/2011/main" xmlns="" val="1"/>
+                <ma14:wrappingTextBoxFlag xmlns="" xmlns:ma14="http://schemas.microsoft.com/office/mac/drawingml/2011/main" val="1"/>
               </a:ext>
             </a:extLst>
           </p:spPr>
@@ -16511,7 +16513,7 @@
             <a:effectLst/>
             <a:extLst>
               <a:ext uri="{C572A759-6A51-4108-AA02-DFA0A04FC94B}">
-                <ma14:wrappingTextBoxFlag xmlns:ma14="http://schemas.microsoft.com/office/mac/drawingml/2011/main" xmlns="" val="1"/>
+                <ma14:wrappingTextBoxFlag xmlns="" xmlns:ma14="http://schemas.microsoft.com/office/mac/drawingml/2011/main" val="1"/>
               </a:ext>
             </a:extLst>
           </p:spPr>
@@ -16670,7 +16672,7 @@
             <a:effectLst/>
             <a:extLst>
               <a:ext uri="{C572A759-6A51-4108-AA02-DFA0A04FC94B}">
-                <ma14:wrappingTextBoxFlag xmlns="" xmlns:ma14="http://schemas.microsoft.com/office/mac/drawingml/2011/main" val="1"/>
+                <ma14:wrappingTextBoxFlag xmlns:ma14="http://schemas.microsoft.com/office/mac/drawingml/2011/main" xmlns="" val="1"/>
               </a:ext>
             </a:extLst>
           </p:spPr>
@@ -17189,7 +17191,7 @@
               <a:effectLst/>
               <a:extLst>
                 <a:ext uri="{C572A759-6A51-4108-AA02-DFA0A04FC94B}">
-                  <ma14:wrappingTextBoxFlag xmlns="" xmlns:ma14="http://schemas.microsoft.com/office/mac/drawingml/2011/main" val="1"/>
+                  <ma14:wrappingTextBoxFlag xmlns:ma14="http://schemas.microsoft.com/office/mac/drawingml/2011/main" xmlns="" val="1"/>
                 </a:ext>
               </a:extLst>
             </p:spPr>
@@ -17339,7 +17341,7 @@
             <a:effectLst/>
             <a:extLst>
               <a:ext uri="{C572A759-6A51-4108-AA02-DFA0A04FC94B}">
-                <ma14:wrappingTextBoxFlag xmlns:ma14="http://schemas.microsoft.com/office/mac/drawingml/2011/main" xmlns="" val="1"/>
+                <ma14:wrappingTextBoxFlag xmlns="" xmlns:ma14="http://schemas.microsoft.com/office/mac/drawingml/2011/main" val="1"/>
               </a:ext>
             </a:extLst>
           </p:spPr>
@@ -17499,7 +17501,7 @@
             <a:effectLst/>
             <a:extLst>
               <a:ext uri="{C572A759-6A51-4108-AA02-DFA0A04FC94B}">
-                <ma14:wrappingTextBoxFlag xmlns="" xmlns:ma14="http://schemas.microsoft.com/office/mac/drawingml/2011/main" val="1"/>
+                <ma14:wrappingTextBoxFlag xmlns:ma14="http://schemas.microsoft.com/office/mac/drawingml/2011/main" xmlns="" val="1"/>
               </a:ext>
             </a:extLst>
           </p:spPr>
@@ -17800,7 +17802,7 @@
               <a:effectLst/>
               <a:extLst>
                 <a:ext uri="{C572A759-6A51-4108-AA02-DFA0A04FC94B}">
-                  <ma14:wrappingTextBoxFlag xmlns="" xmlns:ma14="http://schemas.microsoft.com/office/mac/drawingml/2011/main" val="1"/>
+                  <ma14:wrappingTextBoxFlag xmlns:ma14="http://schemas.microsoft.com/office/mac/drawingml/2011/main" xmlns="" val="1"/>
                 </a:ext>
               </a:extLst>
             </p:spPr>
@@ -23754,6 +23756,1237 @@
 </p:sld>
 </file>
 
+<file path=ppt/slides/slide18.xml><?xml version="1.0" encoding="utf-8"?>
+<p:sld xmlns:a="http://schemas.openxmlformats.org/drawingml/2006/main" xmlns:r="http://schemas.openxmlformats.org/officeDocument/2006/relationships" xmlns:p="http://schemas.openxmlformats.org/presentationml/2006/main">
+  <p:cSld>
+    <p:spTree>
+      <p:nvGrpSpPr>
+        <p:cNvPr id="1" name=""/>
+        <p:cNvGrpSpPr/>
+        <p:nvPr/>
+      </p:nvGrpSpPr>
+      <p:grpSpPr>
+        <a:xfrm>
+          <a:off x="0" y="0"/>
+          <a:ext cx="0" cy="0"/>
+          <a:chOff x="0" y="0"/>
+          <a:chExt cx="0" cy="0"/>
+        </a:xfrm>
+      </p:grpSpPr>
+      <p:sp>
+        <p:nvSpPr>
+          <p:cNvPr id="2" name="Title 1">
+            <a:extLst>
+              <a:ext uri="{FF2B5EF4-FFF2-40B4-BE49-F238E27FC236}">
+                <a16:creationId xmlns:a16="http://schemas.microsoft.com/office/drawing/2014/main" id="{C1146E00-F36B-ED4E-8139-73C266E41712}"/>
+              </a:ext>
+            </a:extLst>
+          </p:cNvPr>
+          <p:cNvSpPr>
+            <a:spLocks noGrp="1"/>
+          </p:cNvSpPr>
+          <p:nvPr>
+            <p:ph type="title"/>
+          </p:nvPr>
+        </p:nvSpPr>
+        <p:spPr/>
+        <p:txBody>
+          <a:bodyPr/>
+          <a:lstStyle/>
+          <a:p>
+            <a:r>
+              <a:rPr lang="en-US" dirty="0"/>
+              <a:t>TLS</a:t>
+            </a:r>
+          </a:p>
+        </p:txBody>
+      </p:sp>
+      <p:sp>
+        <p:nvSpPr>
+          <p:cNvPr id="4" name="Slide Number Placeholder 3">
+            <a:extLst>
+              <a:ext uri="{FF2B5EF4-FFF2-40B4-BE49-F238E27FC236}">
+                <a16:creationId xmlns:a16="http://schemas.microsoft.com/office/drawing/2014/main" id="{AF2CAADE-728A-394D-8302-F78083E20EF6}"/>
+              </a:ext>
+            </a:extLst>
+          </p:cNvPr>
+          <p:cNvSpPr>
+            <a:spLocks noGrp="1"/>
+          </p:cNvSpPr>
+          <p:nvPr>
+            <p:ph type="sldNum" sz="quarter" idx="10"/>
+          </p:nvPr>
+        </p:nvSpPr>
+        <p:spPr/>
+        <p:txBody>
+          <a:bodyPr/>
+          <a:lstStyle/>
+          <a:p>
+            <a:pPr defTabSz="911231" eaLnBrk="1" fontAlgn="auto" hangingPunct="1">
+              <a:spcBef>
+                <a:spcPts val="0"/>
+              </a:spcBef>
+              <a:spcAft>
+                <a:spcPts val="0"/>
+              </a:spcAft>
+              <a:defRPr/>
+            </a:pPr>
+            <a:r>
+              <a:rPr lang="en-US" altLang="en-US">
+                <a:solidFill>
+                  <a:srgbClr val="FFFFFF"/>
+                </a:solidFill>
+                <a:latin typeface="Arial"/>
+                <a:ea typeface="ＭＳ Ｐゴシック" charset="0"/>
+                <a:cs typeface="Arial"/>
+                <a:sym typeface="Helvetica" charset="0"/>
+              </a:rPr>
+              <a:t>IBM Confidential – Page </a:t>
+            </a:r>
+            <a:fld id="{3AD35F64-7BFE-4AA6-B41F-771B1133FB22}" type="slidenum">
+              <a:rPr lang="en-US" altLang="en-US" smtClean="0">
+                <a:solidFill>
+                  <a:srgbClr val="FFFFFF"/>
+                </a:solidFill>
+                <a:latin typeface="Arial"/>
+                <a:ea typeface="ＭＳ Ｐゴシック" charset="0"/>
+                <a:cs typeface="Arial"/>
+                <a:sym typeface="Helvetica" charset="0"/>
+              </a:rPr>
+              <a:pPr defTabSz="911231" eaLnBrk="1" fontAlgn="auto" hangingPunct="1">
+                <a:spcBef>
+                  <a:spcPts val="0"/>
+                </a:spcBef>
+                <a:spcAft>
+                  <a:spcPts val="0"/>
+                </a:spcAft>
+                <a:defRPr/>
+              </a:pPr>
+              <a:t>18</a:t>
+            </a:fld>
+            <a:endParaRPr lang="en-US" altLang="en-US">
+              <a:solidFill>
+                <a:srgbClr val="FFFFFF"/>
+              </a:solidFill>
+              <a:latin typeface="Arial"/>
+              <a:ea typeface="ＭＳ Ｐゴシック" charset="0"/>
+              <a:cs typeface="Arial"/>
+              <a:sym typeface="Helvetica" charset="0"/>
+            </a:endParaRPr>
+          </a:p>
+        </p:txBody>
+      </p:sp>
+      <p:sp>
+        <p:nvSpPr>
+          <p:cNvPr id="5" name="Rounded Rectangle 4">
+            <a:extLst>
+              <a:ext uri="{FF2B5EF4-FFF2-40B4-BE49-F238E27FC236}">
+                <a16:creationId xmlns:a16="http://schemas.microsoft.com/office/drawing/2014/main" id="{824FDA8D-47D4-2840-8757-B6631F41C265}"/>
+              </a:ext>
+            </a:extLst>
+          </p:cNvPr>
+          <p:cNvSpPr/>
+          <p:nvPr/>
+        </p:nvSpPr>
+        <p:spPr>
+          <a:xfrm>
+            <a:off x="1326610" y="1637020"/>
+            <a:ext cx="914400" cy="3051355"/>
+          </a:xfrm>
+          <a:prstGeom prst="roundRect">
+            <a:avLst/>
+          </a:prstGeom>
+          <a:solidFill>
+            <a:schemeClr val="accent2"/>
+          </a:solidFill>
+          <a:effectLst>
+            <a:outerShdw blurRad="50800" dist="38100" dir="5400000" algn="t" rotWithShape="0">
+              <a:prstClr val="black">
+                <a:alpha val="40000"/>
+              </a:prstClr>
+            </a:outerShdw>
+          </a:effectLst>
+        </p:spPr>
+        <p:style>
+          <a:lnRef idx="2">
+            <a:schemeClr val="accent1">
+              <a:shade val="50000"/>
+            </a:schemeClr>
+          </a:lnRef>
+          <a:fillRef idx="1">
+            <a:schemeClr val="accent1"/>
+          </a:fillRef>
+          <a:effectRef idx="0">
+            <a:schemeClr val="accent1"/>
+          </a:effectRef>
+          <a:fontRef idx="minor">
+            <a:schemeClr val="lt1"/>
+          </a:fontRef>
+        </p:style>
+        <p:txBody>
+          <a:bodyPr rtlCol="0" anchor="ctr"/>
+          <a:lstStyle/>
+          <a:p>
+            <a:pPr algn="ctr"/>
+            <a:r>
+              <a:rPr lang="en-US" dirty="0"/>
+              <a:t>App</a:t>
+            </a:r>
+          </a:p>
+        </p:txBody>
+      </p:sp>
+      <p:sp>
+        <p:nvSpPr>
+          <p:cNvPr id="6" name="Rounded Rectangle 5">
+            <a:extLst>
+              <a:ext uri="{FF2B5EF4-FFF2-40B4-BE49-F238E27FC236}">
+                <a16:creationId xmlns:a16="http://schemas.microsoft.com/office/drawing/2014/main" id="{339DBD7A-B11A-3F4A-9D36-21D318F34F31}"/>
+              </a:ext>
+            </a:extLst>
+          </p:cNvPr>
+          <p:cNvSpPr/>
+          <p:nvPr/>
+        </p:nvSpPr>
+        <p:spPr>
+          <a:xfrm>
+            <a:off x="9178734" y="1637019"/>
+            <a:ext cx="1476895" cy="3051353"/>
+          </a:xfrm>
+          <a:prstGeom prst="roundRect">
+            <a:avLst/>
+          </a:prstGeom>
+          <a:solidFill>
+            <a:schemeClr val="accent2"/>
+          </a:solidFill>
+          <a:effectLst>
+            <a:outerShdw blurRad="50800" dist="38100" dir="5400000" algn="t" rotWithShape="0">
+              <a:prstClr val="black">
+                <a:alpha val="40000"/>
+              </a:prstClr>
+            </a:outerShdw>
+          </a:effectLst>
+        </p:spPr>
+        <p:style>
+          <a:lnRef idx="2">
+            <a:schemeClr val="accent1">
+              <a:shade val="50000"/>
+            </a:schemeClr>
+          </a:lnRef>
+          <a:fillRef idx="1">
+            <a:schemeClr val="accent1"/>
+          </a:fillRef>
+          <a:effectRef idx="0">
+            <a:schemeClr val="accent1"/>
+          </a:effectRef>
+          <a:fontRef idx="minor">
+            <a:schemeClr val="lt1"/>
+          </a:fontRef>
+        </p:style>
+        <p:txBody>
+          <a:bodyPr rtlCol="0" anchor="ctr"/>
+          <a:lstStyle/>
+          <a:p>
+            <a:pPr algn="ctr"/>
+            <a:r>
+              <a:rPr lang="en-US" dirty="0"/>
+              <a:t>Server</a:t>
+            </a:r>
+          </a:p>
+        </p:txBody>
+      </p:sp>
+      <p:cxnSp>
+        <p:nvCxnSpPr>
+          <p:cNvPr id="8" name="Straight Arrow Connector 7">
+            <a:extLst>
+              <a:ext uri="{FF2B5EF4-FFF2-40B4-BE49-F238E27FC236}">
+                <a16:creationId xmlns:a16="http://schemas.microsoft.com/office/drawing/2014/main" id="{8FB28C20-04E0-2E4E-81B6-688B2544AB74}"/>
+              </a:ext>
+            </a:extLst>
+          </p:cNvPr>
+          <p:cNvCxnSpPr>
+            <a:cxnSpLocks/>
+          </p:cNvCxnSpPr>
+          <p:nvPr/>
+        </p:nvCxnSpPr>
+        <p:spPr>
+          <a:xfrm>
+            <a:off x="2477193" y="2177941"/>
+            <a:ext cx="6084916" cy="0"/>
+          </a:xfrm>
+          <a:prstGeom prst="straightConnector1">
+            <a:avLst/>
+          </a:prstGeom>
+          <a:ln w="15875">
+            <a:solidFill>
+              <a:srgbClr val="9D381C"/>
+            </a:solidFill>
+            <a:tailEnd type="triangle"/>
+          </a:ln>
+        </p:spPr>
+        <p:style>
+          <a:lnRef idx="1">
+            <a:schemeClr val="accent1"/>
+          </a:lnRef>
+          <a:fillRef idx="0">
+            <a:schemeClr val="accent1"/>
+          </a:fillRef>
+          <a:effectRef idx="0">
+            <a:schemeClr val="accent1"/>
+          </a:effectRef>
+          <a:fontRef idx="minor">
+            <a:schemeClr val="tx1"/>
+          </a:fontRef>
+        </p:style>
+      </p:cxnSp>
+      <p:sp>
+        <p:nvSpPr>
+          <p:cNvPr id="9" name="TextBox 8">
+            <a:extLst>
+              <a:ext uri="{FF2B5EF4-FFF2-40B4-BE49-F238E27FC236}">
+                <a16:creationId xmlns:a16="http://schemas.microsoft.com/office/drawing/2014/main" id="{E93AA34A-1E8F-BF47-ACBB-FC1779E7848B}"/>
+              </a:ext>
+            </a:extLst>
+          </p:cNvPr>
+          <p:cNvSpPr txBox="1"/>
+          <p:nvPr/>
+        </p:nvSpPr>
+        <p:spPr>
+          <a:xfrm>
+            <a:off x="4015105" y="1858484"/>
+            <a:ext cx="2043893" cy="307777"/>
+          </a:xfrm>
+          <a:prstGeom prst="rect">
+            <a:avLst/>
+          </a:prstGeom>
+          <a:noFill/>
+        </p:spPr>
+        <p:txBody>
+          <a:bodyPr wrap="none" rtlCol="0">
+            <a:spAutoFit/>
+          </a:bodyPr>
+          <a:lstStyle/>
+          <a:p>
+            <a:pPr algn="ctr"/>
+            <a:r>
+              <a:rPr lang="en-US" sz="1400" dirty="0"/>
+              <a:t>https://server.dns.name</a:t>
+            </a:r>
+          </a:p>
+        </p:txBody>
+      </p:sp>
+      <p:cxnSp>
+        <p:nvCxnSpPr>
+          <p:cNvPr id="10" name="Straight Arrow Connector 9">
+            <a:extLst>
+              <a:ext uri="{FF2B5EF4-FFF2-40B4-BE49-F238E27FC236}">
+                <a16:creationId xmlns:a16="http://schemas.microsoft.com/office/drawing/2014/main" id="{BE004155-591A-6643-A079-872E28560657}"/>
+              </a:ext>
+            </a:extLst>
+          </p:cNvPr>
+          <p:cNvCxnSpPr>
+            <a:cxnSpLocks/>
+          </p:cNvCxnSpPr>
+          <p:nvPr/>
+        </p:nvCxnSpPr>
+        <p:spPr>
+          <a:xfrm>
+            <a:off x="2477193" y="3137410"/>
+            <a:ext cx="6084916" cy="0"/>
+          </a:xfrm>
+          <a:prstGeom prst="straightConnector1">
+            <a:avLst/>
+          </a:prstGeom>
+          <a:ln w="15875">
+            <a:solidFill>
+              <a:srgbClr val="9D381C"/>
+            </a:solidFill>
+            <a:headEnd type="triangle"/>
+            <a:tailEnd type="none"/>
+          </a:ln>
+        </p:spPr>
+        <p:style>
+          <a:lnRef idx="1">
+            <a:schemeClr val="accent1"/>
+          </a:lnRef>
+          <a:fillRef idx="0">
+            <a:schemeClr val="accent1"/>
+          </a:fillRef>
+          <a:effectRef idx="0">
+            <a:schemeClr val="accent1"/>
+          </a:effectRef>
+          <a:fontRef idx="minor">
+            <a:schemeClr val="tx1"/>
+          </a:fontRef>
+        </p:style>
+      </p:cxnSp>
+      <p:sp>
+        <p:nvSpPr>
+          <p:cNvPr id="11" name="TextBox 10">
+            <a:extLst>
+              <a:ext uri="{FF2B5EF4-FFF2-40B4-BE49-F238E27FC236}">
+                <a16:creationId xmlns:a16="http://schemas.microsoft.com/office/drawing/2014/main" id="{1E369665-764E-BC42-8F5D-03DDBC8837D0}"/>
+              </a:ext>
+            </a:extLst>
+          </p:cNvPr>
+          <p:cNvSpPr txBox="1"/>
+          <p:nvPr/>
+        </p:nvSpPr>
+        <p:spPr>
+          <a:xfrm>
+            <a:off x="3640675" y="2514012"/>
+            <a:ext cx="2792752" cy="523220"/>
+          </a:xfrm>
+          <a:prstGeom prst="rect">
+            <a:avLst/>
+          </a:prstGeom>
+          <a:noFill/>
+        </p:spPr>
+        <p:txBody>
+          <a:bodyPr wrap="none" rtlCol="0">
+            <a:spAutoFit/>
+          </a:bodyPr>
+          <a:lstStyle/>
+          <a:p>
+            <a:pPr algn="ctr"/>
+            <a:r>
+              <a:rPr lang="en-US" sz="1400" dirty="0"/>
+              <a:t>Server certificate with public key </a:t>
+            </a:r>
+          </a:p>
+          <a:p>
+            <a:pPr algn="ctr"/>
+            <a:r>
+              <a:rPr lang="en-US" sz="1400" dirty="0"/>
+              <a:t>signed by a Certificate Authority</a:t>
+            </a:r>
+          </a:p>
+        </p:txBody>
+      </p:sp>
+      <p:cxnSp>
+        <p:nvCxnSpPr>
+          <p:cNvPr id="16" name="Straight Arrow Connector 15">
+            <a:extLst>
+              <a:ext uri="{FF2B5EF4-FFF2-40B4-BE49-F238E27FC236}">
+                <a16:creationId xmlns:a16="http://schemas.microsoft.com/office/drawing/2014/main" id="{A8F22ADD-0C10-324A-B06F-0F0B90950B4F}"/>
+              </a:ext>
+            </a:extLst>
+          </p:cNvPr>
+          <p:cNvCxnSpPr>
+            <a:cxnSpLocks/>
+          </p:cNvCxnSpPr>
+          <p:nvPr/>
+        </p:nvCxnSpPr>
+        <p:spPr>
+          <a:xfrm>
+            <a:off x="2477193" y="3743504"/>
+            <a:ext cx="6084916" cy="0"/>
+          </a:xfrm>
+          <a:prstGeom prst="straightConnector1">
+            <a:avLst/>
+          </a:prstGeom>
+          <a:ln w="15875">
+            <a:solidFill>
+              <a:srgbClr val="9D381C"/>
+            </a:solidFill>
+            <a:tailEnd type="triangle"/>
+          </a:ln>
+        </p:spPr>
+        <p:style>
+          <a:lnRef idx="1">
+            <a:schemeClr val="accent1"/>
+          </a:lnRef>
+          <a:fillRef idx="0">
+            <a:schemeClr val="accent1"/>
+          </a:fillRef>
+          <a:effectRef idx="0">
+            <a:schemeClr val="accent1"/>
+          </a:effectRef>
+          <a:fontRef idx="minor">
+            <a:schemeClr val="tx1"/>
+          </a:fontRef>
+        </p:style>
+      </p:cxnSp>
+      <p:sp>
+        <p:nvSpPr>
+          <p:cNvPr id="19" name="TextBox 18">
+            <a:extLst>
+              <a:ext uri="{FF2B5EF4-FFF2-40B4-BE49-F238E27FC236}">
+                <a16:creationId xmlns:a16="http://schemas.microsoft.com/office/drawing/2014/main" id="{906CD1C4-D2CF-0245-84ED-6A25E9765647}"/>
+              </a:ext>
+            </a:extLst>
+          </p:cNvPr>
+          <p:cNvSpPr txBox="1"/>
+          <p:nvPr/>
+        </p:nvSpPr>
+        <p:spPr>
+          <a:xfrm>
+            <a:off x="3372974" y="3456080"/>
+            <a:ext cx="3328155" cy="523220"/>
+          </a:xfrm>
+          <a:prstGeom prst="rect">
+            <a:avLst/>
+          </a:prstGeom>
+          <a:noFill/>
+        </p:spPr>
+        <p:txBody>
+          <a:bodyPr wrap="none" rtlCol="0">
+            <a:spAutoFit/>
+          </a:bodyPr>
+          <a:lstStyle/>
+          <a:p>
+            <a:pPr algn="ctr"/>
+            <a:r>
+              <a:rPr lang="en-US" sz="1400" dirty="0"/>
+              <a:t>App trusts server and sends secret key </a:t>
+            </a:r>
+          </a:p>
+          <a:p>
+            <a:pPr algn="ctr"/>
+            <a:r>
+              <a:rPr lang="en-US" sz="1400" dirty="0"/>
+              <a:t>encrypted with server public key</a:t>
+            </a:r>
+          </a:p>
+        </p:txBody>
+      </p:sp>
+      <p:cxnSp>
+        <p:nvCxnSpPr>
+          <p:cNvPr id="20" name="Straight Arrow Connector 19">
+            <a:extLst>
+              <a:ext uri="{FF2B5EF4-FFF2-40B4-BE49-F238E27FC236}">
+                <a16:creationId xmlns:a16="http://schemas.microsoft.com/office/drawing/2014/main" id="{6FD114FC-CD5E-EF4B-AC48-106AE86D200D}"/>
+              </a:ext>
+            </a:extLst>
+          </p:cNvPr>
+          <p:cNvCxnSpPr>
+            <a:cxnSpLocks/>
+          </p:cNvCxnSpPr>
+          <p:nvPr/>
+        </p:nvCxnSpPr>
+        <p:spPr>
+          <a:xfrm>
+            <a:off x="2477193" y="4688372"/>
+            <a:ext cx="6084916" cy="0"/>
+          </a:xfrm>
+          <a:prstGeom prst="straightConnector1">
+            <a:avLst/>
+          </a:prstGeom>
+          <a:ln w="15875">
+            <a:solidFill>
+              <a:srgbClr val="9D381C"/>
+            </a:solidFill>
+            <a:headEnd type="triangle"/>
+            <a:tailEnd type="triangle"/>
+          </a:ln>
+        </p:spPr>
+        <p:style>
+          <a:lnRef idx="1">
+            <a:schemeClr val="accent1"/>
+          </a:lnRef>
+          <a:fillRef idx="0">
+            <a:schemeClr val="accent1"/>
+          </a:fillRef>
+          <a:effectRef idx="0">
+            <a:schemeClr val="accent1"/>
+          </a:effectRef>
+          <a:fontRef idx="minor">
+            <a:schemeClr val="tx1"/>
+          </a:fontRef>
+        </p:style>
+      </p:cxnSp>
+      <p:sp>
+        <p:nvSpPr>
+          <p:cNvPr id="21" name="TextBox 20">
+            <a:extLst>
+              <a:ext uri="{FF2B5EF4-FFF2-40B4-BE49-F238E27FC236}">
+                <a16:creationId xmlns:a16="http://schemas.microsoft.com/office/drawing/2014/main" id="{0DC02887-7DC5-A940-B343-32083F5C4573}"/>
+              </a:ext>
+            </a:extLst>
+          </p:cNvPr>
+          <p:cNvSpPr txBox="1"/>
+          <p:nvPr/>
+        </p:nvSpPr>
+        <p:spPr>
+          <a:xfrm>
+            <a:off x="2795988" y="4343327"/>
+            <a:ext cx="5447325" cy="738664"/>
+          </a:xfrm>
+          <a:prstGeom prst="rect">
+            <a:avLst/>
+          </a:prstGeom>
+          <a:noFill/>
+        </p:spPr>
+        <p:txBody>
+          <a:bodyPr wrap="none" rtlCol="0">
+            <a:spAutoFit/>
+          </a:bodyPr>
+          <a:lstStyle/>
+          <a:p>
+            <a:pPr algn="ctr"/>
+            <a:r>
+              <a:rPr lang="en-US" sz="1400" dirty="0"/>
+              <a:t>The two machines are the only ones who know the new secret key</a:t>
+            </a:r>
+          </a:p>
+          <a:p>
+            <a:pPr algn="ctr"/>
+            <a:endParaRPr lang="en-US" sz="1400" dirty="0"/>
+          </a:p>
+          <a:p>
+            <a:pPr algn="ctr"/>
+            <a:r>
+              <a:rPr lang="en-US" sz="1400" dirty="0"/>
+              <a:t>All communication is encrypted with this key</a:t>
+            </a:r>
+          </a:p>
+        </p:txBody>
+      </p:sp>
+    </p:spTree>
+    <p:extLst>
+      <p:ext uri="{BB962C8B-B14F-4D97-AF65-F5344CB8AC3E}">
+        <p14:creationId xmlns:p14="http://schemas.microsoft.com/office/powerpoint/2010/main" val="467888498"/>
+      </p:ext>
+    </p:extLst>
+  </p:cSld>
+  <p:clrMapOvr>
+    <a:masterClrMapping/>
+  </p:clrMapOvr>
+</p:sld>
+</file>
+
+<file path=ppt/slides/slide19.xml><?xml version="1.0" encoding="utf-8"?>
+<p:sld xmlns:a="http://schemas.openxmlformats.org/drawingml/2006/main" xmlns:r="http://schemas.openxmlformats.org/officeDocument/2006/relationships" xmlns:p="http://schemas.openxmlformats.org/presentationml/2006/main">
+  <p:cSld>
+    <p:spTree>
+      <p:nvGrpSpPr>
+        <p:cNvPr id="1" name=""/>
+        <p:cNvGrpSpPr/>
+        <p:nvPr/>
+      </p:nvGrpSpPr>
+      <p:grpSpPr>
+        <a:xfrm>
+          <a:off x="0" y="0"/>
+          <a:ext cx="0" cy="0"/>
+          <a:chOff x="0" y="0"/>
+          <a:chExt cx="0" cy="0"/>
+        </a:xfrm>
+      </p:grpSpPr>
+      <p:sp>
+        <p:nvSpPr>
+          <p:cNvPr id="2" name="Title 1">
+            <a:extLst>
+              <a:ext uri="{FF2B5EF4-FFF2-40B4-BE49-F238E27FC236}">
+                <a16:creationId xmlns:a16="http://schemas.microsoft.com/office/drawing/2014/main" id="{C1146E00-F36B-ED4E-8139-73C266E41712}"/>
+              </a:ext>
+            </a:extLst>
+          </p:cNvPr>
+          <p:cNvSpPr>
+            <a:spLocks noGrp="1"/>
+          </p:cNvSpPr>
+          <p:nvPr>
+            <p:ph type="title"/>
+          </p:nvPr>
+        </p:nvSpPr>
+        <p:spPr/>
+        <p:txBody>
+          <a:bodyPr/>
+          <a:lstStyle/>
+          <a:p>
+            <a:r>
+              <a:rPr lang="en-US" dirty="0"/>
+              <a:t>TLS: Certificate Signing Request</a:t>
+            </a:r>
+          </a:p>
+        </p:txBody>
+      </p:sp>
+      <p:sp>
+        <p:nvSpPr>
+          <p:cNvPr id="4" name="Slide Number Placeholder 3">
+            <a:extLst>
+              <a:ext uri="{FF2B5EF4-FFF2-40B4-BE49-F238E27FC236}">
+                <a16:creationId xmlns:a16="http://schemas.microsoft.com/office/drawing/2014/main" id="{AF2CAADE-728A-394D-8302-F78083E20EF6}"/>
+              </a:ext>
+            </a:extLst>
+          </p:cNvPr>
+          <p:cNvSpPr>
+            <a:spLocks noGrp="1"/>
+          </p:cNvSpPr>
+          <p:nvPr>
+            <p:ph type="sldNum" sz="quarter" idx="10"/>
+          </p:nvPr>
+        </p:nvSpPr>
+        <p:spPr/>
+        <p:txBody>
+          <a:bodyPr/>
+          <a:lstStyle/>
+          <a:p>
+            <a:pPr defTabSz="911231" eaLnBrk="1" fontAlgn="auto" hangingPunct="1">
+              <a:spcBef>
+                <a:spcPts val="0"/>
+              </a:spcBef>
+              <a:spcAft>
+                <a:spcPts val="0"/>
+              </a:spcAft>
+              <a:defRPr/>
+            </a:pPr>
+            <a:r>
+              <a:rPr lang="en-US" altLang="en-US">
+                <a:solidFill>
+                  <a:srgbClr val="FFFFFF"/>
+                </a:solidFill>
+                <a:latin typeface="Arial"/>
+                <a:ea typeface="ＭＳ Ｐゴシック" charset="0"/>
+                <a:cs typeface="Arial"/>
+                <a:sym typeface="Helvetica" charset="0"/>
+              </a:rPr>
+              <a:t>IBM Confidential – Page </a:t>
+            </a:r>
+            <a:fld id="{3AD35F64-7BFE-4AA6-B41F-771B1133FB22}" type="slidenum">
+              <a:rPr lang="en-US" altLang="en-US" smtClean="0">
+                <a:solidFill>
+                  <a:srgbClr val="FFFFFF"/>
+                </a:solidFill>
+                <a:latin typeface="Arial"/>
+                <a:ea typeface="ＭＳ Ｐゴシック" charset="0"/>
+                <a:cs typeface="Arial"/>
+                <a:sym typeface="Helvetica" charset="0"/>
+              </a:rPr>
+              <a:pPr defTabSz="911231" eaLnBrk="1" fontAlgn="auto" hangingPunct="1">
+                <a:spcBef>
+                  <a:spcPts val="0"/>
+                </a:spcBef>
+                <a:spcAft>
+                  <a:spcPts val="0"/>
+                </a:spcAft>
+                <a:defRPr/>
+              </a:pPr>
+              <a:t>19</a:t>
+            </a:fld>
+            <a:endParaRPr lang="en-US" altLang="en-US">
+              <a:solidFill>
+                <a:srgbClr val="FFFFFF"/>
+              </a:solidFill>
+              <a:latin typeface="Arial"/>
+              <a:ea typeface="ＭＳ Ｐゴシック" charset="0"/>
+              <a:cs typeface="Arial"/>
+              <a:sym typeface="Helvetica" charset="0"/>
+            </a:endParaRPr>
+          </a:p>
+        </p:txBody>
+      </p:sp>
+      <p:sp>
+        <p:nvSpPr>
+          <p:cNvPr id="5" name="Rounded Rectangle 4">
+            <a:extLst>
+              <a:ext uri="{FF2B5EF4-FFF2-40B4-BE49-F238E27FC236}">
+                <a16:creationId xmlns:a16="http://schemas.microsoft.com/office/drawing/2014/main" id="{824FDA8D-47D4-2840-8757-B6631F41C265}"/>
+              </a:ext>
+            </a:extLst>
+          </p:cNvPr>
+          <p:cNvSpPr/>
+          <p:nvPr/>
+        </p:nvSpPr>
+        <p:spPr>
+          <a:xfrm>
+            <a:off x="895368" y="1637020"/>
+            <a:ext cx="1345642" cy="3051355"/>
+          </a:xfrm>
+          <a:prstGeom prst="roundRect">
+            <a:avLst/>
+          </a:prstGeom>
+          <a:solidFill>
+            <a:schemeClr val="accent2"/>
+          </a:solidFill>
+          <a:effectLst>
+            <a:outerShdw blurRad="50800" dist="38100" dir="5400000" algn="t" rotWithShape="0">
+              <a:prstClr val="black">
+                <a:alpha val="40000"/>
+              </a:prstClr>
+            </a:outerShdw>
+          </a:effectLst>
+        </p:spPr>
+        <p:style>
+          <a:lnRef idx="2">
+            <a:schemeClr val="accent1">
+              <a:shade val="50000"/>
+            </a:schemeClr>
+          </a:lnRef>
+          <a:fillRef idx="1">
+            <a:schemeClr val="accent1"/>
+          </a:fillRef>
+          <a:effectRef idx="0">
+            <a:schemeClr val="accent1"/>
+          </a:effectRef>
+          <a:fontRef idx="minor">
+            <a:schemeClr val="lt1"/>
+          </a:fontRef>
+        </p:style>
+        <p:txBody>
+          <a:bodyPr rtlCol="0" anchor="ctr"/>
+          <a:lstStyle/>
+          <a:p>
+            <a:pPr algn="ctr"/>
+            <a:r>
+              <a:rPr lang="en-US" dirty="0"/>
+              <a:t>Server</a:t>
+            </a:r>
+          </a:p>
+        </p:txBody>
+      </p:sp>
+      <p:sp>
+        <p:nvSpPr>
+          <p:cNvPr id="6" name="Rounded Rectangle 5">
+            <a:extLst>
+              <a:ext uri="{FF2B5EF4-FFF2-40B4-BE49-F238E27FC236}">
+                <a16:creationId xmlns:a16="http://schemas.microsoft.com/office/drawing/2014/main" id="{339DBD7A-B11A-3F4A-9D36-21D318F34F31}"/>
+              </a:ext>
+            </a:extLst>
+          </p:cNvPr>
+          <p:cNvSpPr/>
+          <p:nvPr/>
+        </p:nvSpPr>
+        <p:spPr>
+          <a:xfrm>
+            <a:off x="9178734" y="1637019"/>
+            <a:ext cx="1476895" cy="3051353"/>
+          </a:xfrm>
+          <a:prstGeom prst="roundRect">
+            <a:avLst/>
+          </a:prstGeom>
+          <a:solidFill>
+            <a:schemeClr val="accent2"/>
+          </a:solidFill>
+          <a:effectLst>
+            <a:outerShdw blurRad="50800" dist="38100" dir="5400000" algn="t" rotWithShape="0">
+              <a:prstClr val="black">
+                <a:alpha val="40000"/>
+              </a:prstClr>
+            </a:outerShdw>
+          </a:effectLst>
+        </p:spPr>
+        <p:style>
+          <a:lnRef idx="2">
+            <a:schemeClr val="accent1">
+              <a:shade val="50000"/>
+            </a:schemeClr>
+          </a:lnRef>
+          <a:fillRef idx="1">
+            <a:schemeClr val="accent1"/>
+          </a:fillRef>
+          <a:effectRef idx="0">
+            <a:schemeClr val="accent1"/>
+          </a:effectRef>
+          <a:fontRef idx="minor">
+            <a:schemeClr val="lt1"/>
+          </a:fontRef>
+        </p:style>
+        <p:txBody>
+          <a:bodyPr rtlCol="0" anchor="ctr"/>
+          <a:lstStyle/>
+          <a:p>
+            <a:pPr algn="ctr"/>
+            <a:r>
+              <a:rPr lang="en-US" dirty="0"/>
+              <a:t>Certificate Authority</a:t>
+            </a:r>
+          </a:p>
+        </p:txBody>
+      </p:sp>
+      <p:cxnSp>
+        <p:nvCxnSpPr>
+          <p:cNvPr id="8" name="Straight Arrow Connector 7">
+            <a:extLst>
+              <a:ext uri="{FF2B5EF4-FFF2-40B4-BE49-F238E27FC236}">
+                <a16:creationId xmlns:a16="http://schemas.microsoft.com/office/drawing/2014/main" id="{8FB28C20-04E0-2E4E-81B6-688B2544AB74}"/>
+              </a:ext>
+            </a:extLst>
+          </p:cNvPr>
+          <p:cNvCxnSpPr>
+            <a:cxnSpLocks/>
+          </p:cNvCxnSpPr>
+          <p:nvPr/>
+        </p:nvCxnSpPr>
+        <p:spPr>
+          <a:xfrm>
+            <a:off x="2477193" y="2177941"/>
+            <a:ext cx="6084916" cy="0"/>
+          </a:xfrm>
+          <a:prstGeom prst="straightConnector1">
+            <a:avLst/>
+          </a:prstGeom>
+          <a:ln w="15875">
+            <a:solidFill>
+              <a:srgbClr val="9D381C"/>
+            </a:solidFill>
+            <a:tailEnd type="triangle"/>
+          </a:ln>
+        </p:spPr>
+        <p:style>
+          <a:lnRef idx="1">
+            <a:schemeClr val="accent1"/>
+          </a:lnRef>
+          <a:fillRef idx="0">
+            <a:schemeClr val="accent1"/>
+          </a:fillRef>
+          <a:effectRef idx="0">
+            <a:schemeClr val="accent1"/>
+          </a:effectRef>
+          <a:fontRef idx="minor">
+            <a:schemeClr val="tx1"/>
+          </a:fontRef>
+        </p:style>
+      </p:cxnSp>
+      <p:sp>
+        <p:nvSpPr>
+          <p:cNvPr id="9" name="TextBox 8">
+            <a:extLst>
+              <a:ext uri="{FF2B5EF4-FFF2-40B4-BE49-F238E27FC236}">
+                <a16:creationId xmlns:a16="http://schemas.microsoft.com/office/drawing/2014/main" id="{E93AA34A-1E8F-BF47-ACBB-FC1779E7848B}"/>
+              </a:ext>
+            </a:extLst>
+          </p:cNvPr>
+          <p:cNvSpPr txBox="1"/>
+          <p:nvPr/>
+        </p:nvSpPr>
+        <p:spPr>
+          <a:xfrm>
+            <a:off x="2695716" y="1858484"/>
+            <a:ext cx="4682693" cy="307777"/>
+          </a:xfrm>
+          <a:prstGeom prst="rect">
+            <a:avLst/>
+          </a:prstGeom>
+          <a:noFill/>
+        </p:spPr>
+        <p:txBody>
+          <a:bodyPr wrap="none" rtlCol="0">
+            <a:spAutoFit/>
+          </a:bodyPr>
+          <a:lstStyle/>
+          <a:p>
+            <a:pPr algn="ctr"/>
+            <a:r>
+              <a:rPr lang="en-US" sz="1400" dirty="0"/>
+              <a:t>Create a Certificate Signing Request with server key pair</a:t>
+            </a:r>
+          </a:p>
+        </p:txBody>
+      </p:sp>
+      <p:cxnSp>
+        <p:nvCxnSpPr>
+          <p:cNvPr id="10" name="Straight Arrow Connector 9">
+            <a:extLst>
+              <a:ext uri="{FF2B5EF4-FFF2-40B4-BE49-F238E27FC236}">
+                <a16:creationId xmlns:a16="http://schemas.microsoft.com/office/drawing/2014/main" id="{BE004155-591A-6643-A079-872E28560657}"/>
+              </a:ext>
+            </a:extLst>
+          </p:cNvPr>
+          <p:cNvCxnSpPr>
+            <a:cxnSpLocks/>
+          </p:cNvCxnSpPr>
+          <p:nvPr/>
+        </p:nvCxnSpPr>
+        <p:spPr>
+          <a:xfrm>
+            <a:off x="2477193" y="3137410"/>
+            <a:ext cx="6084916" cy="0"/>
+          </a:xfrm>
+          <a:prstGeom prst="straightConnector1">
+            <a:avLst/>
+          </a:prstGeom>
+          <a:ln w="15875">
+            <a:solidFill>
+              <a:srgbClr val="9D381C"/>
+            </a:solidFill>
+            <a:headEnd type="triangle"/>
+            <a:tailEnd type="none"/>
+          </a:ln>
+        </p:spPr>
+        <p:style>
+          <a:lnRef idx="1">
+            <a:schemeClr val="accent1"/>
+          </a:lnRef>
+          <a:fillRef idx="0">
+            <a:schemeClr val="accent1"/>
+          </a:fillRef>
+          <a:effectRef idx="0">
+            <a:schemeClr val="accent1"/>
+          </a:effectRef>
+          <a:fontRef idx="minor">
+            <a:schemeClr val="tx1"/>
+          </a:fontRef>
+        </p:style>
+      </p:cxnSp>
+      <p:sp>
+        <p:nvSpPr>
+          <p:cNvPr id="11" name="TextBox 10">
+            <a:extLst>
+              <a:ext uri="{FF2B5EF4-FFF2-40B4-BE49-F238E27FC236}">
+                <a16:creationId xmlns:a16="http://schemas.microsoft.com/office/drawing/2014/main" id="{1E369665-764E-BC42-8F5D-03DDBC8837D0}"/>
+              </a:ext>
+            </a:extLst>
+          </p:cNvPr>
+          <p:cNvSpPr txBox="1"/>
+          <p:nvPr/>
+        </p:nvSpPr>
+        <p:spPr>
+          <a:xfrm>
+            <a:off x="2600476" y="2514012"/>
+            <a:ext cx="4873194" cy="523220"/>
+          </a:xfrm>
+          <a:prstGeom prst="rect">
+            <a:avLst/>
+          </a:prstGeom>
+          <a:noFill/>
+        </p:spPr>
+        <p:txBody>
+          <a:bodyPr wrap="none" rtlCol="0">
+            <a:spAutoFit/>
+          </a:bodyPr>
+          <a:lstStyle/>
+          <a:p>
+            <a:pPr algn="ctr"/>
+            <a:r>
+              <a:rPr lang="en-US" sz="1400" dirty="0"/>
+              <a:t>Signed request by CA private key, </a:t>
+            </a:r>
+          </a:p>
+          <a:p>
+            <a:pPr algn="ctr"/>
+            <a:r>
+              <a:rPr lang="en-US" sz="1400" dirty="0"/>
+              <a:t>anyone who has CA public key can verify it is signed by me</a:t>
+            </a:r>
+          </a:p>
+        </p:txBody>
+      </p:sp>
+      <p:pic>
+        <p:nvPicPr>
+          <p:cNvPr id="3" name="Picture 2">
+            <a:extLst>
+              <a:ext uri="{FF2B5EF4-FFF2-40B4-BE49-F238E27FC236}">
+                <a16:creationId xmlns:a16="http://schemas.microsoft.com/office/drawing/2014/main" id="{69278E5A-1ADD-C04A-A438-BC63AC2F0A44}"/>
+              </a:ext>
+            </a:extLst>
+          </p:cNvPr>
+          <p:cNvPicPr>
+            <a:picLocks noChangeAspect="1"/>
+          </p:cNvPicPr>
+          <p:nvPr/>
+        </p:nvPicPr>
+        <p:blipFill>
+          <a:blip r:embed="rId2"/>
+          <a:stretch>
+            <a:fillRect/>
+          </a:stretch>
+        </p:blipFill>
+        <p:spPr>
+          <a:xfrm>
+            <a:off x="609644" y="4896427"/>
+            <a:ext cx="1727200" cy="889000"/>
+          </a:xfrm>
+          <a:prstGeom prst="rect">
+            <a:avLst/>
+          </a:prstGeom>
+        </p:spPr>
+      </p:pic>
+      <p:pic>
+        <p:nvPicPr>
+          <p:cNvPr id="7" name="Picture 6">
+            <a:extLst>
+              <a:ext uri="{FF2B5EF4-FFF2-40B4-BE49-F238E27FC236}">
+                <a16:creationId xmlns:a16="http://schemas.microsoft.com/office/drawing/2014/main" id="{2432C1A6-1F58-8B4C-AC39-BEC929D35642}"/>
+              </a:ext>
+            </a:extLst>
+          </p:cNvPr>
+          <p:cNvPicPr>
+            <a:picLocks noChangeAspect="1"/>
+          </p:cNvPicPr>
+          <p:nvPr/>
+        </p:nvPicPr>
+        <p:blipFill>
+          <a:blip r:embed="rId2"/>
+          <a:stretch>
+            <a:fillRect/>
+          </a:stretch>
+        </p:blipFill>
+        <p:spPr>
+          <a:xfrm>
+            <a:off x="9178734" y="4889468"/>
+            <a:ext cx="1727200" cy="889000"/>
+          </a:xfrm>
+          <a:prstGeom prst="rect">
+            <a:avLst/>
+          </a:prstGeom>
+        </p:spPr>
+      </p:pic>
+      <p:sp>
+        <p:nvSpPr>
+          <p:cNvPr id="17" name="Rounded Rectangle 16">
+            <a:extLst>
+              <a:ext uri="{FF2B5EF4-FFF2-40B4-BE49-F238E27FC236}">
+                <a16:creationId xmlns:a16="http://schemas.microsoft.com/office/drawing/2014/main" id="{EA32F050-AC7A-8D4F-AC77-001764561A25}"/>
+              </a:ext>
+            </a:extLst>
+          </p:cNvPr>
+          <p:cNvSpPr/>
+          <p:nvPr/>
+        </p:nvSpPr>
+        <p:spPr>
+          <a:xfrm>
+            <a:off x="4405745" y="5333968"/>
+            <a:ext cx="1957446" cy="768440"/>
+          </a:xfrm>
+          <a:prstGeom prst="roundRect">
+            <a:avLst/>
+          </a:prstGeom>
+          <a:solidFill>
+            <a:schemeClr val="accent2"/>
+          </a:solidFill>
+          <a:effectLst>
+            <a:outerShdw blurRad="50800" dist="38100" dir="5400000" algn="t" rotWithShape="0">
+              <a:prstClr val="black">
+                <a:alpha val="40000"/>
+              </a:prstClr>
+            </a:outerShdw>
+          </a:effectLst>
+        </p:spPr>
+        <p:style>
+          <a:lnRef idx="2">
+            <a:schemeClr val="accent1">
+              <a:shade val="50000"/>
+            </a:schemeClr>
+          </a:lnRef>
+          <a:fillRef idx="1">
+            <a:schemeClr val="accent1"/>
+          </a:fillRef>
+          <a:effectRef idx="0">
+            <a:schemeClr val="accent1"/>
+          </a:effectRef>
+          <a:fontRef idx="minor">
+            <a:schemeClr val="lt1"/>
+          </a:fontRef>
+        </p:style>
+        <p:txBody>
+          <a:bodyPr rtlCol="0" anchor="ctr"/>
+          <a:lstStyle/>
+          <a:p>
+            <a:pPr algn="ctr"/>
+            <a:r>
+              <a:rPr lang="en-US" dirty="0"/>
+              <a:t>App</a:t>
+            </a:r>
+          </a:p>
+        </p:txBody>
+      </p:sp>
+      <p:cxnSp>
+        <p:nvCxnSpPr>
+          <p:cNvPr id="13" name="Elbow Connector 12">
+            <a:extLst>
+              <a:ext uri="{FF2B5EF4-FFF2-40B4-BE49-F238E27FC236}">
+                <a16:creationId xmlns:a16="http://schemas.microsoft.com/office/drawing/2014/main" id="{44C5645A-52A6-454D-9F51-147E3D209BA9}"/>
+              </a:ext>
+            </a:extLst>
+          </p:cNvPr>
+          <p:cNvCxnSpPr>
+            <a:cxnSpLocks/>
+            <a:stCxn id="7" idx="3"/>
+            <a:endCxn id="17" idx="3"/>
+          </p:cNvCxnSpPr>
+          <p:nvPr/>
+        </p:nvCxnSpPr>
+        <p:spPr>
+          <a:xfrm flipH="1">
+            <a:off x="6363191" y="5333968"/>
+            <a:ext cx="4542743" cy="384220"/>
+          </a:xfrm>
+          <a:prstGeom prst="bentConnector5">
+            <a:avLst>
+              <a:gd name="adj1" fmla="val -5032"/>
+              <a:gd name="adj2" fmla="val 175186"/>
+              <a:gd name="adj3" fmla="val 69011"/>
+            </a:avLst>
+          </a:prstGeom>
+          <a:ln w="22225">
+            <a:solidFill>
+              <a:srgbClr val="9D381C"/>
+            </a:solidFill>
+            <a:tailEnd type="triangle"/>
+          </a:ln>
+        </p:spPr>
+        <p:style>
+          <a:lnRef idx="1">
+            <a:schemeClr val="accent1"/>
+          </a:lnRef>
+          <a:fillRef idx="0">
+            <a:schemeClr val="accent1"/>
+          </a:fillRef>
+          <a:effectRef idx="0">
+            <a:schemeClr val="accent1"/>
+          </a:effectRef>
+          <a:fontRef idx="minor">
+            <a:schemeClr val="tx1"/>
+          </a:fontRef>
+        </p:style>
+      </p:cxnSp>
+      <p:cxnSp>
+        <p:nvCxnSpPr>
+          <p:cNvPr id="23" name="Elbow Connector 22">
+            <a:extLst>
+              <a:ext uri="{FF2B5EF4-FFF2-40B4-BE49-F238E27FC236}">
+                <a16:creationId xmlns:a16="http://schemas.microsoft.com/office/drawing/2014/main" id="{FA2B403A-623E-9A4F-89B1-A3EFF2A097DD}"/>
+              </a:ext>
+            </a:extLst>
+          </p:cNvPr>
+          <p:cNvCxnSpPr>
+            <a:cxnSpLocks/>
+            <a:stCxn id="17" idx="0"/>
+          </p:cNvCxnSpPr>
+          <p:nvPr/>
+        </p:nvCxnSpPr>
+        <p:spPr>
+          <a:xfrm rot="16200000" flipV="1">
+            <a:off x="3344809" y="3294309"/>
+            <a:ext cx="1390568" cy="2688750"/>
+          </a:xfrm>
+          <a:prstGeom prst="bentConnector2">
+            <a:avLst/>
+          </a:prstGeom>
+          <a:ln w="22225">
+            <a:solidFill>
+              <a:srgbClr val="9D381C"/>
+            </a:solidFill>
+            <a:tailEnd type="triangle"/>
+          </a:ln>
+        </p:spPr>
+        <p:style>
+          <a:lnRef idx="1">
+            <a:schemeClr val="accent1"/>
+          </a:lnRef>
+          <a:fillRef idx="0">
+            <a:schemeClr val="accent1"/>
+          </a:fillRef>
+          <a:effectRef idx="0">
+            <a:schemeClr val="accent1"/>
+          </a:effectRef>
+          <a:fontRef idx="minor">
+            <a:schemeClr val="tx1"/>
+          </a:fontRef>
+        </p:style>
+      </p:cxnSp>
+    </p:spTree>
+    <p:extLst>
+      <p:ext uri="{BB962C8B-B14F-4D97-AF65-F5344CB8AC3E}">
+        <p14:creationId xmlns:p14="http://schemas.microsoft.com/office/powerpoint/2010/main" val="1292618329"/>
+      </p:ext>
+    </p:extLst>
+  </p:cSld>
+  <p:clrMapOvr>
+    <a:masterClrMapping/>
+  </p:clrMapOvr>
+</p:sld>
+</file>
+
 <file path=ppt/slides/slide2.xml><?xml version="1.0" encoding="utf-8"?>
 <p:sld xmlns:a="http://schemas.openxmlformats.org/drawingml/2006/main" xmlns:r="http://schemas.openxmlformats.org/officeDocument/2006/relationships" xmlns:p="http://schemas.openxmlformats.org/presentationml/2006/main">
   <p:cSld>
@@ -23849,7 +25082,7 @@
             <a:effectLst/>
             <a:extLst>
               <a:ext uri="{C572A759-6A51-4108-AA02-DFA0A04FC94B}">
-                <ma14:wrappingTextBoxFlag xmlns="" xmlns:ma14="http://schemas.microsoft.com/office/mac/drawingml/2011/main" val="1"/>
+                <ma14:wrappingTextBoxFlag xmlns:ma14="http://schemas.microsoft.com/office/mac/drawingml/2011/main" xmlns="" val="1"/>
               </a:ext>
             </a:extLst>
           </p:spPr>
@@ -23965,7 +25198,7 @@
             <a:effectLst/>
             <a:extLst>
               <a:ext uri="{C572A759-6A51-4108-AA02-DFA0A04FC94B}">
-                <ma14:wrappingTextBoxFlag xmlns="" xmlns:ma14="http://schemas.microsoft.com/office/mac/drawingml/2011/main" val="1"/>
+                <ma14:wrappingTextBoxFlag xmlns:ma14="http://schemas.microsoft.com/office/mac/drawingml/2011/main" xmlns="" val="1"/>
               </a:ext>
             </a:extLst>
           </p:spPr>
@@ -24435,7 +25668,7 @@
             <a:effectLst/>
             <a:extLst>
               <a:ext uri="{C572A759-6A51-4108-AA02-DFA0A04FC94B}">
-                <ma14:wrappingTextBoxFlag xmlns="" xmlns:ma14="http://schemas.microsoft.com/office/mac/drawingml/2011/main" val="1"/>
+                <ma14:wrappingTextBoxFlag xmlns:ma14="http://schemas.microsoft.com/office/mac/drawingml/2011/main" xmlns="" val="1"/>
               </a:ext>
             </a:extLst>
           </p:spPr>
@@ -24745,7 +25978,7 @@
             <a:effectLst/>
             <a:extLst>
               <a:ext uri="{C572A759-6A51-4108-AA02-DFA0A04FC94B}">
-                <ma14:wrappingTextBoxFlag xmlns="" xmlns:ma14="http://schemas.microsoft.com/office/mac/drawingml/2011/main" val="1"/>
+                <ma14:wrappingTextBoxFlag xmlns:ma14="http://schemas.microsoft.com/office/mac/drawingml/2011/main" xmlns="" val="1"/>
               </a:ext>
             </a:extLst>
           </p:spPr>
@@ -24979,7 +26212,7 @@
             <a:effectLst/>
             <a:extLst>
               <a:ext uri="{C572A759-6A51-4108-AA02-DFA0A04FC94B}">
-                <ma14:wrappingTextBoxFlag xmlns="" xmlns:ma14="http://schemas.microsoft.com/office/mac/drawingml/2011/main" val="1"/>
+                <ma14:wrappingTextBoxFlag xmlns:ma14="http://schemas.microsoft.com/office/mac/drawingml/2011/main" xmlns="" val="1"/>
               </a:ext>
             </a:extLst>
           </p:spPr>
@@ -25112,7 +26345,7 @@
             <a:effectLst/>
             <a:extLst>
               <a:ext uri="{C572A759-6A51-4108-AA02-DFA0A04FC94B}">
-                <ma14:wrappingTextBoxFlag xmlns="" xmlns:ma14="http://schemas.microsoft.com/office/mac/drawingml/2011/main" val="1"/>
+                <ma14:wrappingTextBoxFlag xmlns:ma14="http://schemas.microsoft.com/office/mac/drawingml/2011/main" xmlns="" val="1"/>
               </a:ext>
             </a:extLst>
           </p:spPr>
@@ -26185,7 +27418,7 @@
             <a:effectLst/>
             <a:extLst>
               <a:ext uri="{C572A759-6A51-4108-AA02-DFA0A04FC94B}">
-                <ma14:wrappingTextBoxFlag xmlns="" xmlns:ma14="http://schemas.microsoft.com/office/mac/drawingml/2011/main" val="1"/>
+                <ma14:wrappingTextBoxFlag xmlns:ma14="http://schemas.microsoft.com/office/mac/drawingml/2011/main" xmlns="" val="1"/>
               </a:ext>
             </a:extLst>
           </p:spPr>
@@ -26534,7 +27767,7 @@
             <a:effectLst/>
             <a:extLst>
               <a:ext uri="{C572A759-6A51-4108-AA02-DFA0A04FC94B}">
-                <ma14:wrappingTextBoxFlag xmlns="" xmlns:ma14="http://schemas.microsoft.com/office/mac/drawingml/2011/main" val="1"/>
+                <ma14:wrappingTextBoxFlag xmlns:ma14="http://schemas.microsoft.com/office/mac/drawingml/2011/main" xmlns="" val="1"/>
               </a:ext>
             </a:extLst>
           </p:spPr>
@@ -26954,7 +28187,7 @@
             <a:effectLst/>
             <a:extLst>
               <a:ext uri="{C572A759-6A51-4108-AA02-DFA0A04FC94B}">
-                <ma14:wrappingTextBoxFlag xmlns="" xmlns:ma14="http://schemas.microsoft.com/office/mac/drawingml/2011/main" val="1"/>
+                <ma14:wrappingTextBoxFlag xmlns:ma14="http://schemas.microsoft.com/office/mac/drawingml/2011/main" xmlns="" val="1"/>
               </a:ext>
             </a:extLst>
           </p:spPr>
@@ -28452,7 +29685,7 @@
             <a:effectLst/>
             <a:extLst>
               <a:ext uri="{C572A759-6A51-4108-AA02-DFA0A04FC94B}">
-                <ma14:wrappingTextBoxFlag xmlns="" xmlns:ma14="http://schemas.microsoft.com/office/mac/drawingml/2011/main" val="1"/>
+                <ma14:wrappingTextBoxFlag xmlns:ma14="http://schemas.microsoft.com/office/mac/drawingml/2011/main" xmlns="" val="1"/>
               </a:ext>
             </a:extLst>
           </p:spPr>
@@ -29217,7 +30450,7 @@
             <a:effectLst/>
             <a:extLst>
               <a:ext uri="{C572A759-6A51-4108-AA02-DFA0A04FC94B}">
-                <ma14:wrappingTextBoxFlag xmlns:ma14="http://schemas.microsoft.com/office/mac/drawingml/2011/main" xmlns="" val="1"/>
+                <ma14:wrappingTextBoxFlag xmlns="" xmlns:ma14="http://schemas.microsoft.com/office/mac/drawingml/2011/main" val="1"/>
               </a:ext>
             </a:extLst>
           </p:spPr>
@@ -29333,7 +30566,7 @@
             <a:effectLst/>
             <a:extLst>
               <a:ext uri="{C572A759-6A51-4108-AA02-DFA0A04FC94B}">
-                <ma14:wrappingTextBoxFlag xmlns:ma14="http://schemas.microsoft.com/office/mac/drawingml/2011/main" xmlns="" val="1"/>
+                <ma14:wrappingTextBoxFlag xmlns="" xmlns:ma14="http://schemas.microsoft.com/office/mac/drawingml/2011/main" val="1"/>
               </a:ext>
             </a:extLst>
           </p:spPr>
@@ -29449,7 +30682,7 @@
             <a:effectLst/>
             <a:extLst>
               <a:ext uri="{C572A759-6A51-4108-AA02-DFA0A04FC94B}">
-                <ma14:wrappingTextBoxFlag xmlns:ma14="http://schemas.microsoft.com/office/mac/drawingml/2011/main" xmlns="" val="1"/>
+                <ma14:wrappingTextBoxFlag xmlns="" xmlns:ma14="http://schemas.microsoft.com/office/mac/drawingml/2011/main" val="1"/>
               </a:ext>
             </a:extLst>
           </p:spPr>
@@ -29565,7 +30798,7 @@
             <a:effectLst/>
             <a:extLst>
               <a:ext uri="{C572A759-6A51-4108-AA02-DFA0A04FC94B}">
-                <ma14:wrappingTextBoxFlag xmlns:ma14="http://schemas.microsoft.com/office/mac/drawingml/2011/main" xmlns="" val="1"/>
+                <ma14:wrappingTextBoxFlag xmlns="" xmlns:ma14="http://schemas.microsoft.com/office/mac/drawingml/2011/main" val="1"/>
               </a:ext>
             </a:extLst>
           </p:spPr>
@@ -29681,7 +30914,7 @@
             <a:effectLst/>
             <a:extLst>
               <a:ext uri="{C572A759-6A51-4108-AA02-DFA0A04FC94B}">
-                <ma14:wrappingTextBoxFlag xmlns:ma14="http://schemas.microsoft.com/office/mac/drawingml/2011/main" xmlns="" val="1"/>
+                <ma14:wrappingTextBoxFlag xmlns="" xmlns:ma14="http://schemas.microsoft.com/office/mac/drawingml/2011/main" val="1"/>
               </a:ext>
             </a:extLst>
           </p:spPr>
@@ -29797,7 +31030,7 @@
             <a:effectLst/>
             <a:extLst>
               <a:ext uri="{C572A759-6A51-4108-AA02-DFA0A04FC94B}">
-                <ma14:wrappingTextBoxFlag xmlns:ma14="http://schemas.microsoft.com/office/mac/drawingml/2011/main" xmlns="" val="1"/>
+                <ma14:wrappingTextBoxFlag xmlns="" xmlns:ma14="http://schemas.microsoft.com/office/mac/drawingml/2011/main" val="1"/>
               </a:ext>
             </a:extLst>
           </p:spPr>
@@ -31477,7 +32710,7 @@
             <a:effectLst/>
             <a:extLst>
               <a:ext uri="{C572A759-6A51-4108-AA02-DFA0A04FC94B}">
-                <ma14:wrappingTextBoxFlag xmlns="" xmlns:ma14="http://schemas.microsoft.com/office/mac/drawingml/2011/main" val="1"/>
+                <ma14:wrappingTextBoxFlag xmlns:ma14="http://schemas.microsoft.com/office/mac/drawingml/2011/main" xmlns="" val="1"/>
               </a:ext>
             </a:extLst>
           </p:spPr>
@@ -32130,7 +33363,7 @@
             <a:effectLst/>
             <a:extLst>
               <a:ext uri="{C572A759-6A51-4108-AA02-DFA0A04FC94B}">
-                <ma14:wrappingTextBoxFlag xmlns:ma14="http://schemas.microsoft.com/office/mac/drawingml/2011/main" xmlns="" val="1"/>
+                <ma14:wrappingTextBoxFlag xmlns="" xmlns:ma14="http://schemas.microsoft.com/office/mac/drawingml/2011/main" val="1"/>
               </a:ext>
             </a:extLst>
           </p:spPr>
@@ -32619,7 +33852,7 @@
             <a:effectLst/>
             <a:extLst>
               <a:ext uri="{C572A759-6A51-4108-AA02-DFA0A04FC94B}">
-                <ma14:wrappingTextBoxFlag xmlns="" xmlns:ma14="http://schemas.microsoft.com/office/mac/drawingml/2011/main" val="1"/>
+                <ma14:wrappingTextBoxFlag xmlns:ma14="http://schemas.microsoft.com/office/mac/drawingml/2011/main" xmlns="" val="1"/>
               </a:ext>
             </a:extLst>
           </p:spPr>
@@ -32735,7 +33968,7 @@
             <a:effectLst/>
             <a:extLst>
               <a:ext uri="{C572A759-6A51-4108-AA02-DFA0A04FC94B}">
-                <ma14:wrappingTextBoxFlag xmlns="" xmlns:ma14="http://schemas.microsoft.com/office/mac/drawingml/2011/main" val="1"/>
+                <ma14:wrappingTextBoxFlag xmlns:ma14="http://schemas.microsoft.com/office/mac/drawingml/2011/main" xmlns="" val="1"/>
               </a:ext>
             </a:extLst>
           </p:spPr>
@@ -33065,7 +34298,7 @@
             <a:effectLst/>
             <a:extLst>
               <a:ext uri="{C572A759-6A51-4108-AA02-DFA0A04FC94B}">
-                <ma14:wrappingTextBoxFlag xmlns="" xmlns:ma14="http://schemas.microsoft.com/office/mac/drawingml/2011/main" val="1"/>
+                <ma14:wrappingTextBoxFlag xmlns:ma14="http://schemas.microsoft.com/office/mac/drawingml/2011/main" xmlns="" val="1"/>
               </a:ext>
             </a:extLst>
           </p:spPr>
@@ -33493,7 +34726,7 @@
             <a:effectLst/>
             <a:extLst>
               <a:ext uri="{C572A759-6A51-4108-AA02-DFA0A04FC94B}">
-                <ma14:wrappingTextBoxFlag xmlns="" xmlns:ma14="http://schemas.microsoft.com/office/mac/drawingml/2011/main" val="1"/>
+                <ma14:wrappingTextBoxFlag xmlns:ma14="http://schemas.microsoft.com/office/mac/drawingml/2011/main" xmlns="" val="1"/>
               </a:ext>
             </a:extLst>
           </p:spPr>
@@ -34476,7 +35709,7 @@
             <a:effectLst/>
             <a:extLst>
               <a:ext uri="{C572A759-6A51-4108-AA02-DFA0A04FC94B}">
-                <ma14:wrappingTextBoxFlag xmlns="" xmlns:ma14="http://schemas.microsoft.com/office/mac/drawingml/2011/main" val="1"/>
+                <ma14:wrappingTextBoxFlag xmlns:ma14="http://schemas.microsoft.com/office/mac/drawingml/2011/main" xmlns="" val="1"/>
               </a:ext>
             </a:extLst>
           </p:spPr>
@@ -34731,7 +35964,7 @@
             <a:effectLst/>
             <a:extLst>
               <a:ext uri="{C572A759-6A51-4108-AA02-DFA0A04FC94B}">
-                <ma14:wrappingTextBoxFlag xmlns="" xmlns:ma14="http://schemas.microsoft.com/office/mac/drawingml/2011/main" val="1"/>
+                <ma14:wrappingTextBoxFlag xmlns:ma14="http://schemas.microsoft.com/office/mac/drawingml/2011/main" xmlns="" val="1"/>
               </a:ext>
             </a:extLst>
           </p:spPr>
@@ -35061,7 +36294,7 @@
             <a:effectLst/>
             <a:extLst>
               <a:ext uri="{C572A759-6A51-4108-AA02-DFA0A04FC94B}">
-                <ma14:wrappingTextBoxFlag xmlns="" xmlns:ma14="http://schemas.microsoft.com/office/mac/drawingml/2011/main" val="1"/>
+                <ma14:wrappingTextBoxFlag xmlns:ma14="http://schemas.microsoft.com/office/mac/drawingml/2011/main" xmlns="" val="1"/>
               </a:ext>
             </a:extLst>
           </p:spPr>
@@ -35288,7 +36521,7 @@
             <a:effectLst/>
             <a:extLst>
               <a:ext uri="{C572A759-6A51-4108-AA02-DFA0A04FC94B}">
-                <ma14:wrappingTextBoxFlag xmlns="" xmlns:ma14="http://schemas.microsoft.com/office/mac/drawingml/2011/main" val="1"/>
+                <ma14:wrappingTextBoxFlag xmlns:ma14="http://schemas.microsoft.com/office/mac/drawingml/2011/main" xmlns="" val="1"/>
               </a:ext>
             </a:extLst>
           </p:spPr>
@@ -35629,7 +36862,7 @@
             <a:effectLst/>
             <a:extLst>
               <a:ext uri="{C572A759-6A51-4108-AA02-DFA0A04FC94B}">
-                <ma14:wrappingTextBoxFlag xmlns="" xmlns:ma14="http://schemas.microsoft.com/office/mac/drawingml/2011/main" val="1"/>
+                <ma14:wrappingTextBoxFlag xmlns:ma14="http://schemas.microsoft.com/office/mac/drawingml/2011/main" xmlns="" val="1"/>
               </a:ext>
             </a:extLst>
           </p:spPr>
@@ -36267,7 +37500,7 @@
             <a:effectLst/>
             <a:extLst>
               <a:ext uri="{C572A759-6A51-4108-AA02-DFA0A04FC94B}">
-                <ma14:wrappingTextBoxFlag xmlns="" xmlns:ma14="http://schemas.microsoft.com/office/mac/drawingml/2011/main" val="1"/>
+                <ma14:wrappingTextBoxFlag xmlns:ma14="http://schemas.microsoft.com/office/mac/drawingml/2011/main" xmlns="" val="1"/>
               </a:ext>
             </a:extLst>
           </p:spPr>
@@ -36383,7 +37616,7 @@
             <a:effectLst/>
             <a:extLst>
               <a:ext uri="{C572A759-6A51-4108-AA02-DFA0A04FC94B}">
-                <ma14:wrappingTextBoxFlag xmlns="" xmlns:ma14="http://schemas.microsoft.com/office/mac/drawingml/2011/main" val="1"/>
+                <ma14:wrappingTextBoxFlag xmlns:ma14="http://schemas.microsoft.com/office/mac/drawingml/2011/main" xmlns="" val="1"/>
               </a:ext>
             </a:extLst>
           </p:spPr>
@@ -37575,7 +38808,7 @@
             <a:effectLst/>
             <a:extLst>
               <a:ext uri="{C572A759-6A51-4108-AA02-DFA0A04FC94B}">
-                <ma14:wrappingTextBoxFlag xmlns="" xmlns:ma14="http://schemas.microsoft.com/office/mac/drawingml/2011/main" val="1"/>
+                <ma14:wrappingTextBoxFlag xmlns:ma14="http://schemas.microsoft.com/office/mac/drawingml/2011/main" xmlns="" val="1"/>
               </a:ext>
             </a:extLst>
           </p:spPr>
@@ -37691,7 +38924,7 @@
             <a:effectLst/>
             <a:extLst>
               <a:ext uri="{C572A759-6A51-4108-AA02-DFA0A04FC94B}">
-                <ma14:wrappingTextBoxFlag xmlns="" xmlns:ma14="http://schemas.microsoft.com/office/mac/drawingml/2011/main" val="1"/>
+                <ma14:wrappingTextBoxFlag xmlns:ma14="http://schemas.microsoft.com/office/mac/drawingml/2011/main" xmlns="" val="1"/>
               </a:ext>
             </a:extLst>
           </p:spPr>
@@ -37807,7 +39040,7 @@
             <a:effectLst/>
             <a:extLst>
               <a:ext uri="{C572A759-6A51-4108-AA02-DFA0A04FC94B}">
-                <ma14:wrappingTextBoxFlag xmlns="" xmlns:ma14="http://schemas.microsoft.com/office/mac/drawingml/2011/main" val="1"/>
+                <ma14:wrappingTextBoxFlag xmlns:ma14="http://schemas.microsoft.com/office/mac/drawingml/2011/main" xmlns="" val="1"/>
               </a:ext>
             </a:extLst>
           </p:spPr>
@@ -38218,7 +39451,7 @@
             <a:effectLst/>
             <a:extLst>
               <a:ext uri="{C572A759-6A51-4108-AA02-DFA0A04FC94B}">
-                <ma14:wrappingTextBoxFlag xmlns="" xmlns:ma14="http://schemas.microsoft.com/office/mac/drawingml/2011/main" val="1"/>
+                <ma14:wrappingTextBoxFlag xmlns:ma14="http://schemas.microsoft.com/office/mac/drawingml/2011/main" xmlns="" val="1"/>
               </a:ext>
             </a:extLst>
           </p:spPr>
@@ -38334,7 +39567,7 @@
             <a:effectLst/>
             <a:extLst>
               <a:ext uri="{C572A759-6A51-4108-AA02-DFA0A04FC94B}">
-                <ma14:wrappingTextBoxFlag xmlns="" xmlns:ma14="http://schemas.microsoft.com/office/mac/drawingml/2011/main" val="1"/>
+                <ma14:wrappingTextBoxFlag xmlns:ma14="http://schemas.microsoft.com/office/mac/drawingml/2011/main" xmlns="" val="1"/>
               </a:ext>
             </a:extLst>
           </p:spPr>
@@ -38450,7 +39683,7 @@
             <a:effectLst/>
             <a:extLst>
               <a:ext uri="{C572A759-6A51-4108-AA02-DFA0A04FC94B}">
-                <ma14:wrappingTextBoxFlag xmlns="" xmlns:ma14="http://schemas.microsoft.com/office/mac/drawingml/2011/main" val="1"/>
+                <ma14:wrappingTextBoxFlag xmlns:ma14="http://schemas.microsoft.com/office/mac/drawingml/2011/main" xmlns="" val="1"/>
               </a:ext>
             </a:extLst>
           </p:spPr>
@@ -38826,7 +40059,7 @@
             <a:effectLst/>
             <a:extLst>
               <a:ext uri="{C572A759-6A51-4108-AA02-DFA0A04FC94B}">
-                <ma14:wrappingTextBoxFlag xmlns="" xmlns:ma14="http://schemas.microsoft.com/office/mac/drawingml/2011/main" val="1"/>
+                <ma14:wrappingTextBoxFlag xmlns:ma14="http://schemas.microsoft.com/office/mac/drawingml/2011/main" xmlns="" val="1"/>
               </a:ext>
             </a:extLst>
           </p:spPr>
@@ -38959,7 +40192,7 @@
             <a:effectLst/>
             <a:extLst>
               <a:ext uri="{C572A759-6A51-4108-AA02-DFA0A04FC94B}">
-                <ma14:wrappingTextBoxFlag xmlns="" xmlns:ma14="http://schemas.microsoft.com/office/mac/drawingml/2011/main" val="1"/>
+                <ma14:wrappingTextBoxFlag xmlns:ma14="http://schemas.microsoft.com/office/mac/drawingml/2011/main" xmlns="" val="1"/>
               </a:ext>
             </a:extLst>
           </p:spPr>
@@ -39075,7 +40308,7 @@
             <a:effectLst/>
             <a:extLst>
               <a:ext uri="{C572A759-6A51-4108-AA02-DFA0A04FC94B}">
-                <ma14:wrappingTextBoxFlag xmlns="" xmlns:ma14="http://schemas.microsoft.com/office/mac/drawingml/2011/main" val="1"/>
+                <ma14:wrappingTextBoxFlag xmlns:ma14="http://schemas.microsoft.com/office/mac/drawingml/2011/main" xmlns="" val="1"/>
               </a:ext>
             </a:extLst>
           </p:spPr>
@@ -39288,7 +40521,7 @@
             <a:effectLst/>
             <a:extLst>
               <a:ext uri="{C572A759-6A51-4108-AA02-DFA0A04FC94B}">
-                <ma14:wrappingTextBoxFlag xmlns:ma14="http://schemas.microsoft.com/office/mac/drawingml/2011/main" xmlns="" val="1"/>
+                <ma14:wrappingTextBoxFlag xmlns="" xmlns:ma14="http://schemas.microsoft.com/office/mac/drawingml/2011/main" val="1"/>
               </a:ext>
             </a:extLst>
           </p:spPr>
@@ -39519,7 +40752,7 @@
               <a:effectLst/>
               <a:extLst>
                 <a:ext uri="{C572A759-6A51-4108-AA02-DFA0A04FC94B}">
-                  <ma14:wrappingTextBoxFlag xmlns:ma14="http://schemas.microsoft.com/office/mac/drawingml/2011/main" xmlns="" val="1"/>
+                  <ma14:wrappingTextBoxFlag xmlns="" xmlns:ma14="http://schemas.microsoft.com/office/mac/drawingml/2011/main" val="1"/>
                 </a:ext>
               </a:extLst>
             </p:spPr>
@@ -39985,7 +41218,7 @@
               <a:effectLst/>
               <a:extLst>
                 <a:ext uri="{C572A759-6A51-4108-AA02-DFA0A04FC94B}">
-                  <ma14:wrappingTextBoxFlag xmlns:ma14="http://schemas.microsoft.com/office/mac/drawingml/2011/main" xmlns="" val="1"/>
+                  <ma14:wrappingTextBoxFlag xmlns="" xmlns:ma14="http://schemas.microsoft.com/office/mac/drawingml/2011/main" val="1"/>
                 </a:ext>
               </a:extLst>
             </p:spPr>
@@ -40721,7 +41954,7 @@
               <a:effectLst/>
               <a:extLst>
                 <a:ext uri="{C572A759-6A51-4108-AA02-DFA0A04FC94B}">
-                  <ma14:wrappingTextBoxFlag xmlns:ma14="http://schemas.microsoft.com/office/mac/drawingml/2011/main" xmlns="" val="1"/>
+                  <ma14:wrappingTextBoxFlag xmlns="" xmlns:ma14="http://schemas.microsoft.com/office/mac/drawingml/2011/main" val="1"/>
                 </a:ext>
               </a:extLst>
             </p:spPr>
@@ -41213,7 +42446,7 @@
             <a:effectLst/>
             <a:extLst>
               <a:ext uri="{C572A759-6A51-4108-AA02-DFA0A04FC94B}">
-                <ma14:wrappingTextBoxFlag xmlns:ma14="http://schemas.microsoft.com/office/mac/drawingml/2011/main" xmlns="" val="1"/>
+                <ma14:wrappingTextBoxFlag xmlns="" xmlns:ma14="http://schemas.microsoft.com/office/mac/drawingml/2011/main" val="1"/>
               </a:ext>
             </a:extLst>
           </p:spPr>
@@ -41346,7 +42579,7 @@
             <a:effectLst/>
             <a:extLst>
               <a:ext uri="{C572A759-6A51-4108-AA02-DFA0A04FC94B}">
-                <ma14:wrappingTextBoxFlag xmlns:ma14="http://schemas.microsoft.com/office/mac/drawingml/2011/main" xmlns="" val="1"/>
+                <ma14:wrappingTextBoxFlag xmlns="" xmlns:ma14="http://schemas.microsoft.com/office/mac/drawingml/2011/main" val="1"/>
               </a:ext>
             </a:extLst>
           </p:spPr>
@@ -41479,7 +42712,7 @@
             <a:effectLst/>
             <a:extLst>
               <a:ext uri="{C572A759-6A51-4108-AA02-DFA0A04FC94B}">
-                <ma14:wrappingTextBoxFlag xmlns="" xmlns:ma14="http://schemas.microsoft.com/office/mac/drawingml/2011/main" val="1"/>
+                <ma14:wrappingTextBoxFlag xmlns:ma14="http://schemas.microsoft.com/office/mac/drawingml/2011/main" xmlns="" val="1"/>
               </a:ext>
             </a:extLst>
           </p:spPr>
@@ -41710,7 +42943,7 @@
               <a:effectLst/>
               <a:extLst>
                 <a:ext uri="{C572A759-6A51-4108-AA02-DFA0A04FC94B}">
-                  <ma14:wrappingTextBoxFlag xmlns="" xmlns:ma14="http://schemas.microsoft.com/office/mac/drawingml/2011/main" val="1"/>
+                  <ma14:wrappingTextBoxFlag xmlns:ma14="http://schemas.microsoft.com/office/mac/drawingml/2011/main" xmlns="" val="1"/>
                 </a:ext>
               </a:extLst>
             </p:spPr>
@@ -42088,7 +43321,7 @@
               <a:effectLst/>
               <a:extLst>
                 <a:ext uri="{C572A759-6A51-4108-AA02-DFA0A04FC94B}">
-                  <ma14:wrappingTextBoxFlag xmlns="" xmlns:ma14="http://schemas.microsoft.com/office/mac/drawingml/2011/main" val="1"/>
+                  <ma14:wrappingTextBoxFlag xmlns:ma14="http://schemas.microsoft.com/office/mac/drawingml/2011/main" xmlns="" val="1"/>
                 </a:ext>
               </a:extLst>
             </p:spPr>
@@ -42824,7 +44057,7 @@
               <a:effectLst/>
               <a:extLst>
                 <a:ext uri="{C572A759-6A51-4108-AA02-DFA0A04FC94B}">
-                  <ma14:wrappingTextBoxFlag xmlns="" xmlns:ma14="http://schemas.microsoft.com/office/mac/drawingml/2011/main" val="1"/>
+                  <ma14:wrappingTextBoxFlag xmlns:ma14="http://schemas.microsoft.com/office/mac/drawingml/2011/main" xmlns="" val="1"/>
                 </a:ext>
               </a:extLst>
             </p:spPr>
@@ -43064,7 +44297,7 @@
             <a:effectLst/>
             <a:extLst>
               <a:ext uri="{C572A759-6A51-4108-AA02-DFA0A04FC94B}">
-                <ma14:wrappingTextBoxFlag xmlns="" xmlns:ma14="http://schemas.microsoft.com/office/mac/drawingml/2011/main" val="1"/>
+                <ma14:wrappingTextBoxFlag xmlns:ma14="http://schemas.microsoft.com/office/mac/drawingml/2011/main" xmlns="" val="1"/>
               </a:ext>
             </a:extLst>
           </p:spPr>
@@ -43317,7 +44550,7 @@
             <a:effectLst/>
             <a:extLst>
               <a:ext uri="{C572A759-6A51-4108-AA02-DFA0A04FC94B}">
-                <ma14:wrappingTextBoxFlag xmlns="" xmlns:ma14="http://schemas.microsoft.com/office/mac/drawingml/2011/main" val="1"/>
+                <ma14:wrappingTextBoxFlag xmlns:ma14="http://schemas.microsoft.com/office/mac/drawingml/2011/main" xmlns="" val="1"/>
               </a:ext>
             </a:extLst>
           </p:spPr>
@@ -43649,7 +44882,7 @@
               <a:effectLst/>
               <a:extLst>
                 <a:ext uri="{C572A759-6A51-4108-AA02-DFA0A04FC94B}">
-                  <ma14:wrappingTextBoxFlag xmlns="" xmlns:ma14="http://schemas.microsoft.com/office/mac/drawingml/2011/main" val="1"/>
+                  <ma14:wrappingTextBoxFlag xmlns:ma14="http://schemas.microsoft.com/office/mac/drawingml/2011/main" xmlns="" val="1"/>
                 </a:ext>
               </a:extLst>
             </p:spPr>
@@ -43842,7 +45075,7 @@
             <a:effectLst/>
             <a:extLst>
               <a:ext uri="{C572A759-6A51-4108-AA02-DFA0A04FC94B}">
-                <ma14:wrappingTextBoxFlag xmlns="" xmlns:ma14="http://schemas.microsoft.com/office/mac/drawingml/2011/main" val="1"/>
+                <ma14:wrappingTextBoxFlag xmlns:ma14="http://schemas.microsoft.com/office/mac/drawingml/2011/main" xmlns="" val="1"/>
               </a:ext>
             </a:extLst>
           </p:spPr>

</xml_diff>

<commit_message>
updatee to tekton note
</commit_message>
<xml_diff>
--- a/docs/Diagrams.pptx
+++ b/docs/Diagrams.pptx
@@ -290,7 +290,7 @@
               <a:pPr>
                 <a:defRPr/>
               </a:pPr>
-              <a:t>9/1/21</a:t>
+              <a:t>9/3/21</a:t>
             </a:fld>
             <a:endParaRPr lang="en-US"/>
           </a:p>
@@ -9168,7 +9168,7 @@
             <a:effectLst/>
             <a:extLst>
               <a:ext uri="{C572A759-6A51-4108-AA02-DFA0A04FC94B}">
-                <ma14:wrappingTextBoxFlag xmlns:ma14="http://schemas.microsoft.com/office/mac/drawingml/2011/main" xmlns="" val="1"/>
+                <ma14:wrappingTextBoxFlag xmlns="" xmlns:ma14="http://schemas.microsoft.com/office/mac/drawingml/2011/main" val="1"/>
               </a:ext>
             </a:extLst>
           </p:spPr>
@@ -9984,7 +9984,7 @@
             <a:effectLst/>
             <a:extLst>
               <a:ext uri="{C572A759-6A51-4108-AA02-DFA0A04FC94B}">
-                <ma14:wrappingTextBoxFlag xmlns:ma14="http://schemas.microsoft.com/office/mac/drawingml/2011/main" xmlns="" val="1"/>
+                <ma14:wrappingTextBoxFlag xmlns="" xmlns:ma14="http://schemas.microsoft.com/office/mac/drawingml/2011/main" val="1"/>
               </a:ext>
             </a:extLst>
           </p:spPr>
@@ -10100,7 +10100,7 @@
             <a:effectLst/>
             <a:extLst>
               <a:ext uri="{C572A759-6A51-4108-AA02-DFA0A04FC94B}">
-                <ma14:wrappingTextBoxFlag xmlns:ma14="http://schemas.microsoft.com/office/mac/drawingml/2011/main" xmlns="" val="1"/>
+                <ma14:wrappingTextBoxFlag xmlns="" xmlns:ma14="http://schemas.microsoft.com/office/mac/drawingml/2011/main" val="1"/>
               </a:ext>
             </a:extLst>
           </p:spPr>
@@ -10280,7 +10280,7 @@
             <a:effectLst/>
             <a:extLst>
               <a:ext uri="{C572A759-6A51-4108-AA02-DFA0A04FC94B}">
-                <ma14:wrappingTextBoxFlag xmlns="" xmlns:ma14="http://schemas.microsoft.com/office/mac/drawingml/2011/main" val="1"/>
+                <ma14:wrappingTextBoxFlag xmlns:ma14="http://schemas.microsoft.com/office/mac/drawingml/2011/main" xmlns="" val="1"/>
               </a:ext>
             </a:extLst>
           </p:spPr>
@@ -10595,7 +10595,7 @@
               <a:effectLst/>
               <a:extLst>
                 <a:ext uri="{C572A759-6A51-4108-AA02-DFA0A04FC94B}">
-                  <ma14:wrappingTextBoxFlag xmlns:ma14="http://schemas.microsoft.com/office/mac/drawingml/2011/main" xmlns="" val="1"/>
+                  <ma14:wrappingTextBoxFlag xmlns="" xmlns:ma14="http://schemas.microsoft.com/office/mac/drawingml/2011/main" val="1"/>
                 </a:ext>
               </a:extLst>
             </p:spPr>
@@ -10809,7 +10809,7 @@
               <a:effectLst/>
               <a:extLst>
                 <a:ext uri="{C572A759-6A51-4108-AA02-DFA0A04FC94B}">
-                  <ma14:wrappingTextBoxFlag xmlns:ma14="http://schemas.microsoft.com/office/mac/drawingml/2011/main" xmlns="" val="1"/>
+                  <ma14:wrappingTextBoxFlag xmlns="" xmlns:ma14="http://schemas.microsoft.com/office/mac/drawingml/2011/main" val="1"/>
                 </a:ext>
               </a:extLst>
             </p:spPr>
@@ -11091,7 +11091,7 @@
             <a:effectLst/>
             <a:extLst>
               <a:ext uri="{C572A759-6A51-4108-AA02-DFA0A04FC94B}">
-                <ma14:wrappingTextBoxFlag xmlns:ma14="http://schemas.microsoft.com/office/mac/drawingml/2011/main" xmlns="" val="1"/>
+                <ma14:wrappingTextBoxFlag xmlns="" xmlns:ma14="http://schemas.microsoft.com/office/mac/drawingml/2011/main" val="1"/>
               </a:ext>
             </a:extLst>
           </p:spPr>
@@ -11207,7 +11207,7 @@
             <a:effectLst/>
             <a:extLst>
               <a:ext uri="{C572A759-6A51-4108-AA02-DFA0A04FC94B}">
-                <ma14:wrappingTextBoxFlag xmlns:ma14="http://schemas.microsoft.com/office/mac/drawingml/2011/main" xmlns="" val="1"/>
+                <ma14:wrappingTextBoxFlag xmlns="" xmlns:ma14="http://schemas.microsoft.com/office/mac/drawingml/2011/main" val="1"/>
               </a:ext>
             </a:extLst>
           </p:spPr>
@@ -12345,7 +12345,7 @@
             <a:effectLst/>
             <a:extLst>
               <a:ext uri="{C572A759-6A51-4108-AA02-DFA0A04FC94B}">
-                <ma14:wrappingTextBoxFlag xmlns="" xmlns:ma14="http://schemas.microsoft.com/office/mac/drawingml/2011/main" val="1"/>
+                <ma14:wrappingTextBoxFlag xmlns:ma14="http://schemas.microsoft.com/office/mac/drawingml/2011/main" xmlns="" val="1"/>
               </a:ext>
             </a:extLst>
           </p:spPr>
@@ -12478,7 +12478,7 @@
             <a:effectLst/>
             <a:extLst>
               <a:ext uri="{C572A759-6A51-4108-AA02-DFA0A04FC94B}">
-                <ma14:wrappingTextBoxFlag xmlns="" xmlns:ma14="http://schemas.microsoft.com/office/mac/drawingml/2011/main" val="1"/>
+                <ma14:wrappingTextBoxFlag xmlns:ma14="http://schemas.microsoft.com/office/mac/drawingml/2011/main" xmlns="" val="1"/>
               </a:ext>
             </a:extLst>
           </p:spPr>
@@ -12790,7 +12790,7 @@
               <a:effectLst/>
               <a:extLst>
                 <a:ext uri="{C572A759-6A51-4108-AA02-DFA0A04FC94B}">
-                  <ma14:wrappingTextBoxFlag xmlns:ma14="http://schemas.microsoft.com/office/mac/drawingml/2011/main" xmlns="" val="1"/>
+                  <ma14:wrappingTextBoxFlag xmlns="" xmlns:ma14="http://schemas.microsoft.com/office/mac/drawingml/2011/main" val="1"/>
                 </a:ext>
               </a:extLst>
             </p:spPr>
@@ -13214,7 +13214,7 @@
               <a:effectLst/>
               <a:extLst>
                 <a:ext uri="{C572A759-6A51-4108-AA02-DFA0A04FC94B}">
-                  <ma14:wrappingTextBoxFlag xmlns:ma14="http://schemas.microsoft.com/office/mac/drawingml/2011/main" xmlns="" val="1"/>
+                  <ma14:wrappingTextBoxFlag xmlns="" xmlns:ma14="http://schemas.microsoft.com/office/mac/drawingml/2011/main" val="1"/>
                 </a:ext>
               </a:extLst>
             </p:spPr>
@@ -13865,7 +13865,7 @@
             <a:effectLst/>
             <a:extLst>
               <a:ext uri="{C572A759-6A51-4108-AA02-DFA0A04FC94B}">
-                <ma14:wrappingTextBoxFlag xmlns:ma14="http://schemas.microsoft.com/office/mac/drawingml/2011/main" xmlns="" val="1"/>
+                <ma14:wrappingTextBoxFlag xmlns="" xmlns:ma14="http://schemas.microsoft.com/office/mac/drawingml/2011/main" val="1"/>
               </a:ext>
             </a:extLst>
           </p:spPr>
@@ -14120,7 +14120,7 @@
             <a:effectLst/>
             <a:extLst>
               <a:ext uri="{C572A759-6A51-4108-AA02-DFA0A04FC94B}">
-                <ma14:wrappingTextBoxFlag xmlns="" xmlns:ma14="http://schemas.microsoft.com/office/mac/drawingml/2011/main" val="1"/>
+                <ma14:wrappingTextBoxFlag xmlns:ma14="http://schemas.microsoft.com/office/mac/drawingml/2011/main" xmlns="" val="1"/>
               </a:ext>
             </a:extLst>
           </p:spPr>
@@ -14368,7 +14368,7 @@
               <a:effectLst/>
               <a:extLst>
                 <a:ext uri="{C572A759-6A51-4108-AA02-DFA0A04FC94B}">
-                  <ma14:wrappingTextBoxFlag xmlns:ma14="http://schemas.microsoft.com/office/mac/drawingml/2011/main" xmlns="" val="1"/>
+                  <ma14:wrappingTextBoxFlag xmlns="" xmlns:ma14="http://schemas.microsoft.com/office/mac/drawingml/2011/main" val="1"/>
                 </a:ext>
               </a:extLst>
             </p:spPr>
@@ -14666,7 +14666,7 @@
               <a:effectLst/>
               <a:extLst>
                 <a:ext uri="{C572A759-6A51-4108-AA02-DFA0A04FC94B}">
-                  <ma14:wrappingTextBoxFlag xmlns:ma14="http://schemas.microsoft.com/office/mac/drawingml/2011/main" xmlns="" val="1"/>
+                  <ma14:wrappingTextBoxFlag xmlns="" xmlns:ma14="http://schemas.microsoft.com/office/mac/drawingml/2011/main" val="1"/>
                 </a:ext>
               </a:extLst>
             </p:spPr>
@@ -15976,7 +15976,7 @@
             <a:effectLst/>
             <a:extLst>
               <a:ext uri="{C572A759-6A51-4108-AA02-DFA0A04FC94B}">
-                <ma14:wrappingTextBoxFlag xmlns="" xmlns:ma14="http://schemas.microsoft.com/office/mac/drawingml/2011/main" val="1"/>
+                <ma14:wrappingTextBoxFlag xmlns:ma14="http://schemas.microsoft.com/office/mac/drawingml/2011/main" xmlns="" val="1"/>
               </a:ext>
             </a:extLst>
           </p:spPr>
@@ -16092,7 +16092,7 @@
             <a:effectLst/>
             <a:extLst>
               <a:ext uri="{C572A759-6A51-4108-AA02-DFA0A04FC94B}">
-                <ma14:wrappingTextBoxFlag xmlns="" xmlns:ma14="http://schemas.microsoft.com/office/mac/drawingml/2011/main" val="1"/>
+                <ma14:wrappingTextBoxFlag xmlns:ma14="http://schemas.microsoft.com/office/mac/drawingml/2011/main" xmlns="" val="1"/>
               </a:ext>
             </a:extLst>
           </p:spPr>
@@ -16513,7 +16513,7 @@
             <a:effectLst/>
             <a:extLst>
               <a:ext uri="{C572A759-6A51-4108-AA02-DFA0A04FC94B}">
-                <ma14:wrappingTextBoxFlag xmlns="" xmlns:ma14="http://schemas.microsoft.com/office/mac/drawingml/2011/main" val="1"/>
+                <ma14:wrappingTextBoxFlag xmlns:ma14="http://schemas.microsoft.com/office/mac/drawingml/2011/main" xmlns="" val="1"/>
               </a:ext>
             </a:extLst>
           </p:spPr>
@@ -16672,7 +16672,7 @@
             <a:effectLst/>
             <a:extLst>
               <a:ext uri="{C572A759-6A51-4108-AA02-DFA0A04FC94B}">
-                <ma14:wrappingTextBoxFlag xmlns:ma14="http://schemas.microsoft.com/office/mac/drawingml/2011/main" xmlns="" val="1"/>
+                <ma14:wrappingTextBoxFlag xmlns="" xmlns:ma14="http://schemas.microsoft.com/office/mac/drawingml/2011/main" val="1"/>
               </a:ext>
             </a:extLst>
           </p:spPr>
@@ -17191,7 +17191,7 @@
               <a:effectLst/>
               <a:extLst>
                 <a:ext uri="{C572A759-6A51-4108-AA02-DFA0A04FC94B}">
-                  <ma14:wrappingTextBoxFlag xmlns:ma14="http://schemas.microsoft.com/office/mac/drawingml/2011/main" xmlns="" val="1"/>
+                  <ma14:wrappingTextBoxFlag xmlns="" xmlns:ma14="http://schemas.microsoft.com/office/mac/drawingml/2011/main" val="1"/>
                 </a:ext>
               </a:extLst>
             </p:spPr>
@@ -17341,7 +17341,7 @@
             <a:effectLst/>
             <a:extLst>
               <a:ext uri="{C572A759-6A51-4108-AA02-DFA0A04FC94B}">
-                <ma14:wrappingTextBoxFlag xmlns="" xmlns:ma14="http://schemas.microsoft.com/office/mac/drawingml/2011/main" val="1"/>
+                <ma14:wrappingTextBoxFlag xmlns:ma14="http://schemas.microsoft.com/office/mac/drawingml/2011/main" xmlns="" val="1"/>
               </a:ext>
             </a:extLst>
           </p:spPr>
@@ -17501,7 +17501,7 @@
             <a:effectLst/>
             <a:extLst>
               <a:ext uri="{C572A759-6A51-4108-AA02-DFA0A04FC94B}">
-                <ma14:wrappingTextBoxFlag xmlns:ma14="http://schemas.microsoft.com/office/mac/drawingml/2011/main" xmlns="" val="1"/>
+                <ma14:wrappingTextBoxFlag xmlns="" xmlns:ma14="http://schemas.microsoft.com/office/mac/drawingml/2011/main" val="1"/>
               </a:ext>
             </a:extLst>
           </p:spPr>
@@ -17802,7 +17802,7 @@
               <a:effectLst/>
               <a:extLst>
                 <a:ext uri="{C572A759-6A51-4108-AA02-DFA0A04FC94B}">
-                  <ma14:wrappingTextBoxFlag xmlns:ma14="http://schemas.microsoft.com/office/mac/drawingml/2011/main" xmlns="" val="1"/>
+                  <ma14:wrappingTextBoxFlag xmlns="" xmlns:ma14="http://schemas.microsoft.com/office/mac/drawingml/2011/main" val="1"/>
                 </a:ext>
               </a:extLst>
             </p:spPr>
@@ -23178,6 +23178,47 @@
           <a:chExt cx="0" cy="0"/>
         </a:xfrm>
       </p:grpSpPr>
+      <p:cxnSp>
+        <p:nvCxnSpPr>
+          <p:cNvPr id="31" name="Straight Arrow Connector 30">
+            <a:extLst>
+              <a:ext uri="{FF2B5EF4-FFF2-40B4-BE49-F238E27FC236}">
+                <a16:creationId xmlns:a16="http://schemas.microsoft.com/office/drawing/2014/main" id="{26FEE08F-3BE7-B746-9908-1D61C0DCFCAC}"/>
+              </a:ext>
+            </a:extLst>
+          </p:cNvPr>
+          <p:cNvCxnSpPr>
+            <a:cxnSpLocks/>
+          </p:cNvCxnSpPr>
+          <p:nvPr/>
+        </p:nvCxnSpPr>
+        <p:spPr>
+          <a:xfrm flipH="1">
+            <a:off x="6291575" y="5384032"/>
+            <a:ext cx="1" cy="406381"/>
+          </a:xfrm>
+          <a:prstGeom prst="straightConnector1">
+            <a:avLst/>
+          </a:prstGeom>
+          <a:ln>
+            <a:tailEnd type="triangle"/>
+          </a:ln>
+        </p:spPr>
+        <p:style>
+          <a:lnRef idx="2">
+            <a:schemeClr val="dk1"/>
+          </a:lnRef>
+          <a:fillRef idx="0">
+            <a:schemeClr val="dk1"/>
+          </a:fillRef>
+          <a:effectRef idx="1">
+            <a:schemeClr val="dk1"/>
+          </a:effectRef>
+          <a:fontRef idx="minor">
+            <a:schemeClr val="tx1"/>
+          </a:fontRef>
+        </p:style>
+      </p:cxnSp>
       <p:sp>
         <p:nvSpPr>
           <p:cNvPr id="2" name="Title 1">
@@ -23296,7 +23337,7 @@
         </p:nvSpPr>
         <p:spPr>
           <a:xfrm>
-            <a:off x="8111924" y="2468177"/>
+            <a:off x="8087604" y="1246997"/>
             <a:ext cx="1454551" cy="438587"/>
           </a:xfrm>
           <a:prstGeom prst="rect">
@@ -23362,7 +23403,7 @@
         </p:nvSpPr>
         <p:spPr>
           <a:xfrm>
-            <a:off x="5585281" y="2468178"/>
+            <a:off x="5560961" y="1246998"/>
             <a:ext cx="1454551" cy="438587"/>
           </a:xfrm>
           <a:prstGeom prst="rect">
@@ -23431,7 +23472,7 @@
         </p:nvCxnSpPr>
         <p:spPr>
           <a:xfrm flipV="1">
-            <a:off x="7039832" y="2687471"/>
+            <a:off x="7015512" y="1466291"/>
             <a:ext cx="1072092" cy="1"/>
           </a:xfrm>
           <a:prstGeom prst="straightConnector1">
@@ -23470,7 +23511,7 @@
         </p:nvSpPr>
         <p:spPr>
           <a:xfrm>
-            <a:off x="2855869" y="2468176"/>
+            <a:off x="2831549" y="1246996"/>
             <a:ext cx="1454551" cy="438587"/>
           </a:xfrm>
           <a:prstGeom prst="rect">
@@ -23536,7 +23577,7 @@
         </p:nvSpPr>
         <p:spPr>
           <a:xfrm>
-            <a:off x="7730836" y="2344189"/>
+            <a:off x="7706516" y="1123009"/>
             <a:ext cx="274434" cy="369332"/>
           </a:xfrm>
           <a:prstGeom prst="rect">
@@ -23574,7 +23615,7 @@
         </p:nvCxnSpPr>
         <p:spPr>
           <a:xfrm>
-            <a:off x="4321960" y="2687470"/>
+            <a:off x="4297640" y="1466290"/>
             <a:ext cx="1263321" cy="2"/>
           </a:xfrm>
           <a:prstGeom prst="straightConnector1">
@@ -23613,14 +23654,16 @@
         </p:nvSpPr>
         <p:spPr>
           <a:xfrm>
-            <a:off x="2867409" y="3865419"/>
+            <a:off x="2843089" y="2644239"/>
             <a:ext cx="1454551" cy="438587"/>
           </a:xfrm>
           <a:prstGeom prst="rect">
             <a:avLst/>
           </a:prstGeom>
           <a:solidFill>
-            <a:srgbClr val="4040EA"/>
+            <a:srgbClr val="4040EA">
+              <a:alpha val="49000"/>
+            </a:srgbClr>
           </a:solidFill>
           <a:ln>
             <a:noFill/>
@@ -23683,7 +23726,7 @@
         </p:nvCxnSpPr>
         <p:spPr>
           <a:xfrm>
-            <a:off x="3583145" y="2906763"/>
+            <a:off x="3558825" y="1685583"/>
             <a:ext cx="11540" cy="958656"/>
           </a:xfrm>
           <a:prstGeom prst="straightConnector1">
@@ -23722,7 +23765,7 @@
         </p:nvSpPr>
         <p:spPr>
           <a:xfrm>
-            <a:off x="3594684" y="3510021"/>
+            <a:off x="3570364" y="2288841"/>
             <a:ext cx="274434" cy="369332"/>
           </a:xfrm>
           <a:prstGeom prst="rect">
@@ -23743,6 +23786,1483 @@
           </a:p>
         </p:txBody>
       </p:sp>
+      <p:sp>
+        <p:nvSpPr>
+          <p:cNvPr id="15" name="Rectangle 14">
+            <a:extLst>
+              <a:ext uri="{FF2B5EF4-FFF2-40B4-BE49-F238E27FC236}">
+                <a16:creationId xmlns:a16="http://schemas.microsoft.com/office/drawing/2014/main" id="{800DD121-1597-7944-8DFA-EDD513244EAD}"/>
+              </a:ext>
+            </a:extLst>
+          </p:cNvPr>
+          <p:cNvSpPr/>
+          <p:nvPr/>
+        </p:nvSpPr>
+        <p:spPr>
+          <a:xfrm>
+            <a:off x="3474749" y="4794774"/>
+            <a:ext cx="1454551" cy="438587"/>
+          </a:xfrm>
+          <a:prstGeom prst="rect">
+            <a:avLst/>
+          </a:prstGeom>
+          <a:solidFill>
+            <a:srgbClr val="4040EA"/>
+          </a:solidFill>
+          <a:ln>
+            <a:noFill/>
+          </a:ln>
+          <a:effectLst>
+            <a:outerShdw blurRad="50800" dist="38100" dir="5400000" algn="t" rotWithShape="0">
+              <a:prstClr val="black">
+                <a:alpha val="40000"/>
+              </a:prstClr>
+            </a:outerShdw>
+          </a:effectLst>
+        </p:spPr>
+        <p:style>
+          <a:lnRef idx="2">
+            <a:schemeClr val="accent1">
+              <a:shade val="50000"/>
+            </a:schemeClr>
+          </a:lnRef>
+          <a:fillRef idx="1">
+            <a:schemeClr val="accent1"/>
+          </a:fillRef>
+          <a:effectRef idx="0">
+            <a:schemeClr val="accent1"/>
+          </a:effectRef>
+          <a:fontRef idx="minor">
+            <a:schemeClr val="lt1"/>
+          </a:fontRef>
+        </p:style>
+        <p:txBody>
+          <a:bodyPr rtlCol="0" anchor="ctr"/>
+          <a:lstStyle/>
+          <a:p>
+            <a:pPr algn="ctr"/>
+            <a:r>
+              <a:rPr lang="en-US" sz="1200" dirty="0">
+                <a:solidFill>
+                  <a:schemeClr val="bg1"/>
+                </a:solidFill>
+              </a:rPr>
+              <a:t>EventListener</a:t>
+            </a:r>
+          </a:p>
+        </p:txBody>
+      </p:sp>
+      <p:sp>
+        <p:nvSpPr>
+          <p:cNvPr id="3" name="Rectangle 2">
+            <a:extLst>
+              <a:ext uri="{FF2B5EF4-FFF2-40B4-BE49-F238E27FC236}">
+                <a16:creationId xmlns:a16="http://schemas.microsoft.com/office/drawing/2014/main" id="{2C2CFE2E-5E9B-BC47-A2EA-278F7F1DED20}"/>
+              </a:ext>
+            </a:extLst>
+          </p:cNvPr>
+          <p:cNvSpPr/>
+          <p:nvPr/>
+        </p:nvSpPr>
+        <p:spPr>
+          <a:xfrm>
+            <a:off x="5362327" y="1123009"/>
+            <a:ext cx="4771506" cy="1165832"/>
+          </a:xfrm>
+          <a:prstGeom prst="rect">
+            <a:avLst/>
+          </a:prstGeom>
+          <a:noFill/>
+          <a:ln>
+            <a:solidFill>
+              <a:srgbClr val="7030A0"/>
+            </a:solidFill>
+          </a:ln>
+        </p:spPr>
+        <p:style>
+          <a:lnRef idx="2">
+            <a:schemeClr val="accent1">
+              <a:shade val="50000"/>
+            </a:schemeClr>
+          </a:lnRef>
+          <a:fillRef idx="1">
+            <a:schemeClr val="accent1"/>
+          </a:fillRef>
+          <a:effectRef idx="0">
+            <a:schemeClr val="accent1"/>
+          </a:effectRef>
+          <a:fontRef idx="minor">
+            <a:schemeClr val="lt1"/>
+          </a:fontRef>
+        </p:style>
+        <p:txBody>
+          <a:bodyPr rtlCol="0" anchor="b"/>
+          <a:lstStyle/>
+          <a:p>
+            <a:pPr algn="ctr"/>
+            <a:r>
+              <a:rPr lang="en-US" sz="1400" dirty="0">
+                <a:solidFill>
+                  <a:srgbClr val="0000FF"/>
+                </a:solidFill>
+              </a:rPr>
+              <a:t>Reusable</a:t>
+            </a:r>
+          </a:p>
+        </p:txBody>
+      </p:sp>
+      <p:sp>
+        <p:nvSpPr>
+          <p:cNvPr id="16" name="Rectangle 15">
+            <a:extLst>
+              <a:ext uri="{FF2B5EF4-FFF2-40B4-BE49-F238E27FC236}">
+                <a16:creationId xmlns:a16="http://schemas.microsoft.com/office/drawing/2014/main" id="{85BBDF76-17A3-7C49-A362-8E3AFAE239F2}"/>
+              </a:ext>
+            </a:extLst>
+          </p:cNvPr>
+          <p:cNvSpPr/>
+          <p:nvPr/>
+        </p:nvSpPr>
+        <p:spPr>
+          <a:xfrm>
+            <a:off x="2680735" y="1028014"/>
+            <a:ext cx="2189222" cy="2588813"/>
+          </a:xfrm>
+          <a:custGeom>
+            <a:avLst/>
+            <a:gdLst>
+              <a:gd name="connsiteX0" fmla="*/ 0 w 2189222"/>
+              <a:gd name="connsiteY0" fmla="*/ 0 h 2588813"/>
+              <a:gd name="connsiteX1" fmla="*/ 525413 w 2189222"/>
+              <a:gd name="connsiteY1" fmla="*/ 0 h 2588813"/>
+              <a:gd name="connsiteX2" fmla="*/ 1007042 w 2189222"/>
+              <a:gd name="connsiteY2" fmla="*/ 0 h 2588813"/>
+              <a:gd name="connsiteX3" fmla="*/ 1598132 w 2189222"/>
+              <a:gd name="connsiteY3" fmla="*/ 0 h 2588813"/>
+              <a:gd name="connsiteX4" fmla="*/ 2189222 w 2189222"/>
+              <a:gd name="connsiteY4" fmla="*/ 0 h 2588813"/>
+              <a:gd name="connsiteX5" fmla="*/ 2189222 w 2189222"/>
+              <a:gd name="connsiteY5" fmla="*/ 491874 h 2588813"/>
+              <a:gd name="connsiteX6" fmla="*/ 2189222 w 2189222"/>
+              <a:gd name="connsiteY6" fmla="*/ 957861 h 2588813"/>
+              <a:gd name="connsiteX7" fmla="*/ 2189222 w 2189222"/>
+              <a:gd name="connsiteY7" fmla="*/ 1475623 h 2588813"/>
+              <a:gd name="connsiteX8" fmla="*/ 2189222 w 2189222"/>
+              <a:gd name="connsiteY8" fmla="*/ 1993386 h 2588813"/>
+              <a:gd name="connsiteX9" fmla="*/ 2189222 w 2189222"/>
+              <a:gd name="connsiteY9" fmla="*/ 2588813 h 2588813"/>
+              <a:gd name="connsiteX10" fmla="*/ 1685701 w 2189222"/>
+              <a:gd name="connsiteY10" fmla="*/ 2588813 h 2588813"/>
+              <a:gd name="connsiteX11" fmla="*/ 1138395 w 2189222"/>
+              <a:gd name="connsiteY11" fmla="*/ 2588813 h 2588813"/>
+              <a:gd name="connsiteX12" fmla="*/ 612982 w 2189222"/>
+              <a:gd name="connsiteY12" fmla="*/ 2588813 h 2588813"/>
+              <a:gd name="connsiteX13" fmla="*/ 0 w 2189222"/>
+              <a:gd name="connsiteY13" fmla="*/ 2588813 h 2588813"/>
+              <a:gd name="connsiteX14" fmla="*/ 0 w 2189222"/>
+              <a:gd name="connsiteY14" fmla="*/ 2019274 h 2588813"/>
+              <a:gd name="connsiteX15" fmla="*/ 0 w 2189222"/>
+              <a:gd name="connsiteY15" fmla="*/ 1449735 h 2588813"/>
+              <a:gd name="connsiteX16" fmla="*/ 0 w 2189222"/>
+              <a:gd name="connsiteY16" fmla="*/ 931973 h 2588813"/>
+              <a:gd name="connsiteX17" fmla="*/ 0 w 2189222"/>
+              <a:gd name="connsiteY17" fmla="*/ 0 h 2588813"/>
+            </a:gdLst>
+            <a:ahLst/>
+            <a:cxnLst>
+              <a:cxn ang="0">
+                <a:pos x="connsiteX0" y="connsiteY0"/>
+              </a:cxn>
+              <a:cxn ang="0">
+                <a:pos x="connsiteX1" y="connsiteY1"/>
+              </a:cxn>
+              <a:cxn ang="0">
+                <a:pos x="connsiteX2" y="connsiteY2"/>
+              </a:cxn>
+              <a:cxn ang="0">
+                <a:pos x="connsiteX3" y="connsiteY3"/>
+              </a:cxn>
+              <a:cxn ang="0">
+                <a:pos x="connsiteX4" y="connsiteY4"/>
+              </a:cxn>
+              <a:cxn ang="0">
+                <a:pos x="connsiteX5" y="connsiteY5"/>
+              </a:cxn>
+              <a:cxn ang="0">
+                <a:pos x="connsiteX6" y="connsiteY6"/>
+              </a:cxn>
+              <a:cxn ang="0">
+                <a:pos x="connsiteX7" y="connsiteY7"/>
+              </a:cxn>
+              <a:cxn ang="0">
+                <a:pos x="connsiteX8" y="connsiteY8"/>
+              </a:cxn>
+              <a:cxn ang="0">
+                <a:pos x="connsiteX9" y="connsiteY9"/>
+              </a:cxn>
+              <a:cxn ang="0">
+                <a:pos x="connsiteX10" y="connsiteY10"/>
+              </a:cxn>
+              <a:cxn ang="0">
+                <a:pos x="connsiteX11" y="connsiteY11"/>
+              </a:cxn>
+              <a:cxn ang="0">
+                <a:pos x="connsiteX12" y="connsiteY12"/>
+              </a:cxn>
+              <a:cxn ang="0">
+                <a:pos x="connsiteX13" y="connsiteY13"/>
+              </a:cxn>
+              <a:cxn ang="0">
+                <a:pos x="connsiteX14" y="connsiteY14"/>
+              </a:cxn>
+              <a:cxn ang="0">
+                <a:pos x="connsiteX15" y="connsiteY15"/>
+              </a:cxn>
+              <a:cxn ang="0">
+                <a:pos x="connsiteX16" y="connsiteY16"/>
+              </a:cxn>
+              <a:cxn ang="0">
+                <a:pos x="connsiteX17" y="connsiteY17"/>
+              </a:cxn>
+            </a:cxnLst>
+            <a:rect l="l" t="t" r="r" b="b"/>
+            <a:pathLst>
+              <a:path w="2189222" h="2588813" extrusionOk="0">
+                <a:moveTo>
+                  <a:pt x="0" y="0"/>
+                </a:moveTo>
+                <a:cubicBezTo>
+                  <a:pt x="252644" y="-21292"/>
+                  <a:pt x="273870" y="3218"/>
+                  <a:pt x="525413" y="0"/>
+                </a:cubicBezTo>
+                <a:cubicBezTo>
+                  <a:pt x="776956" y="-3218"/>
+                  <a:pt x="893936" y="50519"/>
+                  <a:pt x="1007042" y="0"/>
+                </a:cubicBezTo>
+                <a:cubicBezTo>
+                  <a:pt x="1120148" y="-50519"/>
+                  <a:pt x="1322691" y="70471"/>
+                  <a:pt x="1598132" y="0"/>
+                </a:cubicBezTo>
+                <a:cubicBezTo>
+                  <a:pt x="1873573" y="-70471"/>
+                  <a:pt x="1929190" y="50193"/>
+                  <a:pt x="2189222" y="0"/>
+                </a:cubicBezTo>
+                <a:cubicBezTo>
+                  <a:pt x="2189341" y="190988"/>
+                  <a:pt x="2172703" y="324265"/>
+                  <a:pt x="2189222" y="491874"/>
+                </a:cubicBezTo>
+                <a:cubicBezTo>
+                  <a:pt x="2205741" y="659483"/>
+                  <a:pt x="2148926" y="807583"/>
+                  <a:pt x="2189222" y="957861"/>
+                </a:cubicBezTo>
+                <a:cubicBezTo>
+                  <a:pt x="2229518" y="1108139"/>
+                  <a:pt x="2187814" y="1291747"/>
+                  <a:pt x="2189222" y="1475623"/>
+                </a:cubicBezTo>
+                <a:cubicBezTo>
+                  <a:pt x="2190630" y="1659499"/>
+                  <a:pt x="2155197" y="1813021"/>
+                  <a:pt x="2189222" y="1993386"/>
+                </a:cubicBezTo>
+                <a:cubicBezTo>
+                  <a:pt x="2223247" y="2173751"/>
+                  <a:pt x="2173324" y="2408297"/>
+                  <a:pt x="2189222" y="2588813"/>
+                </a:cubicBezTo>
+                <a:cubicBezTo>
+                  <a:pt x="2044203" y="2601068"/>
+                  <a:pt x="1884939" y="2543047"/>
+                  <a:pt x="1685701" y="2588813"/>
+                </a:cubicBezTo>
+                <a:cubicBezTo>
+                  <a:pt x="1486463" y="2634579"/>
+                  <a:pt x="1404976" y="2575439"/>
+                  <a:pt x="1138395" y="2588813"/>
+                </a:cubicBezTo>
+                <a:cubicBezTo>
+                  <a:pt x="871814" y="2602187"/>
+                  <a:pt x="824216" y="2568513"/>
+                  <a:pt x="612982" y="2588813"/>
+                </a:cubicBezTo>
+                <a:cubicBezTo>
+                  <a:pt x="401748" y="2609113"/>
+                  <a:pt x="221307" y="2553111"/>
+                  <a:pt x="0" y="2588813"/>
+                </a:cubicBezTo>
+                <a:cubicBezTo>
+                  <a:pt x="-52144" y="2394001"/>
+                  <a:pt x="2912" y="2154323"/>
+                  <a:pt x="0" y="2019274"/>
+                </a:cubicBezTo>
+                <a:cubicBezTo>
+                  <a:pt x="-2912" y="1884225"/>
+                  <a:pt x="35057" y="1721960"/>
+                  <a:pt x="0" y="1449735"/>
+                </a:cubicBezTo>
+                <a:cubicBezTo>
+                  <a:pt x="-35057" y="1177510"/>
+                  <a:pt x="3403" y="1150363"/>
+                  <a:pt x="0" y="931973"/>
+                </a:cubicBezTo>
+                <a:cubicBezTo>
+                  <a:pt x="-3403" y="713583"/>
+                  <a:pt x="52738" y="452826"/>
+                  <a:pt x="0" y="0"/>
+                </a:cubicBezTo>
+                <a:close/>
+              </a:path>
+            </a:pathLst>
+          </a:custGeom>
+          <a:noFill/>
+          <a:ln>
+            <a:solidFill>
+              <a:srgbClr val="7030A0"/>
+            </a:solidFill>
+            <a:extLst>
+              <a:ext uri="{C807C97D-BFC1-408E-A445-0C87EB9F89A2}">
+                <ask:lineSketchStyleProps xmlns:ask="http://schemas.microsoft.com/office/drawing/2018/sketchyshapes" sd="1219033472">
+                  <a:prstGeom prst="rect">
+                    <a:avLst/>
+                  </a:prstGeom>
+                  <ask:type>
+                    <ask:lineSketchScribble/>
+                  </ask:type>
+                </ask:lineSketchStyleProps>
+              </a:ext>
+            </a:extLst>
+          </a:ln>
+        </p:spPr>
+        <p:style>
+          <a:lnRef idx="2">
+            <a:schemeClr val="accent1">
+              <a:shade val="50000"/>
+            </a:schemeClr>
+          </a:lnRef>
+          <a:fillRef idx="1">
+            <a:schemeClr val="accent1"/>
+          </a:fillRef>
+          <a:effectRef idx="0">
+            <a:schemeClr val="accent1"/>
+          </a:effectRef>
+          <a:fontRef idx="minor">
+            <a:schemeClr val="lt1"/>
+          </a:fontRef>
+        </p:style>
+        <p:txBody>
+          <a:bodyPr rtlCol="0" anchor="b"/>
+          <a:lstStyle/>
+          <a:p>
+            <a:pPr algn="ctr"/>
+            <a:r>
+              <a:rPr lang="en-US" sz="1400" dirty="0">
+                <a:solidFill>
+                  <a:srgbClr val="0000FF"/>
+                </a:solidFill>
+              </a:rPr>
+              <a:t>Specific</a:t>
+            </a:r>
+          </a:p>
+        </p:txBody>
+      </p:sp>
+      <p:sp>
+        <p:nvSpPr>
+          <p:cNvPr id="18" name="Rectangle 17">
+            <a:extLst>
+              <a:ext uri="{FF2B5EF4-FFF2-40B4-BE49-F238E27FC236}">
+                <a16:creationId xmlns:a16="http://schemas.microsoft.com/office/drawing/2014/main" id="{05EB6486-7189-E947-AFFF-D050EAE23B4A}"/>
+              </a:ext>
+            </a:extLst>
+          </p:cNvPr>
+          <p:cNvSpPr/>
+          <p:nvPr/>
+        </p:nvSpPr>
+        <p:spPr>
+          <a:xfrm>
+            <a:off x="5625076" y="4794773"/>
+            <a:ext cx="1454551" cy="438587"/>
+          </a:xfrm>
+          <a:prstGeom prst="rect">
+            <a:avLst/>
+          </a:prstGeom>
+          <a:solidFill>
+            <a:srgbClr val="4040EA"/>
+          </a:solidFill>
+          <a:ln>
+            <a:noFill/>
+          </a:ln>
+          <a:effectLst>
+            <a:outerShdw blurRad="50800" dist="38100" dir="5400000" algn="t" rotWithShape="0">
+              <a:prstClr val="black">
+                <a:alpha val="40000"/>
+              </a:prstClr>
+            </a:outerShdw>
+          </a:effectLst>
+        </p:spPr>
+        <p:style>
+          <a:lnRef idx="2">
+            <a:schemeClr val="accent1">
+              <a:shade val="50000"/>
+            </a:schemeClr>
+          </a:lnRef>
+          <a:fillRef idx="1">
+            <a:schemeClr val="accent1"/>
+          </a:fillRef>
+          <a:effectRef idx="0">
+            <a:schemeClr val="accent1"/>
+          </a:effectRef>
+          <a:fontRef idx="minor">
+            <a:schemeClr val="lt1"/>
+          </a:fontRef>
+        </p:style>
+        <p:txBody>
+          <a:bodyPr rtlCol="0" anchor="ctr"/>
+          <a:lstStyle/>
+          <a:p>
+            <a:pPr algn="ctr"/>
+            <a:r>
+              <a:rPr lang="en-US" sz="1200" dirty="0"/>
+              <a:t>TriggerBinding</a:t>
+            </a:r>
+          </a:p>
+        </p:txBody>
+      </p:sp>
+      <p:sp>
+        <p:nvSpPr>
+          <p:cNvPr id="19" name="TextBox 18">
+            <a:extLst>
+              <a:ext uri="{FF2B5EF4-FFF2-40B4-BE49-F238E27FC236}">
+                <a16:creationId xmlns:a16="http://schemas.microsoft.com/office/drawing/2014/main" id="{D3C33CF5-0A49-564B-BFF2-6B85EC767044}"/>
+              </a:ext>
+            </a:extLst>
+          </p:cNvPr>
+          <p:cNvSpPr txBox="1"/>
+          <p:nvPr/>
+        </p:nvSpPr>
+        <p:spPr>
+          <a:xfrm>
+            <a:off x="5286527" y="4587368"/>
+            <a:ext cx="274434" cy="369332"/>
+          </a:xfrm>
+          <a:prstGeom prst="rect">
+            <a:avLst/>
+          </a:prstGeom>
+          <a:noFill/>
+        </p:spPr>
+        <p:txBody>
+          <a:bodyPr wrap="none" rtlCol="0">
+            <a:spAutoFit/>
+          </a:bodyPr>
+          <a:lstStyle/>
+          <a:p>
+            <a:r>
+              <a:rPr lang="en-US" dirty="0"/>
+              <a:t>*</a:t>
+            </a:r>
+          </a:p>
+        </p:txBody>
+      </p:sp>
+      <p:cxnSp>
+        <p:nvCxnSpPr>
+          <p:cNvPr id="20" name="Straight Arrow Connector 19">
+            <a:extLst>
+              <a:ext uri="{FF2B5EF4-FFF2-40B4-BE49-F238E27FC236}">
+                <a16:creationId xmlns:a16="http://schemas.microsoft.com/office/drawing/2014/main" id="{F58804E6-1CC9-C444-B14E-0AA5708C9206}"/>
+              </a:ext>
+            </a:extLst>
+          </p:cNvPr>
+          <p:cNvCxnSpPr>
+            <a:cxnSpLocks/>
+            <a:stCxn id="15" idx="3"/>
+            <a:endCxn id="18" idx="1"/>
+          </p:cNvCxnSpPr>
+          <p:nvPr/>
+        </p:nvCxnSpPr>
+        <p:spPr>
+          <a:xfrm flipV="1">
+            <a:off x="4929300" y="5014067"/>
+            <a:ext cx="695776" cy="1"/>
+          </a:xfrm>
+          <a:prstGeom prst="straightConnector1">
+            <a:avLst/>
+          </a:prstGeom>
+          <a:ln>
+            <a:tailEnd type="triangle"/>
+          </a:ln>
+        </p:spPr>
+        <p:style>
+          <a:lnRef idx="2">
+            <a:schemeClr val="dk1"/>
+          </a:lnRef>
+          <a:fillRef idx="0">
+            <a:schemeClr val="dk1"/>
+          </a:fillRef>
+          <a:effectRef idx="1">
+            <a:schemeClr val="dk1"/>
+          </a:effectRef>
+          <a:fontRef idx="minor">
+            <a:schemeClr val="tx1"/>
+          </a:fontRef>
+        </p:style>
+      </p:cxnSp>
+      <p:sp>
+        <p:nvSpPr>
+          <p:cNvPr id="21" name="TextBox 20">
+            <a:extLst>
+              <a:ext uri="{FF2B5EF4-FFF2-40B4-BE49-F238E27FC236}">
+                <a16:creationId xmlns:a16="http://schemas.microsoft.com/office/drawing/2014/main" id="{4F98148D-8CB0-8F4A-8720-17C81176DF08}"/>
+              </a:ext>
+            </a:extLst>
+          </p:cNvPr>
+          <p:cNvSpPr txBox="1"/>
+          <p:nvPr/>
+        </p:nvSpPr>
+        <p:spPr>
+          <a:xfrm>
+            <a:off x="4909318" y="5006883"/>
+            <a:ext cx="696024" cy="276999"/>
+          </a:xfrm>
+          <a:prstGeom prst="rect">
+            <a:avLst/>
+          </a:prstGeom>
+          <a:noFill/>
+        </p:spPr>
+        <p:txBody>
+          <a:bodyPr wrap="none" rtlCol="0">
+            <a:spAutoFit/>
+          </a:bodyPr>
+          <a:lstStyle/>
+          <a:p>
+            <a:r>
+              <a:rPr lang="en-US" sz="1200" dirty="0"/>
+              <a:t>triggers</a:t>
+            </a:r>
+          </a:p>
+        </p:txBody>
+      </p:sp>
+      <p:sp>
+        <p:nvSpPr>
+          <p:cNvPr id="22" name="TextBox 21">
+            <a:extLst>
+              <a:ext uri="{FF2B5EF4-FFF2-40B4-BE49-F238E27FC236}">
+                <a16:creationId xmlns:a16="http://schemas.microsoft.com/office/drawing/2014/main" id="{AD1CA739-6249-B44F-92BC-56C8EA9CA156}"/>
+              </a:ext>
+            </a:extLst>
+          </p:cNvPr>
+          <p:cNvSpPr txBox="1"/>
+          <p:nvPr/>
+        </p:nvSpPr>
+        <p:spPr>
+          <a:xfrm>
+            <a:off x="5063068" y="5490710"/>
+            <a:ext cx="995785" cy="276999"/>
+          </a:xfrm>
+          <a:prstGeom prst="rect">
+            <a:avLst/>
+          </a:prstGeom>
+          <a:solidFill>
+            <a:schemeClr val="bg1"/>
+          </a:solidFill>
+        </p:spPr>
+        <p:txBody>
+          <a:bodyPr wrap="none" rtlCol="0">
+            <a:spAutoFit/>
+          </a:bodyPr>
+          <a:lstStyle/>
+          <a:p>
+            <a:r>
+              <a:rPr lang="en-US" sz="1200" dirty="0"/>
+              <a:t>Interceptors</a:t>
+            </a:r>
+          </a:p>
+        </p:txBody>
+      </p:sp>
+      <p:sp>
+        <p:nvSpPr>
+          <p:cNvPr id="23" name="Rectangle 22">
+            <a:extLst>
+              <a:ext uri="{FF2B5EF4-FFF2-40B4-BE49-F238E27FC236}">
+                <a16:creationId xmlns:a16="http://schemas.microsoft.com/office/drawing/2014/main" id="{37637ED8-250D-3246-8A76-A24C71A2615E}"/>
+              </a:ext>
+            </a:extLst>
+          </p:cNvPr>
+          <p:cNvSpPr/>
+          <p:nvPr/>
+        </p:nvSpPr>
+        <p:spPr>
+          <a:xfrm>
+            <a:off x="5625076" y="5879545"/>
+            <a:ext cx="1454551" cy="438587"/>
+          </a:xfrm>
+          <a:prstGeom prst="rect">
+            <a:avLst/>
+          </a:prstGeom>
+          <a:solidFill>
+            <a:srgbClr val="4040EA"/>
+          </a:solidFill>
+          <a:ln>
+            <a:noFill/>
+          </a:ln>
+          <a:effectLst>
+            <a:outerShdw blurRad="50800" dist="38100" dir="5400000" algn="t" rotWithShape="0">
+              <a:prstClr val="black">
+                <a:alpha val="40000"/>
+              </a:prstClr>
+            </a:outerShdw>
+          </a:effectLst>
+        </p:spPr>
+        <p:style>
+          <a:lnRef idx="2">
+            <a:schemeClr val="accent1">
+              <a:shade val="50000"/>
+            </a:schemeClr>
+          </a:lnRef>
+          <a:fillRef idx="1">
+            <a:schemeClr val="accent1"/>
+          </a:fillRef>
+          <a:effectRef idx="0">
+            <a:schemeClr val="accent1"/>
+          </a:effectRef>
+          <a:fontRef idx="minor">
+            <a:schemeClr val="lt1"/>
+          </a:fontRef>
+        </p:style>
+        <p:txBody>
+          <a:bodyPr rtlCol="0" anchor="ctr"/>
+          <a:lstStyle/>
+          <a:p>
+            <a:pPr algn="ctr"/>
+            <a:r>
+              <a:rPr lang="en-US" sz="1200" dirty="0">
+                <a:solidFill>
+                  <a:schemeClr val="bg1"/>
+                </a:solidFill>
+              </a:rPr>
+              <a:t>Secrets</a:t>
+            </a:r>
+          </a:p>
+        </p:txBody>
+      </p:sp>
+      <p:sp>
+        <p:nvSpPr>
+          <p:cNvPr id="24" name="TextBox 23">
+            <a:extLst>
+              <a:ext uri="{FF2B5EF4-FFF2-40B4-BE49-F238E27FC236}">
+                <a16:creationId xmlns:a16="http://schemas.microsoft.com/office/drawing/2014/main" id="{59075082-7596-9E4F-945F-9667553F4419}"/>
+              </a:ext>
+            </a:extLst>
+          </p:cNvPr>
+          <p:cNvSpPr txBox="1"/>
+          <p:nvPr/>
+        </p:nvSpPr>
+        <p:spPr>
+          <a:xfrm>
+            <a:off x="5560961" y="6318617"/>
+            <a:ext cx="1589346" cy="276999"/>
+          </a:xfrm>
+          <a:prstGeom prst="rect">
+            <a:avLst/>
+          </a:prstGeom>
+          <a:noFill/>
+        </p:spPr>
+        <p:txBody>
+          <a:bodyPr wrap="none" rtlCol="0">
+            <a:spAutoFit/>
+          </a:bodyPr>
+          <a:lstStyle/>
+          <a:p>
+            <a:r>
+              <a:rPr lang="en-US" sz="1200" dirty="0"/>
+              <a:t>Webhook-secret-key</a:t>
+            </a:r>
+          </a:p>
+        </p:txBody>
+      </p:sp>
+      <p:sp>
+        <p:nvSpPr>
+          <p:cNvPr id="25" name="TextBox 24">
+            <a:extLst>
+              <a:ext uri="{FF2B5EF4-FFF2-40B4-BE49-F238E27FC236}">
+                <a16:creationId xmlns:a16="http://schemas.microsoft.com/office/drawing/2014/main" id="{0DFBCD9F-EF99-F24B-A3B1-FF35FDA11183}"/>
+              </a:ext>
+            </a:extLst>
+          </p:cNvPr>
+          <p:cNvSpPr txBox="1"/>
+          <p:nvPr/>
+        </p:nvSpPr>
+        <p:spPr>
+          <a:xfrm>
+            <a:off x="7418698" y="4587368"/>
+            <a:ext cx="3074881" cy="276999"/>
+          </a:xfrm>
+          <a:prstGeom prst="rect">
+            <a:avLst/>
+          </a:prstGeom>
+          <a:noFill/>
+          <a:ln w="3175">
+            <a:solidFill>
+              <a:schemeClr val="dk1"/>
+            </a:solidFill>
+          </a:ln>
+        </p:spPr>
+        <p:txBody>
+          <a:bodyPr wrap="none" rtlCol="0">
+            <a:spAutoFit/>
+          </a:bodyPr>
+          <a:lstStyle/>
+          <a:p>
+            <a:r>
+              <a:rPr lang="en-US" sz="1200" dirty="0"/>
+              <a:t>imageRepository name for the app to build</a:t>
+            </a:r>
+          </a:p>
+        </p:txBody>
+      </p:sp>
+      <p:sp>
+        <p:nvSpPr>
+          <p:cNvPr id="26" name="TextBox 25">
+            <a:extLst>
+              <a:ext uri="{FF2B5EF4-FFF2-40B4-BE49-F238E27FC236}">
+                <a16:creationId xmlns:a16="http://schemas.microsoft.com/office/drawing/2014/main" id="{B7E5DA4A-1B59-604B-ADB0-536F5F9A8733}"/>
+              </a:ext>
+            </a:extLst>
+          </p:cNvPr>
+          <p:cNvSpPr txBox="1"/>
+          <p:nvPr/>
+        </p:nvSpPr>
+        <p:spPr>
+          <a:xfrm>
+            <a:off x="7418698" y="5135616"/>
+            <a:ext cx="4146135" cy="461665"/>
+          </a:xfrm>
+          <a:prstGeom prst="rect">
+            <a:avLst/>
+          </a:prstGeom>
+          <a:noFill/>
+          <a:ln w="3175">
+            <a:solidFill>
+              <a:schemeClr val="dk1"/>
+            </a:solidFill>
+          </a:ln>
+        </p:spPr>
+        <p:txBody>
+          <a:bodyPr wrap="none" rtlCol="0">
+            <a:spAutoFit/>
+          </a:bodyPr>
+          <a:lstStyle/>
+          <a:p>
+            <a:r>
+              <a:rPr lang="en-US" sz="1200" dirty="0"/>
+              <a:t>Map parameters from HTTP request message sent by git </a:t>
+            </a:r>
+          </a:p>
+          <a:p>
+            <a:r>
+              <a:rPr lang="en-US" sz="1200" dirty="0"/>
+              <a:t>so, they can be used in pipeline run</a:t>
+            </a:r>
+          </a:p>
+        </p:txBody>
+      </p:sp>
+      <p:cxnSp>
+        <p:nvCxnSpPr>
+          <p:cNvPr id="28" name="Straight Arrow Connector 27">
+            <a:extLst>
+              <a:ext uri="{FF2B5EF4-FFF2-40B4-BE49-F238E27FC236}">
+                <a16:creationId xmlns:a16="http://schemas.microsoft.com/office/drawing/2014/main" id="{B908835D-4F62-414A-A099-01A0BA1B3B64}"/>
+              </a:ext>
+            </a:extLst>
+          </p:cNvPr>
+          <p:cNvCxnSpPr>
+            <a:cxnSpLocks/>
+            <a:endCxn id="25" idx="1"/>
+          </p:cNvCxnSpPr>
+          <p:nvPr/>
+        </p:nvCxnSpPr>
+        <p:spPr>
+          <a:xfrm>
+            <a:off x="7116419" y="4721877"/>
+            <a:ext cx="302279" cy="3991"/>
+          </a:xfrm>
+          <a:prstGeom prst="straightConnector1">
+            <a:avLst/>
+          </a:prstGeom>
+          <a:ln>
+            <a:tailEnd type="triangle"/>
+          </a:ln>
+        </p:spPr>
+        <p:style>
+          <a:lnRef idx="2">
+            <a:schemeClr val="dk1"/>
+          </a:lnRef>
+          <a:fillRef idx="0">
+            <a:schemeClr val="dk1"/>
+          </a:fillRef>
+          <a:effectRef idx="1">
+            <a:schemeClr val="dk1"/>
+          </a:effectRef>
+          <a:fontRef idx="minor">
+            <a:schemeClr val="tx1"/>
+          </a:fontRef>
+        </p:style>
+      </p:cxnSp>
+      <p:cxnSp>
+        <p:nvCxnSpPr>
+          <p:cNvPr id="30" name="Straight Arrow Connector 29">
+            <a:extLst>
+              <a:ext uri="{FF2B5EF4-FFF2-40B4-BE49-F238E27FC236}">
+                <a16:creationId xmlns:a16="http://schemas.microsoft.com/office/drawing/2014/main" id="{82517F6D-5F1D-2E4C-AE75-547B2BF8E95F}"/>
+              </a:ext>
+            </a:extLst>
+          </p:cNvPr>
+          <p:cNvCxnSpPr>
+            <a:cxnSpLocks/>
+          </p:cNvCxnSpPr>
+          <p:nvPr/>
+        </p:nvCxnSpPr>
+        <p:spPr>
+          <a:xfrm>
+            <a:off x="7116419" y="5283882"/>
+            <a:ext cx="302279" cy="3991"/>
+          </a:xfrm>
+          <a:prstGeom prst="straightConnector1">
+            <a:avLst/>
+          </a:prstGeom>
+          <a:ln>
+            <a:tailEnd type="triangle"/>
+          </a:ln>
+        </p:spPr>
+        <p:style>
+          <a:lnRef idx="2">
+            <a:schemeClr val="dk1"/>
+          </a:lnRef>
+          <a:fillRef idx="0">
+            <a:schemeClr val="dk1"/>
+          </a:fillRef>
+          <a:effectRef idx="1">
+            <a:schemeClr val="dk1"/>
+          </a:effectRef>
+          <a:fontRef idx="minor">
+            <a:schemeClr val="tx1"/>
+          </a:fontRef>
+        </p:style>
+      </p:cxnSp>
+      <p:sp>
+        <p:nvSpPr>
+          <p:cNvPr id="34" name="Rectangle 33">
+            <a:extLst>
+              <a:ext uri="{FF2B5EF4-FFF2-40B4-BE49-F238E27FC236}">
+                <a16:creationId xmlns:a16="http://schemas.microsoft.com/office/drawing/2014/main" id="{2FE5287B-AF31-154C-BAE6-955F286437E8}"/>
+              </a:ext>
+            </a:extLst>
+          </p:cNvPr>
+          <p:cNvSpPr/>
+          <p:nvPr/>
+        </p:nvSpPr>
+        <p:spPr>
+          <a:xfrm>
+            <a:off x="5605342" y="3868381"/>
+            <a:ext cx="1454551" cy="438587"/>
+          </a:xfrm>
+          <a:prstGeom prst="rect">
+            <a:avLst/>
+          </a:prstGeom>
+          <a:solidFill>
+            <a:srgbClr val="4040EA"/>
+          </a:solidFill>
+          <a:ln>
+            <a:noFill/>
+          </a:ln>
+          <a:effectLst>
+            <a:outerShdw blurRad="50800" dist="38100" dir="5400000" algn="t" rotWithShape="0">
+              <a:prstClr val="black">
+                <a:alpha val="40000"/>
+              </a:prstClr>
+            </a:outerShdw>
+          </a:effectLst>
+        </p:spPr>
+        <p:style>
+          <a:lnRef idx="2">
+            <a:schemeClr val="accent1">
+              <a:shade val="50000"/>
+            </a:schemeClr>
+          </a:lnRef>
+          <a:fillRef idx="1">
+            <a:schemeClr val="accent1"/>
+          </a:fillRef>
+          <a:effectRef idx="0">
+            <a:schemeClr val="accent1"/>
+          </a:effectRef>
+          <a:fontRef idx="minor">
+            <a:schemeClr val="lt1"/>
+          </a:fontRef>
+        </p:style>
+        <p:txBody>
+          <a:bodyPr rtlCol="0" anchor="ctr"/>
+          <a:lstStyle/>
+          <a:p>
+            <a:pPr algn="ctr"/>
+            <a:r>
+              <a:rPr lang="en-US" sz="1200" dirty="0"/>
+              <a:t>TriggerTemplate</a:t>
+            </a:r>
+          </a:p>
+        </p:txBody>
+      </p:sp>
+      <p:cxnSp>
+        <p:nvCxnSpPr>
+          <p:cNvPr id="36" name="Straight Arrow Connector 35">
+            <a:extLst>
+              <a:ext uri="{FF2B5EF4-FFF2-40B4-BE49-F238E27FC236}">
+                <a16:creationId xmlns:a16="http://schemas.microsoft.com/office/drawing/2014/main" id="{2B6E653B-3AAF-CD43-B473-0547C1F36BF6}"/>
+              </a:ext>
+            </a:extLst>
+          </p:cNvPr>
+          <p:cNvCxnSpPr>
+            <a:cxnSpLocks/>
+            <a:endCxn id="34" idx="1"/>
+          </p:cNvCxnSpPr>
+          <p:nvPr/>
+        </p:nvCxnSpPr>
+        <p:spPr>
+          <a:xfrm flipV="1">
+            <a:off x="4392754" y="4087675"/>
+            <a:ext cx="1212588" cy="656578"/>
+          </a:xfrm>
+          <a:prstGeom prst="straightConnector1">
+            <a:avLst/>
+          </a:prstGeom>
+          <a:ln>
+            <a:tailEnd type="triangle"/>
+          </a:ln>
+        </p:spPr>
+        <p:style>
+          <a:lnRef idx="2">
+            <a:schemeClr val="dk1"/>
+          </a:lnRef>
+          <a:fillRef idx="0">
+            <a:schemeClr val="dk1"/>
+          </a:fillRef>
+          <a:effectRef idx="1">
+            <a:schemeClr val="dk1"/>
+          </a:effectRef>
+          <a:fontRef idx="minor">
+            <a:schemeClr val="tx1"/>
+          </a:fontRef>
+        </p:style>
+      </p:cxnSp>
+      <p:sp>
+        <p:nvSpPr>
+          <p:cNvPr id="39" name="TextBox 38">
+            <a:extLst>
+              <a:ext uri="{FF2B5EF4-FFF2-40B4-BE49-F238E27FC236}">
+                <a16:creationId xmlns:a16="http://schemas.microsoft.com/office/drawing/2014/main" id="{9BB1C018-F741-8C4F-9D72-F9684DC7FCDE}"/>
+              </a:ext>
+            </a:extLst>
+          </p:cNvPr>
+          <p:cNvSpPr txBox="1"/>
+          <p:nvPr/>
+        </p:nvSpPr>
+        <p:spPr>
+          <a:xfrm>
+            <a:off x="4372064" y="4233054"/>
+            <a:ext cx="772969" cy="276999"/>
+          </a:xfrm>
+          <a:prstGeom prst="rect">
+            <a:avLst/>
+          </a:prstGeom>
+          <a:solidFill>
+            <a:schemeClr val="bg1"/>
+          </a:solidFill>
+        </p:spPr>
+        <p:txBody>
+          <a:bodyPr wrap="none" rtlCol="0">
+            <a:spAutoFit/>
+          </a:bodyPr>
+          <a:lstStyle/>
+          <a:p>
+            <a:r>
+              <a:rPr lang="en-US" sz="1200" dirty="0"/>
+              <a:t>template</a:t>
+            </a:r>
+          </a:p>
+        </p:txBody>
+      </p:sp>
+      <p:cxnSp>
+        <p:nvCxnSpPr>
+          <p:cNvPr id="43" name="Curved Connector 42">
+            <a:extLst>
+              <a:ext uri="{FF2B5EF4-FFF2-40B4-BE49-F238E27FC236}">
+                <a16:creationId xmlns:a16="http://schemas.microsoft.com/office/drawing/2014/main" id="{92218145-E7EE-2941-B3CC-B5550CF248C0}"/>
+              </a:ext>
+            </a:extLst>
+          </p:cNvPr>
+          <p:cNvCxnSpPr>
+            <a:stCxn id="34" idx="0"/>
+          </p:cNvCxnSpPr>
+          <p:nvPr/>
+        </p:nvCxnSpPr>
+        <p:spPr>
+          <a:xfrm rot="16200000" flipV="1">
+            <a:off x="4186093" y="1721856"/>
+            <a:ext cx="2162456" cy="2130594"/>
+          </a:xfrm>
+          <a:prstGeom prst="curvedConnector3">
+            <a:avLst/>
+          </a:prstGeom>
+          <a:ln w="12700">
+            <a:solidFill>
+              <a:schemeClr val="tx1">
+                <a:lumMod val="65000"/>
+                <a:lumOff val="35000"/>
+              </a:schemeClr>
+            </a:solidFill>
+            <a:tailEnd type="triangle"/>
+          </a:ln>
+        </p:spPr>
+        <p:style>
+          <a:lnRef idx="1">
+            <a:schemeClr val="accent1"/>
+          </a:lnRef>
+          <a:fillRef idx="0">
+            <a:schemeClr val="accent1"/>
+          </a:fillRef>
+          <a:effectRef idx="0">
+            <a:schemeClr val="accent1"/>
+          </a:effectRef>
+          <a:fontRef idx="minor">
+            <a:schemeClr val="tx1"/>
+          </a:fontRef>
+        </p:style>
+      </p:cxnSp>
+      <p:sp>
+        <p:nvSpPr>
+          <p:cNvPr id="44" name="Rectangle 43">
+            <a:extLst>
+              <a:ext uri="{FF2B5EF4-FFF2-40B4-BE49-F238E27FC236}">
+                <a16:creationId xmlns:a16="http://schemas.microsoft.com/office/drawing/2014/main" id="{7DB03802-161A-4542-A753-B81F456C49BB}"/>
+              </a:ext>
+            </a:extLst>
+          </p:cNvPr>
+          <p:cNvSpPr/>
+          <p:nvPr/>
+        </p:nvSpPr>
+        <p:spPr>
+          <a:xfrm>
+            <a:off x="2481395" y="5587222"/>
+            <a:ext cx="1454551" cy="438587"/>
+          </a:xfrm>
+          <a:prstGeom prst="rect">
+            <a:avLst/>
+          </a:prstGeom>
+          <a:solidFill>
+            <a:srgbClr val="4040EA"/>
+          </a:solidFill>
+          <a:ln>
+            <a:noFill/>
+          </a:ln>
+          <a:effectLst>
+            <a:outerShdw blurRad="50800" dist="38100" dir="5400000" algn="t" rotWithShape="0">
+              <a:prstClr val="black">
+                <a:alpha val="40000"/>
+              </a:prstClr>
+            </a:outerShdw>
+          </a:effectLst>
+        </p:spPr>
+        <p:style>
+          <a:lnRef idx="2">
+            <a:schemeClr val="accent1">
+              <a:shade val="50000"/>
+            </a:schemeClr>
+          </a:lnRef>
+          <a:fillRef idx="1">
+            <a:schemeClr val="accent1"/>
+          </a:fillRef>
+          <a:effectRef idx="0">
+            <a:schemeClr val="accent1"/>
+          </a:effectRef>
+          <a:fontRef idx="minor">
+            <a:schemeClr val="lt1"/>
+          </a:fontRef>
+        </p:style>
+        <p:txBody>
+          <a:bodyPr rtlCol="0" anchor="ctr"/>
+          <a:lstStyle/>
+          <a:p>
+            <a:pPr algn="ctr"/>
+            <a:r>
+              <a:rPr lang="en-US" sz="1200" dirty="0">
+                <a:solidFill>
+                  <a:schemeClr val="bg1"/>
+                </a:solidFill>
+              </a:rPr>
+              <a:t>Route</a:t>
+            </a:r>
+          </a:p>
+        </p:txBody>
+      </p:sp>
+      <p:cxnSp>
+        <p:nvCxnSpPr>
+          <p:cNvPr id="45" name="Straight Arrow Connector 44">
+            <a:extLst>
+              <a:ext uri="{FF2B5EF4-FFF2-40B4-BE49-F238E27FC236}">
+                <a16:creationId xmlns:a16="http://schemas.microsoft.com/office/drawing/2014/main" id="{BFE0C9A5-24E2-8546-ADA6-7A7630ECB5C3}"/>
+              </a:ext>
+            </a:extLst>
+          </p:cNvPr>
+          <p:cNvCxnSpPr>
+            <a:cxnSpLocks/>
+            <a:stCxn id="44" idx="0"/>
+          </p:cNvCxnSpPr>
+          <p:nvPr/>
+        </p:nvCxnSpPr>
+        <p:spPr>
+          <a:xfrm flipV="1">
+            <a:off x="3208671" y="5274115"/>
+            <a:ext cx="578309" cy="313107"/>
+          </a:xfrm>
+          <a:prstGeom prst="straightConnector1">
+            <a:avLst/>
+          </a:prstGeom>
+          <a:ln>
+            <a:tailEnd type="triangle"/>
+          </a:ln>
+        </p:spPr>
+        <p:style>
+          <a:lnRef idx="2">
+            <a:schemeClr val="dk1"/>
+          </a:lnRef>
+          <a:fillRef idx="0">
+            <a:schemeClr val="dk1"/>
+          </a:fillRef>
+          <a:effectRef idx="1">
+            <a:schemeClr val="dk1"/>
+          </a:effectRef>
+          <a:fontRef idx="minor">
+            <a:schemeClr val="tx1"/>
+          </a:fontRef>
+        </p:style>
+      </p:cxnSp>
+      <p:pic>
+        <p:nvPicPr>
+          <p:cNvPr id="48" name="Picture 2" descr="Github Logo - Free social media icons">
+            <a:extLst>
+              <a:ext uri="{FF2B5EF4-FFF2-40B4-BE49-F238E27FC236}">
+                <a16:creationId xmlns:a16="http://schemas.microsoft.com/office/drawing/2014/main" id="{C0219134-3DD6-014D-81CD-1F8985D50086}"/>
+              </a:ext>
+            </a:extLst>
+          </p:cNvPr>
+          <p:cNvPicPr>
+            <a:picLocks noChangeAspect="1" noChangeArrowheads="1"/>
+          </p:cNvPicPr>
+          <p:nvPr/>
+        </p:nvPicPr>
+        <p:blipFill>
+          <a:blip r:embed="rId2">
+            <a:extLst>
+              <a:ext uri="{28A0092B-C50C-407E-A947-70E740481C1C}">
+                <a14:useLocalDpi xmlns:a14="http://schemas.microsoft.com/office/drawing/2010/main" val="0"/>
+              </a:ext>
+            </a:extLst>
+          </a:blip>
+          <a:srcRect/>
+          <a:stretch>
+            <a:fillRect/>
+          </a:stretch>
+        </p:blipFill>
+        <p:spPr bwMode="auto">
+          <a:xfrm>
+            <a:off x="281343" y="4522804"/>
+            <a:ext cx="356325" cy="356325"/>
+          </a:xfrm>
+          <a:prstGeom prst="rect">
+            <a:avLst/>
+          </a:prstGeom>
+          <a:noFill/>
+          <a:extLst>
+            <a:ext uri="{909E8E84-426E-40DD-AFC4-6F175D3DCCD1}">
+              <a14:hiddenFill xmlns:a14="http://schemas.microsoft.com/office/drawing/2010/main">
+                <a:solidFill>
+                  <a:srgbClr val="FFFFFF"/>
+                </a:solidFill>
+              </a14:hiddenFill>
+            </a:ext>
+          </a:extLst>
+        </p:spPr>
+      </p:pic>
+      <p:sp>
+        <p:nvSpPr>
+          <p:cNvPr id="49" name="Rectangle 48">
+            <a:extLst>
+              <a:ext uri="{FF2B5EF4-FFF2-40B4-BE49-F238E27FC236}">
+                <a16:creationId xmlns:a16="http://schemas.microsoft.com/office/drawing/2014/main" id="{10FE490E-EADE-7945-A488-9A25C44E8B1F}"/>
+              </a:ext>
+            </a:extLst>
+          </p:cNvPr>
+          <p:cNvSpPr/>
+          <p:nvPr/>
+        </p:nvSpPr>
+        <p:spPr>
+          <a:xfrm>
+            <a:off x="172172" y="4118050"/>
+            <a:ext cx="2185903" cy="1165832"/>
+          </a:xfrm>
+          <a:prstGeom prst="rect">
+            <a:avLst/>
+          </a:prstGeom>
+          <a:noFill/>
+          <a:ln>
+            <a:solidFill>
+              <a:srgbClr val="7030A0"/>
+            </a:solidFill>
+          </a:ln>
+        </p:spPr>
+        <p:style>
+          <a:lnRef idx="2">
+            <a:schemeClr val="accent1">
+              <a:shade val="50000"/>
+            </a:schemeClr>
+          </a:lnRef>
+          <a:fillRef idx="1">
+            <a:schemeClr val="accent1"/>
+          </a:fillRef>
+          <a:effectRef idx="0">
+            <a:schemeClr val="accent1"/>
+          </a:effectRef>
+          <a:fontRef idx="minor">
+            <a:schemeClr val="lt1"/>
+          </a:fontRef>
+        </p:style>
+        <p:txBody>
+          <a:bodyPr rtlCol="0" anchor="b"/>
+          <a:lstStyle/>
+          <a:p>
+            <a:pPr algn="ctr"/>
+            <a:r>
+              <a:rPr lang="en-US" sz="1400" dirty="0">
+                <a:solidFill>
+                  <a:srgbClr val="0000FF"/>
+                </a:solidFill>
+              </a:rPr>
+              <a:t>gtihub</a:t>
+            </a:r>
+          </a:p>
+        </p:txBody>
+      </p:sp>
+      <p:sp>
+        <p:nvSpPr>
+          <p:cNvPr id="50" name="Rectangle 49">
+            <a:extLst>
+              <a:ext uri="{FF2B5EF4-FFF2-40B4-BE49-F238E27FC236}">
+                <a16:creationId xmlns:a16="http://schemas.microsoft.com/office/drawing/2014/main" id="{5C6B41B1-F561-FE45-8BD3-B675E70CA6CA}"/>
+              </a:ext>
+            </a:extLst>
+          </p:cNvPr>
+          <p:cNvSpPr/>
+          <p:nvPr/>
+        </p:nvSpPr>
+        <p:spPr>
+          <a:xfrm>
+            <a:off x="841272" y="4366687"/>
+            <a:ext cx="1202824" cy="312233"/>
+          </a:xfrm>
+          <a:prstGeom prst="rect">
+            <a:avLst/>
+          </a:prstGeom>
+          <a:solidFill>
+            <a:schemeClr val="accent1">
+              <a:lumMod val="60000"/>
+              <a:lumOff val="40000"/>
+            </a:schemeClr>
+          </a:solidFill>
+          <a:ln>
+            <a:noFill/>
+          </a:ln>
+          <a:effectLst>
+            <a:outerShdw blurRad="50800" dist="38100" dir="5400000" algn="t" rotWithShape="0">
+              <a:prstClr val="black">
+                <a:alpha val="40000"/>
+              </a:prstClr>
+            </a:outerShdw>
+          </a:effectLst>
+        </p:spPr>
+        <p:style>
+          <a:lnRef idx="2">
+            <a:schemeClr val="accent1">
+              <a:shade val="50000"/>
+            </a:schemeClr>
+          </a:lnRef>
+          <a:fillRef idx="1">
+            <a:schemeClr val="accent1"/>
+          </a:fillRef>
+          <a:effectRef idx="0">
+            <a:schemeClr val="accent1"/>
+          </a:effectRef>
+          <a:fontRef idx="minor">
+            <a:schemeClr val="lt1"/>
+          </a:fontRef>
+        </p:style>
+        <p:txBody>
+          <a:bodyPr rtlCol="0" anchor="t"/>
+          <a:lstStyle/>
+          <a:p>
+            <a:pPr marL="0" marR="0" indent="0" algn="l" defTabSz="685800" rtl="0" eaLnBrk="1" fontAlgn="auto" latinLnBrk="0" hangingPunct="1">
+              <a:lnSpc>
+                <a:spcPct val="100000"/>
+              </a:lnSpc>
+              <a:spcBef>
+                <a:spcPts val="0"/>
+              </a:spcBef>
+              <a:spcAft>
+                <a:spcPts val="0"/>
+              </a:spcAft>
+              <a:buClrTx/>
+              <a:buSzTx/>
+              <a:buFontTx/>
+              <a:buNone/>
+              <a:tabLst/>
+            </a:pPr>
+            <a:r>
+              <a:rPr kumimoji="0" lang="en-US" sz="1000" b="0" i="0" u="none" strike="noStrike" kern="1200" cap="none" spc="0" normalizeH="0" baseline="0" noProof="0" dirty="0">
+                <a:ln>
+                  <a:noFill/>
+                </a:ln>
+                <a:solidFill>
+                  <a:prstClr val="white"/>
+                </a:solidFill>
+                <a:effectLst/>
+                <a:uLnTx/>
+                <a:uFillTx/>
+                <a:latin typeface="Arial"/>
+                <a:ea typeface="+mn-ea"/>
+                <a:cs typeface="+mn-cs"/>
+              </a:rPr>
+              <a:t>app service</a:t>
+            </a:r>
+          </a:p>
+        </p:txBody>
+      </p:sp>
+      <p:sp>
+        <p:nvSpPr>
+          <p:cNvPr id="51" name="Rectangle 50">
+            <a:extLst>
+              <a:ext uri="{FF2B5EF4-FFF2-40B4-BE49-F238E27FC236}">
+                <a16:creationId xmlns:a16="http://schemas.microsoft.com/office/drawing/2014/main" id="{047BAB92-0BAF-3F42-A410-B3E5E47DCC7B}"/>
+              </a:ext>
+            </a:extLst>
+          </p:cNvPr>
+          <p:cNvSpPr/>
+          <p:nvPr/>
+        </p:nvSpPr>
+        <p:spPr>
+          <a:xfrm>
+            <a:off x="402979" y="5274115"/>
+            <a:ext cx="989833" cy="276999"/>
+          </a:xfrm>
+          <a:prstGeom prst="rect">
+            <a:avLst/>
+          </a:prstGeom>
+          <a:solidFill>
+            <a:srgbClr val="4040EA"/>
+          </a:solidFill>
+          <a:ln>
+            <a:noFill/>
+          </a:ln>
+          <a:effectLst>
+            <a:outerShdw blurRad="50800" dist="38100" dir="5400000" algn="t" rotWithShape="0">
+              <a:prstClr val="black">
+                <a:alpha val="40000"/>
+              </a:prstClr>
+            </a:outerShdw>
+          </a:effectLst>
+        </p:spPr>
+        <p:style>
+          <a:lnRef idx="2">
+            <a:schemeClr val="accent1">
+              <a:shade val="50000"/>
+            </a:schemeClr>
+          </a:lnRef>
+          <a:fillRef idx="1">
+            <a:schemeClr val="accent1"/>
+          </a:fillRef>
+          <a:effectRef idx="0">
+            <a:schemeClr val="accent1"/>
+          </a:effectRef>
+          <a:fontRef idx="minor">
+            <a:schemeClr val="lt1"/>
+          </a:fontRef>
+        </p:style>
+        <p:txBody>
+          <a:bodyPr rtlCol="0" anchor="ctr"/>
+          <a:lstStyle/>
+          <a:p>
+            <a:pPr algn="ctr"/>
+            <a:r>
+              <a:rPr lang="en-US" sz="1200" dirty="0">
+                <a:solidFill>
+                  <a:schemeClr val="bg1"/>
+                </a:solidFill>
+              </a:rPr>
+              <a:t>webhook</a:t>
+            </a:r>
+          </a:p>
+        </p:txBody>
+      </p:sp>
+      <p:cxnSp>
+        <p:nvCxnSpPr>
+          <p:cNvPr id="52" name="Curved Connector 51">
+            <a:extLst>
+              <a:ext uri="{FF2B5EF4-FFF2-40B4-BE49-F238E27FC236}">
+                <a16:creationId xmlns:a16="http://schemas.microsoft.com/office/drawing/2014/main" id="{FD6C006A-3428-8343-9295-3A79D1EAC173}"/>
+              </a:ext>
+            </a:extLst>
+          </p:cNvPr>
+          <p:cNvCxnSpPr>
+            <a:cxnSpLocks/>
+            <a:stCxn id="49" idx="2"/>
+            <a:endCxn id="44" idx="1"/>
+          </p:cNvCxnSpPr>
+          <p:nvPr/>
+        </p:nvCxnSpPr>
+        <p:spPr>
+          <a:xfrm rot="16200000" flipH="1">
+            <a:off x="1611942" y="4937063"/>
+            <a:ext cx="522634" cy="1216271"/>
+          </a:xfrm>
+          <a:prstGeom prst="curvedConnector2">
+            <a:avLst/>
+          </a:prstGeom>
+          <a:ln w="12700">
+            <a:solidFill>
+              <a:schemeClr val="tx1">
+                <a:lumMod val="65000"/>
+                <a:lumOff val="35000"/>
+              </a:schemeClr>
+            </a:solidFill>
+            <a:tailEnd type="triangle"/>
+          </a:ln>
+        </p:spPr>
+        <p:style>
+          <a:lnRef idx="1">
+            <a:schemeClr val="accent1"/>
+          </a:lnRef>
+          <a:fillRef idx="0">
+            <a:schemeClr val="accent1"/>
+          </a:fillRef>
+          <a:effectRef idx="0">
+            <a:schemeClr val="accent1"/>
+          </a:effectRef>
+          <a:fontRef idx="minor">
+            <a:schemeClr val="tx1"/>
+          </a:fontRef>
+        </p:style>
+      </p:cxnSp>
     </p:spTree>
     <p:extLst>
       <p:ext uri="{BB962C8B-B14F-4D97-AF65-F5344CB8AC3E}">
@@ -25082,7 +26602,7 @@
             <a:effectLst/>
             <a:extLst>
               <a:ext uri="{C572A759-6A51-4108-AA02-DFA0A04FC94B}">
-                <ma14:wrappingTextBoxFlag xmlns:ma14="http://schemas.microsoft.com/office/mac/drawingml/2011/main" xmlns="" val="1"/>
+                <ma14:wrappingTextBoxFlag xmlns="" xmlns:ma14="http://schemas.microsoft.com/office/mac/drawingml/2011/main" val="1"/>
               </a:ext>
             </a:extLst>
           </p:spPr>
@@ -25198,7 +26718,7 @@
             <a:effectLst/>
             <a:extLst>
               <a:ext uri="{C572A759-6A51-4108-AA02-DFA0A04FC94B}">
-                <ma14:wrappingTextBoxFlag xmlns:ma14="http://schemas.microsoft.com/office/mac/drawingml/2011/main" xmlns="" val="1"/>
+                <ma14:wrappingTextBoxFlag xmlns="" xmlns:ma14="http://schemas.microsoft.com/office/mac/drawingml/2011/main" val="1"/>
               </a:ext>
             </a:extLst>
           </p:spPr>
@@ -25668,7 +27188,7 @@
             <a:effectLst/>
             <a:extLst>
               <a:ext uri="{C572A759-6A51-4108-AA02-DFA0A04FC94B}">
-                <ma14:wrappingTextBoxFlag xmlns:ma14="http://schemas.microsoft.com/office/mac/drawingml/2011/main" xmlns="" val="1"/>
+                <ma14:wrappingTextBoxFlag xmlns="" xmlns:ma14="http://schemas.microsoft.com/office/mac/drawingml/2011/main" val="1"/>
               </a:ext>
             </a:extLst>
           </p:spPr>
@@ -25978,7 +27498,7 @@
             <a:effectLst/>
             <a:extLst>
               <a:ext uri="{C572A759-6A51-4108-AA02-DFA0A04FC94B}">
-                <ma14:wrappingTextBoxFlag xmlns:ma14="http://schemas.microsoft.com/office/mac/drawingml/2011/main" xmlns="" val="1"/>
+                <ma14:wrappingTextBoxFlag xmlns="" xmlns:ma14="http://schemas.microsoft.com/office/mac/drawingml/2011/main" val="1"/>
               </a:ext>
             </a:extLst>
           </p:spPr>
@@ -26212,7 +27732,7 @@
             <a:effectLst/>
             <a:extLst>
               <a:ext uri="{C572A759-6A51-4108-AA02-DFA0A04FC94B}">
-                <ma14:wrappingTextBoxFlag xmlns:ma14="http://schemas.microsoft.com/office/mac/drawingml/2011/main" xmlns="" val="1"/>
+                <ma14:wrappingTextBoxFlag xmlns="" xmlns:ma14="http://schemas.microsoft.com/office/mac/drawingml/2011/main" val="1"/>
               </a:ext>
             </a:extLst>
           </p:spPr>
@@ -26345,7 +27865,7 @@
             <a:effectLst/>
             <a:extLst>
               <a:ext uri="{C572A759-6A51-4108-AA02-DFA0A04FC94B}">
-                <ma14:wrappingTextBoxFlag xmlns:ma14="http://schemas.microsoft.com/office/mac/drawingml/2011/main" xmlns="" val="1"/>
+                <ma14:wrappingTextBoxFlag xmlns="" xmlns:ma14="http://schemas.microsoft.com/office/mac/drawingml/2011/main" val="1"/>
               </a:ext>
             </a:extLst>
           </p:spPr>
@@ -27418,7 +28938,7 @@
             <a:effectLst/>
             <a:extLst>
               <a:ext uri="{C572A759-6A51-4108-AA02-DFA0A04FC94B}">
-                <ma14:wrappingTextBoxFlag xmlns:ma14="http://schemas.microsoft.com/office/mac/drawingml/2011/main" xmlns="" val="1"/>
+                <ma14:wrappingTextBoxFlag xmlns="" xmlns:ma14="http://schemas.microsoft.com/office/mac/drawingml/2011/main" val="1"/>
               </a:ext>
             </a:extLst>
           </p:spPr>
@@ -27767,7 +29287,7 @@
             <a:effectLst/>
             <a:extLst>
               <a:ext uri="{C572A759-6A51-4108-AA02-DFA0A04FC94B}">
-                <ma14:wrappingTextBoxFlag xmlns:ma14="http://schemas.microsoft.com/office/mac/drawingml/2011/main" xmlns="" val="1"/>
+                <ma14:wrappingTextBoxFlag xmlns="" xmlns:ma14="http://schemas.microsoft.com/office/mac/drawingml/2011/main" val="1"/>
               </a:ext>
             </a:extLst>
           </p:spPr>
@@ -28187,7 +29707,7 @@
             <a:effectLst/>
             <a:extLst>
               <a:ext uri="{C572A759-6A51-4108-AA02-DFA0A04FC94B}">
-                <ma14:wrappingTextBoxFlag xmlns:ma14="http://schemas.microsoft.com/office/mac/drawingml/2011/main" xmlns="" val="1"/>
+                <ma14:wrappingTextBoxFlag xmlns="" xmlns:ma14="http://schemas.microsoft.com/office/mac/drawingml/2011/main" val="1"/>
               </a:ext>
             </a:extLst>
           </p:spPr>
@@ -29685,7 +31205,7 @@
             <a:effectLst/>
             <a:extLst>
               <a:ext uri="{C572A759-6A51-4108-AA02-DFA0A04FC94B}">
-                <ma14:wrappingTextBoxFlag xmlns:ma14="http://schemas.microsoft.com/office/mac/drawingml/2011/main" xmlns="" val="1"/>
+                <ma14:wrappingTextBoxFlag xmlns="" xmlns:ma14="http://schemas.microsoft.com/office/mac/drawingml/2011/main" val="1"/>
               </a:ext>
             </a:extLst>
           </p:spPr>
@@ -30450,7 +31970,7 @@
             <a:effectLst/>
             <a:extLst>
               <a:ext uri="{C572A759-6A51-4108-AA02-DFA0A04FC94B}">
-                <ma14:wrappingTextBoxFlag xmlns="" xmlns:ma14="http://schemas.microsoft.com/office/mac/drawingml/2011/main" val="1"/>
+                <ma14:wrappingTextBoxFlag xmlns:ma14="http://schemas.microsoft.com/office/mac/drawingml/2011/main" xmlns="" val="1"/>
               </a:ext>
             </a:extLst>
           </p:spPr>
@@ -30566,7 +32086,7 @@
             <a:effectLst/>
             <a:extLst>
               <a:ext uri="{C572A759-6A51-4108-AA02-DFA0A04FC94B}">
-                <ma14:wrappingTextBoxFlag xmlns="" xmlns:ma14="http://schemas.microsoft.com/office/mac/drawingml/2011/main" val="1"/>
+                <ma14:wrappingTextBoxFlag xmlns:ma14="http://schemas.microsoft.com/office/mac/drawingml/2011/main" xmlns="" val="1"/>
               </a:ext>
             </a:extLst>
           </p:spPr>
@@ -30682,7 +32202,7 @@
             <a:effectLst/>
             <a:extLst>
               <a:ext uri="{C572A759-6A51-4108-AA02-DFA0A04FC94B}">
-                <ma14:wrappingTextBoxFlag xmlns="" xmlns:ma14="http://schemas.microsoft.com/office/mac/drawingml/2011/main" val="1"/>
+                <ma14:wrappingTextBoxFlag xmlns:ma14="http://schemas.microsoft.com/office/mac/drawingml/2011/main" xmlns="" val="1"/>
               </a:ext>
             </a:extLst>
           </p:spPr>
@@ -30798,7 +32318,7 @@
             <a:effectLst/>
             <a:extLst>
               <a:ext uri="{C572A759-6A51-4108-AA02-DFA0A04FC94B}">
-                <ma14:wrappingTextBoxFlag xmlns="" xmlns:ma14="http://schemas.microsoft.com/office/mac/drawingml/2011/main" val="1"/>
+                <ma14:wrappingTextBoxFlag xmlns:ma14="http://schemas.microsoft.com/office/mac/drawingml/2011/main" xmlns="" val="1"/>
               </a:ext>
             </a:extLst>
           </p:spPr>
@@ -30914,7 +32434,7 @@
             <a:effectLst/>
             <a:extLst>
               <a:ext uri="{C572A759-6A51-4108-AA02-DFA0A04FC94B}">
-                <ma14:wrappingTextBoxFlag xmlns="" xmlns:ma14="http://schemas.microsoft.com/office/mac/drawingml/2011/main" val="1"/>
+                <ma14:wrappingTextBoxFlag xmlns:ma14="http://schemas.microsoft.com/office/mac/drawingml/2011/main" xmlns="" val="1"/>
               </a:ext>
             </a:extLst>
           </p:spPr>
@@ -31030,7 +32550,7 @@
             <a:effectLst/>
             <a:extLst>
               <a:ext uri="{C572A759-6A51-4108-AA02-DFA0A04FC94B}">
-                <ma14:wrappingTextBoxFlag xmlns="" xmlns:ma14="http://schemas.microsoft.com/office/mac/drawingml/2011/main" val="1"/>
+                <ma14:wrappingTextBoxFlag xmlns:ma14="http://schemas.microsoft.com/office/mac/drawingml/2011/main" xmlns="" val="1"/>
               </a:ext>
             </a:extLst>
           </p:spPr>
@@ -32710,7 +34230,7 @@
             <a:effectLst/>
             <a:extLst>
               <a:ext uri="{C572A759-6A51-4108-AA02-DFA0A04FC94B}">
-                <ma14:wrappingTextBoxFlag xmlns:ma14="http://schemas.microsoft.com/office/mac/drawingml/2011/main" xmlns="" val="1"/>
+                <ma14:wrappingTextBoxFlag xmlns="" xmlns:ma14="http://schemas.microsoft.com/office/mac/drawingml/2011/main" val="1"/>
               </a:ext>
             </a:extLst>
           </p:spPr>
@@ -33363,7 +34883,7 @@
             <a:effectLst/>
             <a:extLst>
               <a:ext uri="{C572A759-6A51-4108-AA02-DFA0A04FC94B}">
-                <ma14:wrappingTextBoxFlag xmlns="" xmlns:ma14="http://schemas.microsoft.com/office/mac/drawingml/2011/main" val="1"/>
+                <ma14:wrappingTextBoxFlag xmlns:ma14="http://schemas.microsoft.com/office/mac/drawingml/2011/main" xmlns="" val="1"/>
               </a:ext>
             </a:extLst>
           </p:spPr>
@@ -33852,7 +35372,7 @@
             <a:effectLst/>
             <a:extLst>
               <a:ext uri="{C572A759-6A51-4108-AA02-DFA0A04FC94B}">
-                <ma14:wrappingTextBoxFlag xmlns:ma14="http://schemas.microsoft.com/office/mac/drawingml/2011/main" xmlns="" val="1"/>
+                <ma14:wrappingTextBoxFlag xmlns="" xmlns:ma14="http://schemas.microsoft.com/office/mac/drawingml/2011/main" val="1"/>
               </a:ext>
             </a:extLst>
           </p:spPr>
@@ -33968,7 +35488,7 @@
             <a:effectLst/>
             <a:extLst>
               <a:ext uri="{C572A759-6A51-4108-AA02-DFA0A04FC94B}">
-                <ma14:wrappingTextBoxFlag xmlns:ma14="http://schemas.microsoft.com/office/mac/drawingml/2011/main" xmlns="" val="1"/>
+                <ma14:wrappingTextBoxFlag xmlns="" xmlns:ma14="http://schemas.microsoft.com/office/mac/drawingml/2011/main" val="1"/>
               </a:ext>
             </a:extLst>
           </p:spPr>
@@ -34298,7 +35818,7 @@
             <a:effectLst/>
             <a:extLst>
               <a:ext uri="{C572A759-6A51-4108-AA02-DFA0A04FC94B}">
-                <ma14:wrappingTextBoxFlag xmlns:ma14="http://schemas.microsoft.com/office/mac/drawingml/2011/main" xmlns="" val="1"/>
+                <ma14:wrappingTextBoxFlag xmlns="" xmlns:ma14="http://schemas.microsoft.com/office/mac/drawingml/2011/main" val="1"/>
               </a:ext>
             </a:extLst>
           </p:spPr>
@@ -34726,7 +36246,7 @@
             <a:effectLst/>
             <a:extLst>
               <a:ext uri="{C572A759-6A51-4108-AA02-DFA0A04FC94B}">
-                <ma14:wrappingTextBoxFlag xmlns:ma14="http://schemas.microsoft.com/office/mac/drawingml/2011/main" xmlns="" val="1"/>
+                <ma14:wrappingTextBoxFlag xmlns="" xmlns:ma14="http://schemas.microsoft.com/office/mac/drawingml/2011/main" val="1"/>
               </a:ext>
             </a:extLst>
           </p:spPr>
@@ -35709,7 +37229,7 @@
             <a:effectLst/>
             <a:extLst>
               <a:ext uri="{C572A759-6A51-4108-AA02-DFA0A04FC94B}">
-                <ma14:wrappingTextBoxFlag xmlns:ma14="http://schemas.microsoft.com/office/mac/drawingml/2011/main" xmlns="" val="1"/>
+                <ma14:wrappingTextBoxFlag xmlns="" xmlns:ma14="http://schemas.microsoft.com/office/mac/drawingml/2011/main" val="1"/>
               </a:ext>
             </a:extLst>
           </p:spPr>
@@ -35964,7 +37484,7 @@
             <a:effectLst/>
             <a:extLst>
               <a:ext uri="{C572A759-6A51-4108-AA02-DFA0A04FC94B}">
-                <ma14:wrappingTextBoxFlag xmlns:ma14="http://schemas.microsoft.com/office/mac/drawingml/2011/main" xmlns="" val="1"/>
+                <ma14:wrappingTextBoxFlag xmlns="" xmlns:ma14="http://schemas.microsoft.com/office/mac/drawingml/2011/main" val="1"/>
               </a:ext>
             </a:extLst>
           </p:spPr>
@@ -36294,7 +37814,7 @@
             <a:effectLst/>
             <a:extLst>
               <a:ext uri="{C572A759-6A51-4108-AA02-DFA0A04FC94B}">
-                <ma14:wrappingTextBoxFlag xmlns:ma14="http://schemas.microsoft.com/office/mac/drawingml/2011/main" xmlns="" val="1"/>
+                <ma14:wrappingTextBoxFlag xmlns="" xmlns:ma14="http://schemas.microsoft.com/office/mac/drawingml/2011/main" val="1"/>
               </a:ext>
             </a:extLst>
           </p:spPr>
@@ -36521,7 +38041,7 @@
             <a:effectLst/>
             <a:extLst>
               <a:ext uri="{C572A759-6A51-4108-AA02-DFA0A04FC94B}">
-                <ma14:wrappingTextBoxFlag xmlns:ma14="http://schemas.microsoft.com/office/mac/drawingml/2011/main" xmlns="" val="1"/>
+                <ma14:wrappingTextBoxFlag xmlns="" xmlns:ma14="http://schemas.microsoft.com/office/mac/drawingml/2011/main" val="1"/>
               </a:ext>
             </a:extLst>
           </p:spPr>
@@ -36862,7 +38382,7 @@
             <a:effectLst/>
             <a:extLst>
               <a:ext uri="{C572A759-6A51-4108-AA02-DFA0A04FC94B}">
-                <ma14:wrappingTextBoxFlag xmlns:ma14="http://schemas.microsoft.com/office/mac/drawingml/2011/main" xmlns="" val="1"/>
+                <ma14:wrappingTextBoxFlag xmlns="" xmlns:ma14="http://schemas.microsoft.com/office/mac/drawingml/2011/main" val="1"/>
               </a:ext>
             </a:extLst>
           </p:spPr>
@@ -37500,7 +39020,7 @@
             <a:effectLst/>
             <a:extLst>
               <a:ext uri="{C572A759-6A51-4108-AA02-DFA0A04FC94B}">
-                <ma14:wrappingTextBoxFlag xmlns:ma14="http://schemas.microsoft.com/office/mac/drawingml/2011/main" xmlns="" val="1"/>
+                <ma14:wrappingTextBoxFlag xmlns="" xmlns:ma14="http://schemas.microsoft.com/office/mac/drawingml/2011/main" val="1"/>
               </a:ext>
             </a:extLst>
           </p:spPr>
@@ -37616,7 +39136,7 @@
             <a:effectLst/>
             <a:extLst>
               <a:ext uri="{C572A759-6A51-4108-AA02-DFA0A04FC94B}">
-                <ma14:wrappingTextBoxFlag xmlns:ma14="http://schemas.microsoft.com/office/mac/drawingml/2011/main" xmlns="" val="1"/>
+                <ma14:wrappingTextBoxFlag xmlns="" xmlns:ma14="http://schemas.microsoft.com/office/mac/drawingml/2011/main" val="1"/>
               </a:ext>
             </a:extLst>
           </p:spPr>
@@ -38808,7 +40328,7 @@
             <a:effectLst/>
             <a:extLst>
               <a:ext uri="{C572A759-6A51-4108-AA02-DFA0A04FC94B}">
-                <ma14:wrappingTextBoxFlag xmlns:ma14="http://schemas.microsoft.com/office/mac/drawingml/2011/main" xmlns="" val="1"/>
+                <ma14:wrappingTextBoxFlag xmlns="" xmlns:ma14="http://schemas.microsoft.com/office/mac/drawingml/2011/main" val="1"/>
               </a:ext>
             </a:extLst>
           </p:spPr>
@@ -38924,7 +40444,7 @@
             <a:effectLst/>
             <a:extLst>
               <a:ext uri="{C572A759-6A51-4108-AA02-DFA0A04FC94B}">
-                <ma14:wrappingTextBoxFlag xmlns:ma14="http://schemas.microsoft.com/office/mac/drawingml/2011/main" xmlns="" val="1"/>
+                <ma14:wrappingTextBoxFlag xmlns="" xmlns:ma14="http://schemas.microsoft.com/office/mac/drawingml/2011/main" val="1"/>
               </a:ext>
             </a:extLst>
           </p:spPr>
@@ -39040,7 +40560,7 @@
             <a:effectLst/>
             <a:extLst>
               <a:ext uri="{C572A759-6A51-4108-AA02-DFA0A04FC94B}">
-                <ma14:wrappingTextBoxFlag xmlns:ma14="http://schemas.microsoft.com/office/mac/drawingml/2011/main" xmlns="" val="1"/>
+                <ma14:wrappingTextBoxFlag xmlns="" xmlns:ma14="http://schemas.microsoft.com/office/mac/drawingml/2011/main" val="1"/>
               </a:ext>
             </a:extLst>
           </p:spPr>
@@ -39451,7 +40971,7 @@
             <a:effectLst/>
             <a:extLst>
               <a:ext uri="{C572A759-6A51-4108-AA02-DFA0A04FC94B}">
-                <ma14:wrappingTextBoxFlag xmlns:ma14="http://schemas.microsoft.com/office/mac/drawingml/2011/main" xmlns="" val="1"/>
+                <ma14:wrappingTextBoxFlag xmlns="" xmlns:ma14="http://schemas.microsoft.com/office/mac/drawingml/2011/main" val="1"/>
               </a:ext>
             </a:extLst>
           </p:spPr>
@@ -39567,7 +41087,7 @@
             <a:effectLst/>
             <a:extLst>
               <a:ext uri="{C572A759-6A51-4108-AA02-DFA0A04FC94B}">
-                <ma14:wrappingTextBoxFlag xmlns:ma14="http://schemas.microsoft.com/office/mac/drawingml/2011/main" xmlns="" val="1"/>
+                <ma14:wrappingTextBoxFlag xmlns="" xmlns:ma14="http://schemas.microsoft.com/office/mac/drawingml/2011/main" val="1"/>
               </a:ext>
             </a:extLst>
           </p:spPr>
@@ -39683,7 +41203,7 @@
             <a:effectLst/>
             <a:extLst>
               <a:ext uri="{C572A759-6A51-4108-AA02-DFA0A04FC94B}">
-                <ma14:wrappingTextBoxFlag xmlns:ma14="http://schemas.microsoft.com/office/mac/drawingml/2011/main" xmlns="" val="1"/>
+                <ma14:wrappingTextBoxFlag xmlns="" xmlns:ma14="http://schemas.microsoft.com/office/mac/drawingml/2011/main" val="1"/>
               </a:ext>
             </a:extLst>
           </p:spPr>
@@ -40059,7 +41579,7 @@
             <a:effectLst/>
             <a:extLst>
               <a:ext uri="{C572A759-6A51-4108-AA02-DFA0A04FC94B}">
-                <ma14:wrappingTextBoxFlag xmlns:ma14="http://schemas.microsoft.com/office/mac/drawingml/2011/main" xmlns="" val="1"/>
+                <ma14:wrappingTextBoxFlag xmlns="" xmlns:ma14="http://schemas.microsoft.com/office/mac/drawingml/2011/main" val="1"/>
               </a:ext>
             </a:extLst>
           </p:spPr>
@@ -40192,7 +41712,7 @@
             <a:effectLst/>
             <a:extLst>
               <a:ext uri="{C572A759-6A51-4108-AA02-DFA0A04FC94B}">
-                <ma14:wrappingTextBoxFlag xmlns:ma14="http://schemas.microsoft.com/office/mac/drawingml/2011/main" xmlns="" val="1"/>
+                <ma14:wrappingTextBoxFlag xmlns="" xmlns:ma14="http://schemas.microsoft.com/office/mac/drawingml/2011/main" val="1"/>
               </a:ext>
             </a:extLst>
           </p:spPr>
@@ -40308,7 +41828,7 @@
             <a:effectLst/>
             <a:extLst>
               <a:ext uri="{C572A759-6A51-4108-AA02-DFA0A04FC94B}">
-                <ma14:wrappingTextBoxFlag xmlns:ma14="http://schemas.microsoft.com/office/mac/drawingml/2011/main" xmlns="" val="1"/>
+                <ma14:wrappingTextBoxFlag xmlns="" xmlns:ma14="http://schemas.microsoft.com/office/mac/drawingml/2011/main" val="1"/>
               </a:ext>
             </a:extLst>
           </p:spPr>
@@ -40521,7 +42041,7 @@
             <a:effectLst/>
             <a:extLst>
               <a:ext uri="{C572A759-6A51-4108-AA02-DFA0A04FC94B}">
-                <ma14:wrappingTextBoxFlag xmlns="" xmlns:ma14="http://schemas.microsoft.com/office/mac/drawingml/2011/main" val="1"/>
+                <ma14:wrappingTextBoxFlag xmlns:ma14="http://schemas.microsoft.com/office/mac/drawingml/2011/main" xmlns="" val="1"/>
               </a:ext>
             </a:extLst>
           </p:spPr>
@@ -40752,7 +42272,7 @@
               <a:effectLst/>
               <a:extLst>
                 <a:ext uri="{C572A759-6A51-4108-AA02-DFA0A04FC94B}">
-                  <ma14:wrappingTextBoxFlag xmlns="" xmlns:ma14="http://schemas.microsoft.com/office/mac/drawingml/2011/main" val="1"/>
+                  <ma14:wrappingTextBoxFlag xmlns:ma14="http://schemas.microsoft.com/office/mac/drawingml/2011/main" xmlns="" val="1"/>
                 </a:ext>
               </a:extLst>
             </p:spPr>
@@ -41218,7 +42738,7 @@
               <a:effectLst/>
               <a:extLst>
                 <a:ext uri="{C572A759-6A51-4108-AA02-DFA0A04FC94B}">
-                  <ma14:wrappingTextBoxFlag xmlns="" xmlns:ma14="http://schemas.microsoft.com/office/mac/drawingml/2011/main" val="1"/>
+                  <ma14:wrappingTextBoxFlag xmlns:ma14="http://schemas.microsoft.com/office/mac/drawingml/2011/main" xmlns="" val="1"/>
                 </a:ext>
               </a:extLst>
             </p:spPr>
@@ -41954,7 +43474,7 @@
               <a:effectLst/>
               <a:extLst>
                 <a:ext uri="{C572A759-6A51-4108-AA02-DFA0A04FC94B}">
-                  <ma14:wrappingTextBoxFlag xmlns="" xmlns:ma14="http://schemas.microsoft.com/office/mac/drawingml/2011/main" val="1"/>
+                  <ma14:wrappingTextBoxFlag xmlns:ma14="http://schemas.microsoft.com/office/mac/drawingml/2011/main" xmlns="" val="1"/>
                 </a:ext>
               </a:extLst>
             </p:spPr>
@@ -42446,7 +43966,7 @@
             <a:effectLst/>
             <a:extLst>
               <a:ext uri="{C572A759-6A51-4108-AA02-DFA0A04FC94B}">
-                <ma14:wrappingTextBoxFlag xmlns="" xmlns:ma14="http://schemas.microsoft.com/office/mac/drawingml/2011/main" val="1"/>
+                <ma14:wrappingTextBoxFlag xmlns:ma14="http://schemas.microsoft.com/office/mac/drawingml/2011/main" xmlns="" val="1"/>
               </a:ext>
             </a:extLst>
           </p:spPr>
@@ -42579,7 +44099,7 @@
             <a:effectLst/>
             <a:extLst>
               <a:ext uri="{C572A759-6A51-4108-AA02-DFA0A04FC94B}">
-                <ma14:wrappingTextBoxFlag xmlns="" xmlns:ma14="http://schemas.microsoft.com/office/mac/drawingml/2011/main" val="1"/>
+                <ma14:wrappingTextBoxFlag xmlns:ma14="http://schemas.microsoft.com/office/mac/drawingml/2011/main" xmlns="" val="1"/>
               </a:ext>
             </a:extLst>
           </p:spPr>
@@ -42712,7 +44232,7 @@
             <a:effectLst/>
             <a:extLst>
               <a:ext uri="{C572A759-6A51-4108-AA02-DFA0A04FC94B}">
-                <ma14:wrappingTextBoxFlag xmlns:ma14="http://schemas.microsoft.com/office/mac/drawingml/2011/main" xmlns="" val="1"/>
+                <ma14:wrappingTextBoxFlag xmlns="" xmlns:ma14="http://schemas.microsoft.com/office/mac/drawingml/2011/main" val="1"/>
               </a:ext>
             </a:extLst>
           </p:spPr>
@@ -42943,7 +44463,7 @@
               <a:effectLst/>
               <a:extLst>
                 <a:ext uri="{C572A759-6A51-4108-AA02-DFA0A04FC94B}">
-                  <ma14:wrappingTextBoxFlag xmlns:ma14="http://schemas.microsoft.com/office/mac/drawingml/2011/main" xmlns="" val="1"/>
+                  <ma14:wrappingTextBoxFlag xmlns="" xmlns:ma14="http://schemas.microsoft.com/office/mac/drawingml/2011/main" val="1"/>
                 </a:ext>
               </a:extLst>
             </p:spPr>
@@ -43321,7 +44841,7 @@
               <a:effectLst/>
               <a:extLst>
                 <a:ext uri="{C572A759-6A51-4108-AA02-DFA0A04FC94B}">
-                  <ma14:wrappingTextBoxFlag xmlns:ma14="http://schemas.microsoft.com/office/mac/drawingml/2011/main" xmlns="" val="1"/>
+                  <ma14:wrappingTextBoxFlag xmlns="" xmlns:ma14="http://schemas.microsoft.com/office/mac/drawingml/2011/main" val="1"/>
                 </a:ext>
               </a:extLst>
             </p:spPr>
@@ -44057,7 +45577,7 @@
               <a:effectLst/>
               <a:extLst>
                 <a:ext uri="{C572A759-6A51-4108-AA02-DFA0A04FC94B}">
-                  <ma14:wrappingTextBoxFlag xmlns:ma14="http://schemas.microsoft.com/office/mac/drawingml/2011/main" xmlns="" val="1"/>
+                  <ma14:wrappingTextBoxFlag xmlns="" xmlns:ma14="http://schemas.microsoft.com/office/mac/drawingml/2011/main" val="1"/>
                 </a:ext>
               </a:extLst>
             </p:spPr>
@@ -44297,7 +45817,7 @@
             <a:effectLst/>
             <a:extLst>
               <a:ext uri="{C572A759-6A51-4108-AA02-DFA0A04FC94B}">
-                <ma14:wrappingTextBoxFlag xmlns:ma14="http://schemas.microsoft.com/office/mac/drawingml/2011/main" xmlns="" val="1"/>
+                <ma14:wrappingTextBoxFlag xmlns="" xmlns:ma14="http://schemas.microsoft.com/office/mac/drawingml/2011/main" val="1"/>
               </a:ext>
             </a:extLst>
           </p:spPr>
@@ -44550,7 +46070,7 @@
             <a:effectLst/>
             <a:extLst>
               <a:ext uri="{C572A759-6A51-4108-AA02-DFA0A04FC94B}">
-                <ma14:wrappingTextBoxFlag xmlns:ma14="http://schemas.microsoft.com/office/mac/drawingml/2011/main" xmlns="" val="1"/>
+                <ma14:wrappingTextBoxFlag xmlns="" xmlns:ma14="http://schemas.microsoft.com/office/mac/drawingml/2011/main" val="1"/>
               </a:ext>
             </a:extLst>
           </p:spPr>
@@ -44882,7 +46402,7 @@
               <a:effectLst/>
               <a:extLst>
                 <a:ext uri="{C572A759-6A51-4108-AA02-DFA0A04FC94B}">
-                  <ma14:wrappingTextBoxFlag xmlns:ma14="http://schemas.microsoft.com/office/mac/drawingml/2011/main" xmlns="" val="1"/>
+                  <ma14:wrappingTextBoxFlag xmlns="" xmlns:ma14="http://schemas.microsoft.com/office/mac/drawingml/2011/main" val="1"/>
                 </a:ext>
               </a:extLst>
             </p:spPr>
@@ -45075,7 +46595,7 @@
             <a:effectLst/>
             <a:extLst>
               <a:ext uri="{C572A759-6A51-4108-AA02-DFA0A04FC94B}">
-                <ma14:wrappingTextBoxFlag xmlns:ma14="http://schemas.microsoft.com/office/mac/drawingml/2011/main" xmlns="" val="1"/>
+                <ma14:wrappingTextBoxFlag xmlns="" xmlns:ma14="http://schemas.microsoft.com/office/mac/drawingml/2011/main" val="1"/>
               </a:ext>
             </a:extLst>
           </p:spPr>

</xml_diff>

<commit_message>
start working on process mining
</commit_message>
<xml_diff>
--- a/docs/Diagrams.pptx
+++ b/docs/Diagrams.pptx
@@ -290,7 +290,7 @@
               <a:pPr>
                 <a:defRPr/>
               </a:pPr>
-              <a:t>9/3/21</a:t>
+              <a:t>10/8/21</a:t>
             </a:fld>
             <a:endParaRPr lang="en-US"/>
           </a:p>
@@ -9168,7 +9168,7 @@
             <a:effectLst/>
             <a:extLst>
               <a:ext uri="{C572A759-6A51-4108-AA02-DFA0A04FC94B}">
-                <ma14:wrappingTextBoxFlag xmlns="" xmlns:ma14="http://schemas.microsoft.com/office/mac/drawingml/2011/main" val="1"/>
+                <ma14:wrappingTextBoxFlag xmlns:ma14="http://schemas.microsoft.com/office/mac/drawingml/2011/main" xmlns="" val="1"/>
               </a:ext>
             </a:extLst>
           </p:spPr>
@@ -9984,7 +9984,7 @@
             <a:effectLst/>
             <a:extLst>
               <a:ext uri="{C572A759-6A51-4108-AA02-DFA0A04FC94B}">
-                <ma14:wrappingTextBoxFlag xmlns="" xmlns:ma14="http://schemas.microsoft.com/office/mac/drawingml/2011/main" val="1"/>
+                <ma14:wrappingTextBoxFlag xmlns:ma14="http://schemas.microsoft.com/office/mac/drawingml/2011/main" xmlns="" val="1"/>
               </a:ext>
             </a:extLst>
           </p:spPr>
@@ -10100,7 +10100,7 @@
             <a:effectLst/>
             <a:extLst>
               <a:ext uri="{C572A759-6A51-4108-AA02-DFA0A04FC94B}">
-                <ma14:wrappingTextBoxFlag xmlns="" xmlns:ma14="http://schemas.microsoft.com/office/mac/drawingml/2011/main" val="1"/>
+                <ma14:wrappingTextBoxFlag xmlns:ma14="http://schemas.microsoft.com/office/mac/drawingml/2011/main" xmlns="" val="1"/>
               </a:ext>
             </a:extLst>
           </p:spPr>
@@ -10280,7 +10280,7 @@
             <a:effectLst/>
             <a:extLst>
               <a:ext uri="{C572A759-6A51-4108-AA02-DFA0A04FC94B}">
-                <ma14:wrappingTextBoxFlag xmlns:ma14="http://schemas.microsoft.com/office/mac/drawingml/2011/main" xmlns="" val="1"/>
+                <ma14:wrappingTextBoxFlag xmlns="" xmlns:ma14="http://schemas.microsoft.com/office/mac/drawingml/2011/main" val="1"/>
               </a:ext>
             </a:extLst>
           </p:spPr>
@@ -10595,7 +10595,7 @@
               <a:effectLst/>
               <a:extLst>
                 <a:ext uri="{C572A759-6A51-4108-AA02-DFA0A04FC94B}">
-                  <ma14:wrappingTextBoxFlag xmlns="" xmlns:ma14="http://schemas.microsoft.com/office/mac/drawingml/2011/main" val="1"/>
+                  <ma14:wrappingTextBoxFlag xmlns:ma14="http://schemas.microsoft.com/office/mac/drawingml/2011/main" xmlns="" val="1"/>
                 </a:ext>
               </a:extLst>
             </p:spPr>
@@ -10809,7 +10809,7 @@
               <a:effectLst/>
               <a:extLst>
                 <a:ext uri="{C572A759-6A51-4108-AA02-DFA0A04FC94B}">
-                  <ma14:wrappingTextBoxFlag xmlns="" xmlns:ma14="http://schemas.microsoft.com/office/mac/drawingml/2011/main" val="1"/>
+                  <ma14:wrappingTextBoxFlag xmlns:ma14="http://schemas.microsoft.com/office/mac/drawingml/2011/main" xmlns="" val="1"/>
                 </a:ext>
               </a:extLst>
             </p:spPr>
@@ -11091,7 +11091,7 @@
             <a:effectLst/>
             <a:extLst>
               <a:ext uri="{C572A759-6A51-4108-AA02-DFA0A04FC94B}">
-                <ma14:wrappingTextBoxFlag xmlns="" xmlns:ma14="http://schemas.microsoft.com/office/mac/drawingml/2011/main" val="1"/>
+                <ma14:wrappingTextBoxFlag xmlns:ma14="http://schemas.microsoft.com/office/mac/drawingml/2011/main" xmlns="" val="1"/>
               </a:ext>
             </a:extLst>
           </p:spPr>
@@ -11207,7 +11207,7 @@
             <a:effectLst/>
             <a:extLst>
               <a:ext uri="{C572A759-6A51-4108-AA02-DFA0A04FC94B}">
-                <ma14:wrappingTextBoxFlag xmlns="" xmlns:ma14="http://schemas.microsoft.com/office/mac/drawingml/2011/main" val="1"/>
+                <ma14:wrappingTextBoxFlag xmlns:ma14="http://schemas.microsoft.com/office/mac/drawingml/2011/main" xmlns="" val="1"/>
               </a:ext>
             </a:extLst>
           </p:spPr>
@@ -12345,7 +12345,7 @@
             <a:effectLst/>
             <a:extLst>
               <a:ext uri="{C572A759-6A51-4108-AA02-DFA0A04FC94B}">
-                <ma14:wrappingTextBoxFlag xmlns:ma14="http://schemas.microsoft.com/office/mac/drawingml/2011/main" xmlns="" val="1"/>
+                <ma14:wrappingTextBoxFlag xmlns="" xmlns:ma14="http://schemas.microsoft.com/office/mac/drawingml/2011/main" val="1"/>
               </a:ext>
             </a:extLst>
           </p:spPr>
@@ -12478,7 +12478,7 @@
             <a:effectLst/>
             <a:extLst>
               <a:ext uri="{C572A759-6A51-4108-AA02-DFA0A04FC94B}">
-                <ma14:wrappingTextBoxFlag xmlns:ma14="http://schemas.microsoft.com/office/mac/drawingml/2011/main" xmlns="" val="1"/>
+                <ma14:wrappingTextBoxFlag xmlns="" xmlns:ma14="http://schemas.microsoft.com/office/mac/drawingml/2011/main" val="1"/>
               </a:ext>
             </a:extLst>
           </p:spPr>
@@ -12790,7 +12790,7 @@
               <a:effectLst/>
               <a:extLst>
                 <a:ext uri="{C572A759-6A51-4108-AA02-DFA0A04FC94B}">
-                  <ma14:wrappingTextBoxFlag xmlns="" xmlns:ma14="http://schemas.microsoft.com/office/mac/drawingml/2011/main" val="1"/>
+                  <ma14:wrappingTextBoxFlag xmlns:ma14="http://schemas.microsoft.com/office/mac/drawingml/2011/main" xmlns="" val="1"/>
                 </a:ext>
               </a:extLst>
             </p:spPr>
@@ -13214,7 +13214,7 @@
               <a:effectLst/>
               <a:extLst>
                 <a:ext uri="{C572A759-6A51-4108-AA02-DFA0A04FC94B}">
-                  <ma14:wrappingTextBoxFlag xmlns="" xmlns:ma14="http://schemas.microsoft.com/office/mac/drawingml/2011/main" val="1"/>
+                  <ma14:wrappingTextBoxFlag xmlns:ma14="http://schemas.microsoft.com/office/mac/drawingml/2011/main" xmlns="" val="1"/>
                 </a:ext>
               </a:extLst>
             </p:spPr>
@@ -13865,7 +13865,7 @@
             <a:effectLst/>
             <a:extLst>
               <a:ext uri="{C572A759-6A51-4108-AA02-DFA0A04FC94B}">
-                <ma14:wrappingTextBoxFlag xmlns="" xmlns:ma14="http://schemas.microsoft.com/office/mac/drawingml/2011/main" val="1"/>
+                <ma14:wrappingTextBoxFlag xmlns:ma14="http://schemas.microsoft.com/office/mac/drawingml/2011/main" xmlns="" val="1"/>
               </a:ext>
             </a:extLst>
           </p:spPr>
@@ -14120,7 +14120,7 @@
             <a:effectLst/>
             <a:extLst>
               <a:ext uri="{C572A759-6A51-4108-AA02-DFA0A04FC94B}">
-                <ma14:wrappingTextBoxFlag xmlns:ma14="http://schemas.microsoft.com/office/mac/drawingml/2011/main" xmlns="" val="1"/>
+                <ma14:wrappingTextBoxFlag xmlns="" xmlns:ma14="http://schemas.microsoft.com/office/mac/drawingml/2011/main" val="1"/>
               </a:ext>
             </a:extLst>
           </p:spPr>
@@ -14368,7 +14368,7 @@
               <a:effectLst/>
               <a:extLst>
                 <a:ext uri="{C572A759-6A51-4108-AA02-DFA0A04FC94B}">
-                  <ma14:wrappingTextBoxFlag xmlns="" xmlns:ma14="http://schemas.microsoft.com/office/mac/drawingml/2011/main" val="1"/>
+                  <ma14:wrappingTextBoxFlag xmlns:ma14="http://schemas.microsoft.com/office/mac/drawingml/2011/main" xmlns="" val="1"/>
                 </a:ext>
               </a:extLst>
             </p:spPr>
@@ -14666,7 +14666,7 @@
               <a:effectLst/>
               <a:extLst>
                 <a:ext uri="{C572A759-6A51-4108-AA02-DFA0A04FC94B}">
-                  <ma14:wrappingTextBoxFlag xmlns="" xmlns:ma14="http://schemas.microsoft.com/office/mac/drawingml/2011/main" val="1"/>
+                  <ma14:wrappingTextBoxFlag xmlns:ma14="http://schemas.microsoft.com/office/mac/drawingml/2011/main" xmlns="" val="1"/>
                 </a:ext>
               </a:extLst>
             </p:spPr>
@@ -15976,7 +15976,7 @@
             <a:effectLst/>
             <a:extLst>
               <a:ext uri="{C572A759-6A51-4108-AA02-DFA0A04FC94B}">
-                <ma14:wrappingTextBoxFlag xmlns:ma14="http://schemas.microsoft.com/office/mac/drawingml/2011/main" xmlns="" val="1"/>
+                <ma14:wrappingTextBoxFlag xmlns="" xmlns:ma14="http://schemas.microsoft.com/office/mac/drawingml/2011/main" val="1"/>
               </a:ext>
             </a:extLst>
           </p:spPr>
@@ -16092,7 +16092,7 @@
             <a:effectLst/>
             <a:extLst>
               <a:ext uri="{C572A759-6A51-4108-AA02-DFA0A04FC94B}">
-                <ma14:wrappingTextBoxFlag xmlns:ma14="http://schemas.microsoft.com/office/mac/drawingml/2011/main" xmlns="" val="1"/>
+                <ma14:wrappingTextBoxFlag xmlns="" xmlns:ma14="http://schemas.microsoft.com/office/mac/drawingml/2011/main" val="1"/>
               </a:ext>
             </a:extLst>
           </p:spPr>
@@ -16513,7 +16513,7 @@
             <a:effectLst/>
             <a:extLst>
               <a:ext uri="{C572A759-6A51-4108-AA02-DFA0A04FC94B}">
-                <ma14:wrappingTextBoxFlag xmlns:ma14="http://schemas.microsoft.com/office/mac/drawingml/2011/main" xmlns="" val="1"/>
+                <ma14:wrappingTextBoxFlag xmlns="" xmlns:ma14="http://schemas.microsoft.com/office/mac/drawingml/2011/main" val="1"/>
               </a:ext>
             </a:extLst>
           </p:spPr>
@@ -16672,7 +16672,7 @@
             <a:effectLst/>
             <a:extLst>
               <a:ext uri="{C572A759-6A51-4108-AA02-DFA0A04FC94B}">
-                <ma14:wrappingTextBoxFlag xmlns="" xmlns:ma14="http://schemas.microsoft.com/office/mac/drawingml/2011/main" val="1"/>
+                <ma14:wrappingTextBoxFlag xmlns:ma14="http://schemas.microsoft.com/office/mac/drawingml/2011/main" xmlns="" val="1"/>
               </a:ext>
             </a:extLst>
           </p:spPr>
@@ -17191,7 +17191,7 @@
               <a:effectLst/>
               <a:extLst>
                 <a:ext uri="{C572A759-6A51-4108-AA02-DFA0A04FC94B}">
-                  <ma14:wrappingTextBoxFlag xmlns="" xmlns:ma14="http://schemas.microsoft.com/office/mac/drawingml/2011/main" val="1"/>
+                  <ma14:wrappingTextBoxFlag xmlns:ma14="http://schemas.microsoft.com/office/mac/drawingml/2011/main" xmlns="" val="1"/>
                 </a:ext>
               </a:extLst>
             </p:spPr>
@@ -17341,7 +17341,7 @@
             <a:effectLst/>
             <a:extLst>
               <a:ext uri="{C572A759-6A51-4108-AA02-DFA0A04FC94B}">
-                <ma14:wrappingTextBoxFlag xmlns:ma14="http://schemas.microsoft.com/office/mac/drawingml/2011/main" xmlns="" val="1"/>
+                <ma14:wrappingTextBoxFlag xmlns="" xmlns:ma14="http://schemas.microsoft.com/office/mac/drawingml/2011/main" val="1"/>
               </a:ext>
             </a:extLst>
           </p:spPr>
@@ -17501,7 +17501,7 @@
             <a:effectLst/>
             <a:extLst>
               <a:ext uri="{C572A759-6A51-4108-AA02-DFA0A04FC94B}">
-                <ma14:wrappingTextBoxFlag xmlns="" xmlns:ma14="http://schemas.microsoft.com/office/mac/drawingml/2011/main" val="1"/>
+                <ma14:wrappingTextBoxFlag xmlns:ma14="http://schemas.microsoft.com/office/mac/drawingml/2011/main" xmlns="" val="1"/>
               </a:ext>
             </a:extLst>
           </p:spPr>
@@ -17802,7 +17802,7 @@
               <a:effectLst/>
               <a:extLst>
                 <a:ext uri="{C572A759-6A51-4108-AA02-DFA0A04FC94B}">
-                  <ma14:wrappingTextBoxFlag xmlns="" xmlns:ma14="http://schemas.microsoft.com/office/mac/drawingml/2011/main" val="1"/>
+                  <ma14:wrappingTextBoxFlag xmlns:ma14="http://schemas.microsoft.com/office/mac/drawingml/2011/main" xmlns="" val="1"/>
                 </a:ext>
               </a:extLst>
             </p:spPr>
@@ -26602,7 +26602,7 @@
             <a:effectLst/>
             <a:extLst>
               <a:ext uri="{C572A759-6A51-4108-AA02-DFA0A04FC94B}">
-                <ma14:wrappingTextBoxFlag xmlns="" xmlns:ma14="http://schemas.microsoft.com/office/mac/drawingml/2011/main" val="1"/>
+                <ma14:wrappingTextBoxFlag xmlns:ma14="http://schemas.microsoft.com/office/mac/drawingml/2011/main" xmlns="" val="1"/>
               </a:ext>
             </a:extLst>
           </p:spPr>
@@ -26718,7 +26718,7 @@
             <a:effectLst/>
             <a:extLst>
               <a:ext uri="{C572A759-6A51-4108-AA02-DFA0A04FC94B}">
-                <ma14:wrappingTextBoxFlag xmlns="" xmlns:ma14="http://schemas.microsoft.com/office/mac/drawingml/2011/main" val="1"/>
+                <ma14:wrappingTextBoxFlag xmlns:ma14="http://schemas.microsoft.com/office/mac/drawingml/2011/main" xmlns="" val="1"/>
               </a:ext>
             </a:extLst>
           </p:spPr>
@@ -27188,7 +27188,7 @@
             <a:effectLst/>
             <a:extLst>
               <a:ext uri="{C572A759-6A51-4108-AA02-DFA0A04FC94B}">
-                <ma14:wrappingTextBoxFlag xmlns="" xmlns:ma14="http://schemas.microsoft.com/office/mac/drawingml/2011/main" val="1"/>
+                <ma14:wrappingTextBoxFlag xmlns:ma14="http://schemas.microsoft.com/office/mac/drawingml/2011/main" xmlns="" val="1"/>
               </a:ext>
             </a:extLst>
           </p:spPr>
@@ -27498,7 +27498,7 @@
             <a:effectLst/>
             <a:extLst>
               <a:ext uri="{C572A759-6A51-4108-AA02-DFA0A04FC94B}">
-                <ma14:wrappingTextBoxFlag xmlns="" xmlns:ma14="http://schemas.microsoft.com/office/mac/drawingml/2011/main" val="1"/>
+                <ma14:wrappingTextBoxFlag xmlns:ma14="http://schemas.microsoft.com/office/mac/drawingml/2011/main" xmlns="" val="1"/>
               </a:ext>
             </a:extLst>
           </p:spPr>
@@ -27732,7 +27732,7 @@
             <a:effectLst/>
             <a:extLst>
               <a:ext uri="{C572A759-6A51-4108-AA02-DFA0A04FC94B}">
-                <ma14:wrappingTextBoxFlag xmlns="" xmlns:ma14="http://schemas.microsoft.com/office/mac/drawingml/2011/main" val="1"/>
+                <ma14:wrappingTextBoxFlag xmlns:ma14="http://schemas.microsoft.com/office/mac/drawingml/2011/main" xmlns="" val="1"/>
               </a:ext>
             </a:extLst>
           </p:spPr>
@@ -27865,7 +27865,7 @@
             <a:effectLst/>
             <a:extLst>
               <a:ext uri="{C572A759-6A51-4108-AA02-DFA0A04FC94B}">
-                <ma14:wrappingTextBoxFlag xmlns="" xmlns:ma14="http://schemas.microsoft.com/office/mac/drawingml/2011/main" val="1"/>
+                <ma14:wrappingTextBoxFlag xmlns:ma14="http://schemas.microsoft.com/office/mac/drawingml/2011/main" xmlns="" val="1"/>
               </a:ext>
             </a:extLst>
           </p:spPr>
@@ -28938,7 +28938,7 @@
             <a:effectLst/>
             <a:extLst>
               <a:ext uri="{C572A759-6A51-4108-AA02-DFA0A04FC94B}">
-                <ma14:wrappingTextBoxFlag xmlns="" xmlns:ma14="http://schemas.microsoft.com/office/mac/drawingml/2011/main" val="1"/>
+                <ma14:wrappingTextBoxFlag xmlns:ma14="http://schemas.microsoft.com/office/mac/drawingml/2011/main" xmlns="" val="1"/>
               </a:ext>
             </a:extLst>
           </p:spPr>
@@ -29287,7 +29287,7 @@
             <a:effectLst/>
             <a:extLst>
               <a:ext uri="{C572A759-6A51-4108-AA02-DFA0A04FC94B}">
-                <ma14:wrappingTextBoxFlag xmlns="" xmlns:ma14="http://schemas.microsoft.com/office/mac/drawingml/2011/main" val="1"/>
+                <ma14:wrappingTextBoxFlag xmlns:ma14="http://schemas.microsoft.com/office/mac/drawingml/2011/main" xmlns="" val="1"/>
               </a:ext>
             </a:extLst>
           </p:spPr>
@@ -29707,7 +29707,7 @@
             <a:effectLst/>
             <a:extLst>
               <a:ext uri="{C572A759-6A51-4108-AA02-DFA0A04FC94B}">
-                <ma14:wrappingTextBoxFlag xmlns="" xmlns:ma14="http://schemas.microsoft.com/office/mac/drawingml/2011/main" val="1"/>
+                <ma14:wrappingTextBoxFlag xmlns:ma14="http://schemas.microsoft.com/office/mac/drawingml/2011/main" xmlns="" val="1"/>
               </a:ext>
             </a:extLst>
           </p:spPr>
@@ -31205,7 +31205,7 @@
             <a:effectLst/>
             <a:extLst>
               <a:ext uri="{C572A759-6A51-4108-AA02-DFA0A04FC94B}">
-                <ma14:wrappingTextBoxFlag xmlns="" xmlns:ma14="http://schemas.microsoft.com/office/mac/drawingml/2011/main" val="1"/>
+                <ma14:wrappingTextBoxFlag xmlns:ma14="http://schemas.microsoft.com/office/mac/drawingml/2011/main" xmlns="" val="1"/>
               </a:ext>
             </a:extLst>
           </p:spPr>
@@ -31970,7 +31970,7 @@
             <a:effectLst/>
             <a:extLst>
               <a:ext uri="{C572A759-6A51-4108-AA02-DFA0A04FC94B}">
-                <ma14:wrappingTextBoxFlag xmlns:ma14="http://schemas.microsoft.com/office/mac/drawingml/2011/main" xmlns="" val="1"/>
+                <ma14:wrappingTextBoxFlag xmlns="" xmlns:ma14="http://schemas.microsoft.com/office/mac/drawingml/2011/main" val="1"/>
               </a:ext>
             </a:extLst>
           </p:spPr>
@@ -32086,7 +32086,7 @@
             <a:effectLst/>
             <a:extLst>
               <a:ext uri="{C572A759-6A51-4108-AA02-DFA0A04FC94B}">
-                <ma14:wrappingTextBoxFlag xmlns:ma14="http://schemas.microsoft.com/office/mac/drawingml/2011/main" xmlns="" val="1"/>
+                <ma14:wrappingTextBoxFlag xmlns="" xmlns:ma14="http://schemas.microsoft.com/office/mac/drawingml/2011/main" val="1"/>
               </a:ext>
             </a:extLst>
           </p:spPr>
@@ -32202,7 +32202,7 @@
             <a:effectLst/>
             <a:extLst>
               <a:ext uri="{C572A759-6A51-4108-AA02-DFA0A04FC94B}">
-                <ma14:wrappingTextBoxFlag xmlns:ma14="http://schemas.microsoft.com/office/mac/drawingml/2011/main" xmlns="" val="1"/>
+                <ma14:wrappingTextBoxFlag xmlns="" xmlns:ma14="http://schemas.microsoft.com/office/mac/drawingml/2011/main" val="1"/>
               </a:ext>
             </a:extLst>
           </p:spPr>
@@ -32318,7 +32318,7 @@
             <a:effectLst/>
             <a:extLst>
               <a:ext uri="{C572A759-6A51-4108-AA02-DFA0A04FC94B}">
-                <ma14:wrappingTextBoxFlag xmlns:ma14="http://schemas.microsoft.com/office/mac/drawingml/2011/main" xmlns="" val="1"/>
+                <ma14:wrappingTextBoxFlag xmlns="" xmlns:ma14="http://schemas.microsoft.com/office/mac/drawingml/2011/main" val="1"/>
               </a:ext>
             </a:extLst>
           </p:spPr>
@@ -32434,7 +32434,7 @@
             <a:effectLst/>
             <a:extLst>
               <a:ext uri="{C572A759-6A51-4108-AA02-DFA0A04FC94B}">
-                <ma14:wrappingTextBoxFlag xmlns:ma14="http://schemas.microsoft.com/office/mac/drawingml/2011/main" xmlns="" val="1"/>
+                <ma14:wrappingTextBoxFlag xmlns="" xmlns:ma14="http://schemas.microsoft.com/office/mac/drawingml/2011/main" val="1"/>
               </a:ext>
             </a:extLst>
           </p:spPr>
@@ -32550,7 +32550,7 @@
             <a:effectLst/>
             <a:extLst>
               <a:ext uri="{C572A759-6A51-4108-AA02-DFA0A04FC94B}">
-                <ma14:wrappingTextBoxFlag xmlns:ma14="http://schemas.microsoft.com/office/mac/drawingml/2011/main" xmlns="" val="1"/>
+                <ma14:wrappingTextBoxFlag xmlns="" xmlns:ma14="http://schemas.microsoft.com/office/mac/drawingml/2011/main" val="1"/>
               </a:ext>
             </a:extLst>
           </p:spPr>
@@ -34230,7 +34230,7 @@
             <a:effectLst/>
             <a:extLst>
               <a:ext uri="{C572A759-6A51-4108-AA02-DFA0A04FC94B}">
-                <ma14:wrappingTextBoxFlag xmlns="" xmlns:ma14="http://schemas.microsoft.com/office/mac/drawingml/2011/main" val="1"/>
+                <ma14:wrappingTextBoxFlag xmlns:ma14="http://schemas.microsoft.com/office/mac/drawingml/2011/main" xmlns="" val="1"/>
               </a:ext>
             </a:extLst>
           </p:spPr>
@@ -34883,7 +34883,7 @@
             <a:effectLst/>
             <a:extLst>
               <a:ext uri="{C572A759-6A51-4108-AA02-DFA0A04FC94B}">
-                <ma14:wrappingTextBoxFlag xmlns:ma14="http://schemas.microsoft.com/office/mac/drawingml/2011/main" xmlns="" val="1"/>
+                <ma14:wrappingTextBoxFlag xmlns="" xmlns:ma14="http://schemas.microsoft.com/office/mac/drawingml/2011/main" val="1"/>
               </a:ext>
             </a:extLst>
           </p:spPr>
@@ -35372,7 +35372,7 @@
             <a:effectLst/>
             <a:extLst>
               <a:ext uri="{C572A759-6A51-4108-AA02-DFA0A04FC94B}">
-                <ma14:wrappingTextBoxFlag xmlns="" xmlns:ma14="http://schemas.microsoft.com/office/mac/drawingml/2011/main" val="1"/>
+                <ma14:wrappingTextBoxFlag xmlns:ma14="http://schemas.microsoft.com/office/mac/drawingml/2011/main" xmlns="" val="1"/>
               </a:ext>
             </a:extLst>
           </p:spPr>
@@ -35488,7 +35488,7 @@
             <a:effectLst/>
             <a:extLst>
               <a:ext uri="{C572A759-6A51-4108-AA02-DFA0A04FC94B}">
-                <ma14:wrappingTextBoxFlag xmlns="" xmlns:ma14="http://schemas.microsoft.com/office/mac/drawingml/2011/main" val="1"/>
+                <ma14:wrappingTextBoxFlag xmlns:ma14="http://schemas.microsoft.com/office/mac/drawingml/2011/main" xmlns="" val="1"/>
               </a:ext>
             </a:extLst>
           </p:spPr>
@@ -35818,7 +35818,7 @@
             <a:effectLst/>
             <a:extLst>
               <a:ext uri="{C572A759-6A51-4108-AA02-DFA0A04FC94B}">
-                <ma14:wrappingTextBoxFlag xmlns="" xmlns:ma14="http://schemas.microsoft.com/office/mac/drawingml/2011/main" val="1"/>
+                <ma14:wrappingTextBoxFlag xmlns:ma14="http://schemas.microsoft.com/office/mac/drawingml/2011/main" xmlns="" val="1"/>
               </a:ext>
             </a:extLst>
           </p:spPr>
@@ -36246,7 +36246,7 @@
             <a:effectLst/>
             <a:extLst>
               <a:ext uri="{C572A759-6A51-4108-AA02-DFA0A04FC94B}">
-                <ma14:wrappingTextBoxFlag xmlns="" xmlns:ma14="http://schemas.microsoft.com/office/mac/drawingml/2011/main" val="1"/>
+                <ma14:wrappingTextBoxFlag xmlns:ma14="http://schemas.microsoft.com/office/mac/drawingml/2011/main" xmlns="" val="1"/>
               </a:ext>
             </a:extLst>
           </p:spPr>
@@ -37229,7 +37229,7 @@
             <a:effectLst/>
             <a:extLst>
               <a:ext uri="{C572A759-6A51-4108-AA02-DFA0A04FC94B}">
-                <ma14:wrappingTextBoxFlag xmlns="" xmlns:ma14="http://schemas.microsoft.com/office/mac/drawingml/2011/main" val="1"/>
+                <ma14:wrappingTextBoxFlag xmlns:ma14="http://schemas.microsoft.com/office/mac/drawingml/2011/main" xmlns="" val="1"/>
               </a:ext>
             </a:extLst>
           </p:spPr>
@@ -37484,7 +37484,7 @@
             <a:effectLst/>
             <a:extLst>
               <a:ext uri="{C572A759-6A51-4108-AA02-DFA0A04FC94B}">
-                <ma14:wrappingTextBoxFlag xmlns="" xmlns:ma14="http://schemas.microsoft.com/office/mac/drawingml/2011/main" val="1"/>
+                <ma14:wrappingTextBoxFlag xmlns:ma14="http://schemas.microsoft.com/office/mac/drawingml/2011/main" xmlns="" val="1"/>
               </a:ext>
             </a:extLst>
           </p:spPr>
@@ -37814,7 +37814,7 @@
             <a:effectLst/>
             <a:extLst>
               <a:ext uri="{C572A759-6A51-4108-AA02-DFA0A04FC94B}">
-                <ma14:wrappingTextBoxFlag xmlns="" xmlns:ma14="http://schemas.microsoft.com/office/mac/drawingml/2011/main" val="1"/>
+                <ma14:wrappingTextBoxFlag xmlns:ma14="http://schemas.microsoft.com/office/mac/drawingml/2011/main" xmlns="" val="1"/>
               </a:ext>
             </a:extLst>
           </p:spPr>
@@ -38041,7 +38041,7 @@
             <a:effectLst/>
             <a:extLst>
               <a:ext uri="{C572A759-6A51-4108-AA02-DFA0A04FC94B}">
-                <ma14:wrappingTextBoxFlag xmlns="" xmlns:ma14="http://schemas.microsoft.com/office/mac/drawingml/2011/main" val="1"/>
+                <ma14:wrappingTextBoxFlag xmlns:ma14="http://schemas.microsoft.com/office/mac/drawingml/2011/main" xmlns="" val="1"/>
               </a:ext>
             </a:extLst>
           </p:spPr>
@@ -38382,7 +38382,7 @@
             <a:effectLst/>
             <a:extLst>
               <a:ext uri="{C572A759-6A51-4108-AA02-DFA0A04FC94B}">
-                <ma14:wrappingTextBoxFlag xmlns="" xmlns:ma14="http://schemas.microsoft.com/office/mac/drawingml/2011/main" val="1"/>
+                <ma14:wrappingTextBoxFlag xmlns:ma14="http://schemas.microsoft.com/office/mac/drawingml/2011/main" xmlns="" val="1"/>
               </a:ext>
             </a:extLst>
           </p:spPr>
@@ -39020,7 +39020,7 @@
             <a:effectLst/>
             <a:extLst>
               <a:ext uri="{C572A759-6A51-4108-AA02-DFA0A04FC94B}">
-                <ma14:wrappingTextBoxFlag xmlns="" xmlns:ma14="http://schemas.microsoft.com/office/mac/drawingml/2011/main" val="1"/>
+                <ma14:wrappingTextBoxFlag xmlns:ma14="http://schemas.microsoft.com/office/mac/drawingml/2011/main" xmlns="" val="1"/>
               </a:ext>
             </a:extLst>
           </p:spPr>
@@ -39136,7 +39136,7 @@
             <a:effectLst/>
             <a:extLst>
               <a:ext uri="{C572A759-6A51-4108-AA02-DFA0A04FC94B}">
-                <ma14:wrappingTextBoxFlag xmlns="" xmlns:ma14="http://schemas.microsoft.com/office/mac/drawingml/2011/main" val="1"/>
+                <ma14:wrappingTextBoxFlag xmlns:ma14="http://schemas.microsoft.com/office/mac/drawingml/2011/main" xmlns="" val="1"/>
               </a:ext>
             </a:extLst>
           </p:spPr>
@@ -40328,7 +40328,7 @@
             <a:effectLst/>
             <a:extLst>
               <a:ext uri="{C572A759-6A51-4108-AA02-DFA0A04FC94B}">
-                <ma14:wrappingTextBoxFlag xmlns="" xmlns:ma14="http://schemas.microsoft.com/office/mac/drawingml/2011/main" val="1"/>
+                <ma14:wrappingTextBoxFlag xmlns:ma14="http://schemas.microsoft.com/office/mac/drawingml/2011/main" xmlns="" val="1"/>
               </a:ext>
             </a:extLst>
           </p:spPr>
@@ -40444,7 +40444,7 @@
             <a:effectLst/>
             <a:extLst>
               <a:ext uri="{C572A759-6A51-4108-AA02-DFA0A04FC94B}">
-                <ma14:wrappingTextBoxFlag xmlns="" xmlns:ma14="http://schemas.microsoft.com/office/mac/drawingml/2011/main" val="1"/>
+                <ma14:wrappingTextBoxFlag xmlns:ma14="http://schemas.microsoft.com/office/mac/drawingml/2011/main" xmlns="" val="1"/>
               </a:ext>
             </a:extLst>
           </p:spPr>
@@ -40560,7 +40560,7 @@
             <a:effectLst/>
             <a:extLst>
               <a:ext uri="{C572A759-6A51-4108-AA02-DFA0A04FC94B}">
-                <ma14:wrappingTextBoxFlag xmlns="" xmlns:ma14="http://schemas.microsoft.com/office/mac/drawingml/2011/main" val="1"/>
+                <ma14:wrappingTextBoxFlag xmlns:ma14="http://schemas.microsoft.com/office/mac/drawingml/2011/main" xmlns="" val="1"/>
               </a:ext>
             </a:extLst>
           </p:spPr>
@@ -40971,7 +40971,7 @@
             <a:effectLst/>
             <a:extLst>
               <a:ext uri="{C572A759-6A51-4108-AA02-DFA0A04FC94B}">
-                <ma14:wrappingTextBoxFlag xmlns="" xmlns:ma14="http://schemas.microsoft.com/office/mac/drawingml/2011/main" val="1"/>
+                <ma14:wrappingTextBoxFlag xmlns:ma14="http://schemas.microsoft.com/office/mac/drawingml/2011/main" xmlns="" val="1"/>
               </a:ext>
             </a:extLst>
           </p:spPr>
@@ -41087,7 +41087,7 @@
             <a:effectLst/>
             <a:extLst>
               <a:ext uri="{C572A759-6A51-4108-AA02-DFA0A04FC94B}">
-                <ma14:wrappingTextBoxFlag xmlns="" xmlns:ma14="http://schemas.microsoft.com/office/mac/drawingml/2011/main" val="1"/>
+                <ma14:wrappingTextBoxFlag xmlns:ma14="http://schemas.microsoft.com/office/mac/drawingml/2011/main" xmlns="" val="1"/>
               </a:ext>
             </a:extLst>
           </p:spPr>
@@ -41203,7 +41203,7 @@
             <a:effectLst/>
             <a:extLst>
               <a:ext uri="{C572A759-6A51-4108-AA02-DFA0A04FC94B}">
-                <ma14:wrappingTextBoxFlag xmlns="" xmlns:ma14="http://schemas.microsoft.com/office/mac/drawingml/2011/main" val="1"/>
+                <ma14:wrappingTextBoxFlag xmlns:ma14="http://schemas.microsoft.com/office/mac/drawingml/2011/main" xmlns="" val="1"/>
               </a:ext>
             </a:extLst>
           </p:spPr>
@@ -41579,7 +41579,7 @@
             <a:effectLst/>
             <a:extLst>
               <a:ext uri="{C572A759-6A51-4108-AA02-DFA0A04FC94B}">
-                <ma14:wrappingTextBoxFlag xmlns="" xmlns:ma14="http://schemas.microsoft.com/office/mac/drawingml/2011/main" val="1"/>
+                <ma14:wrappingTextBoxFlag xmlns:ma14="http://schemas.microsoft.com/office/mac/drawingml/2011/main" xmlns="" val="1"/>
               </a:ext>
             </a:extLst>
           </p:spPr>
@@ -41712,7 +41712,7 @@
             <a:effectLst/>
             <a:extLst>
               <a:ext uri="{C572A759-6A51-4108-AA02-DFA0A04FC94B}">
-                <ma14:wrappingTextBoxFlag xmlns="" xmlns:ma14="http://schemas.microsoft.com/office/mac/drawingml/2011/main" val="1"/>
+                <ma14:wrappingTextBoxFlag xmlns:ma14="http://schemas.microsoft.com/office/mac/drawingml/2011/main" xmlns="" val="1"/>
               </a:ext>
             </a:extLst>
           </p:spPr>
@@ -41828,7 +41828,7 @@
             <a:effectLst/>
             <a:extLst>
               <a:ext uri="{C572A759-6A51-4108-AA02-DFA0A04FC94B}">
-                <ma14:wrappingTextBoxFlag xmlns="" xmlns:ma14="http://schemas.microsoft.com/office/mac/drawingml/2011/main" val="1"/>
+                <ma14:wrappingTextBoxFlag xmlns:ma14="http://schemas.microsoft.com/office/mac/drawingml/2011/main" xmlns="" val="1"/>
               </a:ext>
             </a:extLst>
           </p:spPr>
@@ -42041,7 +42041,7 @@
             <a:effectLst/>
             <a:extLst>
               <a:ext uri="{C572A759-6A51-4108-AA02-DFA0A04FC94B}">
-                <ma14:wrappingTextBoxFlag xmlns:ma14="http://schemas.microsoft.com/office/mac/drawingml/2011/main" xmlns="" val="1"/>
+                <ma14:wrappingTextBoxFlag xmlns="" xmlns:ma14="http://schemas.microsoft.com/office/mac/drawingml/2011/main" val="1"/>
               </a:ext>
             </a:extLst>
           </p:spPr>
@@ -42272,7 +42272,7 @@
               <a:effectLst/>
               <a:extLst>
                 <a:ext uri="{C572A759-6A51-4108-AA02-DFA0A04FC94B}">
-                  <ma14:wrappingTextBoxFlag xmlns:ma14="http://schemas.microsoft.com/office/mac/drawingml/2011/main" xmlns="" val="1"/>
+                  <ma14:wrappingTextBoxFlag xmlns="" xmlns:ma14="http://schemas.microsoft.com/office/mac/drawingml/2011/main" val="1"/>
                 </a:ext>
               </a:extLst>
             </p:spPr>
@@ -42738,7 +42738,7 @@
               <a:effectLst/>
               <a:extLst>
                 <a:ext uri="{C572A759-6A51-4108-AA02-DFA0A04FC94B}">
-                  <ma14:wrappingTextBoxFlag xmlns:ma14="http://schemas.microsoft.com/office/mac/drawingml/2011/main" xmlns="" val="1"/>
+                  <ma14:wrappingTextBoxFlag xmlns="" xmlns:ma14="http://schemas.microsoft.com/office/mac/drawingml/2011/main" val="1"/>
                 </a:ext>
               </a:extLst>
             </p:spPr>
@@ -43474,7 +43474,7 @@
               <a:effectLst/>
               <a:extLst>
                 <a:ext uri="{C572A759-6A51-4108-AA02-DFA0A04FC94B}">
-                  <ma14:wrappingTextBoxFlag xmlns:ma14="http://schemas.microsoft.com/office/mac/drawingml/2011/main" xmlns="" val="1"/>
+                  <ma14:wrappingTextBoxFlag xmlns="" xmlns:ma14="http://schemas.microsoft.com/office/mac/drawingml/2011/main" val="1"/>
                 </a:ext>
               </a:extLst>
             </p:spPr>
@@ -43966,7 +43966,7 @@
             <a:effectLst/>
             <a:extLst>
               <a:ext uri="{C572A759-6A51-4108-AA02-DFA0A04FC94B}">
-                <ma14:wrappingTextBoxFlag xmlns:ma14="http://schemas.microsoft.com/office/mac/drawingml/2011/main" xmlns="" val="1"/>
+                <ma14:wrappingTextBoxFlag xmlns="" xmlns:ma14="http://schemas.microsoft.com/office/mac/drawingml/2011/main" val="1"/>
               </a:ext>
             </a:extLst>
           </p:spPr>
@@ -44099,7 +44099,7 @@
             <a:effectLst/>
             <a:extLst>
               <a:ext uri="{C572A759-6A51-4108-AA02-DFA0A04FC94B}">
-                <ma14:wrappingTextBoxFlag xmlns:ma14="http://schemas.microsoft.com/office/mac/drawingml/2011/main" xmlns="" val="1"/>
+                <ma14:wrappingTextBoxFlag xmlns="" xmlns:ma14="http://schemas.microsoft.com/office/mac/drawingml/2011/main" val="1"/>
               </a:ext>
             </a:extLst>
           </p:spPr>
@@ -44232,7 +44232,7 @@
             <a:effectLst/>
             <a:extLst>
               <a:ext uri="{C572A759-6A51-4108-AA02-DFA0A04FC94B}">
-                <ma14:wrappingTextBoxFlag xmlns="" xmlns:ma14="http://schemas.microsoft.com/office/mac/drawingml/2011/main" val="1"/>
+                <ma14:wrappingTextBoxFlag xmlns:ma14="http://schemas.microsoft.com/office/mac/drawingml/2011/main" xmlns="" val="1"/>
               </a:ext>
             </a:extLst>
           </p:spPr>
@@ -44463,7 +44463,7 @@
               <a:effectLst/>
               <a:extLst>
                 <a:ext uri="{C572A759-6A51-4108-AA02-DFA0A04FC94B}">
-                  <ma14:wrappingTextBoxFlag xmlns="" xmlns:ma14="http://schemas.microsoft.com/office/mac/drawingml/2011/main" val="1"/>
+                  <ma14:wrappingTextBoxFlag xmlns:ma14="http://schemas.microsoft.com/office/mac/drawingml/2011/main" xmlns="" val="1"/>
                 </a:ext>
               </a:extLst>
             </p:spPr>
@@ -44841,7 +44841,7 @@
               <a:effectLst/>
               <a:extLst>
                 <a:ext uri="{C572A759-6A51-4108-AA02-DFA0A04FC94B}">
-                  <ma14:wrappingTextBoxFlag xmlns="" xmlns:ma14="http://schemas.microsoft.com/office/mac/drawingml/2011/main" val="1"/>
+                  <ma14:wrappingTextBoxFlag xmlns:ma14="http://schemas.microsoft.com/office/mac/drawingml/2011/main" xmlns="" val="1"/>
                 </a:ext>
               </a:extLst>
             </p:spPr>
@@ -45577,7 +45577,7 @@
               <a:effectLst/>
               <a:extLst>
                 <a:ext uri="{C572A759-6A51-4108-AA02-DFA0A04FC94B}">
-                  <ma14:wrappingTextBoxFlag xmlns="" xmlns:ma14="http://schemas.microsoft.com/office/mac/drawingml/2011/main" val="1"/>
+                  <ma14:wrappingTextBoxFlag xmlns:ma14="http://schemas.microsoft.com/office/mac/drawingml/2011/main" xmlns="" val="1"/>
                 </a:ext>
               </a:extLst>
             </p:spPr>
@@ -45817,7 +45817,7 @@
             <a:effectLst/>
             <a:extLst>
               <a:ext uri="{C572A759-6A51-4108-AA02-DFA0A04FC94B}">
-                <ma14:wrappingTextBoxFlag xmlns="" xmlns:ma14="http://schemas.microsoft.com/office/mac/drawingml/2011/main" val="1"/>
+                <ma14:wrappingTextBoxFlag xmlns:ma14="http://schemas.microsoft.com/office/mac/drawingml/2011/main" xmlns="" val="1"/>
               </a:ext>
             </a:extLst>
           </p:spPr>
@@ -46070,7 +46070,7 @@
             <a:effectLst/>
             <a:extLst>
               <a:ext uri="{C572A759-6A51-4108-AA02-DFA0A04FC94B}">
-                <ma14:wrappingTextBoxFlag xmlns="" xmlns:ma14="http://schemas.microsoft.com/office/mac/drawingml/2011/main" val="1"/>
+                <ma14:wrappingTextBoxFlag xmlns:ma14="http://schemas.microsoft.com/office/mac/drawingml/2011/main" xmlns="" val="1"/>
               </a:ext>
             </a:extLst>
           </p:spPr>
@@ -46402,7 +46402,7 @@
               <a:effectLst/>
               <a:extLst>
                 <a:ext uri="{C572A759-6A51-4108-AA02-DFA0A04FC94B}">
-                  <ma14:wrappingTextBoxFlag xmlns="" xmlns:ma14="http://schemas.microsoft.com/office/mac/drawingml/2011/main" val="1"/>
+                  <ma14:wrappingTextBoxFlag xmlns:ma14="http://schemas.microsoft.com/office/mac/drawingml/2011/main" xmlns="" val="1"/>
                 </a:ext>
               </a:extLst>
             </p:spPr>
@@ -46595,7 +46595,7 @@
             <a:effectLst/>
             <a:extLst>
               <a:ext uri="{C572A759-6A51-4108-AA02-DFA0A04FC94B}">
-                <ma14:wrappingTextBoxFlag xmlns="" xmlns:ma14="http://schemas.microsoft.com/office/mac/drawingml/2011/main" val="1"/>
+                <ma14:wrappingTextBoxFlag xmlns:ma14="http://schemas.microsoft.com/office/mac/drawingml/2011/main" xmlns="" val="1"/>
               </a:ext>
             </a:extLst>
           </p:spPr>

</xml_diff>

<commit_message>
update blog on eda dev
</commit_message>
<xml_diff>
--- a/docs/Diagrams.pptx
+++ b/docs/Diagrams.pptx
@@ -6,7 +6,7 @@
     <p:sldMasterId id="2147484308" r:id="rId2"/>
   </p:sldMasterIdLst>
   <p:notesMasterIdLst>
-    <p:notesMasterId r:id="rId23"/>
+    <p:notesMasterId r:id="rId24"/>
   </p:notesMasterIdLst>
   <p:sldIdLst>
     <p:sldId id="2670" r:id="rId3"/>
@@ -29,6 +29,7 @@
     <p:sldId id="2687" r:id="rId20"/>
     <p:sldId id="2688" r:id="rId21"/>
     <p:sldId id="2689" r:id="rId22"/>
+    <p:sldId id="2692" r:id="rId23"/>
   </p:sldIdLst>
   <p:sldSz cx="12192000" cy="6858000"/>
   <p:notesSz cx="7086600" cy="9372600"/>
@@ -291,7 +292,7 @@
               <a:pPr>
                 <a:defRPr/>
               </a:pPr>
-              <a:t>10/21/21</a:t>
+              <a:t>12/6/21</a:t>
             </a:fld>
             <a:endParaRPr lang="en-US"/>
           </a:p>
@@ -9268,7 +9269,7 @@
             <a:effectLst/>
             <a:extLst>
               <a:ext uri="{C572A759-6A51-4108-AA02-DFA0A04FC94B}">
-                <ma14:wrappingTextBoxFlag xmlns="" xmlns:ma14="http://schemas.microsoft.com/office/mac/drawingml/2011/main" val="1"/>
+                <ma14:wrappingTextBoxFlag xmlns:ma14="http://schemas.microsoft.com/office/mac/drawingml/2011/main" xmlns="" val="1"/>
               </a:ext>
             </a:extLst>
           </p:spPr>
@@ -10084,7 +10085,7 @@
             <a:effectLst/>
             <a:extLst>
               <a:ext uri="{C572A759-6A51-4108-AA02-DFA0A04FC94B}">
-                <ma14:wrappingTextBoxFlag xmlns="" xmlns:ma14="http://schemas.microsoft.com/office/mac/drawingml/2011/main" val="1"/>
+                <ma14:wrappingTextBoxFlag xmlns:ma14="http://schemas.microsoft.com/office/mac/drawingml/2011/main" xmlns="" val="1"/>
               </a:ext>
             </a:extLst>
           </p:spPr>
@@ -10200,7 +10201,7 @@
             <a:effectLst/>
             <a:extLst>
               <a:ext uri="{C572A759-6A51-4108-AA02-DFA0A04FC94B}">
-                <ma14:wrappingTextBoxFlag xmlns="" xmlns:ma14="http://schemas.microsoft.com/office/mac/drawingml/2011/main" val="1"/>
+                <ma14:wrappingTextBoxFlag xmlns:ma14="http://schemas.microsoft.com/office/mac/drawingml/2011/main" xmlns="" val="1"/>
               </a:ext>
             </a:extLst>
           </p:spPr>
@@ -10380,7 +10381,7 @@
             <a:effectLst/>
             <a:extLst>
               <a:ext uri="{C572A759-6A51-4108-AA02-DFA0A04FC94B}">
-                <ma14:wrappingTextBoxFlag xmlns:ma14="http://schemas.microsoft.com/office/mac/drawingml/2011/main" xmlns="" val="1"/>
+                <ma14:wrappingTextBoxFlag xmlns="" xmlns:ma14="http://schemas.microsoft.com/office/mac/drawingml/2011/main" val="1"/>
               </a:ext>
             </a:extLst>
           </p:spPr>
@@ -10695,7 +10696,7 @@
               <a:effectLst/>
               <a:extLst>
                 <a:ext uri="{C572A759-6A51-4108-AA02-DFA0A04FC94B}">
-                  <ma14:wrappingTextBoxFlag xmlns="" xmlns:ma14="http://schemas.microsoft.com/office/mac/drawingml/2011/main" val="1"/>
+                  <ma14:wrappingTextBoxFlag xmlns:ma14="http://schemas.microsoft.com/office/mac/drawingml/2011/main" xmlns="" val="1"/>
                 </a:ext>
               </a:extLst>
             </p:spPr>
@@ -10909,7 +10910,7 @@
               <a:effectLst/>
               <a:extLst>
                 <a:ext uri="{C572A759-6A51-4108-AA02-DFA0A04FC94B}">
-                  <ma14:wrappingTextBoxFlag xmlns="" xmlns:ma14="http://schemas.microsoft.com/office/mac/drawingml/2011/main" val="1"/>
+                  <ma14:wrappingTextBoxFlag xmlns:ma14="http://schemas.microsoft.com/office/mac/drawingml/2011/main" xmlns="" val="1"/>
                 </a:ext>
               </a:extLst>
             </p:spPr>
@@ -11191,7 +11192,7 @@
             <a:effectLst/>
             <a:extLst>
               <a:ext uri="{C572A759-6A51-4108-AA02-DFA0A04FC94B}">
-                <ma14:wrappingTextBoxFlag xmlns="" xmlns:ma14="http://schemas.microsoft.com/office/mac/drawingml/2011/main" val="1"/>
+                <ma14:wrappingTextBoxFlag xmlns:ma14="http://schemas.microsoft.com/office/mac/drawingml/2011/main" xmlns="" val="1"/>
               </a:ext>
             </a:extLst>
           </p:spPr>
@@ -11307,7 +11308,7 @@
             <a:effectLst/>
             <a:extLst>
               <a:ext uri="{C572A759-6A51-4108-AA02-DFA0A04FC94B}">
-                <ma14:wrappingTextBoxFlag xmlns="" xmlns:ma14="http://schemas.microsoft.com/office/mac/drawingml/2011/main" val="1"/>
+                <ma14:wrappingTextBoxFlag xmlns:ma14="http://schemas.microsoft.com/office/mac/drawingml/2011/main" xmlns="" val="1"/>
               </a:ext>
             </a:extLst>
           </p:spPr>
@@ -12445,7 +12446,7 @@
             <a:effectLst/>
             <a:extLst>
               <a:ext uri="{C572A759-6A51-4108-AA02-DFA0A04FC94B}">
-                <ma14:wrappingTextBoxFlag xmlns:ma14="http://schemas.microsoft.com/office/mac/drawingml/2011/main" xmlns="" val="1"/>
+                <ma14:wrappingTextBoxFlag xmlns="" xmlns:ma14="http://schemas.microsoft.com/office/mac/drawingml/2011/main" val="1"/>
               </a:ext>
             </a:extLst>
           </p:spPr>
@@ -12578,7 +12579,7 @@
             <a:effectLst/>
             <a:extLst>
               <a:ext uri="{C572A759-6A51-4108-AA02-DFA0A04FC94B}">
-                <ma14:wrappingTextBoxFlag xmlns:ma14="http://schemas.microsoft.com/office/mac/drawingml/2011/main" xmlns="" val="1"/>
+                <ma14:wrappingTextBoxFlag xmlns="" xmlns:ma14="http://schemas.microsoft.com/office/mac/drawingml/2011/main" val="1"/>
               </a:ext>
             </a:extLst>
           </p:spPr>
@@ -12890,7 +12891,7 @@
               <a:effectLst/>
               <a:extLst>
                 <a:ext uri="{C572A759-6A51-4108-AA02-DFA0A04FC94B}">
-                  <ma14:wrappingTextBoxFlag xmlns="" xmlns:ma14="http://schemas.microsoft.com/office/mac/drawingml/2011/main" val="1"/>
+                  <ma14:wrappingTextBoxFlag xmlns:ma14="http://schemas.microsoft.com/office/mac/drawingml/2011/main" xmlns="" val="1"/>
                 </a:ext>
               </a:extLst>
             </p:spPr>
@@ -13314,7 +13315,7 @@
               <a:effectLst/>
               <a:extLst>
                 <a:ext uri="{C572A759-6A51-4108-AA02-DFA0A04FC94B}">
-                  <ma14:wrappingTextBoxFlag xmlns="" xmlns:ma14="http://schemas.microsoft.com/office/mac/drawingml/2011/main" val="1"/>
+                  <ma14:wrappingTextBoxFlag xmlns:ma14="http://schemas.microsoft.com/office/mac/drawingml/2011/main" xmlns="" val="1"/>
                 </a:ext>
               </a:extLst>
             </p:spPr>
@@ -13965,7 +13966,7 @@
             <a:effectLst/>
             <a:extLst>
               <a:ext uri="{C572A759-6A51-4108-AA02-DFA0A04FC94B}">
-                <ma14:wrappingTextBoxFlag xmlns="" xmlns:ma14="http://schemas.microsoft.com/office/mac/drawingml/2011/main" val="1"/>
+                <ma14:wrappingTextBoxFlag xmlns:ma14="http://schemas.microsoft.com/office/mac/drawingml/2011/main" xmlns="" val="1"/>
               </a:ext>
             </a:extLst>
           </p:spPr>
@@ -14220,7 +14221,7 @@
             <a:effectLst/>
             <a:extLst>
               <a:ext uri="{C572A759-6A51-4108-AA02-DFA0A04FC94B}">
-                <ma14:wrappingTextBoxFlag xmlns:ma14="http://schemas.microsoft.com/office/mac/drawingml/2011/main" xmlns="" val="1"/>
+                <ma14:wrappingTextBoxFlag xmlns="" xmlns:ma14="http://schemas.microsoft.com/office/mac/drawingml/2011/main" val="1"/>
               </a:ext>
             </a:extLst>
           </p:spPr>
@@ -14468,7 +14469,7 @@
               <a:effectLst/>
               <a:extLst>
                 <a:ext uri="{C572A759-6A51-4108-AA02-DFA0A04FC94B}">
-                  <ma14:wrappingTextBoxFlag xmlns="" xmlns:ma14="http://schemas.microsoft.com/office/mac/drawingml/2011/main" val="1"/>
+                  <ma14:wrappingTextBoxFlag xmlns:ma14="http://schemas.microsoft.com/office/mac/drawingml/2011/main" xmlns="" val="1"/>
                 </a:ext>
               </a:extLst>
             </p:spPr>
@@ -14766,7 +14767,7 @@
               <a:effectLst/>
               <a:extLst>
                 <a:ext uri="{C572A759-6A51-4108-AA02-DFA0A04FC94B}">
-                  <ma14:wrappingTextBoxFlag xmlns="" xmlns:ma14="http://schemas.microsoft.com/office/mac/drawingml/2011/main" val="1"/>
+                  <ma14:wrappingTextBoxFlag xmlns:ma14="http://schemas.microsoft.com/office/mac/drawingml/2011/main" xmlns="" val="1"/>
                 </a:ext>
               </a:extLst>
             </p:spPr>
@@ -16076,7 +16077,7 @@
             <a:effectLst/>
             <a:extLst>
               <a:ext uri="{C572A759-6A51-4108-AA02-DFA0A04FC94B}">
-                <ma14:wrappingTextBoxFlag xmlns:ma14="http://schemas.microsoft.com/office/mac/drawingml/2011/main" xmlns="" val="1"/>
+                <ma14:wrappingTextBoxFlag xmlns="" xmlns:ma14="http://schemas.microsoft.com/office/mac/drawingml/2011/main" val="1"/>
               </a:ext>
             </a:extLst>
           </p:spPr>
@@ -16192,7 +16193,7 @@
             <a:effectLst/>
             <a:extLst>
               <a:ext uri="{C572A759-6A51-4108-AA02-DFA0A04FC94B}">
-                <ma14:wrappingTextBoxFlag xmlns:ma14="http://schemas.microsoft.com/office/mac/drawingml/2011/main" xmlns="" val="1"/>
+                <ma14:wrappingTextBoxFlag xmlns="" xmlns:ma14="http://schemas.microsoft.com/office/mac/drawingml/2011/main" val="1"/>
               </a:ext>
             </a:extLst>
           </p:spPr>
@@ -16613,7 +16614,7 @@
             <a:effectLst/>
             <a:extLst>
               <a:ext uri="{C572A759-6A51-4108-AA02-DFA0A04FC94B}">
-                <ma14:wrappingTextBoxFlag xmlns:ma14="http://schemas.microsoft.com/office/mac/drawingml/2011/main" xmlns="" val="1"/>
+                <ma14:wrappingTextBoxFlag xmlns="" xmlns:ma14="http://schemas.microsoft.com/office/mac/drawingml/2011/main" val="1"/>
               </a:ext>
             </a:extLst>
           </p:spPr>
@@ -16772,7 +16773,7 @@
             <a:effectLst/>
             <a:extLst>
               <a:ext uri="{C572A759-6A51-4108-AA02-DFA0A04FC94B}">
-                <ma14:wrappingTextBoxFlag xmlns="" xmlns:ma14="http://schemas.microsoft.com/office/mac/drawingml/2011/main" val="1"/>
+                <ma14:wrappingTextBoxFlag xmlns:ma14="http://schemas.microsoft.com/office/mac/drawingml/2011/main" xmlns="" val="1"/>
               </a:ext>
             </a:extLst>
           </p:spPr>
@@ -17291,7 +17292,7 @@
               <a:effectLst/>
               <a:extLst>
                 <a:ext uri="{C572A759-6A51-4108-AA02-DFA0A04FC94B}">
-                  <ma14:wrappingTextBoxFlag xmlns="" xmlns:ma14="http://schemas.microsoft.com/office/mac/drawingml/2011/main" val="1"/>
+                  <ma14:wrappingTextBoxFlag xmlns:ma14="http://schemas.microsoft.com/office/mac/drawingml/2011/main" xmlns="" val="1"/>
                 </a:ext>
               </a:extLst>
             </p:spPr>
@@ -17441,7 +17442,7 @@
             <a:effectLst/>
             <a:extLst>
               <a:ext uri="{C572A759-6A51-4108-AA02-DFA0A04FC94B}">
-                <ma14:wrappingTextBoxFlag xmlns:ma14="http://schemas.microsoft.com/office/mac/drawingml/2011/main" xmlns="" val="1"/>
+                <ma14:wrappingTextBoxFlag xmlns="" xmlns:ma14="http://schemas.microsoft.com/office/mac/drawingml/2011/main" val="1"/>
               </a:ext>
             </a:extLst>
           </p:spPr>
@@ -17601,7 +17602,7 @@
             <a:effectLst/>
             <a:extLst>
               <a:ext uri="{C572A759-6A51-4108-AA02-DFA0A04FC94B}">
-                <ma14:wrappingTextBoxFlag xmlns="" xmlns:ma14="http://schemas.microsoft.com/office/mac/drawingml/2011/main" val="1"/>
+                <ma14:wrappingTextBoxFlag xmlns:ma14="http://schemas.microsoft.com/office/mac/drawingml/2011/main" xmlns="" val="1"/>
               </a:ext>
             </a:extLst>
           </p:spPr>
@@ -17902,7 +17903,7 @@
               <a:effectLst/>
               <a:extLst>
                 <a:ext uri="{C572A759-6A51-4108-AA02-DFA0A04FC94B}">
-                  <ma14:wrappingTextBoxFlag xmlns="" xmlns:ma14="http://schemas.microsoft.com/office/mac/drawingml/2011/main" val="1"/>
+                  <ma14:wrappingTextBoxFlag xmlns:ma14="http://schemas.microsoft.com/office/mac/drawingml/2011/main" xmlns="" val="1"/>
                 </a:ext>
               </a:extLst>
             </p:spPr>
@@ -26702,7 +26703,7 @@
             <a:effectLst/>
             <a:extLst>
               <a:ext uri="{C572A759-6A51-4108-AA02-DFA0A04FC94B}">
-                <ma14:wrappingTextBoxFlag xmlns="" xmlns:ma14="http://schemas.microsoft.com/office/mac/drawingml/2011/main" val="1"/>
+                <ma14:wrappingTextBoxFlag xmlns:ma14="http://schemas.microsoft.com/office/mac/drawingml/2011/main" xmlns="" val="1"/>
               </a:ext>
             </a:extLst>
           </p:spPr>
@@ -26818,7 +26819,7 @@
             <a:effectLst/>
             <a:extLst>
               <a:ext uri="{C572A759-6A51-4108-AA02-DFA0A04FC94B}">
-                <ma14:wrappingTextBoxFlag xmlns="" xmlns:ma14="http://schemas.microsoft.com/office/mac/drawingml/2011/main" val="1"/>
+                <ma14:wrappingTextBoxFlag xmlns:ma14="http://schemas.microsoft.com/office/mac/drawingml/2011/main" xmlns="" val="1"/>
               </a:ext>
             </a:extLst>
           </p:spPr>
@@ -27288,7 +27289,7 @@
             <a:effectLst/>
             <a:extLst>
               <a:ext uri="{C572A759-6A51-4108-AA02-DFA0A04FC94B}">
-                <ma14:wrappingTextBoxFlag xmlns="" xmlns:ma14="http://schemas.microsoft.com/office/mac/drawingml/2011/main" val="1"/>
+                <ma14:wrappingTextBoxFlag xmlns:ma14="http://schemas.microsoft.com/office/mac/drawingml/2011/main" xmlns="" val="1"/>
               </a:ext>
             </a:extLst>
           </p:spPr>
@@ -27598,7 +27599,7 @@
             <a:effectLst/>
             <a:extLst>
               <a:ext uri="{C572A759-6A51-4108-AA02-DFA0A04FC94B}">
-                <ma14:wrappingTextBoxFlag xmlns="" xmlns:ma14="http://schemas.microsoft.com/office/mac/drawingml/2011/main" val="1"/>
+                <ma14:wrappingTextBoxFlag xmlns:ma14="http://schemas.microsoft.com/office/mac/drawingml/2011/main" xmlns="" val="1"/>
               </a:ext>
             </a:extLst>
           </p:spPr>
@@ -27832,7 +27833,7 @@
             <a:effectLst/>
             <a:extLst>
               <a:ext uri="{C572A759-6A51-4108-AA02-DFA0A04FC94B}">
-                <ma14:wrappingTextBoxFlag xmlns="" xmlns:ma14="http://schemas.microsoft.com/office/mac/drawingml/2011/main" val="1"/>
+                <ma14:wrappingTextBoxFlag xmlns:ma14="http://schemas.microsoft.com/office/mac/drawingml/2011/main" xmlns="" val="1"/>
               </a:ext>
             </a:extLst>
           </p:spPr>
@@ -27965,7 +27966,7 @@
             <a:effectLst/>
             <a:extLst>
               <a:ext uri="{C572A759-6A51-4108-AA02-DFA0A04FC94B}">
-                <ma14:wrappingTextBoxFlag xmlns="" xmlns:ma14="http://schemas.microsoft.com/office/mac/drawingml/2011/main" val="1"/>
+                <ma14:wrappingTextBoxFlag xmlns:ma14="http://schemas.microsoft.com/office/mac/drawingml/2011/main" xmlns="" val="1"/>
               </a:ext>
             </a:extLst>
           </p:spPr>
@@ -29038,7 +29039,7 @@
             <a:effectLst/>
             <a:extLst>
               <a:ext uri="{C572A759-6A51-4108-AA02-DFA0A04FC94B}">
-                <ma14:wrappingTextBoxFlag xmlns="" xmlns:ma14="http://schemas.microsoft.com/office/mac/drawingml/2011/main" val="1"/>
+                <ma14:wrappingTextBoxFlag xmlns:ma14="http://schemas.microsoft.com/office/mac/drawingml/2011/main" xmlns="" val="1"/>
               </a:ext>
             </a:extLst>
           </p:spPr>
@@ -29387,7 +29388,7 @@
             <a:effectLst/>
             <a:extLst>
               <a:ext uri="{C572A759-6A51-4108-AA02-DFA0A04FC94B}">
-                <ma14:wrappingTextBoxFlag xmlns="" xmlns:ma14="http://schemas.microsoft.com/office/mac/drawingml/2011/main" val="1"/>
+                <ma14:wrappingTextBoxFlag xmlns:ma14="http://schemas.microsoft.com/office/mac/drawingml/2011/main" xmlns="" val="1"/>
               </a:ext>
             </a:extLst>
           </p:spPr>
@@ -29807,7 +29808,7 @@
             <a:effectLst/>
             <a:extLst>
               <a:ext uri="{C572A759-6A51-4108-AA02-DFA0A04FC94B}">
-                <ma14:wrappingTextBoxFlag xmlns="" xmlns:ma14="http://schemas.microsoft.com/office/mac/drawingml/2011/main" val="1"/>
+                <ma14:wrappingTextBoxFlag xmlns:ma14="http://schemas.microsoft.com/office/mac/drawingml/2011/main" xmlns="" val="1"/>
               </a:ext>
             </a:extLst>
           </p:spPr>
@@ -31305,7 +31306,7 @@
             <a:effectLst/>
             <a:extLst>
               <a:ext uri="{C572A759-6A51-4108-AA02-DFA0A04FC94B}">
-                <ma14:wrappingTextBoxFlag xmlns="" xmlns:ma14="http://schemas.microsoft.com/office/mac/drawingml/2011/main" val="1"/>
+                <ma14:wrappingTextBoxFlag xmlns:ma14="http://schemas.microsoft.com/office/mac/drawingml/2011/main" xmlns="" val="1"/>
               </a:ext>
             </a:extLst>
           </p:spPr>
@@ -33104,6 +33105,805 @@
     <p:extLst>
       <p:ext uri="{BB962C8B-B14F-4D97-AF65-F5344CB8AC3E}">
         <p14:creationId xmlns:p14="http://schemas.microsoft.com/office/powerpoint/2010/main" val="637984822"/>
+      </p:ext>
+    </p:extLst>
+  </p:cSld>
+  <p:clrMapOvr>
+    <a:masterClrMapping/>
+  </p:clrMapOvr>
+</p:sld>
+</file>
+
+<file path=ppt/slides/slide21.xml><?xml version="1.0" encoding="utf-8"?>
+<p:sld xmlns:a="http://schemas.openxmlformats.org/drawingml/2006/main" xmlns:r="http://schemas.openxmlformats.org/officeDocument/2006/relationships" xmlns:p="http://schemas.openxmlformats.org/presentationml/2006/main">
+  <p:cSld>
+    <p:spTree>
+      <p:nvGrpSpPr>
+        <p:cNvPr id="1" name=""/>
+        <p:cNvGrpSpPr/>
+        <p:nvPr/>
+      </p:nvGrpSpPr>
+      <p:grpSpPr>
+        <a:xfrm>
+          <a:off x="0" y="0"/>
+          <a:ext cx="0" cy="0"/>
+          <a:chOff x="0" y="0"/>
+          <a:chExt cx="0" cy="0"/>
+        </a:xfrm>
+      </p:grpSpPr>
+      <p:pic>
+        <p:nvPicPr>
+          <p:cNvPr id="2" name="Picture 1">
+            <a:extLst>
+              <a:ext uri="{FF2B5EF4-FFF2-40B4-BE49-F238E27FC236}">
+                <a16:creationId xmlns:a16="http://schemas.microsoft.com/office/drawing/2014/main" id="{8AD36365-784C-D547-B815-D4A46450F514}"/>
+              </a:ext>
+            </a:extLst>
+          </p:cNvPr>
+          <p:cNvPicPr>
+            <a:picLocks noChangeAspect="1"/>
+          </p:cNvPicPr>
+          <p:nvPr/>
+        </p:nvPicPr>
+        <p:blipFill>
+          <a:blip r:embed="rId2"/>
+          <a:stretch>
+            <a:fillRect/>
+          </a:stretch>
+        </p:blipFill>
+        <p:spPr>
+          <a:xfrm>
+            <a:off x="361950" y="374650"/>
+            <a:ext cx="3105150" cy="1446081"/>
+          </a:xfrm>
+          <a:prstGeom prst="rect">
+            <a:avLst/>
+          </a:prstGeom>
+        </p:spPr>
+      </p:pic>
+      <p:sp>
+        <p:nvSpPr>
+          <p:cNvPr id="4" name="Rectangle 3">
+            <a:extLst>
+              <a:ext uri="{FF2B5EF4-FFF2-40B4-BE49-F238E27FC236}">
+                <a16:creationId xmlns:a16="http://schemas.microsoft.com/office/drawing/2014/main" id="{7140FB5C-BE76-614C-B91A-FFA4840BB7FA}"/>
+              </a:ext>
+            </a:extLst>
+          </p:cNvPr>
+          <p:cNvSpPr/>
+          <p:nvPr/>
+        </p:nvSpPr>
+        <p:spPr>
+          <a:xfrm>
+            <a:off x="5802634" y="636334"/>
+            <a:ext cx="2896506" cy="911647"/>
+          </a:xfrm>
+          <a:prstGeom prst="rect">
+            <a:avLst/>
+          </a:prstGeom>
+          <a:solidFill>
+            <a:schemeClr val="bg1"/>
+          </a:solidFill>
+          <a:ln>
+            <a:solidFill>
+              <a:srgbClr val="7030A0"/>
+            </a:solidFill>
+            <a:prstDash val="solid"/>
+          </a:ln>
+          <a:effectLst>
+            <a:outerShdw blurRad="50800" dist="38100" dir="5400000" algn="t" rotWithShape="0">
+              <a:prstClr val="black">
+                <a:alpha val="40000"/>
+              </a:prstClr>
+            </a:outerShdw>
+          </a:effectLst>
+        </p:spPr>
+        <p:style>
+          <a:lnRef idx="2">
+            <a:schemeClr val="accent1">
+              <a:shade val="50000"/>
+            </a:schemeClr>
+          </a:lnRef>
+          <a:fillRef idx="1">
+            <a:schemeClr val="accent1"/>
+          </a:fillRef>
+          <a:effectRef idx="0">
+            <a:schemeClr val="accent1"/>
+          </a:effectRef>
+          <a:fontRef idx="minor">
+            <a:schemeClr val="lt1"/>
+          </a:fontRef>
+        </p:style>
+        <p:txBody>
+          <a:bodyPr rtlCol="0" anchor="t"/>
+          <a:lstStyle/>
+          <a:p>
+            <a:pPr algn="ctr"/>
+            <a:r>
+              <a:rPr lang="en-US" sz="1050" dirty="0" err="1">
+                <a:solidFill>
+                  <a:schemeClr val="accent1">
+                    <a:lumMod val="75000"/>
+                  </a:schemeClr>
+                </a:solidFill>
+              </a:rPr>
+              <a:t>eda</a:t>
+            </a:r>
+            <a:r>
+              <a:rPr lang="en-US" sz="1050" dirty="0">
+                <a:solidFill>
+                  <a:schemeClr val="accent1">
+                    <a:lumMod val="75000"/>
+                  </a:schemeClr>
+                </a:solidFill>
+              </a:rPr>
+              <a:t>-demo-producer-</a:t>
+            </a:r>
+            <a:r>
+              <a:rPr lang="en-US" sz="1050" dirty="0" err="1">
+                <a:solidFill>
+                  <a:schemeClr val="accent1">
+                    <a:lumMod val="75000"/>
+                  </a:schemeClr>
+                </a:solidFill>
+              </a:rPr>
+              <a:t>ms</a:t>
+            </a:r>
+            <a:endParaRPr lang="en-US" sz="1050" dirty="0">
+              <a:solidFill>
+                <a:schemeClr val="accent1">
+                  <a:lumMod val="75000"/>
+                </a:schemeClr>
+              </a:solidFill>
+            </a:endParaRPr>
+          </a:p>
+        </p:txBody>
+      </p:sp>
+      <p:pic>
+        <p:nvPicPr>
+          <p:cNvPr id="3" name="Picture 2" descr="Github Logo - Free social media icons">
+            <a:extLst>
+              <a:ext uri="{FF2B5EF4-FFF2-40B4-BE49-F238E27FC236}">
+                <a16:creationId xmlns:a16="http://schemas.microsoft.com/office/drawing/2014/main" id="{25B55492-E4FD-BF41-9B76-374D8392CCDE}"/>
+              </a:ext>
+            </a:extLst>
+          </p:cNvPr>
+          <p:cNvPicPr>
+            <a:picLocks noChangeAspect="1" noChangeArrowheads="1"/>
+          </p:cNvPicPr>
+          <p:nvPr/>
+        </p:nvPicPr>
+        <p:blipFill>
+          <a:blip r:embed="rId3">
+            <a:extLst>
+              <a:ext uri="{28A0092B-C50C-407E-A947-70E740481C1C}">
+                <a14:useLocalDpi xmlns:a14="http://schemas.microsoft.com/office/drawing/2010/main" val="0"/>
+              </a:ext>
+            </a:extLst>
+          </a:blip>
+          <a:srcRect/>
+          <a:stretch>
+            <a:fillRect/>
+          </a:stretch>
+        </p:blipFill>
+        <p:spPr bwMode="auto">
+          <a:xfrm>
+            <a:off x="5828396" y="636334"/>
+            <a:ext cx="356325" cy="356325"/>
+          </a:xfrm>
+          <a:prstGeom prst="rect">
+            <a:avLst/>
+          </a:prstGeom>
+          <a:noFill/>
+          <a:extLst>
+            <a:ext uri="{909E8E84-426E-40DD-AFC4-6F175D3DCCD1}">
+              <a14:hiddenFill xmlns:a14="http://schemas.microsoft.com/office/drawing/2010/main">
+                <a:solidFill>
+                  <a:srgbClr val="FFFFFF"/>
+                </a:solidFill>
+              </a14:hiddenFill>
+            </a:ext>
+          </a:extLst>
+        </p:spPr>
+      </p:pic>
+      <p:cxnSp>
+        <p:nvCxnSpPr>
+          <p:cNvPr id="5" name="Elbow Connector 4">
+            <a:extLst>
+              <a:ext uri="{FF2B5EF4-FFF2-40B4-BE49-F238E27FC236}">
+                <a16:creationId xmlns:a16="http://schemas.microsoft.com/office/drawing/2014/main" id="{B9C60A3A-6150-1147-AB36-68FFF87A73E9}"/>
+              </a:ext>
+            </a:extLst>
+          </p:cNvPr>
+          <p:cNvCxnSpPr>
+            <a:cxnSpLocks/>
+            <a:stCxn id="2" idx="3"/>
+            <a:endCxn id="4" idx="1"/>
+          </p:cNvCxnSpPr>
+          <p:nvPr/>
+        </p:nvCxnSpPr>
+        <p:spPr>
+          <a:xfrm flipV="1">
+            <a:off x="3467100" y="1092158"/>
+            <a:ext cx="2335534" cy="5533"/>
+          </a:xfrm>
+          <a:prstGeom prst="bentConnector3">
+            <a:avLst/>
+          </a:prstGeom>
+          <a:ln>
+            <a:solidFill>
+              <a:srgbClr val="7030A0"/>
+            </a:solidFill>
+            <a:headEnd type="none"/>
+            <a:tailEnd type="triangle"/>
+          </a:ln>
+        </p:spPr>
+        <p:style>
+          <a:lnRef idx="1">
+            <a:schemeClr val="accent1"/>
+          </a:lnRef>
+          <a:fillRef idx="0">
+            <a:schemeClr val="accent1"/>
+          </a:fillRef>
+          <a:effectRef idx="0">
+            <a:schemeClr val="accent1"/>
+          </a:effectRef>
+          <a:fontRef idx="minor">
+            <a:schemeClr val="tx1"/>
+          </a:fontRef>
+        </p:style>
+      </p:cxnSp>
+      <p:sp>
+        <p:nvSpPr>
+          <p:cNvPr id="8" name="Rectangle 7">
+            <a:extLst>
+              <a:ext uri="{FF2B5EF4-FFF2-40B4-BE49-F238E27FC236}">
+                <a16:creationId xmlns:a16="http://schemas.microsoft.com/office/drawing/2014/main" id="{069301DC-6C13-564E-B6D3-B987621821CF}"/>
+              </a:ext>
+            </a:extLst>
+          </p:cNvPr>
+          <p:cNvSpPr/>
+          <p:nvPr/>
+        </p:nvSpPr>
+        <p:spPr>
+          <a:xfrm>
+            <a:off x="5794018" y="3115374"/>
+            <a:ext cx="2896506" cy="911647"/>
+          </a:xfrm>
+          <a:prstGeom prst="rect">
+            <a:avLst/>
+          </a:prstGeom>
+          <a:solidFill>
+            <a:schemeClr val="bg1"/>
+          </a:solidFill>
+          <a:ln>
+            <a:solidFill>
+              <a:srgbClr val="7030A0"/>
+            </a:solidFill>
+            <a:prstDash val="solid"/>
+          </a:ln>
+          <a:effectLst>
+            <a:outerShdw blurRad="50800" dist="38100" dir="5400000" algn="t" rotWithShape="0">
+              <a:prstClr val="black">
+                <a:alpha val="40000"/>
+              </a:prstClr>
+            </a:outerShdw>
+          </a:effectLst>
+        </p:spPr>
+        <p:style>
+          <a:lnRef idx="2">
+            <a:schemeClr val="accent1">
+              <a:shade val="50000"/>
+            </a:schemeClr>
+          </a:lnRef>
+          <a:fillRef idx="1">
+            <a:schemeClr val="accent1"/>
+          </a:fillRef>
+          <a:effectRef idx="0">
+            <a:schemeClr val="accent1"/>
+          </a:effectRef>
+          <a:fontRef idx="minor">
+            <a:schemeClr val="lt1"/>
+          </a:fontRef>
+        </p:style>
+        <p:txBody>
+          <a:bodyPr rtlCol="0" anchor="t"/>
+          <a:lstStyle/>
+          <a:p>
+            <a:pPr algn="ctr"/>
+            <a:r>
+              <a:rPr lang="en-US" sz="1050" dirty="0" err="1">
+                <a:solidFill>
+                  <a:schemeClr val="accent1">
+                    <a:lumMod val="75000"/>
+                  </a:schemeClr>
+                </a:solidFill>
+              </a:rPr>
+              <a:t>eda</a:t>
+            </a:r>
+            <a:r>
+              <a:rPr lang="en-US" sz="1050" dirty="0">
+                <a:solidFill>
+                  <a:schemeClr val="accent1">
+                    <a:lumMod val="75000"/>
+                  </a:schemeClr>
+                </a:solidFill>
+              </a:rPr>
+              <a:t>-demo-order-gitops</a:t>
+            </a:r>
+          </a:p>
+        </p:txBody>
+      </p:sp>
+      <p:pic>
+        <p:nvPicPr>
+          <p:cNvPr id="9" name="Picture 8" descr="Github Logo - Free social media icons">
+            <a:extLst>
+              <a:ext uri="{FF2B5EF4-FFF2-40B4-BE49-F238E27FC236}">
+                <a16:creationId xmlns:a16="http://schemas.microsoft.com/office/drawing/2014/main" id="{375C7724-E8A9-0348-9B61-9EB0546BB1E9}"/>
+              </a:ext>
+            </a:extLst>
+          </p:cNvPr>
+          <p:cNvPicPr>
+            <a:picLocks noChangeAspect="1" noChangeArrowheads="1"/>
+          </p:cNvPicPr>
+          <p:nvPr/>
+        </p:nvPicPr>
+        <p:blipFill>
+          <a:blip r:embed="rId3">
+            <a:extLst>
+              <a:ext uri="{28A0092B-C50C-407E-A947-70E740481C1C}">
+                <a14:useLocalDpi xmlns:a14="http://schemas.microsoft.com/office/drawing/2010/main" val="0"/>
+              </a:ext>
+            </a:extLst>
+          </a:blip>
+          <a:srcRect/>
+          <a:stretch>
+            <a:fillRect/>
+          </a:stretch>
+        </p:blipFill>
+        <p:spPr bwMode="auto">
+          <a:xfrm>
+            <a:off x="5794017" y="3115374"/>
+            <a:ext cx="356325" cy="356325"/>
+          </a:xfrm>
+          <a:prstGeom prst="rect">
+            <a:avLst/>
+          </a:prstGeom>
+          <a:noFill/>
+          <a:extLst>
+            <a:ext uri="{909E8E84-426E-40DD-AFC4-6F175D3DCCD1}">
+              <a14:hiddenFill xmlns:a14="http://schemas.microsoft.com/office/drawing/2010/main">
+                <a:solidFill>
+                  <a:srgbClr val="FFFFFF"/>
+                </a:solidFill>
+              </a14:hiddenFill>
+            </a:ext>
+          </a:extLst>
+        </p:spPr>
+      </p:pic>
+      <p:sp>
+        <p:nvSpPr>
+          <p:cNvPr id="12" name="Rectangle 11">
+            <a:extLst>
+              <a:ext uri="{FF2B5EF4-FFF2-40B4-BE49-F238E27FC236}">
+                <a16:creationId xmlns:a16="http://schemas.microsoft.com/office/drawing/2014/main" id="{25C70562-CB2A-C74E-94AE-F3C10626CE3E}"/>
+              </a:ext>
+            </a:extLst>
+          </p:cNvPr>
+          <p:cNvSpPr/>
+          <p:nvPr/>
+        </p:nvSpPr>
+        <p:spPr>
+          <a:xfrm>
+            <a:off x="477702" y="3134143"/>
+            <a:ext cx="2896506" cy="911647"/>
+          </a:xfrm>
+          <a:prstGeom prst="rect">
+            <a:avLst/>
+          </a:prstGeom>
+          <a:solidFill>
+            <a:schemeClr val="bg1"/>
+          </a:solidFill>
+          <a:ln>
+            <a:solidFill>
+              <a:srgbClr val="7030A0"/>
+            </a:solidFill>
+            <a:prstDash val="solid"/>
+          </a:ln>
+          <a:effectLst>
+            <a:outerShdw blurRad="50800" dist="38100" dir="5400000" algn="t" rotWithShape="0">
+              <a:prstClr val="black">
+                <a:alpha val="40000"/>
+              </a:prstClr>
+            </a:outerShdw>
+          </a:effectLst>
+        </p:spPr>
+        <p:style>
+          <a:lnRef idx="2">
+            <a:schemeClr val="accent1">
+              <a:shade val="50000"/>
+            </a:schemeClr>
+          </a:lnRef>
+          <a:fillRef idx="1">
+            <a:schemeClr val="accent1"/>
+          </a:fillRef>
+          <a:effectRef idx="0">
+            <a:schemeClr val="accent1"/>
+          </a:effectRef>
+          <a:fontRef idx="minor">
+            <a:schemeClr val="lt1"/>
+          </a:fontRef>
+        </p:style>
+        <p:txBody>
+          <a:bodyPr rtlCol="0" anchor="t"/>
+          <a:lstStyle/>
+          <a:p>
+            <a:pPr algn="ctr"/>
+            <a:r>
+              <a:rPr lang="en-US" sz="1050" dirty="0">
+                <a:solidFill>
+                  <a:schemeClr val="accent1">
+                    <a:lumMod val="75000"/>
+                  </a:schemeClr>
+                </a:solidFill>
+              </a:rPr>
+              <a:t>GitOps &amp; KAM</a:t>
+            </a:r>
+          </a:p>
+        </p:txBody>
+      </p:sp>
+      <p:pic>
+        <p:nvPicPr>
+          <p:cNvPr id="13" name="Picture 8">
+            <a:extLst>
+              <a:ext uri="{FF2B5EF4-FFF2-40B4-BE49-F238E27FC236}">
+                <a16:creationId xmlns:a16="http://schemas.microsoft.com/office/drawing/2014/main" id="{8F3F13ED-1CCC-BC4A-8C52-DA93CD530C7F}"/>
+              </a:ext>
+            </a:extLst>
+          </p:cNvPr>
+          <p:cNvPicPr>
+            <a:picLocks noChangeAspect="1" noChangeArrowheads="1"/>
+          </p:cNvPicPr>
+          <p:nvPr/>
+        </p:nvPicPr>
+        <p:blipFill>
+          <a:blip r:embed="rId4">
+            <a:extLst>
+              <a:ext uri="{28A0092B-C50C-407E-A947-70E740481C1C}">
+                <a14:useLocalDpi xmlns:a14="http://schemas.microsoft.com/office/drawing/2010/main" val="0"/>
+              </a:ext>
+            </a:extLst>
+          </a:blip>
+          <a:srcRect/>
+          <a:stretch>
+            <a:fillRect/>
+          </a:stretch>
+        </p:blipFill>
+        <p:spPr bwMode="auto">
+          <a:xfrm>
+            <a:off x="477701" y="3087498"/>
+            <a:ext cx="345923" cy="345923"/>
+          </a:xfrm>
+          <a:prstGeom prst="rect">
+            <a:avLst/>
+          </a:prstGeom>
+          <a:noFill/>
+          <a:extLst>
+            <a:ext uri="{909E8E84-426E-40DD-AFC4-6F175D3DCCD1}">
+              <a14:hiddenFill xmlns:a14="http://schemas.microsoft.com/office/drawing/2010/main">
+                <a:solidFill>
+                  <a:srgbClr val="FFFFFF"/>
+                </a:solidFill>
+              </a14:hiddenFill>
+            </a:ext>
+          </a:extLst>
+        </p:spPr>
+      </p:pic>
+      <p:cxnSp>
+        <p:nvCxnSpPr>
+          <p:cNvPr id="14" name="Elbow Connector 13">
+            <a:extLst>
+              <a:ext uri="{FF2B5EF4-FFF2-40B4-BE49-F238E27FC236}">
+                <a16:creationId xmlns:a16="http://schemas.microsoft.com/office/drawing/2014/main" id="{DF3F5B54-E133-1E4D-AF16-4EE4E2EF3EA0}"/>
+              </a:ext>
+            </a:extLst>
+          </p:cNvPr>
+          <p:cNvCxnSpPr>
+            <a:cxnSpLocks/>
+            <a:stCxn id="12" idx="3"/>
+            <a:endCxn id="8" idx="1"/>
+          </p:cNvCxnSpPr>
+          <p:nvPr/>
+        </p:nvCxnSpPr>
+        <p:spPr>
+          <a:xfrm flipV="1">
+            <a:off x="3374208" y="3571198"/>
+            <a:ext cx="2419810" cy="18769"/>
+          </a:xfrm>
+          <a:prstGeom prst="bentConnector3">
+            <a:avLst/>
+          </a:prstGeom>
+          <a:ln>
+            <a:solidFill>
+              <a:srgbClr val="7030A0"/>
+            </a:solidFill>
+            <a:headEnd type="none"/>
+            <a:tailEnd type="triangle"/>
+          </a:ln>
+        </p:spPr>
+        <p:style>
+          <a:lnRef idx="1">
+            <a:schemeClr val="accent1"/>
+          </a:lnRef>
+          <a:fillRef idx="0">
+            <a:schemeClr val="accent1"/>
+          </a:fillRef>
+          <a:effectRef idx="0">
+            <a:schemeClr val="accent1"/>
+          </a:effectRef>
+          <a:fontRef idx="minor">
+            <a:schemeClr val="tx1"/>
+          </a:fontRef>
+        </p:style>
+      </p:cxnSp>
+      <p:sp>
+        <p:nvSpPr>
+          <p:cNvPr id="22" name="TextBox 21">
+            <a:extLst>
+              <a:ext uri="{FF2B5EF4-FFF2-40B4-BE49-F238E27FC236}">
+                <a16:creationId xmlns:a16="http://schemas.microsoft.com/office/drawing/2014/main" id="{EF6D1C4E-D8D2-8448-82E2-59D405D2B6D0}"/>
+              </a:ext>
+            </a:extLst>
+          </p:cNvPr>
+          <p:cNvSpPr txBox="1"/>
+          <p:nvPr/>
+        </p:nvSpPr>
+        <p:spPr>
+          <a:xfrm>
+            <a:off x="9308528" y="1958364"/>
+            <a:ext cx="1923219" cy="1384995"/>
+          </a:xfrm>
+          <a:prstGeom prst="rect">
+            <a:avLst/>
+          </a:prstGeom>
+          <a:noFill/>
+        </p:spPr>
+        <p:txBody>
+          <a:bodyPr wrap="none" rtlCol="0">
+            <a:spAutoFit/>
+          </a:bodyPr>
+          <a:lstStyle/>
+          <a:p>
+            <a:r>
+              <a:rPr lang="en-US" sz="1400" dirty="0"/>
+              <a:t>Dev, stating, production</a:t>
+            </a:r>
+          </a:p>
+          <a:p>
+            <a:r>
+              <a:rPr lang="en-US" sz="1400" dirty="0"/>
+              <a:t>Services</a:t>
+            </a:r>
+          </a:p>
+          <a:p>
+            <a:r>
+              <a:rPr lang="en-US" sz="1400" dirty="0"/>
+              <a:t>CI pipelines, webhook</a:t>
+            </a:r>
+          </a:p>
+          <a:p>
+            <a:r>
+              <a:rPr lang="en-US" sz="1400" dirty="0"/>
+              <a:t>Secrets</a:t>
+            </a:r>
+          </a:p>
+          <a:p>
+            <a:r>
+              <a:rPr lang="en-US" sz="1400" dirty="0"/>
+              <a:t>CD </a:t>
+            </a:r>
+          </a:p>
+          <a:p>
+            <a:endParaRPr lang="en-US" sz="1400" dirty="0"/>
+          </a:p>
+        </p:txBody>
+      </p:sp>
+      <p:sp>
+        <p:nvSpPr>
+          <p:cNvPr id="23" name="Rectangle 22">
+            <a:extLst>
+              <a:ext uri="{FF2B5EF4-FFF2-40B4-BE49-F238E27FC236}">
+                <a16:creationId xmlns:a16="http://schemas.microsoft.com/office/drawing/2014/main" id="{433A4D71-829C-384F-97B7-7D7650E467D6}"/>
+              </a:ext>
+            </a:extLst>
+          </p:cNvPr>
+          <p:cNvSpPr/>
+          <p:nvPr/>
+        </p:nvSpPr>
+        <p:spPr>
+          <a:xfrm>
+            <a:off x="5802634" y="1668512"/>
+            <a:ext cx="2896506" cy="911647"/>
+          </a:xfrm>
+          <a:prstGeom prst="rect">
+            <a:avLst/>
+          </a:prstGeom>
+          <a:solidFill>
+            <a:schemeClr val="bg1"/>
+          </a:solidFill>
+          <a:ln>
+            <a:solidFill>
+              <a:srgbClr val="7030A0"/>
+            </a:solidFill>
+            <a:prstDash val="solid"/>
+          </a:ln>
+          <a:effectLst>
+            <a:outerShdw blurRad="50800" dist="38100" dir="5400000" algn="t" rotWithShape="0">
+              <a:prstClr val="black">
+                <a:alpha val="40000"/>
+              </a:prstClr>
+            </a:outerShdw>
+          </a:effectLst>
+        </p:spPr>
+        <p:style>
+          <a:lnRef idx="2">
+            <a:schemeClr val="accent1">
+              <a:shade val="50000"/>
+            </a:schemeClr>
+          </a:lnRef>
+          <a:fillRef idx="1">
+            <a:schemeClr val="accent1"/>
+          </a:fillRef>
+          <a:effectRef idx="0">
+            <a:schemeClr val="accent1"/>
+          </a:effectRef>
+          <a:fontRef idx="minor">
+            <a:schemeClr val="lt1"/>
+          </a:fontRef>
+        </p:style>
+        <p:txBody>
+          <a:bodyPr rtlCol="0" anchor="t"/>
+          <a:lstStyle/>
+          <a:p>
+            <a:pPr algn="ctr"/>
+            <a:r>
+              <a:rPr lang="en-US" sz="1050" dirty="0" err="1">
+                <a:solidFill>
+                  <a:schemeClr val="accent1">
+                    <a:lumMod val="75000"/>
+                  </a:schemeClr>
+                </a:solidFill>
+              </a:rPr>
+              <a:t>eda</a:t>
+            </a:r>
+            <a:r>
+              <a:rPr lang="en-US" sz="1050" dirty="0">
+                <a:solidFill>
+                  <a:schemeClr val="accent1">
+                    <a:lumMod val="75000"/>
+                  </a:schemeClr>
+                </a:solidFill>
+              </a:rPr>
+              <a:t>-demo-consumer-</a:t>
+            </a:r>
+            <a:r>
+              <a:rPr lang="en-US" sz="1050" dirty="0" err="1">
+                <a:solidFill>
+                  <a:schemeClr val="accent1">
+                    <a:lumMod val="75000"/>
+                  </a:schemeClr>
+                </a:solidFill>
+              </a:rPr>
+              <a:t>ms</a:t>
+            </a:r>
+            <a:endParaRPr lang="en-US" sz="1050" dirty="0">
+              <a:solidFill>
+                <a:schemeClr val="accent1">
+                  <a:lumMod val="75000"/>
+                </a:schemeClr>
+              </a:solidFill>
+            </a:endParaRPr>
+          </a:p>
+        </p:txBody>
+      </p:sp>
+      <p:pic>
+        <p:nvPicPr>
+          <p:cNvPr id="24" name="Picture 23" descr="Github Logo - Free social media icons">
+            <a:extLst>
+              <a:ext uri="{FF2B5EF4-FFF2-40B4-BE49-F238E27FC236}">
+                <a16:creationId xmlns:a16="http://schemas.microsoft.com/office/drawing/2014/main" id="{8521C21F-7E01-FE45-91F9-FF65800BEB5F}"/>
+              </a:ext>
+            </a:extLst>
+          </p:cNvPr>
+          <p:cNvPicPr>
+            <a:picLocks noChangeAspect="1" noChangeArrowheads="1"/>
+          </p:cNvPicPr>
+          <p:nvPr/>
+        </p:nvPicPr>
+        <p:blipFill>
+          <a:blip r:embed="rId3">
+            <a:extLst>
+              <a:ext uri="{28A0092B-C50C-407E-A947-70E740481C1C}">
+                <a14:useLocalDpi xmlns:a14="http://schemas.microsoft.com/office/drawing/2010/main" val="0"/>
+              </a:ext>
+            </a:extLst>
+          </a:blip>
+          <a:srcRect/>
+          <a:stretch>
+            <a:fillRect/>
+          </a:stretch>
+        </p:blipFill>
+        <p:spPr bwMode="auto">
+          <a:xfrm>
+            <a:off x="5836247" y="1691405"/>
+            <a:ext cx="356325" cy="356325"/>
+          </a:xfrm>
+          <a:prstGeom prst="rect">
+            <a:avLst/>
+          </a:prstGeom>
+          <a:noFill/>
+          <a:extLst>
+            <a:ext uri="{909E8E84-426E-40DD-AFC4-6F175D3DCCD1}">
+              <a14:hiddenFill xmlns:a14="http://schemas.microsoft.com/office/drawing/2010/main">
+                <a:solidFill>
+                  <a:srgbClr val="FFFFFF"/>
+                </a:solidFill>
+              </a14:hiddenFill>
+            </a:ext>
+          </a:extLst>
+        </p:spPr>
+      </p:pic>
+      <p:cxnSp>
+        <p:nvCxnSpPr>
+          <p:cNvPr id="21" name="Elbow Connector 20">
+            <a:extLst>
+              <a:ext uri="{FF2B5EF4-FFF2-40B4-BE49-F238E27FC236}">
+                <a16:creationId xmlns:a16="http://schemas.microsoft.com/office/drawing/2014/main" id="{502474A7-E335-654F-BD6B-C4D0058D498C}"/>
+              </a:ext>
+            </a:extLst>
+          </p:cNvPr>
+          <p:cNvCxnSpPr>
+            <a:cxnSpLocks/>
+            <a:stCxn id="2" idx="3"/>
+            <a:endCxn id="23" idx="1"/>
+          </p:cNvCxnSpPr>
+          <p:nvPr/>
+        </p:nvCxnSpPr>
+        <p:spPr>
+          <a:xfrm>
+            <a:off x="3467100" y="1097691"/>
+            <a:ext cx="2335534" cy="1026645"/>
+          </a:xfrm>
+          <a:prstGeom prst="bentConnector3">
+            <a:avLst/>
+          </a:prstGeom>
+          <a:ln>
+            <a:solidFill>
+              <a:srgbClr val="7030A0"/>
+            </a:solidFill>
+            <a:headEnd type="none"/>
+            <a:tailEnd type="triangle"/>
+          </a:ln>
+        </p:spPr>
+        <p:style>
+          <a:lnRef idx="1">
+            <a:schemeClr val="accent1"/>
+          </a:lnRef>
+          <a:fillRef idx="0">
+            <a:schemeClr val="accent1"/>
+          </a:fillRef>
+          <a:effectRef idx="0">
+            <a:schemeClr val="accent1"/>
+          </a:effectRef>
+          <a:fontRef idx="minor">
+            <a:schemeClr val="tx1"/>
+          </a:fontRef>
+        </p:style>
+      </p:cxnSp>
+    </p:spTree>
+    <p:extLst>
+      <p:ext uri="{BB962C8B-B14F-4D97-AF65-F5344CB8AC3E}">
+        <p14:creationId xmlns:p14="http://schemas.microsoft.com/office/powerpoint/2010/main" val="232935086"/>
       </p:ext>
     </p:extLst>
   </p:cSld>
@@ -33781,7 +34581,7 @@
             <a:effectLst/>
             <a:extLst>
               <a:ext uri="{C572A759-6A51-4108-AA02-DFA0A04FC94B}">
-                <ma14:wrappingTextBoxFlag xmlns:ma14="http://schemas.microsoft.com/office/mac/drawingml/2011/main" xmlns="" val="1"/>
+                <ma14:wrappingTextBoxFlag xmlns="" xmlns:ma14="http://schemas.microsoft.com/office/mac/drawingml/2011/main" val="1"/>
               </a:ext>
             </a:extLst>
           </p:spPr>
@@ -33897,7 +34697,7 @@
             <a:effectLst/>
             <a:extLst>
               <a:ext uri="{C572A759-6A51-4108-AA02-DFA0A04FC94B}">
-                <ma14:wrappingTextBoxFlag xmlns:ma14="http://schemas.microsoft.com/office/mac/drawingml/2011/main" xmlns="" val="1"/>
+                <ma14:wrappingTextBoxFlag xmlns="" xmlns:ma14="http://schemas.microsoft.com/office/mac/drawingml/2011/main" val="1"/>
               </a:ext>
             </a:extLst>
           </p:spPr>
@@ -34013,7 +34813,7 @@
             <a:effectLst/>
             <a:extLst>
               <a:ext uri="{C572A759-6A51-4108-AA02-DFA0A04FC94B}">
-                <ma14:wrappingTextBoxFlag xmlns:ma14="http://schemas.microsoft.com/office/mac/drawingml/2011/main" xmlns="" val="1"/>
+                <ma14:wrappingTextBoxFlag xmlns="" xmlns:ma14="http://schemas.microsoft.com/office/mac/drawingml/2011/main" val="1"/>
               </a:ext>
             </a:extLst>
           </p:spPr>
@@ -34129,7 +34929,7 @@
             <a:effectLst/>
             <a:extLst>
               <a:ext uri="{C572A759-6A51-4108-AA02-DFA0A04FC94B}">
-                <ma14:wrappingTextBoxFlag xmlns:ma14="http://schemas.microsoft.com/office/mac/drawingml/2011/main" xmlns="" val="1"/>
+                <ma14:wrappingTextBoxFlag xmlns="" xmlns:ma14="http://schemas.microsoft.com/office/mac/drawingml/2011/main" val="1"/>
               </a:ext>
             </a:extLst>
           </p:spPr>
@@ -34245,7 +35045,7 @@
             <a:effectLst/>
             <a:extLst>
               <a:ext uri="{C572A759-6A51-4108-AA02-DFA0A04FC94B}">
-                <ma14:wrappingTextBoxFlag xmlns:ma14="http://schemas.microsoft.com/office/mac/drawingml/2011/main" xmlns="" val="1"/>
+                <ma14:wrappingTextBoxFlag xmlns="" xmlns:ma14="http://schemas.microsoft.com/office/mac/drawingml/2011/main" val="1"/>
               </a:ext>
             </a:extLst>
           </p:spPr>
@@ -34361,7 +35161,7 @@
             <a:effectLst/>
             <a:extLst>
               <a:ext uri="{C572A759-6A51-4108-AA02-DFA0A04FC94B}">
-                <ma14:wrappingTextBoxFlag xmlns:ma14="http://schemas.microsoft.com/office/mac/drawingml/2011/main" xmlns="" val="1"/>
+                <ma14:wrappingTextBoxFlag xmlns="" xmlns:ma14="http://schemas.microsoft.com/office/mac/drawingml/2011/main" val="1"/>
               </a:ext>
             </a:extLst>
           </p:spPr>
@@ -36041,7 +36841,7 @@
             <a:effectLst/>
             <a:extLst>
               <a:ext uri="{C572A759-6A51-4108-AA02-DFA0A04FC94B}">
-                <ma14:wrappingTextBoxFlag xmlns="" xmlns:ma14="http://schemas.microsoft.com/office/mac/drawingml/2011/main" val="1"/>
+                <ma14:wrappingTextBoxFlag xmlns:ma14="http://schemas.microsoft.com/office/mac/drawingml/2011/main" xmlns="" val="1"/>
               </a:ext>
             </a:extLst>
           </p:spPr>
@@ -36694,7 +37494,7 @@
             <a:effectLst/>
             <a:extLst>
               <a:ext uri="{C572A759-6A51-4108-AA02-DFA0A04FC94B}">
-                <ma14:wrappingTextBoxFlag xmlns:ma14="http://schemas.microsoft.com/office/mac/drawingml/2011/main" xmlns="" val="1"/>
+                <ma14:wrappingTextBoxFlag xmlns="" xmlns:ma14="http://schemas.microsoft.com/office/mac/drawingml/2011/main" val="1"/>
               </a:ext>
             </a:extLst>
           </p:spPr>
@@ -37183,7 +37983,7 @@
             <a:effectLst/>
             <a:extLst>
               <a:ext uri="{C572A759-6A51-4108-AA02-DFA0A04FC94B}">
-                <ma14:wrappingTextBoxFlag xmlns="" xmlns:ma14="http://schemas.microsoft.com/office/mac/drawingml/2011/main" val="1"/>
+                <ma14:wrappingTextBoxFlag xmlns:ma14="http://schemas.microsoft.com/office/mac/drawingml/2011/main" xmlns="" val="1"/>
               </a:ext>
             </a:extLst>
           </p:spPr>
@@ -37299,7 +38099,7 @@
             <a:effectLst/>
             <a:extLst>
               <a:ext uri="{C572A759-6A51-4108-AA02-DFA0A04FC94B}">
-                <ma14:wrappingTextBoxFlag xmlns="" xmlns:ma14="http://schemas.microsoft.com/office/mac/drawingml/2011/main" val="1"/>
+                <ma14:wrappingTextBoxFlag xmlns:ma14="http://schemas.microsoft.com/office/mac/drawingml/2011/main" xmlns="" val="1"/>
               </a:ext>
             </a:extLst>
           </p:spPr>
@@ -37629,7 +38429,7 @@
             <a:effectLst/>
             <a:extLst>
               <a:ext uri="{C572A759-6A51-4108-AA02-DFA0A04FC94B}">
-                <ma14:wrappingTextBoxFlag xmlns="" xmlns:ma14="http://schemas.microsoft.com/office/mac/drawingml/2011/main" val="1"/>
+                <ma14:wrappingTextBoxFlag xmlns:ma14="http://schemas.microsoft.com/office/mac/drawingml/2011/main" xmlns="" val="1"/>
               </a:ext>
             </a:extLst>
           </p:spPr>
@@ -38057,7 +38857,7 @@
             <a:effectLst/>
             <a:extLst>
               <a:ext uri="{C572A759-6A51-4108-AA02-DFA0A04FC94B}">
-                <ma14:wrappingTextBoxFlag xmlns="" xmlns:ma14="http://schemas.microsoft.com/office/mac/drawingml/2011/main" val="1"/>
+                <ma14:wrappingTextBoxFlag xmlns:ma14="http://schemas.microsoft.com/office/mac/drawingml/2011/main" xmlns="" val="1"/>
               </a:ext>
             </a:extLst>
           </p:spPr>
@@ -39040,7 +39840,7 @@
             <a:effectLst/>
             <a:extLst>
               <a:ext uri="{C572A759-6A51-4108-AA02-DFA0A04FC94B}">
-                <ma14:wrappingTextBoxFlag xmlns="" xmlns:ma14="http://schemas.microsoft.com/office/mac/drawingml/2011/main" val="1"/>
+                <ma14:wrappingTextBoxFlag xmlns:ma14="http://schemas.microsoft.com/office/mac/drawingml/2011/main" xmlns="" val="1"/>
               </a:ext>
             </a:extLst>
           </p:spPr>
@@ -39295,7 +40095,7 @@
             <a:effectLst/>
             <a:extLst>
               <a:ext uri="{C572A759-6A51-4108-AA02-DFA0A04FC94B}">
-                <ma14:wrappingTextBoxFlag xmlns="" xmlns:ma14="http://schemas.microsoft.com/office/mac/drawingml/2011/main" val="1"/>
+                <ma14:wrappingTextBoxFlag xmlns:ma14="http://schemas.microsoft.com/office/mac/drawingml/2011/main" xmlns="" val="1"/>
               </a:ext>
             </a:extLst>
           </p:spPr>
@@ -39625,7 +40425,7 @@
             <a:effectLst/>
             <a:extLst>
               <a:ext uri="{C572A759-6A51-4108-AA02-DFA0A04FC94B}">
-                <ma14:wrappingTextBoxFlag xmlns="" xmlns:ma14="http://schemas.microsoft.com/office/mac/drawingml/2011/main" val="1"/>
+                <ma14:wrappingTextBoxFlag xmlns:ma14="http://schemas.microsoft.com/office/mac/drawingml/2011/main" xmlns="" val="1"/>
               </a:ext>
             </a:extLst>
           </p:spPr>
@@ -39852,7 +40652,7 @@
             <a:effectLst/>
             <a:extLst>
               <a:ext uri="{C572A759-6A51-4108-AA02-DFA0A04FC94B}">
-                <ma14:wrappingTextBoxFlag xmlns="" xmlns:ma14="http://schemas.microsoft.com/office/mac/drawingml/2011/main" val="1"/>
+                <ma14:wrappingTextBoxFlag xmlns:ma14="http://schemas.microsoft.com/office/mac/drawingml/2011/main" xmlns="" val="1"/>
               </a:ext>
             </a:extLst>
           </p:spPr>
@@ -40193,7 +40993,7 @@
             <a:effectLst/>
             <a:extLst>
               <a:ext uri="{C572A759-6A51-4108-AA02-DFA0A04FC94B}">
-                <ma14:wrappingTextBoxFlag xmlns="" xmlns:ma14="http://schemas.microsoft.com/office/mac/drawingml/2011/main" val="1"/>
+                <ma14:wrappingTextBoxFlag xmlns:ma14="http://schemas.microsoft.com/office/mac/drawingml/2011/main" xmlns="" val="1"/>
               </a:ext>
             </a:extLst>
           </p:spPr>
@@ -40831,7 +41631,7 @@
             <a:effectLst/>
             <a:extLst>
               <a:ext uri="{C572A759-6A51-4108-AA02-DFA0A04FC94B}">
-                <ma14:wrappingTextBoxFlag xmlns="" xmlns:ma14="http://schemas.microsoft.com/office/mac/drawingml/2011/main" val="1"/>
+                <ma14:wrappingTextBoxFlag xmlns:ma14="http://schemas.microsoft.com/office/mac/drawingml/2011/main" xmlns="" val="1"/>
               </a:ext>
             </a:extLst>
           </p:spPr>
@@ -40947,7 +41747,7 @@
             <a:effectLst/>
             <a:extLst>
               <a:ext uri="{C572A759-6A51-4108-AA02-DFA0A04FC94B}">
-                <ma14:wrappingTextBoxFlag xmlns="" xmlns:ma14="http://schemas.microsoft.com/office/mac/drawingml/2011/main" val="1"/>
+                <ma14:wrappingTextBoxFlag xmlns:ma14="http://schemas.microsoft.com/office/mac/drawingml/2011/main" xmlns="" val="1"/>
               </a:ext>
             </a:extLst>
           </p:spPr>
@@ -42139,7 +42939,7 @@
             <a:effectLst/>
             <a:extLst>
               <a:ext uri="{C572A759-6A51-4108-AA02-DFA0A04FC94B}">
-                <ma14:wrappingTextBoxFlag xmlns="" xmlns:ma14="http://schemas.microsoft.com/office/mac/drawingml/2011/main" val="1"/>
+                <ma14:wrappingTextBoxFlag xmlns:ma14="http://schemas.microsoft.com/office/mac/drawingml/2011/main" xmlns="" val="1"/>
               </a:ext>
             </a:extLst>
           </p:spPr>
@@ -42255,7 +43055,7 @@
             <a:effectLst/>
             <a:extLst>
               <a:ext uri="{C572A759-6A51-4108-AA02-DFA0A04FC94B}">
-                <ma14:wrappingTextBoxFlag xmlns="" xmlns:ma14="http://schemas.microsoft.com/office/mac/drawingml/2011/main" val="1"/>
+                <ma14:wrappingTextBoxFlag xmlns:ma14="http://schemas.microsoft.com/office/mac/drawingml/2011/main" xmlns="" val="1"/>
               </a:ext>
             </a:extLst>
           </p:spPr>
@@ -42371,7 +43171,7 @@
             <a:effectLst/>
             <a:extLst>
               <a:ext uri="{C572A759-6A51-4108-AA02-DFA0A04FC94B}">
-                <ma14:wrappingTextBoxFlag xmlns="" xmlns:ma14="http://schemas.microsoft.com/office/mac/drawingml/2011/main" val="1"/>
+                <ma14:wrappingTextBoxFlag xmlns:ma14="http://schemas.microsoft.com/office/mac/drawingml/2011/main" xmlns="" val="1"/>
               </a:ext>
             </a:extLst>
           </p:spPr>
@@ -42782,7 +43582,7 @@
             <a:effectLst/>
             <a:extLst>
               <a:ext uri="{C572A759-6A51-4108-AA02-DFA0A04FC94B}">
-                <ma14:wrappingTextBoxFlag xmlns="" xmlns:ma14="http://schemas.microsoft.com/office/mac/drawingml/2011/main" val="1"/>
+                <ma14:wrappingTextBoxFlag xmlns:ma14="http://schemas.microsoft.com/office/mac/drawingml/2011/main" xmlns="" val="1"/>
               </a:ext>
             </a:extLst>
           </p:spPr>
@@ -42898,7 +43698,7 @@
             <a:effectLst/>
             <a:extLst>
               <a:ext uri="{C572A759-6A51-4108-AA02-DFA0A04FC94B}">
-                <ma14:wrappingTextBoxFlag xmlns="" xmlns:ma14="http://schemas.microsoft.com/office/mac/drawingml/2011/main" val="1"/>
+                <ma14:wrappingTextBoxFlag xmlns:ma14="http://schemas.microsoft.com/office/mac/drawingml/2011/main" xmlns="" val="1"/>
               </a:ext>
             </a:extLst>
           </p:spPr>
@@ -43014,7 +43814,7 @@
             <a:effectLst/>
             <a:extLst>
               <a:ext uri="{C572A759-6A51-4108-AA02-DFA0A04FC94B}">
-                <ma14:wrappingTextBoxFlag xmlns="" xmlns:ma14="http://schemas.microsoft.com/office/mac/drawingml/2011/main" val="1"/>
+                <ma14:wrappingTextBoxFlag xmlns:ma14="http://schemas.microsoft.com/office/mac/drawingml/2011/main" xmlns="" val="1"/>
               </a:ext>
             </a:extLst>
           </p:spPr>
@@ -43390,7 +44190,7 @@
             <a:effectLst/>
             <a:extLst>
               <a:ext uri="{C572A759-6A51-4108-AA02-DFA0A04FC94B}">
-                <ma14:wrappingTextBoxFlag xmlns="" xmlns:ma14="http://schemas.microsoft.com/office/mac/drawingml/2011/main" val="1"/>
+                <ma14:wrappingTextBoxFlag xmlns:ma14="http://schemas.microsoft.com/office/mac/drawingml/2011/main" xmlns="" val="1"/>
               </a:ext>
             </a:extLst>
           </p:spPr>
@@ -43523,7 +44323,7 @@
             <a:effectLst/>
             <a:extLst>
               <a:ext uri="{C572A759-6A51-4108-AA02-DFA0A04FC94B}">
-                <ma14:wrappingTextBoxFlag xmlns="" xmlns:ma14="http://schemas.microsoft.com/office/mac/drawingml/2011/main" val="1"/>
+                <ma14:wrappingTextBoxFlag xmlns:ma14="http://schemas.microsoft.com/office/mac/drawingml/2011/main" xmlns="" val="1"/>
               </a:ext>
             </a:extLst>
           </p:spPr>
@@ -43639,7 +44439,7 @@
             <a:effectLst/>
             <a:extLst>
               <a:ext uri="{C572A759-6A51-4108-AA02-DFA0A04FC94B}">
-                <ma14:wrappingTextBoxFlag xmlns="" xmlns:ma14="http://schemas.microsoft.com/office/mac/drawingml/2011/main" val="1"/>
+                <ma14:wrappingTextBoxFlag xmlns:ma14="http://schemas.microsoft.com/office/mac/drawingml/2011/main" xmlns="" val="1"/>
               </a:ext>
             </a:extLst>
           </p:spPr>
@@ -43852,7 +44652,7 @@
             <a:effectLst/>
             <a:extLst>
               <a:ext uri="{C572A759-6A51-4108-AA02-DFA0A04FC94B}">
-                <ma14:wrappingTextBoxFlag xmlns:ma14="http://schemas.microsoft.com/office/mac/drawingml/2011/main" xmlns="" val="1"/>
+                <ma14:wrappingTextBoxFlag xmlns="" xmlns:ma14="http://schemas.microsoft.com/office/mac/drawingml/2011/main" val="1"/>
               </a:ext>
             </a:extLst>
           </p:spPr>
@@ -44083,7 +44883,7 @@
               <a:effectLst/>
               <a:extLst>
                 <a:ext uri="{C572A759-6A51-4108-AA02-DFA0A04FC94B}">
-                  <ma14:wrappingTextBoxFlag xmlns:ma14="http://schemas.microsoft.com/office/mac/drawingml/2011/main" xmlns="" val="1"/>
+                  <ma14:wrappingTextBoxFlag xmlns="" xmlns:ma14="http://schemas.microsoft.com/office/mac/drawingml/2011/main" val="1"/>
                 </a:ext>
               </a:extLst>
             </p:spPr>
@@ -44549,7 +45349,7 @@
               <a:effectLst/>
               <a:extLst>
                 <a:ext uri="{C572A759-6A51-4108-AA02-DFA0A04FC94B}">
-                  <ma14:wrappingTextBoxFlag xmlns:ma14="http://schemas.microsoft.com/office/mac/drawingml/2011/main" xmlns="" val="1"/>
+                  <ma14:wrappingTextBoxFlag xmlns="" xmlns:ma14="http://schemas.microsoft.com/office/mac/drawingml/2011/main" val="1"/>
                 </a:ext>
               </a:extLst>
             </p:spPr>
@@ -45285,7 +46085,7 @@
               <a:effectLst/>
               <a:extLst>
                 <a:ext uri="{C572A759-6A51-4108-AA02-DFA0A04FC94B}">
-                  <ma14:wrappingTextBoxFlag xmlns:ma14="http://schemas.microsoft.com/office/mac/drawingml/2011/main" xmlns="" val="1"/>
+                  <ma14:wrappingTextBoxFlag xmlns="" xmlns:ma14="http://schemas.microsoft.com/office/mac/drawingml/2011/main" val="1"/>
                 </a:ext>
               </a:extLst>
             </p:spPr>
@@ -45777,7 +46577,7 @@
             <a:effectLst/>
             <a:extLst>
               <a:ext uri="{C572A759-6A51-4108-AA02-DFA0A04FC94B}">
-                <ma14:wrappingTextBoxFlag xmlns:ma14="http://schemas.microsoft.com/office/mac/drawingml/2011/main" xmlns="" val="1"/>
+                <ma14:wrappingTextBoxFlag xmlns="" xmlns:ma14="http://schemas.microsoft.com/office/mac/drawingml/2011/main" val="1"/>
               </a:ext>
             </a:extLst>
           </p:spPr>
@@ -45910,7 +46710,7 @@
             <a:effectLst/>
             <a:extLst>
               <a:ext uri="{C572A759-6A51-4108-AA02-DFA0A04FC94B}">
-                <ma14:wrappingTextBoxFlag xmlns:ma14="http://schemas.microsoft.com/office/mac/drawingml/2011/main" xmlns="" val="1"/>
+                <ma14:wrappingTextBoxFlag xmlns="" xmlns:ma14="http://schemas.microsoft.com/office/mac/drawingml/2011/main" val="1"/>
               </a:ext>
             </a:extLst>
           </p:spPr>
@@ -46043,7 +46843,7 @@
             <a:effectLst/>
             <a:extLst>
               <a:ext uri="{C572A759-6A51-4108-AA02-DFA0A04FC94B}">
-                <ma14:wrappingTextBoxFlag xmlns="" xmlns:ma14="http://schemas.microsoft.com/office/mac/drawingml/2011/main" val="1"/>
+                <ma14:wrappingTextBoxFlag xmlns:ma14="http://schemas.microsoft.com/office/mac/drawingml/2011/main" xmlns="" val="1"/>
               </a:ext>
             </a:extLst>
           </p:spPr>
@@ -46274,7 +47074,7 @@
               <a:effectLst/>
               <a:extLst>
                 <a:ext uri="{C572A759-6A51-4108-AA02-DFA0A04FC94B}">
-                  <ma14:wrappingTextBoxFlag xmlns="" xmlns:ma14="http://schemas.microsoft.com/office/mac/drawingml/2011/main" val="1"/>
+                  <ma14:wrappingTextBoxFlag xmlns:ma14="http://schemas.microsoft.com/office/mac/drawingml/2011/main" xmlns="" val="1"/>
                 </a:ext>
               </a:extLst>
             </p:spPr>
@@ -46652,7 +47452,7 @@
               <a:effectLst/>
               <a:extLst>
                 <a:ext uri="{C572A759-6A51-4108-AA02-DFA0A04FC94B}">
-                  <ma14:wrappingTextBoxFlag xmlns="" xmlns:ma14="http://schemas.microsoft.com/office/mac/drawingml/2011/main" val="1"/>
+                  <ma14:wrappingTextBoxFlag xmlns:ma14="http://schemas.microsoft.com/office/mac/drawingml/2011/main" xmlns="" val="1"/>
                 </a:ext>
               </a:extLst>
             </p:spPr>
@@ -47388,7 +48188,7 @@
               <a:effectLst/>
               <a:extLst>
                 <a:ext uri="{C572A759-6A51-4108-AA02-DFA0A04FC94B}">
-                  <ma14:wrappingTextBoxFlag xmlns="" xmlns:ma14="http://schemas.microsoft.com/office/mac/drawingml/2011/main" val="1"/>
+                  <ma14:wrappingTextBoxFlag xmlns:ma14="http://schemas.microsoft.com/office/mac/drawingml/2011/main" xmlns="" val="1"/>
                 </a:ext>
               </a:extLst>
             </p:spPr>
@@ -47628,7 +48428,7 @@
             <a:effectLst/>
             <a:extLst>
               <a:ext uri="{C572A759-6A51-4108-AA02-DFA0A04FC94B}">
-                <ma14:wrappingTextBoxFlag xmlns="" xmlns:ma14="http://schemas.microsoft.com/office/mac/drawingml/2011/main" val="1"/>
+                <ma14:wrappingTextBoxFlag xmlns:ma14="http://schemas.microsoft.com/office/mac/drawingml/2011/main" xmlns="" val="1"/>
               </a:ext>
             </a:extLst>
           </p:spPr>
@@ -47881,7 +48681,7 @@
             <a:effectLst/>
             <a:extLst>
               <a:ext uri="{C572A759-6A51-4108-AA02-DFA0A04FC94B}">
-                <ma14:wrappingTextBoxFlag xmlns="" xmlns:ma14="http://schemas.microsoft.com/office/mac/drawingml/2011/main" val="1"/>
+                <ma14:wrappingTextBoxFlag xmlns:ma14="http://schemas.microsoft.com/office/mac/drawingml/2011/main" xmlns="" val="1"/>
               </a:ext>
             </a:extLst>
           </p:spPr>
@@ -48213,7 +49013,7 @@
               <a:effectLst/>
               <a:extLst>
                 <a:ext uri="{C572A759-6A51-4108-AA02-DFA0A04FC94B}">
-                  <ma14:wrappingTextBoxFlag xmlns="" xmlns:ma14="http://schemas.microsoft.com/office/mac/drawingml/2011/main" val="1"/>
+                  <ma14:wrappingTextBoxFlag xmlns:ma14="http://schemas.microsoft.com/office/mac/drawingml/2011/main" xmlns="" val="1"/>
                 </a:ext>
               </a:extLst>
             </p:spPr>
@@ -48406,7 +49206,7 @@
             <a:effectLst/>
             <a:extLst>
               <a:ext uri="{C572A759-6A51-4108-AA02-DFA0A04FC94B}">
-                <ma14:wrappingTextBoxFlag xmlns="" xmlns:ma14="http://schemas.microsoft.com/office/mac/drawingml/2011/main" val="1"/>
+                <ma14:wrappingTextBoxFlag xmlns:ma14="http://schemas.microsoft.com/office/mac/drawingml/2011/main" xmlns="" val="1"/>
               </a:ext>
             </a:extLst>
           </p:spPr>

</xml_diff>